<commit_message>
Update Data Sources from LFX
Signed-off-by: github-actions[bot] <41898282+github-actions[bot]@users.noreply.github.com>
</commit_message>
<xml_diff>
--- a/overview_deck/LF Energy High Level Overview.pptx
+++ b/overview_deck/LF Energy High Level Overview.pptx
@@ -25946,7 +25946,7 @@
             <a:tbl>
               <a:tblPr>
                 <a:noFill/>
-                <a:tableStyleId>{213B4FB6-F5A2-4B1F-A40E-250E5A8CA83A}</a:tableStyleId>
+                <a:tableStyleId>{76AEB783-E90B-4FD3-9B3C-ECA70C141418}</a:tableStyleId>
               </a:tblPr>
               <a:tblGrid>
                 <a:gridCol w="1695200"/>
@@ -26736,7 +26736,7 @@
             <a:tbl>
               <a:tblPr>
                 <a:noFill/>
-                <a:tableStyleId>{213B4FB6-F5A2-4B1F-A40E-250E5A8CA83A}</a:tableStyleId>
+                <a:tableStyleId>{76AEB783-E90B-4FD3-9B3C-ECA70C141418}</a:tableStyleId>
               </a:tblPr>
               <a:tblGrid>
                 <a:gridCol w="1695200"/>
@@ -27426,7 +27426,7 @@
             <a:tbl>
               <a:tblPr>
                 <a:noFill/>
-                <a:tableStyleId>{213B4FB6-F5A2-4B1F-A40E-250E5A8CA83A}</a:tableStyleId>
+                <a:tableStyleId>{76AEB783-E90B-4FD3-9B3C-ECA70C141418}</a:tableStyleId>
               </a:tblPr>
               <a:tblGrid>
                 <a:gridCol w="1695200"/>
@@ -28678,7 +28678,7 @@
             <a:tbl>
               <a:tblPr>
                 <a:noFill/>
-                <a:tableStyleId>{213B4FB6-F5A2-4B1F-A40E-250E5A8CA83A}</a:tableStyleId>
+                <a:tableStyleId>{76AEB783-E90B-4FD3-9B3C-ECA70C141418}</a:tableStyleId>
               </a:tblPr>
               <a:tblGrid>
                 <a:gridCol w="1695200"/>
@@ -29670,7 +29670,7 @@
             <a:tbl>
               <a:tblPr>
                 <a:noFill/>
-                <a:tableStyleId>{213B4FB6-F5A2-4B1F-A40E-250E5A8CA83A}</a:tableStyleId>
+                <a:tableStyleId>{76AEB783-E90B-4FD3-9B3C-ECA70C141418}</a:tableStyleId>
               </a:tblPr>
               <a:tblGrid>
                 <a:gridCol w="3048000"/>
@@ -33175,7 +33175,7 @@
             <a:tbl>
               <a:tblPr>
                 <a:noFill/>
-                <a:tableStyleId>{213B4FB6-F5A2-4B1F-A40E-250E5A8CA83A}</a:tableStyleId>
+                <a:tableStyleId>{76AEB783-E90B-4FD3-9B3C-ECA70C141418}</a:tableStyleId>
               </a:tblPr>
               <a:tblGrid>
                 <a:gridCol w="1828800"/>
@@ -34281,6 +34281,285 @@
 </file>
 
 <file path=ppt/theme/theme2.xml><?xml version="1.0" encoding="utf-8"?>
+<a:theme xmlns:a="http://schemas.openxmlformats.org/drawingml/2006/main" xmlns:r="http://schemas.openxmlformats.org/officeDocument/2006/relationships" name="LF Energy Theme 2023">
+  <a:themeElements>
+    <a:clrScheme name="Geometric">
+      <a:dk1>
+        <a:srgbClr val="222222"/>
+      </a:dk1>
+      <a:lt1>
+        <a:srgbClr val="FFFFFF"/>
+      </a:lt1>
+      <a:dk2>
+        <a:srgbClr val="434343"/>
+      </a:dk2>
+      <a:lt2>
+        <a:srgbClr val="999999"/>
+      </a:lt2>
+      <a:accent1>
+        <a:srgbClr val="003778"/>
+      </a:accent1>
+      <a:accent2>
+        <a:srgbClr val="0094FF"/>
+      </a:accent2>
+      <a:accent3>
+        <a:srgbClr val="5B1DE7"/>
+      </a:accent3>
+      <a:accent4>
+        <a:srgbClr val="12E2E2"/>
+      </a:accent4>
+      <a:accent5>
+        <a:srgbClr val="FF00AA"/>
+      </a:accent5>
+      <a:accent6>
+        <a:srgbClr val="ACDE1F"/>
+      </a:accent6>
+      <a:hlink>
+        <a:srgbClr val="0077CC"/>
+      </a:hlink>
+      <a:folHlink>
+        <a:srgbClr val="F06292"/>
+      </a:folHlink>
+    </a:clrScheme>
+    <a:fontScheme name="Office">
+      <a:majorFont>
+        <a:latin typeface="Arial"/>
+        <a:ea typeface=""/>
+        <a:cs typeface=""/>
+        <a:font script="Jpan" typeface="ＭＳ Ｐゴシック"/>
+        <a:font script="Hang" typeface="맑은 고딕"/>
+        <a:font script="Hans" typeface="宋体"/>
+        <a:font script="Hant" typeface="新細明體"/>
+        <a:font script="Arab" typeface="Times New Roman"/>
+        <a:font script="Hebr" typeface="Times New Roman"/>
+        <a:font script="Thai" typeface="Angsana New"/>
+        <a:font script="Ethi" typeface="Nyala"/>
+        <a:font script="Beng" typeface="Vrinda"/>
+        <a:font script="Gujr" typeface="Shruti"/>
+        <a:font script="Khmr" typeface="MoolBoran"/>
+        <a:font script="Knda" typeface="Tunga"/>
+        <a:font script="Guru" typeface="Raavi"/>
+        <a:font script="Cans" typeface="Euphemia"/>
+        <a:font script="Cher" typeface="Plantagenet Cherokee"/>
+        <a:font script="Yiii" typeface="Microsoft Yi Baiti"/>
+        <a:font script="Tibt" typeface="Microsoft Himalaya"/>
+        <a:font script="Thaa" typeface="MV Boli"/>
+        <a:font script="Deva" typeface="Mangal"/>
+        <a:font script="Telu" typeface="Gautami"/>
+        <a:font script="Taml" typeface="Latha"/>
+        <a:font script="Syrc" typeface="Estrangelo Edessa"/>
+        <a:font script="Orya" typeface="Kalinga"/>
+        <a:font script="Mlym" typeface="Kartika"/>
+        <a:font script="Laoo" typeface="DokChampa"/>
+        <a:font script="Sinh" typeface="Iskoola Pota"/>
+        <a:font script="Mong" typeface="Mongolian Baiti"/>
+        <a:font script="Viet" typeface="Times New Roman"/>
+        <a:font script="Uigh" typeface="Microsoft Uighur"/>
+        <a:font script="Geor" typeface="Sylfaen"/>
+      </a:majorFont>
+      <a:minorFont>
+        <a:latin typeface="Arial"/>
+        <a:ea typeface=""/>
+        <a:cs typeface=""/>
+        <a:font script="Jpan" typeface="ＭＳ Ｐゴシック"/>
+        <a:font script="Hang" typeface="맑은 고딕"/>
+        <a:font script="Hans" typeface="宋体"/>
+        <a:font script="Hant" typeface="新細明體"/>
+        <a:font script="Arab" typeface="Arial"/>
+        <a:font script="Hebr" typeface="Arial"/>
+        <a:font script="Thai" typeface="Cordia New"/>
+        <a:font script="Ethi" typeface="Nyala"/>
+        <a:font script="Beng" typeface="Vrinda"/>
+        <a:font script="Gujr" typeface="Shruti"/>
+        <a:font script="Khmr" typeface="DaunPenh"/>
+        <a:font script="Knda" typeface="Tunga"/>
+        <a:font script="Guru" typeface="Raavi"/>
+        <a:font script="Cans" typeface="Euphemia"/>
+        <a:font script="Cher" typeface="Plantagenet Cherokee"/>
+        <a:font script="Yiii" typeface="Microsoft Yi Baiti"/>
+        <a:font script="Tibt" typeface="Microsoft Himalaya"/>
+        <a:font script="Thaa" typeface="MV Boli"/>
+        <a:font script="Deva" typeface="Mangal"/>
+        <a:font script="Telu" typeface="Gautami"/>
+        <a:font script="Taml" typeface="Latha"/>
+        <a:font script="Syrc" typeface="Estrangelo Edessa"/>
+        <a:font script="Orya" typeface="Kalinga"/>
+        <a:font script="Mlym" typeface="Kartika"/>
+        <a:font script="Laoo" typeface="DokChampa"/>
+        <a:font script="Sinh" typeface="Iskoola Pota"/>
+        <a:font script="Mong" typeface="Mongolian Baiti"/>
+        <a:font script="Viet" typeface="Arial"/>
+        <a:font script="Uigh" typeface="Microsoft Uighur"/>
+        <a:font script="Geor" typeface="Sylfaen"/>
+      </a:minorFont>
+    </a:fontScheme>
+    <a:fmtScheme name="Office">
+      <a:fillStyleLst>
+        <a:solidFill>
+          <a:schemeClr val="phClr"/>
+        </a:solidFill>
+        <a:gradFill rotWithShape="1">
+          <a:gsLst>
+            <a:gs pos="0">
+              <a:schemeClr val="phClr">
+                <a:tint val="50000"/>
+                <a:satMod val="300000"/>
+              </a:schemeClr>
+            </a:gs>
+            <a:gs pos="35000">
+              <a:schemeClr val="phClr">
+                <a:tint val="37000"/>
+                <a:satMod val="300000"/>
+              </a:schemeClr>
+            </a:gs>
+            <a:gs pos="100000">
+              <a:schemeClr val="phClr">
+                <a:tint val="15000"/>
+                <a:satMod val="350000"/>
+              </a:schemeClr>
+            </a:gs>
+          </a:gsLst>
+          <a:lin ang="16200000" scaled="1"/>
+        </a:gradFill>
+        <a:gradFill rotWithShape="1">
+          <a:gsLst>
+            <a:gs pos="0">
+              <a:schemeClr val="phClr">
+                <a:tint val="100000"/>
+                <a:shade val="100000"/>
+                <a:satMod val="130000"/>
+              </a:schemeClr>
+            </a:gs>
+            <a:gs pos="100000">
+              <a:schemeClr val="phClr">
+                <a:tint val="50000"/>
+                <a:shade val="100000"/>
+                <a:satMod val="350000"/>
+              </a:schemeClr>
+            </a:gs>
+          </a:gsLst>
+          <a:lin ang="16200000" scaled="0"/>
+        </a:gradFill>
+      </a:fillStyleLst>
+      <a:lnStyleLst>
+        <a:ln w="9525" cap="flat" cmpd="sng" algn="ctr">
+          <a:solidFill>
+            <a:schemeClr val="phClr">
+              <a:shade val="95000"/>
+              <a:satMod val="105000"/>
+            </a:schemeClr>
+          </a:solidFill>
+          <a:prstDash val="solid"/>
+        </a:ln>
+        <a:ln w="25400" cap="flat" cmpd="sng" algn="ctr">
+          <a:solidFill>
+            <a:schemeClr val="phClr"/>
+          </a:solidFill>
+          <a:prstDash val="solid"/>
+        </a:ln>
+        <a:ln w="38100" cap="flat" cmpd="sng" algn="ctr">
+          <a:solidFill>
+            <a:schemeClr val="phClr"/>
+          </a:solidFill>
+          <a:prstDash val="solid"/>
+        </a:ln>
+      </a:lnStyleLst>
+      <a:effectStyleLst>
+        <a:effectStyle>
+          <a:effectLst>
+            <a:outerShdw blurRad="40000" dist="20000" dir="5400000" rotWithShape="0">
+              <a:srgbClr val="000000">
+                <a:alpha val="38000"/>
+              </a:srgbClr>
+            </a:outerShdw>
+          </a:effectLst>
+        </a:effectStyle>
+        <a:effectStyle>
+          <a:effectLst>
+            <a:outerShdw blurRad="40000" dist="23000" dir="5400000" rotWithShape="0">
+              <a:srgbClr val="000000">
+                <a:alpha val="35000"/>
+              </a:srgbClr>
+            </a:outerShdw>
+          </a:effectLst>
+        </a:effectStyle>
+        <a:effectStyle>
+          <a:effectLst>
+            <a:outerShdw blurRad="40000" dist="23000" dir="5400000" rotWithShape="0">
+              <a:srgbClr val="000000">
+                <a:alpha val="35000"/>
+              </a:srgbClr>
+            </a:outerShdw>
+          </a:effectLst>
+          <a:scene3d>
+            <a:camera prst="orthographicFront">
+              <a:rot lat="0" lon="0" rev="0"/>
+            </a:camera>
+            <a:lightRig rig="threePt" dir="t">
+              <a:rot lat="0" lon="0" rev="1200000"/>
+            </a:lightRig>
+          </a:scene3d>
+          <a:sp3d>
+            <a:bevelT w="63500" h="25400"/>
+          </a:sp3d>
+        </a:effectStyle>
+      </a:effectStyleLst>
+      <a:bgFillStyleLst>
+        <a:solidFill>
+          <a:schemeClr val="phClr"/>
+        </a:solidFill>
+        <a:gradFill rotWithShape="1">
+          <a:gsLst>
+            <a:gs pos="0">
+              <a:schemeClr val="phClr">
+                <a:tint val="40000"/>
+                <a:satMod val="350000"/>
+              </a:schemeClr>
+            </a:gs>
+            <a:gs pos="40000">
+              <a:schemeClr val="phClr">
+                <a:tint val="45000"/>
+                <a:shade val="99000"/>
+                <a:satMod val="350000"/>
+              </a:schemeClr>
+            </a:gs>
+            <a:gs pos="100000">
+              <a:schemeClr val="phClr">
+                <a:shade val="20000"/>
+                <a:satMod val="255000"/>
+              </a:schemeClr>
+            </a:gs>
+          </a:gsLst>
+          <a:path path="circle">
+            <a:fillToRect l="50000" t="-80000" r="50000" b="180000"/>
+          </a:path>
+        </a:gradFill>
+        <a:gradFill rotWithShape="1">
+          <a:gsLst>
+            <a:gs pos="0">
+              <a:schemeClr val="phClr">
+                <a:tint val="80000"/>
+                <a:satMod val="300000"/>
+              </a:schemeClr>
+            </a:gs>
+            <a:gs pos="100000">
+              <a:schemeClr val="phClr">
+                <a:shade val="30000"/>
+                <a:satMod val="200000"/>
+              </a:schemeClr>
+            </a:gs>
+          </a:gsLst>
+          <a:path path="circle">
+            <a:fillToRect l="50000" t="50000" r="50000" b="50000"/>
+          </a:path>
+        </a:gradFill>
+      </a:bgFillStyleLst>
+    </a:fmtScheme>
+  </a:themeElements>
+</a:theme>
+</file>
+
+<file path=ppt/theme/theme3.xml><?xml version="1.0" encoding="utf-8"?>
 <a:theme xmlns:a="http://schemas.openxmlformats.org/drawingml/2006/main" xmlns:r="http://schemas.openxmlformats.org/officeDocument/2006/relationships" name="Simple Light">
   <a:themeElements>
     <a:clrScheme name="Simple Light">
@@ -34557,283 +34836,4 @@
     </a:fmtScheme>
   </a:themeElements>
 </a:theme>
-</file>
-
-<file path=ppt/theme/theme3.xml><?xml version="1.0" encoding="utf-8"?>
-<a:theme xmlns:a="http://schemas.openxmlformats.org/drawingml/2006/main" xmlns:r="http://schemas.openxmlformats.org/officeDocument/2006/relationships" name="LF Energy Theme 2023">
-  <a:themeElements>
-    <a:clrScheme name="Geometric">
-      <a:dk1>
-        <a:srgbClr val="222222"/>
-      </a:dk1>
-      <a:lt1>
-        <a:srgbClr val="FFFFFF"/>
-      </a:lt1>
-      <a:dk2>
-        <a:srgbClr val="434343"/>
-      </a:dk2>
-      <a:lt2>
-        <a:srgbClr val="999999"/>
-      </a:lt2>
-      <a:accent1>
-        <a:srgbClr val="003778"/>
-      </a:accent1>
-      <a:accent2>
-        <a:srgbClr val="0094FF"/>
-      </a:accent2>
-      <a:accent3>
-        <a:srgbClr val="5B1DE7"/>
-      </a:accent3>
-      <a:accent4>
-        <a:srgbClr val="12E2E2"/>
-      </a:accent4>
-      <a:accent5>
-        <a:srgbClr val="FF00AA"/>
-      </a:accent5>
-      <a:accent6>
-        <a:srgbClr val="ACDE1F"/>
-      </a:accent6>
-      <a:hlink>
-        <a:srgbClr val="0077CC"/>
-      </a:hlink>
-      <a:folHlink>
-        <a:srgbClr val="F06292"/>
-      </a:folHlink>
-    </a:clrScheme>
-    <a:fontScheme name="Office">
-      <a:majorFont>
-        <a:latin typeface="Arial"/>
-        <a:ea typeface=""/>
-        <a:cs typeface=""/>
-        <a:font script="Jpan" typeface="ＭＳ Ｐゴシック"/>
-        <a:font script="Hang" typeface="맑은 고딕"/>
-        <a:font script="Hans" typeface="宋体"/>
-        <a:font script="Hant" typeface="新細明體"/>
-        <a:font script="Arab" typeface="Times New Roman"/>
-        <a:font script="Hebr" typeface="Times New Roman"/>
-        <a:font script="Thai" typeface="Angsana New"/>
-        <a:font script="Ethi" typeface="Nyala"/>
-        <a:font script="Beng" typeface="Vrinda"/>
-        <a:font script="Gujr" typeface="Shruti"/>
-        <a:font script="Khmr" typeface="MoolBoran"/>
-        <a:font script="Knda" typeface="Tunga"/>
-        <a:font script="Guru" typeface="Raavi"/>
-        <a:font script="Cans" typeface="Euphemia"/>
-        <a:font script="Cher" typeface="Plantagenet Cherokee"/>
-        <a:font script="Yiii" typeface="Microsoft Yi Baiti"/>
-        <a:font script="Tibt" typeface="Microsoft Himalaya"/>
-        <a:font script="Thaa" typeface="MV Boli"/>
-        <a:font script="Deva" typeface="Mangal"/>
-        <a:font script="Telu" typeface="Gautami"/>
-        <a:font script="Taml" typeface="Latha"/>
-        <a:font script="Syrc" typeface="Estrangelo Edessa"/>
-        <a:font script="Orya" typeface="Kalinga"/>
-        <a:font script="Mlym" typeface="Kartika"/>
-        <a:font script="Laoo" typeface="DokChampa"/>
-        <a:font script="Sinh" typeface="Iskoola Pota"/>
-        <a:font script="Mong" typeface="Mongolian Baiti"/>
-        <a:font script="Viet" typeface="Times New Roman"/>
-        <a:font script="Uigh" typeface="Microsoft Uighur"/>
-        <a:font script="Geor" typeface="Sylfaen"/>
-      </a:majorFont>
-      <a:minorFont>
-        <a:latin typeface="Arial"/>
-        <a:ea typeface=""/>
-        <a:cs typeface=""/>
-        <a:font script="Jpan" typeface="ＭＳ Ｐゴシック"/>
-        <a:font script="Hang" typeface="맑은 고딕"/>
-        <a:font script="Hans" typeface="宋体"/>
-        <a:font script="Hant" typeface="新細明體"/>
-        <a:font script="Arab" typeface="Arial"/>
-        <a:font script="Hebr" typeface="Arial"/>
-        <a:font script="Thai" typeface="Cordia New"/>
-        <a:font script="Ethi" typeface="Nyala"/>
-        <a:font script="Beng" typeface="Vrinda"/>
-        <a:font script="Gujr" typeface="Shruti"/>
-        <a:font script="Khmr" typeface="DaunPenh"/>
-        <a:font script="Knda" typeface="Tunga"/>
-        <a:font script="Guru" typeface="Raavi"/>
-        <a:font script="Cans" typeface="Euphemia"/>
-        <a:font script="Cher" typeface="Plantagenet Cherokee"/>
-        <a:font script="Yiii" typeface="Microsoft Yi Baiti"/>
-        <a:font script="Tibt" typeface="Microsoft Himalaya"/>
-        <a:font script="Thaa" typeface="MV Boli"/>
-        <a:font script="Deva" typeface="Mangal"/>
-        <a:font script="Telu" typeface="Gautami"/>
-        <a:font script="Taml" typeface="Latha"/>
-        <a:font script="Syrc" typeface="Estrangelo Edessa"/>
-        <a:font script="Orya" typeface="Kalinga"/>
-        <a:font script="Mlym" typeface="Kartika"/>
-        <a:font script="Laoo" typeface="DokChampa"/>
-        <a:font script="Sinh" typeface="Iskoola Pota"/>
-        <a:font script="Mong" typeface="Mongolian Baiti"/>
-        <a:font script="Viet" typeface="Arial"/>
-        <a:font script="Uigh" typeface="Microsoft Uighur"/>
-        <a:font script="Geor" typeface="Sylfaen"/>
-      </a:minorFont>
-    </a:fontScheme>
-    <a:fmtScheme name="Office">
-      <a:fillStyleLst>
-        <a:solidFill>
-          <a:schemeClr val="phClr"/>
-        </a:solidFill>
-        <a:gradFill rotWithShape="1">
-          <a:gsLst>
-            <a:gs pos="0">
-              <a:schemeClr val="phClr">
-                <a:tint val="50000"/>
-                <a:satMod val="300000"/>
-              </a:schemeClr>
-            </a:gs>
-            <a:gs pos="35000">
-              <a:schemeClr val="phClr">
-                <a:tint val="37000"/>
-                <a:satMod val="300000"/>
-              </a:schemeClr>
-            </a:gs>
-            <a:gs pos="100000">
-              <a:schemeClr val="phClr">
-                <a:tint val="15000"/>
-                <a:satMod val="350000"/>
-              </a:schemeClr>
-            </a:gs>
-          </a:gsLst>
-          <a:lin ang="16200000" scaled="1"/>
-        </a:gradFill>
-        <a:gradFill rotWithShape="1">
-          <a:gsLst>
-            <a:gs pos="0">
-              <a:schemeClr val="phClr">
-                <a:tint val="100000"/>
-                <a:shade val="100000"/>
-                <a:satMod val="130000"/>
-              </a:schemeClr>
-            </a:gs>
-            <a:gs pos="100000">
-              <a:schemeClr val="phClr">
-                <a:tint val="50000"/>
-                <a:shade val="100000"/>
-                <a:satMod val="350000"/>
-              </a:schemeClr>
-            </a:gs>
-          </a:gsLst>
-          <a:lin ang="16200000" scaled="0"/>
-        </a:gradFill>
-      </a:fillStyleLst>
-      <a:lnStyleLst>
-        <a:ln w="9525" cap="flat" cmpd="sng" algn="ctr">
-          <a:solidFill>
-            <a:schemeClr val="phClr">
-              <a:shade val="95000"/>
-              <a:satMod val="105000"/>
-            </a:schemeClr>
-          </a:solidFill>
-          <a:prstDash val="solid"/>
-        </a:ln>
-        <a:ln w="25400" cap="flat" cmpd="sng" algn="ctr">
-          <a:solidFill>
-            <a:schemeClr val="phClr"/>
-          </a:solidFill>
-          <a:prstDash val="solid"/>
-        </a:ln>
-        <a:ln w="38100" cap="flat" cmpd="sng" algn="ctr">
-          <a:solidFill>
-            <a:schemeClr val="phClr"/>
-          </a:solidFill>
-          <a:prstDash val="solid"/>
-        </a:ln>
-      </a:lnStyleLst>
-      <a:effectStyleLst>
-        <a:effectStyle>
-          <a:effectLst>
-            <a:outerShdw blurRad="40000" dist="20000" dir="5400000" rotWithShape="0">
-              <a:srgbClr val="000000">
-                <a:alpha val="38000"/>
-              </a:srgbClr>
-            </a:outerShdw>
-          </a:effectLst>
-        </a:effectStyle>
-        <a:effectStyle>
-          <a:effectLst>
-            <a:outerShdw blurRad="40000" dist="23000" dir="5400000" rotWithShape="0">
-              <a:srgbClr val="000000">
-                <a:alpha val="35000"/>
-              </a:srgbClr>
-            </a:outerShdw>
-          </a:effectLst>
-        </a:effectStyle>
-        <a:effectStyle>
-          <a:effectLst>
-            <a:outerShdw blurRad="40000" dist="23000" dir="5400000" rotWithShape="0">
-              <a:srgbClr val="000000">
-                <a:alpha val="35000"/>
-              </a:srgbClr>
-            </a:outerShdw>
-          </a:effectLst>
-          <a:scene3d>
-            <a:camera prst="orthographicFront">
-              <a:rot lat="0" lon="0" rev="0"/>
-            </a:camera>
-            <a:lightRig rig="threePt" dir="t">
-              <a:rot lat="0" lon="0" rev="1200000"/>
-            </a:lightRig>
-          </a:scene3d>
-          <a:sp3d>
-            <a:bevelT w="63500" h="25400"/>
-          </a:sp3d>
-        </a:effectStyle>
-      </a:effectStyleLst>
-      <a:bgFillStyleLst>
-        <a:solidFill>
-          <a:schemeClr val="phClr"/>
-        </a:solidFill>
-        <a:gradFill rotWithShape="1">
-          <a:gsLst>
-            <a:gs pos="0">
-              <a:schemeClr val="phClr">
-                <a:tint val="40000"/>
-                <a:satMod val="350000"/>
-              </a:schemeClr>
-            </a:gs>
-            <a:gs pos="40000">
-              <a:schemeClr val="phClr">
-                <a:tint val="45000"/>
-                <a:shade val="99000"/>
-                <a:satMod val="350000"/>
-              </a:schemeClr>
-            </a:gs>
-            <a:gs pos="100000">
-              <a:schemeClr val="phClr">
-                <a:shade val="20000"/>
-                <a:satMod val="255000"/>
-              </a:schemeClr>
-            </a:gs>
-          </a:gsLst>
-          <a:path path="circle">
-            <a:fillToRect l="50000" t="-80000" r="50000" b="180000"/>
-          </a:path>
-        </a:gradFill>
-        <a:gradFill rotWithShape="1">
-          <a:gsLst>
-            <a:gs pos="0">
-              <a:schemeClr val="phClr">
-                <a:tint val="80000"/>
-                <a:satMod val="300000"/>
-              </a:schemeClr>
-            </a:gs>
-            <a:gs pos="100000">
-              <a:schemeClr val="phClr">
-                <a:shade val="30000"/>
-                <a:satMod val="200000"/>
-              </a:schemeClr>
-            </a:gs>
-          </a:gsLst>
-          <a:path path="circle">
-            <a:fillToRect l="50000" t="50000" r="50000" b="50000"/>
-          </a:path>
-        </a:gradFill>
-      </a:bgFillStyleLst>
-    </a:fmtScheme>
-  </a:themeElements>
-</a:theme>
 </file>
</xml_diff>

<commit_message>
Update Data Sources from LFX 2026-02-03 (#76)
</commit_message>
<xml_diff>
--- a/overview_deck/LF Energy High Level Overview.pptx
+++ b/overview_deck/LF Energy High Level Overview.pptx
@@ -25946,7 +25946,7 @@
             <a:tbl>
               <a:tblPr>
                 <a:noFill/>
-                <a:tableStyleId>{213B4FB6-F5A2-4B1F-A40E-250E5A8CA83A}</a:tableStyleId>
+                <a:tableStyleId>{76AEB783-E90B-4FD3-9B3C-ECA70C141418}</a:tableStyleId>
               </a:tblPr>
               <a:tblGrid>
                 <a:gridCol w="1695200"/>
@@ -26736,7 +26736,7 @@
             <a:tbl>
               <a:tblPr>
                 <a:noFill/>
-                <a:tableStyleId>{213B4FB6-F5A2-4B1F-A40E-250E5A8CA83A}</a:tableStyleId>
+                <a:tableStyleId>{76AEB783-E90B-4FD3-9B3C-ECA70C141418}</a:tableStyleId>
               </a:tblPr>
               <a:tblGrid>
                 <a:gridCol w="1695200"/>
@@ -27426,7 +27426,7 @@
             <a:tbl>
               <a:tblPr>
                 <a:noFill/>
-                <a:tableStyleId>{213B4FB6-F5A2-4B1F-A40E-250E5A8CA83A}</a:tableStyleId>
+                <a:tableStyleId>{76AEB783-E90B-4FD3-9B3C-ECA70C141418}</a:tableStyleId>
               </a:tblPr>
               <a:tblGrid>
                 <a:gridCol w="1695200"/>
@@ -28678,7 +28678,7 @@
             <a:tbl>
               <a:tblPr>
                 <a:noFill/>
-                <a:tableStyleId>{213B4FB6-F5A2-4B1F-A40E-250E5A8CA83A}</a:tableStyleId>
+                <a:tableStyleId>{76AEB783-E90B-4FD3-9B3C-ECA70C141418}</a:tableStyleId>
               </a:tblPr>
               <a:tblGrid>
                 <a:gridCol w="1695200"/>
@@ -29670,7 +29670,7 @@
             <a:tbl>
               <a:tblPr>
                 <a:noFill/>
-                <a:tableStyleId>{213B4FB6-F5A2-4B1F-A40E-250E5A8CA83A}</a:tableStyleId>
+                <a:tableStyleId>{76AEB783-E90B-4FD3-9B3C-ECA70C141418}</a:tableStyleId>
               </a:tblPr>
               <a:tblGrid>
                 <a:gridCol w="3048000"/>
@@ -33175,7 +33175,7 @@
             <a:tbl>
               <a:tblPr>
                 <a:noFill/>
-                <a:tableStyleId>{213B4FB6-F5A2-4B1F-A40E-250E5A8CA83A}</a:tableStyleId>
+                <a:tableStyleId>{76AEB783-E90B-4FD3-9B3C-ECA70C141418}</a:tableStyleId>
               </a:tblPr>
               <a:tblGrid>
                 <a:gridCol w="1828800"/>
@@ -34281,6 +34281,285 @@
 </file>
 
 <file path=ppt/theme/theme2.xml><?xml version="1.0" encoding="utf-8"?>
+<a:theme xmlns:a="http://schemas.openxmlformats.org/drawingml/2006/main" xmlns:r="http://schemas.openxmlformats.org/officeDocument/2006/relationships" name="LF Energy Theme 2023">
+  <a:themeElements>
+    <a:clrScheme name="Geometric">
+      <a:dk1>
+        <a:srgbClr val="222222"/>
+      </a:dk1>
+      <a:lt1>
+        <a:srgbClr val="FFFFFF"/>
+      </a:lt1>
+      <a:dk2>
+        <a:srgbClr val="434343"/>
+      </a:dk2>
+      <a:lt2>
+        <a:srgbClr val="999999"/>
+      </a:lt2>
+      <a:accent1>
+        <a:srgbClr val="003778"/>
+      </a:accent1>
+      <a:accent2>
+        <a:srgbClr val="0094FF"/>
+      </a:accent2>
+      <a:accent3>
+        <a:srgbClr val="5B1DE7"/>
+      </a:accent3>
+      <a:accent4>
+        <a:srgbClr val="12E2E2"/>
+      </a:accent4>
+      <a:accent5>
+        <a:srgbClr val="FF00AA"/>
+      </a:accent5>
+      <a:accent6>
+        <a:srgbClr val="ACDE1F"/>
+      </a:accent6>
+      <a:hlink>
+        <a:srgbClr val="0077CC"/>
+      </a:hlink>
+      <a:folHlink>
+        <a:srgbClr val="F06292"/>
+      </a:folHlink>
+    </a:clrScheme>
+    <a:fontScheme name="Office">
+      <a:majorFont>
+        <a:latin typeface="Arial"/>
+        <a:ea typeface=""/>
+        <a:cs typeface=""/>
+        <a:font script="Jpan" typeface="ＭＳ Ｐゴシック"/>
+        <a:font script="Hang" typeface="맑은 고딕"/>
+        <a:font script="Hans" typeface="宋体"/>
+        <a:font script="Hant" typeface="新細明體"/>
+        <a:font script="Arab" typeface="Times New Roman"/>
+        <a:font script="Hebr" typeface="Times New Roman"/>
+        <a:font script="Thai" typeface="Angsana New"/>
+        <a:font script="Ethi" typeface="Nyala"/>
+        <a:font script="Beng" typeface="Vrinda"/>
+        <a:font script="Gujr" typeface="Shruti"/>
+        <a:font script="Khmr" typeface="MoolBoran"/>
+        <a:font script="Knda" typeface="Tunga"/>
+        <a:font script="Guru" typeface="Raavi"/>
+        <a:font script="Cans" typeface="Euphemia"/>
+        <a:font script="Cher" typeface="Plantagenet Cherokee"/>
+        <a:font script="Yiii" typeface="Microsoft Yi Baiti"/>
+        <a:font script="Tibt" typeface="Microsoft Himalaya"/>
+        <a:font script="Thaa" typeface="MV Boli"/>
+        <a:font script="Deva" typeface="Mangal"/>
+        <a:font script="Telu" typeface="Gautami"/>
+        <a:font script="Taml" typeface="Latha"/>
+        <a:font script="Syrc" typeface="Estrangelo Edessa"/>
+        <a:font script="Orya" typeface="Kalinga"/>
+        <a:font script="Mlym" typeface="Kartika"/>
+        <a:font script="Laoo" typeface="DokChampa"/>
+        <a:font script="Sinh" typeface="Iskoola Pota"/>
+        <a:font script="Mong" typeface="Mongolian Baiti"/>
+        <a:font script="Viet" typeface="Times New Roman"/>
+        <a:font script="Uigh" typeface="Microsoft Uighur"/>
+        <a:font script="Geor" typeface="Sylfaen"/>
+      </a:majorFont>
+      <a:minorFont>
+        <a:latin typeface="Arial"/>
+        <a:ea typeface=""/>
+        <a:cs typeface=""/>
+        <a:font script="Jpan" typeface="ＭＳ Ｐゴシック"/>
+        <a:font script="Hang" typeface="맑은 고딕"/>
+        <a:font script="Hans" typeface="宋体"/>
+        <a:font script="Hant" typeface="新細明體"/>
+        <a:font script="Arab" typeface="Arial"/>
+        <a:font script="Hebr" typeface="Arial"/>
+        <a:font script="Thai" typeface="Cordia New"/>
+        <a:font script="Ethi" typeface="Nyala"/>
+        <a:font script="Beng" typeface="Vrinda"/>
+        <a:font script="Gujr" typeface="Shruti"/>
+        <a:font script="Khmr" typeface="DaunPenh"/>
+        <a:font script="Knda" typeface="Tunga"/>
+        <a:font script="Guru" typeface="Raavi"/>
+        <a:font script="Cans" typeface="Euphemia"/>
+        <a:font script="Cher" typeface="Plantagenet Cherokee"/>
+        <a:font script="Yiii" typeface="Microsoft Yi Baiti"/>
+        <a:font script="Tibt" typeface="Microsoft Himalaya"/>
+        <a:font script="Thaa" typeface="MV Boli"/>
+        <a:font script="Deva" typeface="Mangal"/>
+        <a:font script="Telu" typeface="Gautami"/>
+        <a:font script="Taml" typeface="Latha"/>
+        <a:font script="Syrc" typeface="Estrangelo Edessa"/>
+        <a:font script="Orya" typeface="Kalinga"/>
+        <a:font script="Mlym" typeface="Kartika"/>
+        <a:font script="Laoo" typeface="DokChampa"/>
+        <a:font script="Sinh" typeface="Iskoola Pota"/>
+        <a:font script="Mong" typeface="Mongolian Baiti"/>
+        <a:font script="Viet" typeface="Arial"/>
+        <a:font script="Uigh" typeface="Microsoft Uighur"/>
+        <a:font script="Geor" typeface="Sylfaen"/>
+      </a:minorFont>
+    </a:fontScheme>
+    <a:fmtScheme name="Office">
+      <a:fillStyleLst>
+        <a:solidFill>
+          <a:schemeClr val="phClr"/>
+        </a:solidFill>
+        <a:gradFill rotWithShape="1">
+          <a:gsLst>
+            <a:gs pos="0">
+              <a:schemeClr val="phClr">
+                <a:tint val="50000"/>
+                <a:satMod val="300000"/>
+              </a:schemeClr>
+            </a:gs>
+            <a:gs pos="35000">
+              <a:schemeClr val="phClr">
+                <a:tint val="37000"/>
+                <a:satMod val="300000"/>
+              </a:schemeClr>
+            </a:gs>
+            <a:gs pos="100000">
+              <a:schemeClr val="phClr">
+                <a:tint val="15000"/>
+                <a:satMod val="350000"/>
+              </a:schemeClr>
+            </a:gs>
+          </a:gsLst>
+          <a:lin ang="16200000" scaled="1"/>
+        </a:gradFill>
+        <a:gradFill rotWithShape="1">
+          <a:gsLst>
+            <a:gs pos="0">
+              <a:schemeClr val="phClr">
+                <a:tint val="100000"/>
+                <a:shade val="100000"/>
+                <a:satMod val="130000"/>
+              </a:schemeClr>
+            </a:gs>
+            <a:gs pos="100000">
+              <a:schemeClr val="phClr">
+                <a:tint val="50000"/>
+                <a:shade val="100000"/>
+                <a:satMod val="350000"/>
+              </a:schemeClr>
+            </a:gs>
+          </a:gsLst>
+          <a:lin ang="16200000" scaled="0"/>
+        </a:gradFill>
+      </a:fillStyleLst>
+      <a:lnStyleLst>
+        <a:ln w="9525" cap="flat" cmpd="sng" algn="ctr">
+          <a:solidFill>
+            <a:schemeClr val="phClr">
+              <a:shade val="95000"/>
+              <a:satMod val="105000"/>
+            </a:schemeClr>
+          </a:solidFill>
+          <a:prstDash val="solid"/>
+        </a:ln>
+        <a:ln w="25400" cap="flat" cmpd="sng" algn="ctr">
+          <a:solidFill>
+            <a:schemeClr val="phClr"/>
+          </a:solidFill>
+          <a:prstDash val="solid"/>
+        </a:ln>
+        <a:ln w="38100" cap="flat" cmpd="sng" algn="ctr">
+          <a:solidFill>
+            <a:schemeClr val="phClr"/>
+          </a:solidFill>
+          <a:prstDash val="solid"/>
+        </a:ln>
+      </a:lnStyleLst>
+      <a:effectStyleLst>
+        <a:effectStyle>
+          <a:effectLst>
+            <a:outerShdw blurRad="40000" dist="20000" dir="5400000" rotWithShape="0">
+              <a:srgbClr val="000000">
+                <a:alpha val="38000"/>
+              </a:srgbClr>
+            </a:outerShdw>
+          </a:effectLst>
+        </a:effectStyle>
+        <a:effectStyle>
+          <a:effectLst>
+            <a:outerShdw blurRad="40000" dist="23000" dir="5400000" rotWithShape="0">
+              <a:srgbClr val="000000">
+                <a:alpha val="35000"/>
+              </a:srgbClr>
+            </a:outerShdw>
+          </a:effectLst>
+        </a:effectStyle>
+        <a:effectStyle>
+          <a:effectLst>
+            <a:outerShdw blurRad="40000" dist="23000" dir="5400000" rotWithShape="0">
+              <a:srgbClr val="000000">
+                <a:alpha val="35000"/>
+              </a:srgbClr>
+            </a:outerShdw>
+          </a:effectLst>
+          <a:scene3d>
+            <a:camera prst="orthographicFront">
+              <a:rot lat="0" lon="0" rev="0"/>
+            </a:camera>
+            <a:lightRig rig="threePt" dir="t">
+              <a:rot lat="0" lon="0" rev="1200000"/>
+            </a:lightRig>
+          </a:scene3d>
+          <a:sp3d>
+            <a:bevelT w="63500" h="25400"/>
+          </a:sp3d>
+        </a:effectStyle>
+      </a:effectStyleLst>
+      <a:bgFillStyleLst>
+        <a:solidFill>
+          <a:schemeClr val="phClr"/>
+        </a:solidFill>
+        <a:gradFill rotWithShape="1">
+          <a:gsLst>
+            <a:gs pos="0">
+              <a:schemeClr val="phClr">
+                <a:tint val="40000"/>
+                <a:satMod val="350000"/>
+              </a:schemeClr>
+            </a:gs>
+            <a:gs pos="40000">
+              <a:schemeClr val="phClr">
+                <a:tint val="45000"/>
+                <a:shade val="99000"/>
+                <a:satMod val="350000"/>
+              </a:schemeClr>
+            </a:gs>
+            <a:gs pos="100000">
+              <a:schemeClr val="phClr">
+                <a:shade val="20000"/>
+                <a:satMod val="255000"/>
+              </a:schemeClr>
+            </a:gs>
+          </a:gsLst>
+          <a:path path="circle">
+            <a:fillToRect l="50000" t="-80000" r="50000" b="180000"/>
+          </a:path>
+        </a:gradFill>
+        <a:gradFill rotWithShape="1">
+          <a:gsLst>
+            <a:gs pos="0">
+              <a:schemeClr val="phClr">
+                <a:tint val="80000"/>
+                <a:satMod val="300000"/>
+              </a:schemeClr>
+            </a:gs>
+            <a:gs pos="100000">
+              <a:schemeClr val="phClr">
+                <a:shade val="30000"/>
+                <a:satMod val="200000"/>
+              </a:schemeClr>
+            </a:gs>
+          </a:gsLst>
+          <a:path path="circle">
+            <a:fillToRect l="50000" t="50000" r="50000" b="50000"/>
+          </a:path>
+        </a:gradFill>
+      </a:bgFillStyleLst>
+    </a:fmtScheme>
+  </a:themeElements>
+</a:theme>
+</file>
+
+<file path=ppt/theme/theme3.xml><?xml version="1.0" encoding="utf-8"?>
 <a:theme xmlns:a="http://schemas.openxmlformats.org/drawingml/2006/main" xmlns:r="http://schemas.openxmlformats.org/officeDocument/2006/relationships" name="Simple Light">
   <a:themeElements>
     <a:clrScheme name="Simple Light">
@@ -34557,283 +34836,4 @@
     </a:fmtScheme>
   </a:themeElements>
 </a:theme>
-</file>
-
-<file path=ppt/theme/theme3.xml><?xml version="1.0" encoding="utf-8"?>
-<a:theme xmlns:a="http://schemas.openxmlformats.org/drawingml/2006/main" xmlns:r="http://schemas.openxmlformats.org/officeDocument/2006/relationships" name="LF Energy Theme 2023">
-  <a:themeElements>
-    <a:clrScheme name="Geometric">
-      <a:dk1>
-        <a:srgbClr val="222222"/>
-      </a:dk1>
-      <a:lt1>
-        <a:srgbClr val="FFFFFF"/>
-      </a:lt1>
-      <a:dk2>
-        <a:srgbClr val="434343"/>
-      </a:dk2>
-      <a:lt2>
-        <a:srgbClr val="999999"/>
-      </a:lt2>
-      <a:accent1>
-        <a:srgbClr val="003778"/>
-      </a:accent1>
-      <a:accent2>
-        <a:srgbClr val="0094FF"/>
-      </a:accent2>
-      <a:accent3>
-        <a:srgbClr val="5B1DE7"/>
-      </a:accent3>
-      <a:accent4>
-        <a:srgbClr val="12E2E2"/>
-      </a:accent4>
-      <a:accent5>
-        <a:srgbClr val="FF00AA"/>
-      </a:accent5>
-      <a:accent6>
-        <a:srgbClr val="ACDE1F"/>
-      </a:accent6>
-      <a:hlink>
-        <a:srgbClr val="0077CC"/>
-      </a:hlink>
-      <a:folHlink>
-        <a:srgbClr val="F06292"/>
-      </a:folHlink>
-    </a:clrScheme>
-    <a:fontScheme name="Office">
-      <a:majorFont>
-        <a:latin typeface="Arial"/>
-        <a:ea typeface=""/>
-        <a:cs typeface=""/>
-        <a:font script="Jpan" typeface="ＭＳ Ｐゴシック"/>
-        <a:font script="Hang" typeface="맑은 고딕"/>
-        <a:font script="Hans" typeface="宋体"/>
-        <a:font script="Hant" typeface="新細明體"/>
-        <a:font script="Arab" typeface="Times New Roman"/>
-        <a:font script="Hebr" typeface="Times New Roman"/>
-        <a:font script="Thai" typeface="Angsana New"/>
-        <a:font script="Ethi" typeface="Nyala"/>
-        <a:font script="Beng" typeface="Vrinda"/>
-        <a:font script="Gujr" typeface="Shruti"/>
-        <a:font script="Khmr" typeface="MoolBoran"/>
-        <a:font script="Knda" typeface="Tunga"/>
-        <a:font script="Guru" typeface="Raavi"/>
-        <a:font script="Cans" typeface="Euphemia"/>
-        <a:font script="Cher" typeface="Plantagenet Cherokee"/>
-        <a:font script="Yiii" typeface="Microsoft Yi Baiti"/>
-        <a:font script="Tibt" typeface="Microsoft Himalaya"/>
-        <a:font script="Thaa" typeface="MV Boli"/>
-        <a:font script="Deva" typeface="Mangal"/>
-        <a:font script="Telu" typeface="Gautami"/>
-        <a:font script="Taml" typeface="Latha"/>
-        <a:font script="Syrc" typeface="Estrangelo Edessa"/>
-        <a:font script="Orya" typeface="Kalinga"/>
-        <a:font script="Mlym" typeface="Kartika"/>
-        <a:font script="Laoo" typeface="DokChampa"/>
-        <a:font script="Sinh" typeface="Iskoola Pota"/>
-        <a:font script="Mong" typeface="Mongolian Baiti"/>
-        <a:font script="Viet" typeface="Times New Roman"/>
-        <a:font script="Uigh" typeface="Microsoft Uighur"/>
-        <a:font script="Geor" typeface="Sylfaen"/>
-      </a:majorFont>
-      <a:minorFont>
-        <a:latin typeface="Arial"/>
-        <a:ea typeface=""/>
-        <a:cs typeface=""/>
-        <a:font script="Jpan" typeface="ＭＳ Ｐゴシック"/>
-        <a:font script="Hang" typeface="맑은 고딕"/>
-        <a:font script="Hans" typeface="宋体"/>
-        <a:font script="Hant" typeface="新細明體"/>
-        <a:font script="Arab" typeface="Arial"/>
-        <a:font script="Hebr" typeface="Arial"/>
-        <a:font script="Thai" typeface="Cordia New"/>
-        <a:font script="Ethi" typeface="Nyala"/>
-        <a:font script="Beng" typeface="Vrinda"/>
-        <a:font script="Gujr" typeface="Shruti"/>
-        <a:font script="Khmr" typeface="DaunPenh"/>
-        <a:font script="Knda" typeface="Tunga"/>
-        <a:font script="Guru" typeface="Raavi"/>
-        <a:font script="Cans" typeface="Euphemia"/>
-        <a:font script="Cher" typeface="Plantagenet Cherokee"/>
-        <a:font script="Yiii" typeface="Microsoft Yi Baiti"/>
-        <a:font script="Tibt" typeface="Microsoft Himalaya"/>
-        <a:font script="Thaa" typeface="MV Boli"/>
-        <a:font script="Deva" typeface="Mangal"/>
-        <a:font script="Telu" typeface="Gautami"/>
-        <a:font script="Taml" typeface="Latha"/>
-        <a:font script="Syrc" typeface="Estrangelo Edessa"/>
-        <a:font script="Orya" typeface="Kalinga"/>
-        <a:font script="Mlym" typeface="Kartika"/>
-        <a:font script="Laoo" typeface="DokChampa"/>
-        <a:font script="Sinh" typeface="Iskoola Pota"/>
-        <a:font script="Mong" typeface="Mongolian Baiti"/>
-        <a:font script="Viet" typeface="Arial"/>
-        <a:font script="Uigh" typeface="Microsoft Uighur"/>
-        <a:font script="Geor" typeface="Sylfaen"/>
-      </a:minorFont>
-    </a:fontScheme>
-    <a:fmtScheme name="Office">
-      <a:fillStyleLst>
-        <a:solidFill>
-          <a:schemeClr val="phClr"/>
-        </a:solidFill>
-        <a:gradFill rotWithShape="1">
-          <a:gsLst>
-            <a:gs pos="0">
-              <a:schemeClr val="phClr">
-                <a:tint val="50000"/>
-                <a:satMod val="300000"/>
-              </a:schemeClr>
-            </a:gs>
-            <a:gs pos="35000">
-              <a:schemeClr val="phClr">
-                <a:tint val="37000"/>
-                <a:satMod val="300000"/>
-              </a:schemeClr>
-            </a:gs>
-            <a:gs pos="100000">
-              <a:schemeClr val="phClr">
-                <a:tint val="15000"/>
-                <a:satMod val="350000"/>
-              </a:schemeClr>
-            </a:gs>
-          </a:gsLst>
-          <a:lin ang="16200000" scaled="1"/>
-        </a:gradFill>
-        <a:gradFill rotWithShape="1">
-          <a:gsLst>
-            <a:gs pos="0">
-              <a:schemeClr val="phClr">
-                <a:tint val="100000"/>
-                <a:shade val="100000"/>
-                <a:satMod val="130000"/>
-              </a:schemeClr>
-            </a:gs>
-            <a:gs pos="100000">
-              <a:schemeClr val="phClr">
-                <a:tint val="50000"/>
-                <a:shade val="100000"/>
-                <a:satMod val="350000"/>
-              </a:schemeClr>
-            </a:gs>
-          </a:gsLst>
-          <a:lin ang="16200000" scaled="0"/>
-        </a:gradFill>
-      </a:fillStyleLst>
-      <a:lnStyleLst>
-        <a:ln w="9525" cap="flat" cmpd="sng" algn="ctr">
-          <a:solidFill>
-            <a:schemeClr val="phClr">
-              <a:shade val="95000"/>
-              <a:satMod val="105000"/>
-            </a:schemeClr>
-          </a:solidFill>
-          <a:prstDash val="solid"/>
-        </a:ln>
-        <a:ln w="25400" cap="flat" cmpd="sng" algn="ctr">
-          <a:solidFill>
-            <a:schemeClr val="phClr"/>
-          </a:solidFill>
-          <a:prstDash val="solid"/>
-        </a:ln>
-        <a:ln w="38100" cap="flat" cmpd="sng" algn="ctr">
-          <a:solidFill>
-            <a:schemeClr val="phClr"/>
-          </a:solidFill>
-          <a:prstDash val="solid"/>
-        </a:ln>
-      </a:lnStyleLst>
-      <a:effectStyleLst>
-        <a:effectStyle>
-          <a:effectLst>
-            <a:outerShdw blurRad="40000" dist="20000" dir="5400000" rotWithShape="0">
-              <a:srgbClr val="000000">
-                <a:alpha val="38000"/>
-              </a:srgbClr>
-            </a:outerShdw>
-          </a:effectLst>
-        </a:effectStyle>
-        <a:effectStyle>
-          <a:effectLst>
-            <a:outerShdw blurRad="40000" dist="23000" dir="5400000" rotWithShape="0">
-              <a:srgbClr val="000000">
-                <a:alpha val="35000"/>
-              </a:srgbClr>
-            </a:outerShdw>
-          </a:effectLst>
-        </a:effectStyle>
-        <a:effectStyle>
-          <a:effectLst>
-            <a:outerShdw blurRad="40000" dist="23000" dir="5400000" rotWithShape="0">
-              <a:srgbClr val="000000">
-                <a:alpha val="35000"/>
-              </a:srgbClr>
-            </a:outerShdw>
-          </a:effectLst>
-          <a:scene3d>
-            <a:camera prst="orthographicFront">
-              <a:rot lat="0" lon="0" rev="0"/>
-            </a:camera>
-            <a:lightRig rig="threePt" dir="t">
-              <a:rot lat="0" lon="0" rev="1200000"/>
-            </a:lightRig>
-          </a:scene3d>
-          <a:sp3d>
-            <a:bevelT w="63500" h="25400"/>
-          </a:sp3d>
-        </a:effectStyle>
-      </a:effectStyleLst>
-      <a:bgFillStyleLst>
-        <a:solidFill>
-          <a:schemeClr val="phClr"/>
-        </a:solidFill>
-        <a:gradFill rotWithShape="1">
-          <a:gsLst>
-            <a:gs pos="0">
-              <a:schemeClr val="phClr">
-                <a:tint val="40000"/>
-                <a:satMod val="350000"/>
-              </a:schemeClr>
-            </a:gs>
-            <a:gs pos="40000">
-              <a:schemeClr val="phClr">
-                <a:tint val="45000"/>
-                <a:shade val="99000"/>
-                <a:satMod val="350000"/>
-              </a:schemeClr>
-            </a:gs>
-            <a:gs pos="100000">
-              <a:schemeClr val="phClr">
-                <a:shade val="20000"/>
-                <a:satMod val="255000"/>
-              </a:schemeClr>
-            </a:gs>
-          </a:gsLst>
-          <a:path path="circle">
-            <a:fillToRect l="50000" t="-80000" r="50000" b="180000"/>
-          </a:path>
-        </a:gradFill>
-        <a:gradFill rotWithShape="1">
-          <a:gsLst>
-            <a:gs pos="0">
-              <a:schemeClr val="phClr">
-                <a:tint val="80000"/>
-                <a:satMod val="300000"/>
-              </a:schemeClr>
-            </a:gs>
-            <a:gs pos="100000">
-              <a:schemeClr val="phClr">
-                <a:shade val="30000"/>
-                <a:satMod val="200000"/>
-              </a:schemeClr>
-            </a:gs>
-          </a:gsLst>
-          <a:path path="circle">
-            <a:fillToRect l="50000" t="50000" r="50000" b="50000"/>
-          </a:path>
-        </a:gradFill>
-      </a:bgFillStyleLst>
-    </a:fmtScheme>
-  </a:themeElements>
-</a:theme>
 </file>
</xml_diff>

<commit_message>
Update Data Sources from LFX 2026-02-04 (#77)
</commit_message>
<xml_diff>
--- a/overview_deck/LF Energy High Level Overview.pptx
+++ b/overview_deck/LF Energy High Level Overview.pptx
@@ -25946,7 +25946,7 @@
             <a:tbl>
               <a:tblPr>
                 <a:noFill/>
-                <a:tableStyleId>{76AEB783-E90B-4FD3-9B3C-ECA70C141418}</a:tableStyleId>
+                <a:tableStyleId>{8D3E67DC-7664-4D72-9394-26F2834BD407}</a:tableStyleId>
               </a:tblPr>
               <a:tblGrid>
                 <a:gridCol w="1695200"/>
@@ -26736,7 +26736,7 @@
             <a:tbl>
               <a:tblPr>
                 <a:noFill/>
-                <a:tableStyleId>{76AEB783-E90B-4FD3-9B3C-ECA70C141418}</a:tableStyleId>
+                <a:tableStyleId>{8D3E67DC-7664-4D72-9394-26F2834BD407}</a:tableStyleId>
               </a:tblPr>
               <a:tblGrid>
                 <a:gridCol w="1695200"/>
@@ -27426,7 +27426,7 @@
             <a:tbl>
               <a:tblPr>
                 <a:noFill/>
-                <a:tableStyleId>{76AEB783-E90B-4FD3-9B3C-ECA70C141418}</a:tableStyleId>
+                <a:tableStyleId>{8D3E67DC-7664-4D72-9394-26F2834BD407}</a:tableStyleId>
               </a:tblPr>
               <a:tblGrid>
                 <a:gridCol w="1695200"/>
@@ -28678,7 +28678,7 @@
             <a:tbl>
               <a:tblPr>
                 <a:noFill/>
-                <a:tableStyleId>{76AEB783-E90B-4FD3-9B3C-ECA70C141418}</a:tableStyleId>
+                <a:tableStyleId>{8D3E67DC-7664-4D72-9394-26F2834BD407}</a:tableStyleId>
               </a:tblPr>
               <a:tblGrid>
                 <a:gridCol w="1695200"/>
@@ -29670,7 +29670,7 @@
             <a:tbl>
               <a:tblPr>
                 <a:noFill/>
-                <a:tableStyleId>{76AEB783-E90B-4FD3-9B3C-ECA70C141418}</a:tableStyleId>
+                <a:tableStyleId>{8D3E67DC-7664-4D72-9394-26F2834BD407}</a:tableStyleId>
               </a:tblPr>
               <a:tblGrid>
                 <a:gridCol w="3048000"/>
@@ -33175,7 +33175,7 @@
             <a:tbl>
               <a:tblPr>
                 <a:noFill/>
-                <a:tableStyleId>{76AEB783-E90B-4FD3-9B3C-ECA70C141418}</a:tableStyleId>
+                <a:tableStyleId>{8D3E67DC-7664-4D72-9394-26F2834BD407}</a:tableStyleId>
               </a:tblPr>
               <a:tblGrid>
                 <a:gridCol w="1828800"/>
@@ -34002,6 +34002,285 @@
 </file>
 
 <file path=ppt/theme/theme1.xml><?xml version="1.0" encoding="utf-8"?>
+<a:theme xmlns:a="http://schemas.openxmlformats.org/drawingml/2006/main" xmlns:r="http://schemas.openxmlformats.org/officeDocument/2006/relationships" name="Simple Light">
+  <a:themeElements>
+    <a:clrScheme name="Simple Light">
+      <a:dk1>
+        <a:srgbClr val="000000"/>
+      </a:dk1>
+      <a:lt1>
+        <a:srgbClr val="FFFFFF"/>
+      </a:lt1>
+      <a:dk2>
+        <a:srgbClr val="595959"/>
+      </a:dk2>
+      <a:lt2>
+        <a:srgbClr val="EEEEEE"/>
+      </a:lt2>
+      <a:accent1>
+        <a:srgbClr val="4285F4"/>
+      </a:accent1>
+      <a:accent2>
+        <a:srgbClr val="212121"/>
+      </a:accent2>
+      <a:accent3>
+        <a:srgbClr val="78909C"/>
+      </a:accent3>
+      <a:accent4>
+        <a:srgbClr val="FFAB40"/>
+      </a:accent4>
+      <a:accent5>
+        <a:srgbClr val="0097A7"/>
+      </a:accent5>
+      <a:accent6>
+        <a:srgbClr val="EEFF41"/>
+      </a:accent6>
+      <a:hlink>
+        <a:srgbClr val="0097A7"/>
+      </a:hlink>
+      <a:folHlink>
+        <a:srgbClr val="0097A7"/>
+      </a:folHlink>
+    </a:clrScheme>
+    <a:fontScheme name="Office">
+      <a:majorFont>
+        <a:latin typeface="Arial"/>
+        <a:ea typeface=""/>
+        <a:cs typeface=""/>
+        <a:font script="Jpan" typeface="ＭＳ Ｐゴシック"/>
+        <a:font script="Hang" typeface="맑은 고딕"/>
+        <a:font script="Hans" typeface="宋体"/>
+        <a:font script="Hant" typeface="新細明體"/>
+        <a:font script="Arab" typeface="Times New Roman"/>
+        <a:font script="Hebr" typeface="Times New Roman"/>
+        <a:font script="Thai" typeface="Angsana New"/>
+        <a:font script="Ethi" typeface="Nyala"/>
+        <a:font script="Beng" typeface="Vrinda"/>
+        <a:font script="Gujr" typeface="Shruti"/>
+        <a:font script="Khmr" typeface="MoolBoran"/>
+        <a:font script="Knda" typeface="Tunga"/>
+        <a:font script="Guru" typeface="Raavi"/>
+        <a:font script="Cans" typeface="Euphemia"/>
+        <a:font script="Cher" typeface="Plantagenet Cherokee"/>
+        <a:font script="Yiii" typeface="Microsoft Yi Baiti"/>
+        <a:font script="Tibt" typeface="Microsoft Himalaya"/>
+        <a:font script="Thaa" typeface="MV Boli"/>
+        <a:font script="Deva" typeface="Mangal"/>
+        <a:font script="Telu" typeface="Gautami"/>
+        <a:font script="Taml" typeface="Latha"/>
+        <a:font script="Syrc" typeface="Estrangelo Edessa"/>
+        <a:font script="Orya" typeface="Kalinga"/>
+        <a:font script="Mlym" typeface="Kartika"/>
+        <a:font script="Laoo" typeface="DokChampa"/>
+        <a:font script="Sinh" typeface="Iskoola Pota"/>
+        <a:font script="Mong" typeface="Mongolian Baiti"/>
+        <a:font script="Viet" typeface="Times New Roman"/>
+        <a:font script="Uigh" typeface="Microsoft Uighur"/>
+        <a:font script="Geor" typeface="Sylfaen"/>
+      </a:majorFont>
+      <a:minorFont>
+        <a:latin typeface="Arial"/>
+        <a:ea typeface=""/>
+        <a:cs typeface=""/>
+        <a:font script="Jpan" typeface="ＭＳ Ｐゴシック"/>
+        <a:font script="Hang" typeface="맑은 고딕"/>
+        <a:font script="Hans" typeface="宋体"/>
+        <a:font script="Hant" typeface="新細明體"/>
+        <a:font script="Arab" typeface="Arial"/>
+        <a:font script="Hebr" typeface="Arial"/>
+        <a:font script="Thai" typeface="Cordia New"/>
+        <a:font script="Ethi" typeface="Nyala"/>
+        <a:font script="Beng" typeface="Vrinda"/>
+        <a:font script="Gujr" typeface="Shruti"/>
+        <a:font script="Khmr" typeface="DaunPenh"/>
+        <a:font script="Knda" typeface="Tunga"/>
+        <a:font script="Guru" typeface="Raavi"/>
+        <a:font script="Cans" typeface="Euphemia"/>
+        <a:font script="Cher" typeface="Plantagenet Cherokee"/>
+        <a:font script="Yiii" typeface="Microsoft Yi Baiti"/>
+        <a:font script="Tibt" typeface="Microsoft Himalaya"/>
+        <a:font script="Thaa" typeface="MV Boli"/>
+        <a:font script="Deva" typeface="Mangal"/>
+        <a:font script="Telu" typeface="Gautami"/>
+        <a:font script="Taml" typeface="Latha"/>
+        <a:font script="Syrc" typeface="Estrangelo Edessa"/>
+        <a:font script="Orya" typeface="Kalinga"/>
+        <a:font script="Mlym" typeface="Kartika"/>
+        <a:font script="Laoo" typeface="DokChampa"/>
+        <a:font script="Sinh" typeface="Iskoola Pota"/>
+        <a:font script="Mong" typeface="Mongolian Baiti"/>
+        <a:font script="Viet" typeface="Arial"/>
+        <a:font script="Uigh" typeface="Microsoft Uighur"/>
+        <a:font script="Geor" typeface="Sylfaen"/>
+      </a:minorFont>
+    </a:fontScheme>
+    <a:fmtScheme name="Office">
+      <a:fillStyleLst>
+        <a:solidFill>
+          <a:schemeClr val="phClr"/>
+        </a:solidFill>
+        <a:gradFill rotWithShape="1">
+          <a:gsLst>
+            <a:gs pos="0">
+              <a:schemeClr val="phClr">
+                <a:tint val="50000"/>
+                <a:satMod val="300000"/>
+              </a:schemeClr>
+            </a:gs>
+            <a:gs pos="35000">
+              <a:schemeClr val="phClr">
+                <a:tint val="37000"/>
+                <a:satMod val="300000"/>
+              </a:schemeClr>
+            </a:gs>
+            <a:gs pos="100000">
+              <a:schemeClr val="phClr">
+                <a:tint val="15000"/>
+                <a:satMod val="350000"/>
+              </a:schemeClr>
+            </a:gs>
+          </a:gsLst>
+          <a:lin ang="16200000" scaled="1"/>
+        </a:gradFill>
+        <a:gradFill rotWithShape="1">
+          <a:gsLst>
+            <a:gs pos="0">
+              <a:schemeClr val="phClr">
+                <a:tint val="100000"/>
+                <a:shade val="100000"/>
+                <a:satMod val="130000"/>
+              </a:schemeClr>
+            </a:gs>
+            <a:gs pos="100000">
+              <a:schemeClr val="phClr">
+                <a:tint val="50000"/>
+                <a:shade val="100000"/>
+                <a:satMod val="350000"/>
+              </a:schemeClr>
+            </a:gs>
+          </a:gsLst>
+          <a:lin ang="16200000" scaled="0"/>
+        </a:gradFill>
+      </a:fillStyleLst>
+      <a:lnStyleLst>
+        <a:ln w="9525" cap="flat" cmpd="sng" algn="ctr">
+          <a:solidFill>
+            <a:schemeClr val="phClr">
+              <a:shade val="95000"/>
+              <a:satMod val="105000"/>
+            </a:schemeClr>
+          </a:solidFill>
+          <a:prstDash val="solid"/>
+        </a:ln>
+        <a:ln w="25400" cap="flat" cmpd="sng" algn="ctr">
+          <a:solidFill>
+            <a:schemeClr val="phClr"/>
+          </a:solidFill>
+          <a:prstDash val="solid"/>
+        </a:ln>
+        <a:ln w="38100" cap="flat" cmpd="sng" algn="ctr">
+          <a:solidFill>
+            <a:schemeClr val="phClr"/>
+          </a:solidFill>
+          <a:prstDash val="solid"/>
+        </a:ln>
+      </a:lnStyleLst>
+      <a:effectStyleLst>
+        <a:effectStyle>
+          <a:effectLst>
+            <a:outerShdw blurRad="40000" dist="20000" dir="5400000" rotWithShape="0">
+              <a:srgbClr val="000000">
+                <a:alpha val="38000"/>
+              </a:srgbClr>
+            </a:outerShdw>
+          </a:effectLst>
+        </a:effectStyle>
+        <a:effectStyle>
+          <a:effectLst>
+            <a:outerShdw blurRad="40000" dist="23000" dir="5400000" rotWithShape="0">
+              <a:srgbClr val="000000">
+                <a:alpha val="35000"/>
+              </a:srgbClr>
+            </a:outerShdw>
+          </a:effectLst>
+        </a:effectStyle>
+        <a:effectStyle>
+          <a:effectLst>
+            <a:outerShdw blurRad="40000" dist="23000" dir="5400000" rotWithShape="0">
+              <a:srgbClr val="000000">
+                <a:alpha val="35000"/>
+              </a:srgbClr>
+            </a:outerShdw>
+          </a:effectLst>
+          <a:scene3d>
+            <a:camera prst="orthographicFront">
+              <a:rot lat="0" lon="0" rev="0"/>
+            </a:camera>
+            <a:lightRig rig="threePt" dir="t">
+              <a:rot lat="0" lon="0" rev="1200000"/>
+            </a:lightRig>
+          </a:scene3d>
+          <a:sp3d>
+            <a:bevelT w="63500" h="25400"/>
+          </a:sp3d>
+        </a:effectStyle>
+      </a:effectStyleLst>
+      <a:bgFillStyleLst>
+        <a:solidFill>
+          <a:schemeClr val="phClr"/>
+        </a:solidFill>
+        <a:gradFill rotWithShape="1">
+          <a:gsLst>
+            <a:gs pos="0">
+              <a:schemeClr val="phClr">
+                <a:tint val="40000"/>
+                <a:satMod val="350000"/>
+              </a:schemeClr>
+            </a:gs>
+            <a:gs pos="40000">
+              <a:schemeClr val="phClr">
+                <a:tint val="45000"/>
+                <a:shade val="99000"/>
+                <a:satMod val="350000"/>
+              </a:schemeClr>
+            </a:gs>
+            <a:gs pos="100000">
+              <a:schemeClr val="phClr">
+                <a:shade val="20000"/>
+                <a:satMod val="255000"/>
+              </a:schemeClr>
+            </a:gs>
+          </a:gsLst>
+          <a:path path="circle">
+            <a:fillToRect l="50000" t="-80000" r="50000" b="180000"/>
+          </a:path>
+        </a:gradFill>
+        <a:gradFill rotWithShape="1">
+          <a:gsLst>
+            <a:gs pos="0">
+              <a:schemeClr val="phClr">
+                <a:tint val="80000"/>
+                <a:satMod val="300000"/>
+              </a:schemeClr>
+            </a:gs>
+            <a:gs pos="100000">
+              <a:schemeClr val="phClr">
+                <a:shade val="30000"/>
+                <a:satMod val="200000"/>
+              </a:schemeClr>
+            </a:gs>
+          </a:gsLst>
+          <a:path path="circle">
+            <a:fillToRect l="50000" t="50000" r="50000" b="50000"/>
+          </a:path>
+        </a:gradFill>
+      </a:bgFillStyleLst>
+    </a:fmtScheme>
+  </a:themeElements>
+</a:theme>
+</file>
+
+<file path=ppt/theme/theme2.xml><?xml version="1.0" encoding="utf-8"?>
 <a:theme xmlns:a="http://schemas.openxmlformats.org/drawingml/2006/main" xmlns:r="http://schemas.openxmlformats.org/officeDocument/2006/relationships">
   <a:themeElements>
     <a:clrScheme name="Default">
@@ -34280,7 +34559,7 @@
 </a:theme>
 </file>
 
-<file path=ppt/theme/theme2.xml><?xml version="1.0" encoding="utf-8"?>
+<file path=ppt/theme/theme3.xml><?xml version="1.0" encoding="utf-8"?>
 <a:theme xmlns:a="http://schemas.openxmlformats.org/drawingml/2006/main" xmlns:r="http://schemas.openxmlformats.org/officeDocument/2006/relationships" name="LF Energy Theme 2023">
   <a:themeElements>
     <a:clrScheme name="Geometric">
@@ -34557,283 +34836,4 @@
     </a:fmtScheme>
   </a:themeElements>
 </a:theme>
-</file>
-
-<file path=ppt/theme/theme3.xml><?xml version="1.0" encoding="utf-8"?>
-<a:theme xmlns:a="http://schemas.openxmlformats.org/drawingml/2006/main" xmlns:r="http://schemas.openxmlformats.org/officeDocument/2006/relationships" name="Simple Light">
-  <a:themeElements>
-    <a:clrScheme name="Simple Light">
-      <a:dk1>
-        <a:srgbClr val="000000"/>
-      </a:dk1>
-      <a:lt1>
-        <a:srgbClr val="FFFFFF"/>
-      </a:lt1>
-      <a:dk2>
-        <a:srgbClr val="595959"/>
-      </a:dk2>
-      <a:lt2>
-        <a:srgbClr val="EEEEEE"/>
-      </a:lt2>
-      <a:accent1>
-        <a:srgbClr val="4285F4"/>
-      </a:accent1>
-      <a:accent2>
-        <a:srgbClr val="212121"/>
-      </a:accent2>
-      <a:accent3>
-        <a:srgbClr val="78909C"/>
-      </a:accent3>
-      <a:accent4>
-        <a:srgbClr val="FFAB40"/>
-      </a:accent4>
-      <a:accent5>
-        <a:srgbClr val="0097A7"/>
-      </a:accent5>
-      <a:accent6>
-        <a:srgbClr val="EEFF41"/>
-      </a:accent6>
-      <a:hlink>
-        <a:srgbClr val="0097A7"/>
-      </a:hlink>
-      <a:folHlink>
-        <a:srgbClr val="0097A7"/>
-      </a:folHlink>
-    </a:clrScheme>
-    <a:fontScheme name="Office">
-      <a:majorFont>
-        <a:latin typeface="Arial"/>
-        <a:ea typeface=""/>
-        <a:cs typeface=""/>
-        <a:font script="Jpan" typeface="ＭＳ Ｐゴシック"/>
-        <a:font script="Hang" typeface="맑은 고딕"/>
-        <a:font script="Hans" typeface="宋体"/>
-        <a:font script="Hant" typeface="新細明體"/>
-        <a:font script="Arab" typeface="Times New Roman"/>
-        <a:font script="Hebr" typeface="Times New Roman"/>
-        <a:font script="Thai" typeface="Angsana New"/>
-        <a:font script="Ethi" typeface="Nyala"/>
-        <a:font script="Beng" typeface="Vrinda"/>
-        <a:font script="Gujr" typeface="Shruti"/>
-        <a:font script="Khmr" typeface="MoolBoran"/>
-        <a:font script="Knda" typeface="Tunga"/>
-        <a:font script="Guru" typeface="Raavi"/>
-        <a:font script="Cans" typeface="Euphemia"/>
-        <a:font script="Cher" typeface="Plantagenet Cherokee"/>
-        <a:font script="Yiii" typeface="Microsoft Yi Baiti"/>
-        <a:font script="Tibt" typeface="Microsoft Himalaya"/>
-        <a:font script="Thaa" typeface="MV Boli"/>
-        <a:font script="Deva" typeface="Mangal"/>
-        <a:font script="Telu" typeface="Gautami"/>
-        <a:font script="Taml" typeface="Latha"/>
-        <a:font script="Syrc" typeface="Estrangelo Edessa"/>
-        <a:font script="Orya" typeface="Kalinga"/>
-        <a:font script="Mlym" typeface="Kartika"/>
-        <a:font script="Laoo" typeface="DokChampa"/>
-        <a:font script="Sinh" typeface="Iskoola Pota"/>
-        <a:font script="Mong" typeface="Mongolian Baiti"/>
-        <a:font script="Viet" typeface="Times New Roman"/>
-        <a:font script="Uigh" typeface="Microsoft Uighur"/>
-        <a:font script="Geor" typeface="Sylfaen"/>
-      </a:majorFont>
-      <a:minorFont>
-        <a:latin typeface="Arial"/>
-        <a:ea typeface=""/>
-        <a:cs typeface=""/>
-        <a:font script="Jpan" typeface="ＭＳ Ｐゴシック"/>
-        <a:font script="Hang" typeface="맑은 고딕"/>
-        <a:font script="Hans" typeface="宋体"/>
-        <a:font script="Hant" typeface="新細明體"/>
-        <a:font script="Arab" typeface="Arial"/>
-        <a:font script="Hebr" typeface="Arial"/>
-        <a:font script="Thai" typeface="Cordia New"/>
-        <a:font script="Ethi" typeface="Nyala"/>
-        <a:font script="Beng" typeface="Vrinda"/>
-        <a:font script="Gujr" typeface="Shruti"/>
-        <a:font script="Khmr" typeface="DaunPenh"/>
-        <a:font script="Knda" typeface="Tunga"/>
-        <a:font script="Guru" typeface="Raavi"/>
-        <a:font script="Cans" typeface="Euphemia"/>
-        <a:font script="Cher" typeface="Plantagenet Cherokee"/>
-        <a:font script="Yiii" typeface="Microsoft Yi Baiti"/>
-        <a:font script="Tibt" typeface="Microsoft Himalaya"/>
-        <a:font script="Thaa" typeface="MV Boli"/>
-        <a:font script="Deva" typeface="Mangal"/>
-        <a:font script="Telu" typeface="Gautami"/>
-        <a:font script="Taml" typeface="Latha"/>
-        <a:font script="Syrc" typeface="Estrangelo Edessa"/>
-        <a:font script="Orya" typeface="Kalinga"/>
-        <a:font script="Mlym" typeface="Kartika"/>
-        <a:font script="Laoo" typeface="DokChampa"/>
-        <a:font script="Sinh" typeface="Iskoola Pota"/>
-        <a:font script="Mong" typeface="Mongolian Baiti"/>
-        <a:font script="Viet" typeface="Arial"/>
-        <a:font script="Uigh" typeface="Microsoft Uighur"/>
-        <a:font script="Geor" typeface="Sylfaen"/>
-      </a:minorFont>
-    </a:fontScheme>
-    <a:fmtScheme name="Office">
-      <a:fillStyleLst>
-        <a:solidFill>
-          <a:schemeClr val="phClr"/>
-        </a:solidFill>
-        <a:gradFill rotWithShape="1">
-          <a:gsLst>
-            <a:gs pos="0">
-              <a:schemeClr val="phClr">
-                <a:tint val="50000"/>
-                <a:satMod val="300000"/>
-              </a:schemeClr>
-            </a:gs>
-            <a:gs pos="35000">
-              <a:schemeClr val="phClr">
-                <a:tint val="37000"/>
-                <a:satMod val="300000"/>
-              </a:schemeClr>
-            </a:gs>
-            <a:gs pos="100000">
-              <a:schemeClr val="phClr">
-                <a:tint val="15000"/>
-                <a:satMod val="350000"/>
-              </a:schemeClr>
-            </a:gs>
-          </a:gsLst>
-          <a:lin ang="16200000" scaled="1"/>
-        </a:gradFill>
-        <a:gradFill rotWithShape="1">
-          <a:gsLst>
-            <a:gs pos="0">
-              <a:schemeClr val="phClr">
-                <a:tint val="100000"/>
-                <a:shade val="100000"/>
-                <a:satMod val="130000"/>
-              </a:schemeClr>
-            </a:gs>
-            <a:gs pos="100000">
-              <a:schemeClr val="phClr">
-                <a:tint val="50000"/>
-                <a:shade val="100000"/>
-                <a:satMod val="350000"/>
-              </a:schemeClr>
-            </a:gs>
-          </a:gsLst>
-          <a:lin ang="16200000" scaled="0"/>
-        </a:gradFill>
-      </a:fillStyleLst>
-      <a:lnStyleLst>
-        <a:ln w="9525" cap="flat" cmpd="sng" algn="ctr">
-          <a:solidFill>
-            <a:schemeClr val="phClr">
-              <a:shade val="95000"/>
-              <a:satMod val="105000"/>
-            </a:schemeClr>
-          </a:solidFill>
-          <a:prstDash val="solid"/>
-        </a:ln>
-        <a:ln w="25400" cap="flat" cmpd="sng" algn="ctr">
-          <a:solidFill>
-            <a:schemeClr val="phClr"/>
-          </a:solidFill>
-          <a:prstDash val="solid"/>
-        </a:ln>
-        <a:ln w="38100" cap="flat" cmpd="sng" algn="ctr">
-          <a:solidFill>
-            <a:schemeClr val="phClr"/>
-          </a:solidFill>
-          <a:prstDash val="solid"/>
-        </a:ln>
-      </a:lnStyleLst>
-      <a:effectStyleLst>
-        <a:effectStyle>
-          <a:effectLst>
-            <a:outerShdw blurRad="40000" dist="20000" dir="5400000" rotWithShape="0">
-              <a:srgbClr val="000000">
-                <a:alpha val="38000"/>
-              </a:srgbClr>
-            </a:outerShdw>
-          </a:effectLst>
-        </a:effectStyle>
-        <a:effectStyle>
-          <a:effectLst>
-            <a:outerShdw blurRad="40000" dist="23000" dir="5400000" rotWithShape="0">
-              <a:srgbClr val="000000">
-                <a:alpha val="35000"/>
-              </a:srgbClr>
-            </a:outerShdw>
-          </a:effectLst>
-        </a:effectStyle>
-        <a:effectStyle>
-          <a:effectLst>
-            <a:outerShdw blurRad="40000" dist="23000" dir="5400000" rotWithShape="0">
-              <a:srgbClr val="000000">
-                <a:alpha val="35000"/>
-              </a:srgbClr>
-            </a:outerShdw>
-          </a:effectLst>
-          <a:scene3d>
-            <a:camera prst="orthographicFront">
-              <a:rot lat="0" lon="0" rev="0"/>
-            </a:camera>
-            <a:lightRig rig="threePt" dir="t">
-              <a:rot lat="0" lon="0" rev="1200000"/>
-            </a:lightRig>
-          </a:scene3d>
-          <a:sp3d>
-            <a:bevelT w="63500" h="25400"/>
-          </a:sp3d>
-        </a:effectStyle>
-      </a:effectStyleLst>
-      <a:bgFillStyleLst>
-        <a:solidFill>
-          <a:schemeClr val="phClr"/>
-        </a:solidFill>
-        <a:gradFill rotWithShape="1">
-          <a:gsLst>
-            <a:gs pos="0">
-              <a:schemeClr val="phClr">
-                <a:tint val="40000"/>
-                <a:satMod val="350000"/>
-              </a:schemeClr>
-            </a:gs>
-            <a:gs pos="40000">
-              <a:schemeClr val="phClr">
-                <a:tint val="45000"/>
-                <a:shade val="99000"/>
-                <a:satMod val="350000"/>
-              </a:schemeClr>
-            </a:gs>
-            <a:gs pos="100000">
-              <a:schemeClr val="phClr">
-                <a:shade val="20000"/>
-                <a:satMod val="255000"/>
-              </a:schemeClr>
-            </a:gs>
-          </a:gsLst>
-          <a:path path="circle">
-            <a:fillToRect l="50000" t="-80000" r="50000" b="180000"/>
-          </a:path>
-        </a:gradFill>
-        <a:gradFill rotWithShape="1">
-          <a:gsLst>
-            <a:gs pos="0">
-              <a:schemeClr val="phClr">
-                <a:tint val="80000"/>
-                <a:satMod val="300000"/>
-              </a:schemeClr>
-            </a:gs>
-            <a:gs pos="100000">
-              <a:schemeClr val="phClr">
-                <a:shade val="30000"/>
-                <a:satMod val="200000"/>
-              </a:schemeClr>
-            </a:gs>
-          </a:gsLst>
-          <a:path path="circle">
-            <a:fillToRect l="50000" t="50000" r="50000" b="50000"/>
-          </a:path>
-        </a:gradFill>
-      </a:bgFillStyleLst>
-    </a:fmtScheme>
-  </a:themeElements>
-</a:theme>
 </file>
</xml_diff>

<commit_message>
Update Data Sources from LFX 2026-02-05 (#78)
Update Data Sources from LFX

Signed-off-by: github-actions[bot] <41898282+github-actions[bot]@users.noreply.github.com>
</commit_message>
<xml_diff>
--- a/overview_deck/LF Energy High Level Overview.pptx
+++ b/overview_deck/LF Energy High Level Overview.pptx
@@ -25946,7 +25946,7 @@
             <a:tbl>
               <a:tblPr>
                 <a:noFill/>
-                <a:tableStyleId>{8D3E67DC-7664-4D72-9394-26F2834BD407}</a:tableStyleId>
+                <a:tableStyleId>{C13E3245-A485-425E-8DFC-A9FE81DB0A83}</a:tableStyleId>
               </a:tblPr>
               <a:tblGrid>
                 <a:gridCol w="1695200"/>
@@ -26736,7 +26736,7 @@
             <a:tbl>
               <a:tblPr>
                 <a:noFill/>
-                <a:tableStyleId>{8D3E67DC-7664-4D72-9394-26F2834BD407}</a:tableStyleId>
+                <a:tableStyleId>{C13E3245-A485-425E-8DFC-A9FE81DB0A83}</a:tableStyleId>
               </a:tblPr>
               <a:tblGrid>
                 <a:gridCol w="1695200"/>
@@ -27426,7 +27426,7 @@
             <a:tbl>
               <a:tblPr>
                 <a:noFill/>
-                <a:tableStyleId>{8D3E67DC-7664-4D72-9394-26F2834BD407}</a:tableStyleId>
+                <a:tableStyleId>{C13E3245-A485-425E-8DFC-A9FE81DB0A83}</a:tableStyleId>
               </a:tblPr>
               <a:tblGrid>
                 <a:gridCol w="1695200"/>
@@ -28678,7 +28678,7 @@
             <a:tbl>
               <a:tblPr>
                 <a:noFill/>
-                <a:tableStyleId>{8D3E67DC-7664-4D72-9394-26F2834BD407}</a:tableStyleId>
+                <a:tableStyleId>{C13E3245-A485-425E-8DFC-A9FE81DB0A83}</a:tableStyleId>
               </a:tblPr>
               <a:tblGrid>
                 <a:gridCol w="1695200"/>
@@ -29670,7 +29670,7 @@
             <a:tbl>
               <a:tblPr>
                 <a:noFill/>
-                <a:tableStyleId>{8D3E67DC-7664-4D72-9394-26F2834BD407}</a:tableStyleId>
+                <a:tableStyleId>{C13E3245-A485-425E-8DFC-A9FE81DB0A83}</a:tableStyleId>
               </a:tblPr>
               <a:tblGrid>
                 <a:gridCol w="3048000"/>
@@ -33175,7 +33175,7 @@
             <a:tbl>
               <a:tblPr>
                 <a:noFill/>
-                <a:tableStyleId>{8D3E67DC-7664-4D72-9394-26F2834BD407}</a:tableStyleId>
+                <a:tableStyleId>{C13E3245-A485-425E-8DFC-A9FE81DB0A83}</a:tableStyleId>
               </a:tblPr>
               <a:tblGrid>
                 <a:gridCol w="1828800"/>
@@ -34002,6 +34002,285 @@
 </file>
 
 <file path=ppt/theme/theme1.xml><?xml version="1.0" encoding="utf-8"?>
+<a:theme xmlns:a="http://schemas.openxmlformats.org/drawingml/2006/main" xmlns:r="http://schemas.openxmlformats.org/officeDocument/2006/relationships" name="LF Energy Theme 2023">
+  <a:themeElements>
+    <a:clrScheme name="Geometric">
+      <a:dk1>
+        <a:srgbClr val="222222"/>
+      </a:dk1>
+      <a:lt1>
+        <a:srgbClr val="FFFFFF"/>
+      </a:lt1>
+      <a:dk2>
+        <a:srgbClr val="434343"/>
+      </a:dk2>
+      <a:lt2>
+        <a:srgbClr val="999999"/>
+      </a:lt2>
+      <a:accent1>
+        <a:srgbClr val="003778"/>
+      </a:accent1>
+      <a:accent2>
+        <a:srgbClr val="0094FF"/>
+      </a:accent2>
+      <a:accent3>
+        <a:srgbClr val="5B1DE7"/>
+      </a:accent3>
+      <a:accent4>
+        <a:srgbClr val="12E2E2"/>
+      </a:accent4>
+      <a:accent5>
+        <a:srgbClr val="FF00AA"/>
+      </a:accent5>
+      <a:accent6>
+        <a:srgbClr val="ACDE1F"/>
+      </a:accent6>
+      <a:hlink>
+        <a:srgbClr val="0077CC"/>
+      </a:hlink>
+      <a:folHlink>
+        <a:srgbClr val="F06292"/>
+      </a:folHlink>
+    </a:clrScheme>
+    <a:fontScheme name="Office">
+      <a:majorFont>
+        <a:latin typeface="Arial"/>
+        <a:ea typeface=""/>
+        <a:cs typeface=""/>
+        <a:font script="Jpan" typeface="ＭＳ Ｐゴシック"/>
+        <a:font script="Hang" typeface="맑은 고딕"/>
+        <a:font script="Hans" typeface="宋体"/>
+        <a:font script="Hant" typeface="新細明體"/>
+        <a:font script="Arab" typeface="Times New Roman"/>
+        <a:font script="Hebr" typeface="Times New Roman"/>
+        <a:font script="Thai" typeface="Angsana New"/>
+        <a:font script="Ethi" typeface="Nyala"/>
+        <a:font script="Beng" typeface="Vrinda"/>
+        <a:font script="Gujr" typeface="Shruti"/>
+        <a:font script="Khmr" typeface="MoolBoran"/>
+        <a:font script="Knda" typeface="Tunga"/>
+        <a:font script="Guru" typeface="Raavi"/>
+        <a:font script="Cans" typeface="Euphemia"/>
+        <a:font script="Cher" typeface="Plantagenet Cherokee"/>
+        <a:font script="Yiii" typeface="Microsoft Yi Baiti"/>
+        <a:font script="Tibt" typeface="Microsoft Himalaya"/>
+        <a:font script="Thaa" typeface="MV Boli"/>
+        <a:font script="Deva" typeface="Mangal"/>
+        <a:font script="Telu" typeface="Gautami"/>
+        <a:font script="Taml" typeface="Latha"/>
+        <a:font script="Syrc" typeface="Estrangelo Edessa"/>
+        <a:font script="Orya" typeface="Kalinga"/>
+        <a:font script="Mlym" typeface="Kartika"/>
+        <a:font script="Laoo" typeface="DokChampa"/>
+        <a:font script="Sinh" typeface="Iskoola Pota"/>
+        <a:font script="Mong" typeface="Mongolian Baiti"/>
+        <a:font script="Viet" typeface="Times New Roman"/>
+        <a:font script="Uigh" typeface="Microsoft Uighur"/>
+        <a:font script="Geor" typeface="Sylfaen"/>
+      </a:majorFont>
+      <a:minorFont>
+        <a:latin typeface="Arial"/>
+        <a:ea typeface=""/>
+        <a:cs typeface=""/>
+        <a:font script="Jpan" typeface="ＭＳ Ｐゴシック"/>
+        <a:font script="Hang" typeface="맑은 고딕"/>
+        <a:font script="Hans" typeface="宋体"/>
+        <a:font script="Hant" typeface="新細明體"/>
+        <a:font script="Arab" typeface="Arial"/>
+        <a:font script="Hebr" typeface="Arial"/>
+        <a:font script="Thai" typeface="Cordia New"/>
+        <a:font script="Ethi" typeface="Nyala"/>
+        <a:font script="Beng" typeface="Vrinda"/>
+        <a:font script="Gujr" typeface="Shruti"/>
+        <a:font script="Khmr" typeface="DaunPenh"/>
+        <a:font script="Knda" typeface="Tunga"/>
+        <a:font script="Guru" typeface="Raavi"/>
+        <a:font script="Cans" typeface="Euphemia"/>
+        <a:font script="Cher" typeface="Plantagenet Cherokee"/>
+        <a:font script="Yiii" typeface="Microsoft Yi Baiti"/>
+        <a:font script="Tibt" typeface="Microsoft Himalaya"/>
+        <a:font script="Thaa" typeface="MV Boli"/>
+        <a:font script="Deva" typeface="Mangal"/>
+        <a:font script="Telu" typeface="Gautami"/>
+        <a:font script="Taml" typeface="Latha"/>
+        <a:font script="Syrc" typeface="Estrangelo Edessa"/>
+        <a:font script="Orya" typeface="Kalinga"/>
+        <a:font script="Mlym" typeface="Kartika"/>
+        <a:font script="Laoo" typeface="DokChampa"/>
+        <a:font script="Sinh" typeface="Iskoola Pota"/>
+        <a:font script="Mong" typeface="Mongolian Baiti"/>
+        <a:font script="Viet" typeface="Arial"/>
+        <a:font script="Uigh" typeface="Microsoft Uighur"/>
+        <a:font script="Geor" typeface="Sylfaen"/>
+      </a:minorFont>
+    </a:fontScheme>
+    <a:fmtScheme name="Office">
+      <a:fillStyleLst>
+        <a:solidFill>
+          <a:schemeClr val="phClr"/>
+        </a:solidFill>
+        <a:gradFill rotWithShape="1">
+          <a:gsLst>
+            <a:gs pos="0">
+              <a:schemeClr val="phClr">
+                <a:tint val="50000"/>
+                <a:satMod val="300000"/>
+              </a:schemeClr>
+            </a:gs>
+            <a:gs pos="35000">
+              <a:schemeClr val="phClr">
+                <a:tint val="37000"/>
+                <a:satMod val="300000"/>
+              </a:schemeClr>
+            </a:gs>
+            <a:gs pos="100000">
+              <a:schemeClr val="phClr">
+                <a:tint val="15000"/>
+                <a:satMod val="350000"/>
+              </a:schemeClr>
+            </a:gs>
+          </a:gsLst>
+          <a:lin ang="16200000" scaled="1"/>
+        </a:gradFill>
+        <a:gradFill rotWithShape="1">
+          <a:gsLst>
+            <a:gs pos="0">
+              <a:schemeClr val="phClr">
+                <a:tint val="100000"/>
+                <a:shade val="100000"/>
+                <a:satMod val="130000"/>
+              </a:schemeClr>
+            </a:gs>
+            <a:gs pos="100000">
+              <a:schemeClr val="phClr">
+                <a:tint val="50000"/>
+                <a:shade val="100000"/>
+                <a:satMod val="350000"/>
+              </a:schemeClr>
+            </a:gs>
+          </a:gsLst>
+          <a:lin ang="16200000" scaled="0"/>
+        </a:gradFill>
+      </a:fillStyleLst>
+      <a:lnStyleLst>
+        <a:ln w="9525" cap="flat" cmpd="sng" algn="ctr">
+          <a:solidFill>
+            <a:schemeClr val="phClr">
+              <a:shade val="95000"/>
+              <a:satMod val="105000"/>
+            </a:schemeClr>
+          </a:solidFill>
+          <a:prstDash val="solid"/>
+        </a:ln>
+        <a:ln w="25400" cap="flat" cmpd="sng" algn="ctr">
+          <a:solidFill>
+            <a:schemeClr val="phClr"/>
+          </a:solidFill>
+          <a:prstDash val="solid"/>
+        </a:ln>
+        <a:ln w="38100" cap="flat" cmpd="sng" algn="ctr">
+          <a:solidFill>
+            <a:schemeClr val="phClr"/>
+          </a:solidFill>
+          <a:prstDash val="solid"/>
+        </a:ln>
+      </a:lnStyleLst>
+      <a:effectStyleLst>
+        <a:effectStyle>
+          <a:effectLst>
+            <a:outerShdw blurRad="40000" dist="20000" dir="5400000" rotWithShape="0">
+              <a:srgbClr val="000000">
+                <a:alpha val="38000"/>
+              </a:srgbClr>
+            </a:outerShdw>
+          </a:effectLst>
+        </a:effectStyle>
+        <a:effectStyle>
+          <a:effectLst>
+            <a:outerShdw blurRad="40000" dist="23000" dir="5400000" rotWithShape="0">
+              <a:srgbClr val="000000">
+                <a:alpha val="35000"/>
+              </a:srgbClr>
+            </a:outerShdw>
+          </a:effectLst>
+        </a:effectStyle>
+        <a:effectStyle>
+          <a:effectLst>
+            <a:outerShdw blurRad="40000" dist="23000" dir="5400000" rotWithShape="0">
+              <a:srgbClr val="000000">
+                <a:alpha val="35000"/>
+              </a:srgbClr>
+            </a:outerShdw>
+          </a:effectLst>
+          <a:scene3d>
+            <a:camera prst="orthographicFront">
+              <a:rot lat="0" lon="0" rev="0"/>
+            </a:camera>
+            <a:lightRig rig="threePt" dir="t">
+              <a:rot lat="0" lon="0" rev="1200000"/>
+            </a:lightRig>
+          </a:scene3d>
+          <a:sp3d>
+            <a:bevelT w="63500" h="25400"/>
+          </a:sp3d>
+        </a:effectStyle>
+      </a:effectStyleLst>
+      <a:bgFillStyleLst>
+        <a:solidFill>
+          <a:schemeClr val="phClr"/>
+        </a:solidFill>
+        <a:gradFill rotWithShape="1">
+          <a:gsLst>
+            <a:gs pos="0">
+              <a:schemeClr val="phClr">
+                <a:tint val="40000"/>
+                <a:satMod val="350000"/>
+              </a:schemeClr>
+            </a:gs>
+            <a:gs pos="40000">
+              <a:schemeClr val="phClr">
+                <a:tint val="45000"/>
+                <a:shade val="99000"/>
+                <a:satMod val="350000"/>
+              </a:schemeClr>
+            </a:gs>
+            <a:gs pos="100000">
+              <a:schemeClr val="phClr">
+                <a:shade val="20000"/>
+                <a:satMod val="255000"/>
+              </a:schemeClr>
+            </a:gs>
+          </a:gsLst>
+          <a:path path="circle">
+            <a:fillToRect l="50000" t="-80000" r="50000" b="180000"/>
+          </a:path>
+        </a:gradFill>
+        <a:gradFill rotWithShape="1">
+          <a:gsLst>
+            <a:gs pos="0">
+              <a:schemeClr val="phClr">
+                <a:tint val="80000"/>
+                <a:satMod val="300000"/>
+              </a:schemeClr>
+            </a:gs>
+            <a:gs pos="100000">
+              <a:schemeClr val="phClr">
+                <a:shade val="30000"/>
+                <a:satMod val="200000"/>
+              </a:schemeClr>
+            </a:gs>
+          </a:gsLst>
+          <a:path path="circle">
+            <a:fillToRect l="50000" t="50000" r="50000" b="50000"/>
+          </a:path>
+        </a:gradFill>
+      </a:bgFillStyleLst>
+    </a:fmtScheme>
+  </a:themeElements>
+</a:theme>
+</file>
+
+<file path=ppt/theme/theme2.xml><?xml version="1.0" encoding="utf-8"?>
 <a:theme xmlns:a="http://schemas.openxmlformats.org/drawingml/2006/main" xmlns:r="http://schemas.openxmlformats.org/officeDocument/2006/relationships" name="Simple Light">
   <a:themeElements>
     <a:clrScheme name="Simple Light">
@@ -34280,7 +34559,7 @@
 </a:theme>
 </file>
 
-<file path=ppt/theme/theme2.xml><?xml version="1.0" encoding="utf-8"?>
+<file path=ppt/theme/theme3.xml><?xml version="1.0" encoding="utf-8"?>
 <a:theme xmlns:a="http://schemas.openxmlformats.org/drawingml/2006/main" xmlns:r="http://schemas.openxmlformats.org/officeDocument/2006/relationships">
   <a:themeElements>
     <a:clrScheme name="Default">
@@ -34557,283 +34836,4 @@
     </a:fmtScheme>
   </a:themeElements>
 </a:theme>
-</file>
-
-<file path=ppt/theme/theme3.xml><?xml version="1.0" encoding="utf-8"?>
-<a:theme xmlns:a="http://schemas.openxmlformats.org/drawingml/2006/main" xmlns:r="http://schemas.openxmlformats.org/officeDocument/2006/relationships" name="LF Energy Theme 2023">
-  <a:themeElements>
-    <a:clrScheme name="Geometric">
-      <a:dk1>
-        <a:srgbClr val="222222"/>
-      </a:dk1>
-      <a:lt1>
-        <a:srgbClr val="FFFFFF"/>
-      </a:lt1>
-      <a:dk2>
-        <a:srgbClr val="434343"/>
-      </a:dk2>
-      <a:lt2>
-        <a:srgbClr val="999999"/>
-      </a:lt2>
-      <a:accent1>
-        <a:srgbClr val="003778"/>
-      </a:accent1>
-      <a:accent2>
-        <a:srgbClr val="0094FF"/>
-      </a:accent2>
-      <a:accent3>
-        <a:srgbClr val="5B1DE7"/>
-      </a:accent3>
-      <a:accent4>
-        <a:srgbClr val="12E2E2"/>
-      </a:accent4>
-      <a:accent5>
-        <a:srgbClr val="FF00AA"/>
-      </a:accent5>
-      <a:accent6>
-        <a:srgbClr val="ACDE1F"/>
-      </a:accent6>
-      <a:hlink>
-        <a:srgbClr val="0077CC"/>
-      </a:hlink>
-      <a:folHlink>
-        <a:srgbClr val="F06292"/>
-      </a:folHlink>
-    </a:clrScheme>
-    <a:fontScheme name="Office">
-      <a:majorFont>
-        <a:latin typeface="Arial"/>
-        <a:ea typeface=""/>
-        <a:cs typeface=""/>
-        <a:font script="Jpan" typeface="ＭＳ Ｐゴシック"/>
-        <a:font script="Hang" typeface="맑은 고딕"/>
-        <a:font script="Hans" typeface="宋体"/>
-        <a:font script="Hant" typeface="新細明體"/>
-        <a:font script="Arab" typeface="Times New Roman"/>
-        <a:font script="Hebr" typeface="Times New Roman"/>
-        <a:font script="Thai" typeface="Angsana New"/>
-        <a:font script="Ethi" typeface="Nyala"/>
-        <a:font script="Beng" typeface="Vrinda"/>
-        <a:font script="Gujr" typeface="Shruti"/>
-        <a:font script="Khmr" typeface="MoolBoran"/>
-        <a:font script="Knda" typeface="Tunga"/>
-        <a:font script="Guru" typeface="Raavi"/>
-        <a:font script="Cans" typeface="Euphemia"/>
-        <a:font script="Cher" typeface="Plantagenet Cherokee"/>
-        <a:font script="Yiii" typeface="Microsoft Yi Baiti"/>
-        <a:font script="Tibt" typeface="Microsoft Himalaya"/>
-        <a:font script="Thaa" typeface="MV Boli"/>
-        <a:font script="Deva" typeface="Mangal"/>
-        <a:font script="Telu" typeface="Gautami"/>
-        <a:font script="Taml" typeface="Latha"/>
-        <a:font script="Syrc" typeface="Estrangelo Edessa"/>
-        <a:font script="Orya" typeface="Kalinga"/>
-        <a:font script="Mlym" typeface="Kartika"/>
-        <a:font script="Laoo" typeface="DokChampa"/>
-        <a:font script="Sinh" typeface="Iskoola Pota"/>
-        <a:font script="Mong" typeface="Mongolian Baiti"/>
-        <a:font script="Viet" typeface="Times New Roman"/>
-        <a:font script="Uigh" typeface="Microsoft Uighur"/>
-        <a:font script="Geor" typeface="Sylfaen"/>
-      </a:majorFont>
-      <a:minorFont>
-        <a:latin typeface="Arial"/>
-        <a:ea typeface=""/>
-        <a:cs typeface=""/>
-        <a:font script="Jpan" typeface="ＭＳ Ｐゴシック"/>
-        <a:font script="Hang" typeface="맑은 고딕"/>
-        <a:font script="Hans" typeface="宋体"/>
-        <a:font script="Hant" typeface="新細明體"/>
-        <a:font script="Arab" typeface="Arial"/>
-        <a:font script="Hebr" typeface="Arial"/>
-        <a:font script="Thai" typeface="Cordia New"/>
-        <a:font script="Ethi" typeface="Nyala"/>
-        <a:font script="Beng" typeface="Vrinda"/>
-        <a:font script="Gujr" typeface="Shruti"/>
-        <a:font script="Khmr" typeface="DaunPenh"/>
-        <a:font script="Knda" typeface="Tunga"/>
-        <a:font script="Guru" typeface="Raavi"/>
-        <a:font script="Cans" typeface="Euphemia"/>
-        <a:font script="Cher" typeface="Plantagenet Cherokee"/>
-        <a:font script="Yiii" typeface="Microsoft Yi Baiti"/>
-        <a:font script="Tibt" typeface="Microsoft Himalaya"/>
-        <a:font script="Thaa" typeface="MV Boli"/>
-        <a:font script="Deva" typeface="Mangal"/>
-        <a:font script="Telu" typeface="Gautami"/>
-        <a:font script="Taml" typeface="Latha"/>
-        <a:font script="Syrc" typeface="Estrangelo Edessa"/>
-        <a:font script="Orya" typeface="Kalinga"/>
-        <a:font script="Mlym" typeface="Kartika"/>
-        <a:font script="Laoo" typeface="DokChampa"/>
-        <a:font script="Sinh" typeface="Iskoola Pota"/>
-        <a:font script="Mong" typeface="Mongolian Baiti"/>
-        <a:font script="Viet" typeface="Arial"/>
-        <a:font script="Uigh" typeface="Microsoft Uighur"/>
-        <a:font script="Geor" typeface="Sylfaen"/>
-      </a:minorFont>
-    </a:fontScheme>
-    <a:fmtScheme name="Office">
-      <a:fillStyleLst>
-        <a:solidFill>
-          <a:schemeClr val="phClr"/>
-        </a:solidFill>
-        <a:gradFill rotWithShape="1">
-          <a:gsLst>
-            <a:gs pos="0">
-              <a:schemeClr val="phClr">
-                <a:tint val="50000"/>
-                <a:satMod val="300000"/>
-              </a:schemeClr>
-            </a:gs>
-            <a:gs pos="35000">
-              <a:schemeClr val="phClr">
-                <a:tint val="37000"/>
-                <a:satMod val="300000"/>
-              </a:schemeClr>
-            </a:gs>
-            <a:gs pos="100000">
-              <a:schemeClr val="phClr">
-                <a:tint val="15000"/>
-                <a:satMod val="350000"/>
-              </a:schemeClr>
-            </a:gs>
-          </a:gsLst>
-          <a:lin ang="16200000" scaled="1"/>
-        </a:gradFill>
-        <a:gradFill rotWithShape="1">
-          <a:gsLst>
-            <a:gs pos="0">
-              <a:schemeClr val="phClr">
-                <a:tint val="100000"/>
-                <a:shade val="100000"/>
-                <a:satMod val="130000"/>
-              </a:schemeClr>
-            </a:gs>
-            <a:gs pos="100000">
-              <a:schemeClr val="phClr">
-                <a:tint val="50000"/>
-                <a:shade val="100000"/>
-                <a:satMod val="350000"/>
-              </a:schemeClr>
-            </a:gs>
-          </a:gsLst>
-          <a:lin ang="16200000" scaled="0"/>
-        </a:gradFill>
-      </a:fillStyleLst>
-      <a:lnStyleLst>
-        <a:ln w="9525" cap="flat" cmpd="sng" algn="ctr">
-          <a:solidFill>
-            <a:schemeClr val="phClr">
-              <a:shade val="95000"/>
-              <a:satMod val="105000"/>
-            </a:schemeClr>
-          </a:solidFill>
-          <a:prstDash val="solid"/>
-        </a:ln>
-        <a:ln w="25400" cap="flat" cmpd="sng" algn="ctr">
-          <a:solidFill>
-            <a:schemeClr val="phClr"/>
-          </a:solidFill>
-          <a:prstDash val="solid"/>
-        </a:ln>
-        <a:ln w="38100" cap="flat" cmpd="sng" algn="ctr">
-          <a:solidFill>
-            <a:schemeClr val="phClr"/>
-          </a:solidFill>
-          <a:prstDash val="solid"/>
-        </a:ln>
-      </a:lnStyleLst>
-      <a:effectStyleLst>
-        <a:effectStyle>
-          <a:effectLst>
-            <a:outerShdw blurRad="40000" dist="20000" dir="5400000" rotWithShape="0">
-              <a:srgbClr val="000000">
-                <a:alpha val="38000"/>
-              </a:srgbClr>
-            </a:outerShdw>
-          </a:effectLst>
-        </a:effectStyle>
-        <a:effectStyle>
-          <a:effectLst>
-            <a:outerShdw blurRad="40000" dist="23000" dir="5400000" rotWithShape="0">
-              <a:srgbClr val="000000">
-                <a:alpha val="35000"/>
-              </a:srgbClr>
-            </a:outerShdw>
-          </a:effectLst>
-        </a:effectStyle>
-        <a:effectStyle>
-          <a:effectLst>
-            <a:outerShdw blurRad="40000" dist="23000" dir="5400000" rotWithShape="0">
-              <a:srgbClr val="000000">
-                <a:alpha val="35000"/>
-              </a:srgbClr>
-            </a:outerShdw>
-          </a:effectLst>
-          <a:scene3d>
-            <a:camera prst="orthographicFront">
-              <a:rot lat="0" lon="0" rev="0"/>
-            </a:camera>
-            <a:lightRig rig="threePt" dir="t">
-              <a:rot lat="0" lon="0" rev="1200000"/>
-            </a:lightRig>
-          </a:scene3d>
-          <a:sp3d>
-            <a:bevelT w="63500" h="25400"/>
-          </a:sp3d>
-        </a:effectStyle>
-      </a:effectStyleLst>
-      <a:bgFillStyleLst>
-        <a:solidFill>
-          <a:schemeClr val="phClr"/>
-        </a:solidFill>
-        <a:gradFill rotWithShape="1">
-          <a:gsLst>
-            <a:gs pos="0">
-              <a:schemeClr val="phClr">
-                <a:tint val="40000"/>
-                <a:satMod val="350000"/>
-              </a:schemeClr>
-            </a:gs>
-            <a:gs pos="40000">
-              <a:schemeClr val="phClr">
-                <a:tint val="45000"/>
-                <a:shade val="99000"/>
-                <a:satMod val="350000"/>
-              </a:schemeClr>
-            </a:gs>
-            <a:gs pos="100000">
-              <a:schemeClr val="phClr">
-                <a:shade val="20000"/>
-                <a:satMod val="255000"/>
-              </a:schemeClr>
-            </a:gs>
-          </a:gsLst>
-          <a:path path="circle">
-            <a:fillToRect l="50000" t="-80000" r="50000" b="180000"/>
-          </a:path>
-        </a:gradFill>
-        <a:gradFill rotWithShape="1">
-          <a:gsLst>
-            <a:gs pos="0">
-              <a:schemeClr val="phClr">
-                <a:tint val="80000"/>
-                <a:satMod val="300000"/>
-              </a:schemeClr>
-            </a:gs>
-            <a:gs pos="100000">
-              <a:schemeClr val="phClr">
-                <a:shade val="30000"/>
-                <a:satMod val="200000"/>
-              </a:schemeClr>
-            </a:gs>
-          </a:gsLst>
-          <a:path path="circle">
-            <a:fillToRect l="50000" t="50000" r="50000" b="50000"/>
-          </a:path>
-        </a:gradFill>
-      </a:bgFillStyleLst>
-    </a:fmtScheme>
-  </a:themeElements>
-</a:theme>
 </file>
</xml_diff>

<commit_message>
Update Data Sources from LFX 2026-02-06 (#79)
Update Data Sources from LFX

Signed-off-by: github-actions[bot] <41898282+github-actions[bot]@users.noreply.github.com>
</commit_message>
<xml_diff>
--- a/overview_deck/LF Energy High Level Overview.pptx
+++ b/overview_deck/LF Energy High Level Overview.pptx
@@ -25946,7 +25946,7 @@
             <a:tbl>
               <a:tblPr>
                 <a:noFill/>
-                <a:tableStyleId>{C13E3245-A485-425E-8DFC-A9FE81DB0A83}</a:tableStyleId>
+                <a:tableStyleId>{7E67995A-638B-42D5-9D7F-B0D75F3B4303}</a:tableStyleId>
               </a:tblPr>
               <a:tblGrid>
                 <a:gridCol w="1695200"/>
@@ -26736,7 +26736,7 @@
             <a:tbl>
               <a:tblPr>
                 <a:noFill/>
-                <a:tableStyleId>{C13E3245-A485-425E-8DFC-A9FE81DB0A83}</a:tableStyleId>
+                <a:tableStyleId>{7E67995A-638B-42D5-9D7F-B0D75F3B4303}</a:tableStyleId>
               </a:tblPr>
               <a:tblGrid>
                 <a:gridCol w="1695200"/>
@@ -27426,7 +27426,7 @@
             <a:tbl>
               <a:tblPr>
                 <a:noFill/>
-                <a:tableStyleId>{C13E3245-A485-425E-8DFC-A9FE81DB0A83}</a:tableStyleId>
+                <a:tableStyleId>{7E67995A-638B-42D5-9D7F-B0D75F3B4303}</a:tableStyleId>
               </a:tblPr>
               <a:tblGrid>
                 <a:gridCol w="1695200"/>
@@ -28678,7 +28678,7 @@
             <a:tbl>
               <a:tblPr>
                 <a:noFill/>
-                <a:tableStyleId>{C13E3245-A485-425E-8DFC-A9FE81DB0A83}</a:tableStyleId>
+                <a:tableStyleId>{7E67995A-638B-42D5-9D7F-B0D75F3B4303}</a:tableStyleId>
               </a:tblPr>
               <a:tblGrid>
                 <a:gridCol w="1695200"/>
@@ -29670,7 +29670,7 @@
             <a:tbl>
               <a:tblPr>
                 <a:noFill/>
-                <a:tableStyleId>{C13E3245-A485-425E-8DFC-A9FE81DB0A83}</a:tableStyleId>
+                <a:tableStyleId>{7E67995A-638B-42D5-9D7F-B0D75F3B4303}</a:tableStyleId>
               </a:tblPr>
               <a:tblGrid>
                 <a:gridCol w="3048000"/>
@@ -33175,7 +33175,7 @@
             <a:tbl>
               <a:tblPr>
                 <a:noFill/>
-                <a:tableStyleId>{C13E3245-A485-425E-8DFC-A9FE81DB0A83}</a:tableStyleId>
+                <a:tableStyleId>{7E67995A-638B-42D5-9D7F-B0D75F3B4303}</a:tableStyleId>
               </a:tblPr>
               <a:tblGrid>
                 <a:gridCol w="1828800"/>
@@ -34002,285 +34002,6 @@
 </file>
 
 <file path=ppt/theme/theme1.xml><?xml version="1.0" encoding="utf-8"?>
-<a:theme xmlns:a="http://schemas.openxmlformats.org/drawingml/2006/main" xmlns:r="http://schemas.openxmlformats.org/officeDocument/2006/relationships" name="LF Energy Theme 2023">
-  <a:themeElements>
-    <a:clrScheme name="Geometric">
-      <a:dk1>
-        <a:srgbClr val="222222"/>
-      </a:dk1>
-      <a:lt1>
-        <a:srgbClr val="FFFFFF"/>
-      </a:lt1>
-      <a:dk2>
-        <a:srgbClr val="434343"/>
-      </a:dk2>
-      <a:lt2>
-        <a:srgbClr val="999999"/>
-      </a:lt2>
-      <a:accent1>
-        <a:srgbClr val="003778"/>
-      </a:accent1>
-      <a:accent2>
-        <a:srgbClr val="0094FF"/>
-      </a:accent2>
-      <a:accent3>
-        <a:srgbClr val="5B1DE7"/>
-      </a:accent3>
-      <a:accent4>
-        <a:srgbClr val="12E2E2"/>
-      </a:accent4>
-      <a:accent5>
-        <a:srgbClr val="FF00AA"/>
-      </a:accent5>
-      <a:accent6>
-        <a:srgbClr val="ACDE1F"/>
-      </a:accent6>
-      <a:hlink>
-        <a:srgbClr val="0077CC"/>
-      </a:hlink>
-      <a:folHlink>
-        <a:srgbClr val="F06292"/>
-      </a:folHlink>
-    </a:clrScheme>
-    <a:fontScheme name="Office">
-      <a:majorFont>
-        <a:latin typeface="Arial"/>
-        <a:ea typeface=""/>
-        <a:cs typeface=""/>
-        <a:font script="Jpan" typeface="ＭＳ Ｐゴシック"/>
-        <a:font script="Hang" typeface="맑은 고딕"/>
-        <a:font script="Hans" typeface="宋体"/>
-        <a:font script="Hant" typeface="新細明體"/>
-        <a:font script="Arab" typeface="Times New Roman"/>
-        <a:font script="Hebr" typeface="Times New Roman"/>
-        <a:font script="Thai" typeface="Angsana New"/>
-        <a:font script="Ethi" typeface="Nyala"/>
-        <a:font script="Beng" typeface="Vrinda"/>
-        <a:font script="Gujr" typeface="Shruti"/>
-        <a:font script="Khmr" typeface="MoolBoran"/>
-        <a:font script="Knda" typeface="Tunga"/>
-        <a:font script="Guru" typeface="Raavi"/>
-        <a:font script="Cans" typeface="Euphemia"/>
-        <a:font script="Cher" typeface="Plantagenet Cherokee"/>
-        <a:font script="Yiii" typeface="Microsoft Yi Baiti"/>
-        <a:font script="Tibt" typeface="Microsoft Himalaya"/>
-        <a:font script="Thaa" typeface="MV Boli"/>
-        <a:font script="Deva" typeface="Mangal"/>
-        <a:font script="Telu" typeface="Gautami"/>
-        <a:font script="Taml" typeface="Latha"/>
-        <a:font script="Syrc" typeface="Estrangelo Edessa"/>
-        <a:font script="Orya" typeface="Kalinga"/>
-        <a:font script="Mlym" typeface="Kartika"/>
-        <a:font script="Laoo" typeface="DokChampa"/>
-        <a:font script="Sinh" typeface="Iskoola Pota"/>
-        <a:font script="Mong" typeface="Mongolian Baiti"/>
-        <a:font script="Viet" typeface="Times New Roman"/>
-        <a:font script="Uigh" typeface="Microsoft Uighur"/>
-        <a:font script="Geor" typeface="Sylfaen"/>
-      </a:majorFont>
-      <a:minorFont>
-        <a:latin typeface="Arial"/>
-        <a:ea typeface=""/>
-        <a:cs typeface=""/>
-        <a:font script="Jpan" typeface="ＭＳ Ｐゴシック"/>
-        <a:font script="Hang" typeface="맑은 고딕"/>
-        <a:font script="Hans" typeface="宋体"/>
-        <a:font script="Hant" typeface="新細明體"/>
-        <a:font script="Arab" typeface="Arial"/>
-        <a:font script="Hebr" typeface="Arial"/>
-        <a:font script="Thai" typeface="Cordia New"/>
-        <a:font script="Ethi" typeface="Nyala"/>
-        <a:font script="Beng" typeface="Vrinda"/>
-        <a:font script="Gujr" typeface="Shruti"/>
-        <a:font script="Khmr" typeface="DaunPenh"/>
-        <a:font script="Knda" typeface="Tunga"/>
-        <a:font script="Guru" typeface="Raavi"/>
-        <a:font script="Cans" typeface="Euphemia"/>
-        <a:font script="Cher" typeface="Plantagenet Cherokee"/>
-        <a:font script="Yiii" typeface="Microsoft Yi Baiti"/>
-        <a:font script="Tibt" typeface="Microsoft Himalaya"/>
-        <a:font script="Thaa" typeface="MV Boli"/>
-        <a:font script="Deva" typeface="Mangal"/>
-        <a:font script="Telu" typeface="Gautami"/>
-        <a:font script="Taml" typeface="Latha"/>
-        <a:font script="Syrc" typeface="Estrangelo Edessa"/>
-        <a:font script="Orya" typeface="Kalinga"/>
-        <a:font script="Mlym" typeface="Kartika"/>
-        <a:font script="Laoo" typeface="DokChampa"/>
-        <a:font script="Sinh" typeface="Iskoola Pota"/>
-        <a:font script="Mong" typeface="Mongolian Baiti"/>
-        <a:font script="Viet" typeface="Arial"/>
-        <a:font script="Uigh" typeface="Microsoft Uighur"/>
-        <a:font script="Geor" typeface="Sylfaen"/>
-      </a:minorFont>
-    </a:fontScheme>
-    <a:fmtScheme name="Office">
-      <a:fillStyleLst>
-        <a:solidFill>
-          <a:schemeClr val="phClr"/>
-        </a:solidFill>
-        <a:gradFill rotWithShape="1">
-          <a:gsLst>
-            <a:gs pos="0">
-              <a:schemeClr val="phClr">
-                <a:tint val="50000"/>
-                <a:satMod val="300000"/>
-              </a:schemeClr>
-            </a:gs>
-            <a:gs pos="35000">
-              <a:schemeClr val="phClr">
-                <a:tint val="37000"/>
-                <a:satMod val="300000"/>
-              </a:schemeClr>
-            </a:gs>
-            <a:gs pos="100000">
-              <a:schemeClr val="phClr">
-                <a:tint val="15000"/>
-                <a:satMod val="350000"/>
-              </a:schemeClr>
-            </a:gs>
-          </a:gsLst>
-          <a:lin ang="16200000" scaled="1"/>
-        </a:gradFill>
-        <a:gradFill rotWithShape="1">
-          <a:gsLst>
-            <a:gs pos="0">
-              <a:schemeClr val="phClr">
-                <a:tint val="100000"/>
-                <a:shade val="100000"/>
-                <a:satMod val="130000"/>
-              </a:schemeClr>
-            </a:gs>
-            <a:gs pos="100000">
-              <a:schemeClr val="phClr">
-                <a:tint val="50000"/>
-                <a:shade val="100000"/>
-                <a:satMod val="350000"/>
-              </a:schemeClr>
-            </a:gs>
-          </a:gsLst>
-          <a:lin ang="16200000" scaled="0"/>
-        </a:gradFill>
-      </a:fillStyleLst>
-      <a:lnStyleLst>
-        <a:ln w="9525" cap="flat" cmpd="sng" algn="ctr">
-          <a:solidFill>
-            <a:schemeClr val="phClr">
-              <a:shade val="95000"/>
-              <a:satMod val="105000"/>
-            </a:schemeClr>
-          </a:solidFill>
-          <a:prstDash val="solid"/>
-        </a:ln>
-        <a:ln w="25400" cap="flat" cmpd="sng" algn="ctr">
-          <a:solidFill>
-            <a:schemeClr val="phClr"/>
-          </a:solidFill>
-          <a:prstDash val="solid"/>
-        </a:ln>
-        <a:ln w="38100" cap="flat" cmpd="sng" algn="ctr">
-          <a:solidFill>
-            <a:schemeClr val="phClr"/>
-          </a:solidFill>
-          <a:prstDash val="solid"/>
-        </a:ln>
-      </a:lnStyleLst>
-      <a:effectStyleLst>
-        <a:effectStyle>
-          <a:effectLst>
-            <a:outerShdw blurRad="40000" dist="20000" dir="5400000" rotWithShape="0">
-              <a:srgbClr val="000000">
-                <a:alpha val="38000"/>
-              </a:srgbClr>
-            </a:outerShdw>
-          </a:effectLst>
-        </a:effectStyle>
-        <a:effectStyle>
-          <a:effectLst>
-            <a:outerShdw blurRad="40000" dist="23000" dir="5400000" rotWithShape="0">
-              <a:srgbClr val="000000">
-                <a:alpha val="35000"/>
-              </a:srgbClr>
-            </a:outerShdw>
-          </a:effectLst>
-        </a:effectStyle>
-        <a:effectStyle>
-          <a:effectLst>
-            <a:outerShdw blurRad="40000" dist="23000" dir="5400000" rotWithShape="0">
-              <a:srgbClr val="000000">
-                <a:alpha val="35000"/>
-              </a:srgbClr>
-            </a:outerShdw>
-          </a:effectLst>
-          <a:scene3d>
-            <a:camera prst="orthographicFront">
-              <a:rot lat="0" lon="0" rev="0"/>
-            </a:camera>
-            <a:lightRig rig="threePt" dir="t">
-              <a:rot lat="0" lon="0" rev="1200000"/>
-            </a:lightRig>
-          </a:scene3d>
-          <a:sp3d>
-            <a:bevelT w="63500" h="25400"/>
-          </a:sp3d>
-        </a:effectStyle>
-      </a:effectStyleLst>
-      <a:bgFillStyleLst>
-        <a:solidFill>
-          <a:schemeClr val="phClr"/>
-        </a:solidFill>
-        <a:gradFill rotWithShape="1">
-          <a:gsLst>
-            <a:gs pos="0">
-              <a:schemeClr val="phClr">
-                <a:tint val="40000"/>
-                <a:satMod val="350000"/>
-              </a:schemeClr>
-            </a:gs>
-            <a:gs pos="40000">
-              <a:schemeClr val="phClr">
-                <a:tint val="45000"/>
-                <a:shade val="99000"/>
-                <a:satMod val="350000"/>
-              </a:schemeClr>
-            </a:gs>
-            <a:gs pos="100000">
-              <a:schemeClr val="phClr">
-                <a:shade val="20000"/>
-                <a:satMod val="255000"/>
-              </a:schemeClr>
-            </a:gs>
-          </a:gsLst>
-          <a:path path="circle">
-            <a:fillToRect l="50000" t="-80000" r="50000" b="180000"/>
-          </a:path>
-        </a:gradFill>
-        <a:gradFill rotWithShape="1">
-          <a:gsLst>
-            <a:gs pos="0">
-              <a:schemeClr val="phClr">
-                <a:tint val="80000"/>
-                <a:satMod val="300000"/>
-              </a:schemeClr>
-            </a:gs>
-            <a:gs pos="100000">
-              <a:schemeClr val="phClr">
-                <a:shade val="30000"/>
-                <a:satMod val="200000"/>
-              </a:schemeClr>
-            </a:gs>
-          </a:gsLst>
-          <a:path path="circle">
-            <a:fillToRect l="50000" t="50000" r="50000" b="50000"/>
-          </a:path>
-        </a:gradFill>
-      </a:bgFillStyleLst>
-    </a:fmtScheme>
-  </a:themeElements>
-</a:theme>
-</file>
-
-<file path=ppt/theme/theme2.xml><?xml version="1.0" encoding="utf-8"?>
 <a:theme xmlns:a="http://schemas.openxmlformats.org/drawingml/2006/main" xmlns:r="http://schemas.openxmlformats.org/officeDocument/2006/relationships" name="Simple Light">
   <a:themeElements>
     <a:clrScheme name="Simple Light">
@@ -34559,7 +34280,7 @@
 </a:theme>
 </file>
 
-<file path=ppt/theme/theme3.xml><?xml version="1.0" encoding="utf-8"?>
+<file path=ppt/theme/theme2.xml><?xml version="1.0" encoding="utf-8"?>
 <a:theme xmlns:a="http://schemas.openxmlformats.org/drawingml/2006/main" xmlns:r="http://schemas.openxmlformats.org/officeDocument/2006/relationships">
   <a:themeElements>
     <a:clrScheme name="Default">
@@ -34836,4 +34557,283 @@
     </a:fmtScheme>
   </a:themeElements>
 </a:theme>
+</file>
+
+<file path=ppt/theme/theme3.xml><?xml version="1.0" encoding="utf-8"?>
+<a:theme xmlns:a="http://schemas.openxmlformats.org/drawingml/2006/main" xmlns:r="http://schemas.openxmlformats.org/officeDocument/2006/relationships" name="LF Energy Theme 2023">
+  <a:themeElements>
+    <a:clrScheme name="Geometric">
+      <a:dk1>
+        <a:srgbClr val="222222"/>
+      </a:dk1>
+      <a:lt1>
+        <a:srgbClr val="FFFFFF"/>
+      </a:lt1>
+      <a:dk2>
+        <a:srgbClr val="434343"/>
+      </a:dk2>
+      <a:lt2>
+        <a:srgbClr val="999999"/>
+      </a:lt2>
+      <a:accent1>
+        <a:srgbClr val="003778"/>
+      </a:accent1>
+      <a:accent2>
+        <a:srgbClr val="0094FF"/>
+      </a:accent2>
+      <a:accent3>
+        <a:srgbClr val="5B1DE7"/>
+      </a:accent3>
+      <a:accent4>
+        <a:srgbClr val="12E2E2"/>
+      </a:accent4>
+      <a:accent5>
+        <a:srgbClr val="FF00AA"/>
+      </a:accent5>
+      <a:accent6>
+        <a:srgbClr val="ACDE1F"/>
+      </a:accent6>
+      <a:hlink>
+        <a:srgbClr val="0077CC"/>
+      </a:hlink>
+      <a:folHlink>
+        <a:srgbClr val="F06292"/>
+      </a:folHlink>
+    </a:clrScheme>
+    <a:fontScheme name="Office">
+      <a:majorFont>
+        <a:latin typeface="Arial"/>
+        <a:ea typeface=""/>
+        <a:cs typeface=""/>
+        <a:font script="Jpan" typeface="ＭＳ Ｐゴシック"/>
+        <a:font script="Hang" typeface="맑은 고딕"/>
+        <a:font script="Hans" typeface="宋体"/>
+        <a:font script="Hant" typeface="新細明體"/>
+        <a:font script="Arab" typeface="Times New Roman"/>
+        <a:font script="Hebr" typeface="Times New Roman"/>
+        <a:font script="Thai" typeface="Angsana New"/>
+        <a:font script="Ethi" typeface="Nyala"/>
+        <a:font script="Beng" typeface="Vrinda"/>
+        <a:font script="Gujr" typeface="Shruti"/>
+        <a:font script="Khmr" typeface="MoolBoran"/>
+        <a:font script="Knda" typeface="Tunga"/>
+        <a:font script="Guru" typeface="Raavi"/>
+        <a:font script="Cans" typeface="Euphemia"/>
+        <a:font script="Cher" typeface="Plantagenet Cherokee"/>
+        <a:font script="Yiii" typeface="Microsoft Yi Baiti"/>
+        <a:font script="Tibt" typeface="Microsoft Himalaya"/>
+        <a:font script="Thaa" typeface="MV Boli"/>
+        <a:font script="Deva" typeface="Mangal"/>
+        <a:font script="Telu" typeface="Gautami"/>
+        <a:font script="Taml" typeface="Latha"/>
+        <a:font script="Syrc" typeface="Estrangelo Edessa"/>
+        <a:font script="Orya" typeface="Kalinga"/>
+        <a:font script="Mlym" typeface="Kartika"/>
+        <a:font script="Laoo" typeface="DokChampa"/>
+        <a:font script="Sinh" typeface="Iskoola Pota"/>
+        <a:font script="Mong" typeface="Mongolian Baiti"/>
+        <a:font script="Viet" typeface="Times New Roman"/>
+        <a:font script="Uigh" typeface="Microsoft Uighur"/>
+        <a:font script="Geor" typeface="Sylfaen"/>
+      </a:majorFont>
+      <a:minorFont>
+        <a:latin typeface="Arial"/>
+        <a:ea typeface=""/>
+        <a:cs typeface=""/>
+        <a:font script="Jpan" typeface="ＭＳ Ｐゴシック"/>
+        <a:font script="Hang" typeface="맑은 고딕"/>
+        <a:font script="Hans" typeface="宋体"/>
+        <a:font script="Hant" typeface="新細明體"/>
+        <a:font script="Arab" typeface="Arial"/>
+        <a:font script="Hebr" typeface="Arial"/>
+        <a:font script="Thai" typeface="Cordia New"/>
+        <a:font script="Ethi" typeface="Nyala"/>
+        <a:font script="Beng" typeface="Vrinda"/>
+        <a:font script="Gujr" typeface="Shruti"/>
+        <a:font script="Khmr" typeface="DaunPenh"/>
+        <a:font script="Knda" typeface="Tunga"/>
+        <a:font script="Guru" typeface="Raavi"/>
+        <a:font script="Cans" typeface="Euphemia"/>
+        <a:font script="Cher" typeface="Plantagenet Cherokee"/>
+        <a:font script="Yiii" typeface="Microsoft Yi Baiti"/>
+        <a:font script="Tibt" typeface="Microsoft Himalaya"/>
+        <a:font script="Thaa" typeface="MV Boli"/>
+        <a:font script="Deva" typeface="Mangal"/>
+        <a:font script="Telu" typeface="Gautami"/>
+        <a:font script="Taml" typeface="Latha"/>
+        <a:font script="Syrc" typeface="Estrangelo Edessa"/>
+        <a:font script="Orya" typeface="Kalinga"/>
+        <a:font script="Mlym" typeface="Kartika"/>
+        <a:font script="Laoo" typeface="DokChampa"/>
+        <a:font script="Sinh" typeface="Iskoola Pota"/>
+        <a:font script="Mong" typeface="Mongolian Baiti"/>
+        <a:font script="Viet" typeface="Arial"/>
+        <a:font script="Uigh" typeface="Microsoft Uighur"/>
+        <a:font script="Geor" typeface="Sylfaen"/>
+      </a:minorFont>
+    </a:fontScheme>
+    <a:fmtScheme name="Office">
+      <a:fillStyleLst>
+        <a:solidFill>
+          <a:schemeClr val="phClr"/>
+        </a:solidFill>
+        <a:gradFill rotWithShape="1">
+          <a:gsLst>
+            <a:gs pos="0">
+              <a:schemeClr val="phClr">
+                <a:tint val="50000"/>
+                <a:satMod val="300000"/>
+              </a:schemeClr>
+            </a:gs>
+            <a:gs pos="35000">
+              <a:schemeClr val="phClr">
+                <a:tint val="37000"/>
+                <a:satMod val="300000"/>
+              </a:schemeClr>
+            </a:gs>
+            <a:gs pos="100000">
+              <a:schemeClr val="phClr">
+                <a:tint val="15000"/>
+                <a:satMod val="350000"/>
+              </a:schemeClr>
+            </a:gs>
+          </a:gsLst>
+          <a:lin ang="16200000" scaled="1"/>
+        </a:gradFill>
+        <a:gradFill rotWithShape="1">
+          <a:gsLst>
+            <a:gs pos="0">
+              <a:schemeClr val="phClr">
+                <a:tint val="100000"/>
+                <a:shade val="100000"/>
+                <a:satMod val="130000"/>
+              </a:schemeClr>
+            </a:gs>
+            <a:gs pos="100000">
+              <a:schemeClr val="phClr">
+                <a:tint val="50000"/>
+                <a:shade val="100000"/>
+                <a:satMod val="350000"/>
+              </a:schemeClr>
+            </a:gs>
+          </a:gsLst>
+          <a:lin ang="16200000" scaled="0"/>
+        </a:gradFill>
+      </a:fillStyleLst>
+      <a:lnStyleLst>
+        <a:ln w="9525" cap="flat" cmpd="sng" algn="ctr">
+          <a:solidFill>
+            <a:schemeClr val="phClr">
+              <a:shade val="95000"/>
+              <a:satMod val="105000"/>
+            </a:schemeClr>
+          </a:solidFill>
+          <a:prstDash val="solid"/>
+        </a:ln>
+        <a:ln w="25400" cap="flat" cmpd="sng" algn="ctr">
+          <a:solidFill>
+            <a:schemeClr val="phClr"/>
+          </a:solidFill>
+          <a:prstDash val="solid"/>
+        </a:ln>
+        <a:ln w="38100" cap="flat" cmpd="sng" algn="ctr">
+          <a:solidFill>
+            <a:schemeClr val="phClr"/>
+          </a:solidFill>
+          <a:prstDash val="solid"/>
+        </a:ln>
+      </a:lnStyleLst>
+      <a:effectStyleLst>
+        <a:effectStyle>
+          <a:effectLst>
+            <a:outerShdw blurRad="40000" dist="20000" dir="5400000" rotWithShape="0">
+              <a:srgbClr val="000000">
+                <a:alpha val="38000"/>
+              </a:srgbClr>
+            </a:outerShdw>
+          </a:effectLst>
+        </a:effectStyle>
+        <a:effectStyle>
+          <a:effectLst>
+            <a:outerShdw blurRad="40000" dist="23000" dir="5400000" rotWithShape="0">
+              <a:srgbClr val="000000">
+                <a:alpha val="35000"/>
+              </a:srgbClr>
+            </a:outerShdw>
+          </a:effectLst>
+        </a:effectStyle>
+        <a:effectStyle>
+          <a:effectLst>
+            <a:outerShdw blurRad="40000" dist="23000" dir="5400000" rotWithShape="0">
+              <a:srgbClr val="000000">
+                <a:alpha val="35000"/>
+              </a:srgbClr>
+            </a:outerShdw>
+          </a:effectLst>
+          <a:scene3d>
+            <a:camera prst="orthographicFront">
+              <a:rot lat="0" lon="0" rev="0"/>
+            </a:camera>
+            <a:lightRig rig="threePt" dir="t">
+              <a:rot lat="0" lon="0" rev="1200000"/>
+            </a:lightRig>
+          </a:scene3d>
+          <a:sp3d>
+            <a:bevelT w="63500" h="25400"/>
+          </a:sp3d>
+        </a:effectStyle>
+      </a:effectStyleLst>
+      <a:bgFillStyleLst>
+        <a:solidFill>
+          <a:schemeClr val="phClr"/>
+        </a:solidFill>
+        <a:gradFill rotWithShape="1">
+          <a:gsLst>
+            <a:gs pos="0">
+              <a:schemeClr val="phClr">
+                <a:tint val="40000"/>
+                <a:satMod val="350000"/>
+              </a:schemeClr>
+            </a:gs>
+            <a:gs pos="40000">
+              <a:schemeClr val="phClr">
+                <a:tint val="45000"/>
+                <a:shade val="99000"/>
+                <a:satMod val="350000"/>
+              </a:schemeClr>
+            </a:gs>
+            <a:gs pos="100000">
+              <a:schemeClr val="phClr">
+                <a:shade val="20000"/>
+                <a:satMod val="255000"/>
+              </a:schemeClr>
+            </a:gs>
+          </a:gsLst>
+          <a:path path="circle">
+            <a:fillToRect l="50000" t="-80000" r="50000" b="180000"/>
+          </a:path>
+        </a:gradFill>
+        <a:gradFill rotWithShape="1">
+          <a:gsLst>
+            <a:gs pos="0">
+              <a:schemeClr val="phClr">
+                <a:tint val="80000"/>
+                <a:satMod val="300000"/>
+              </a:schemeClr>
+            </a:gs>
+            <a:gs pos="100000">
+              <a:schemeClr val="phClr">
+                <a:shade val="30000"/>
+                <a:satMod val="200000"/>
+              </a:schemeClr>
+            </a:gs>
+          </a:gsLst>
+          <a:path path="circle">
+            <a:fillToRect l="50000" t="50000" r="50000" b="50000"/>
+          </a:path>
+        </a:gradFill>
+      </a:bgFillStyleLst>
+    </a:fmtScheme>
+  </a:themeElements>
+</a:theme>
 </file>
</xml_diff>

<commit_message>
Update Data Sources from LFX 2026-02-07 (#80)
Update Data Sources from LFX

Signed-off-by: github-actions[bot] <41898282+github-actions[bot]@users.noreply.github.com>
</commit_message>
<xml_diff>
--- a/overview_deck/LF Energy High Level Overview.pptx
+++ b/overview_deck/LF Energy High Level Overview.pptx
@@ -25946,7 +25946,7 @@
             <a:tbl>
               <a:tblPr>
                 <a:noFill/>
-                <a:tableStyleId>{7E67995A-638B-42D5-9D7F-B0D75F3B4303}</a:tableStyleId>
+                <a:tableStyleId>{F0D96829-4DF0-4124-B3A6-FF5CE9578CA7}</a:tableStyleId>
               </a:tblPr>
               <a:tblGrid>
                 <a:gridCol w="1695200"/>
@@ -26736,7 +26736,7 @@
             <a:tbl>
               <a:tblPr>
                 <a:noFill/>
-                <a:tableStyleId>{7E67995A-638B-42D5-9D7F-B0D75F3B4303}</a:tableStyleId>
+                <a:tableStyleId>{F0D96829-4DF0-4124-B3A6-FF5CE9578CA7}</a:tableStyleId>
               </a:tblPr>
               <a:tblGrid>
                 <a:gridCol w="1695200"/>
@@ -27426,7 +27426,7 @@
             <a:tbl>
               <a:tblPr>
                 <a:noFill/>
-                <a:tableStyleId>{7E67995A-638B-42D5-9D7F-B0D75F3B4303}</a:tableStyleId>
+                <a:tableStyleId>{F0D96829-4DF0-4124-B3A6-FF5CE9578CA7}</a:tableStyleId>
               </a:tblPr>
               <a:tblGrid>
                 <a:gridCol w="1695200"/>
@@ -28678,7 +28678,7 @@
             <a:tbl>
               <a:tblPr>
                 <a:noFill/>
-                <a:tableStyleId>{7E67995A-638B-42D5-9D7F-B0D75F3B4303}</a:tableStyleId>
+                <a:tableStyleId>{F0D96829-4DF0-4124-B3A6-FF5CE9578CA7}</a:tableStyleId>
               </a:tblPr>
               <a:tblGrid>
                 <a:gridCol w="1695200"/>
@@ -29670,7 +29670,7 @@
             <a:tbl>
               <a:tblPr>
                 <a:noFill/>
-                <a:tableStyleId>{7E67995A-638B-42D5-9D7F-B0D75F3B4303}</a:tableStyleId>
+                <a:tableStyleId>{F0D96829-4DF0-4124-B3A6-FF5CE9578CA7}</a:tableStyleId>
               </a:tblPr>
               <a:tblGrid>
                 <a:gridCol w="3048000"/>
@@ -33175,7 +33175,7 @@
             <a:tbl>
               <a:tblPr>
                 <a:noFill/>
-                <a:tableStyleId>{7E67995A-638B-42D5-9D7F-B0D75F3B4303}</a:tableStyleId>
+                <a:tableStyleId>{F0D96829-4DF0-4124-B3A6-FF5CE9578CA7}</a:tableStyleId>
               </a:tblPr>
               <a:tblGrid>
                 <a:gridCol w="1828800"/>
@@ -34002,9 +34002,9 @@
 </file>
 
 <file path=ppt/theme/theme1.xml><?xml version="1.0" encoding="utf-8"?>
-<a:theme xmlns:a="http://schemas.openxmlformats.org/drawingml/2006/main" xmlns:r="http://schemas.openxmlformats.org/officeDocument/2006/relationships" name="Simple Light">
+<a:theme xmlns:a="http://schemas.openxmlformats.org/drawingml/2006/main" xmlns:r="http://schemas.openxmlformats.org/officeDocument/2006/relationships">
   <a:themeElements>
-    <a:clrScheme name="Simple Light">
+    <a:clrScheme name="Default">
       <a:dk1>
         <a:srgbClr val="000000"/>
       </a:dk1>
@@ -34012,34 +34012,34 @@
         <a:srgbClr val="FFFFFF"/>
       </a:lt1>
       <a:dk2>
-        <a:srgbClr val="595959"/>
+        <a:srgbClr val="158158"/>
       </a:dk2>
       <a:lt2>
-        <a:srgbClr val="EEEEEE"/>
+        <a:srgbClr val="F3F3F3"/>
       </a:lt2>
       <a:accent1>
-        <a:srgbClr val="4285F4"/>
+        <a:srgbClr val="058DC7"/>
       </a:accent1>
       <a:accent2>
-        <a:srgbClr val="212121"/>
+        <a:srgbClr val="50B432"/>
       </a:accent2>
       <a:accent3>
-        <a:srgbClr val="78909C"/>
+        <a:srgbClr val="ED561B"/>
       </a:accent3>
       <a:accent4>
-        <a:srgbClr val="FFAB40"/>
+        <a:srgbClr val="EDEF00"/>
       </a:accent4>
       <a:accent5>
-        <a:srgbClr val="0097A7"/>
+        <a:srgbClr val="24CBE5"/>
       </a:accent5>
       <a:accent6>
-        <a:srgbClr val="EEFF41"/>
+        <a:srgbClr val="64E572"/>
       </a:accent6>
       <a:hlink>
-        <a:srgbClr val="0097A7"/>
+        <a:srgbClr val="2200CC"/>
       </a:hlink>
       <a:folHlink>
-        <a:srgbClr val="0097A7"/>
+        <a:srgbClr val="551A8B"/>
       </a:folHlink>
     </a:clrScheme>
     <a:fontScheme name="Office">
@@ -34281,9 +34281,9 @@
 </file>
 
 <file path=ppt/theme/theme2.xml><?xml version="1.0" encoding="utf-8"?>
-<a:theme xmlns:a="http://schemas.openxmlformats.org/drawingml/2006/main" xmlns:r="http://schemas.openxmlformats.org/officeDocument/2006/relationships">
+<a:theme xmlns:a="http://schemas.openxmlformats.org/drawingml/2006/main" xmlns:r="http://schemas.openxmlformats.org/officeDocument/2006/relationships" name="Simple Light">
   <a:themeElements>
-    <a:clrScheme name="Default">
+    <a:clrScheme name="Simple Light">
       <a:dk1>
         <a:srgbClr val="000000"/>
       </a:dk1>
@@ -34291,34 +34291,34 @@
         <a:srgbClr val="FFFFFF"/>
       </a:lt1>
       <a:dk2>
-        <a:srgbClr val="158158"/>
+        <a:srgbClr val="595959"/>
       </a:dk2>
       <a:lt2>
-        <a:srgbClr val="F3F3F3"/>
+        <a:srgbClr val="EEEEEE"/>
       </a:lt2>
       <a:accent1>
-        <a:srgbClr val="058DC7"/>
+        <a:srgbClr val="4285F4"/>
       </a:accent1>
       <a:accent2>
-        <a:srgbClr val="50B432"/>
+        <a:srgbClr val="212121"/>
       </a:accent2>
       <a:accent3>
-        <a:srgbClr val="ED561B"/>
+        <a:srgbClr val="78909C"/>
       </a:accent3>
       <a:accent4>
-        <a:srgbClr val="EDEF00"/>
+        <a:srgbClr val="FFAB40"/>
       </a:accent4>
       <a:accent5>
-        <a:srgbClr val="24CBE5"/>
+        <a:srgbClr val="0097A7"/>
       </a:accent5>
       <a:accent6>
-        <a:srgbClr val="64E572"/>
+        <a:srgbClr val="EEFF41"/>
       </a:accent6>
       <a:hlink>
-        <a:srgbClr val="2200CC"/>
+        <a:srgbClr val="0097A7"/>
       </a:hlink>
       <a:folHlink>
-        <a:srgbClr val="551A8B"/>
+        <a:srgbClr val="0097A7"/>
       </a:folHlink>
     </a:clrScheme>
     <a:fontScheme name="Office">

</xml_diff>

<commit_message>
Update Data Sources from LFX 2026-02-08 (#81)
Update Data Sources from LFX

Signed-off-by: github-actions[bot] <41898282+github-actions[bot]@users.noreply.github.com>
</commit_message>
<xml_diff>
--- a/overview_deck/LF Energy High Level Overview.pptx
+++ b/overview_deck/LF Energy High Level Overview.pptx
@@ -25946,7 +25946,7 @@
             <a:tbl>
               <a:tblPr>
                 <a:noFill/>
-                <a:tableStyleId>{F0D96829-4DF0-4124-B3A6-FF5CE9578CA7}</a:tableStyleId>
+                <a:tableStyleId>{74CF3CD3-5AD3-4896-9624-B6345D4F0AB6}</a:tableStyleId>
               </a:tblPr>
               <a:tblGrid>
                 <a:gridCol w="1695200"/>
@@ -26736,7 +26736,7 @@
             <a:tbl>
               <a:tblPr>
                 <a:noFill/>
-                <a:tableStyleId>{F0D96829-4DF0-4124-B3A6-FF5CE9578CA7}</a:tableStyleId>
+                <a:tableStyleId>{74CF3CD3-5AD3-4896-9624-B6345D4F0AB6}</a:tableStyleId>
               </a:tblPr>
               <a:tblGrid>
                 <a:gridCol w="1695200"/>
@@ -27426,7 +27426,7 @@
             <a:tbl>
               <a:tblPr>
                 <a:noFill/>
-                <a:tableStyleId>{F0D96829-4DF0-4124-B3A6-FF5CE9578CA7}</a:tableStyleId>
+                <a:tableStyleId>{74CF3CD3-5AD3-4896-9624-B6345D4F0AB6}</a:tableStyleId>
               </a:tblPr>
               <a:tblGrid>
                 <a:gridCol w="1695200"/>
@@ -28678,7 +28678,7 @@
             <a:tbl>
               <a:tblPr>
                 <a:noFill/>
-                <a:tableStyleId>{F0D96829-4DF0-4124-B3A6-FF5CE9578CA7}</a:tableStyleId>
+                <a:tableStyleId>{74CF3CD3-5AD3-4896-9624-B6345D4F0AB6}</a:tableStyleId>
               </a:tblPr>
               <a:tblGrid>
                 <a:gridCol w="1695200"/>
@@ -29670,7 +29670,7 @@
             <a:tbl>
               <a:tblPr>
                 <a:noFill/>
-                <a:tableStyleId>{F0D96829-4DF0-4124-B3A6-FF5CE9578CA7}</a:tableStyleId>
+                <a:tableStyleId>{74CF3CD3-5AD3-4896-9624-B6345D4F0AB6}</a:tableStyleId>
               </a:tblPr>
               <a:tblGrid>
                 <a:gridCol w="3048000"/>
@@ -33175,7 +33175,7 @@
             <a:tbl>
               <a:tblPr>
                 <a:noFill/>
-                <a:tableStyleId>{F0D96829-4DF0-4124-B3A6-FF5CE9578CA7}</a:tableStyleId>
+                <a:tableStyleId>{74CF3CD3-5AD3-4896-9624-B6345D4F0AB6}</a:tableStyleId>
               </a:tblPr>
               <a:tblGrid>
                 <a:gridCol w="1828800"/>
@@ -34002,44 +34002,44 @@
 </file>
 
 <file path=ppt/theme/theme1.xml><?xml version="1.0" encoding="utf-8"?>
-<a:theme xmlns:a="http://schemas.openxmlformats.org/drawingml/2006/main" xmlns:r="http://schemas.openxmlformats.org/officeDocument/2006/relationships">
+<a:theme xmlns:a="http://schemas.openxmlformats.org/drawingml/2006/main" xmlns:r="http://schemas.openxmlformats.org/officeDocument/2006/relationships" name="LF Energy Theme 2023">
   <a:themeElements>
-    <a:clrScheme name="Default">
+    <a:clrScheme name="Geometric">
       <a:dk1>
-        <a:srgbClr val="000000"/>
+        <a:srgbClr val="222222"/>
       </a:dk1>
       <a:lt1>
         <a:srgbClr val="FFFFFF"/>
       </a:lt1>
       <a:dk2>
-        <a:srgbClr val="158158"/>
+        <a:srgbClr val="434343"/>
       </a:dk2>
       <a:lt2>
-        <a:srgbClr val="F3F3F3"/>
+        <a:srgbClr val="999999"/>
       </a:lt2>
       <a:accent1>
-        <a:srgbClr val="058DC7"/>
+        <a:srgbClr val="003778"/>
       </a:accent1>
       <a:accent2>
-        <a:srgbClr val="50B432"/>
+        <a:srgbClr val="0094FF"/>
       </a:accent2>
       <a:accent3>
-        <a:srgbClr val="ED561B"/>
+        <a:srgbClr val="5B1DE7"/>
       </a:accent3>
       <a:accent4>
-        <a:srgbClr val="EDEF00"/>
+        <a:srgbClr val="12E2E2"/>
       </a:accent4>
       <a:accent5>
-        <a:srgbClr val="24CBE5"/>
+        <a:srgbClr val="FF00AA"/>
       </a:accent5>
       <a:accent6>
-        <a:srgbClr val="64E572"/>
+        <a:srgbClr val="ACDE1F"/>
       </a:accent6>
       <a:hlink>
-        <a:srgbClr val="2200CC"/>
+        <a:srgbClr val="0077CC"/>
       </a:hlink>
       <a:folHlink>
-        <a:srgbClr val="551A8B"/>
+        <a:srgbClr val="F06292"/>
       </a:folHlink>
     </a:clrScheme>
     <a:fontScheme name="Office">
@@ -34560,44 +34560,44 @@
 </file>
 
 <file path=ppt/theme/theme3.xml><?xml version="1.0" encoding="utf-8"?>
-<a:theme xmlns:a="http://schemas.openxmlformats.org/drawingml/2006/main" xmlns:r="http://schemas.openxmlformats.org/officeDocument/2006/relationships" name="LF Energy Theme 2023">
+<a:theme xmlns:a="http://schemas.openxmlformats.org/drawingml/2006/main" xmlns:r="http://schemas.openxmlformats.org/officeDocument/2006/relationships">
   <a:themeElements>
-    <a:clrScheme name="Geometric">
+    <a:clrScheme name="Default">
       <a:dk1>
-        <a:srgbClr val="222222"/>
+        <a:srgbClr val="000000"/>
       </a:dk1>
       <a:lt1>
         <a:srgbClr val="FFFFFF"/>
       </a:lt1>
       <a:dk2>
-        <a:srgbClr val="434343"/>
+        <a:srgbClr val="158158"/>
       </a:dk2>
       <a:lt2>
-        <a:srgbClr val="999999"/>
+        <a:srgbClr val="F3F3F3"/>
       </a:lt2>
       <a:accent1>
-        <a:srgbClr val="003778"/>
+        <a:srgbClr val="058DC7"/>
       </a:accent1>
       <a:accent2>
-        <a:srgbClr val="0094FF"/>
+        <a:srgbClr val="50B432"/>
       </a:accent2>
       <a:accent3>
-        <a:srgbClr val="5B1DE7"/>
+        <a:srgbClr val="ED561B"/>
       </a:accent3>
       <a:accent4>
-        <a:srgbClr val="12E2E2"/>
+        <a:srgbClr val="EDEF00"/>
       </a:accent4>
       <a:accent5>
-        <a:srgbClr val="FF00AA"/>
+        <a:srgbClr val="24CBE5"/>
       </a:accent5>
       <a:accent6>
-        <a:srgbClr val="ACDE1F"/>
+        <a:srgbClr val="64E572"/>
       </a:accent6>
       <a:hlink>
-        <a:srgbClr val="0077CC"/>
+        <a:srgbClr val="2200CC"/>
       </a:hlink>
       <a:folHlink>
-        <a:srgbClr val="F06292"/>
+        <a:srgbClr val="551A8B"/>
       </a:folHlink>
     </a:clrScheme>
     <a:fontScheme name="Office">

</xml_diff>

<commit_message>
Update Data Sources from LFX 2026-02-09 (#83)
Update Data Sources from LFX

Signed-off-by: github-actions[bot] <41898282+github-actions[bot]@users.noreply.github.com>
</commit_message>
<xml_diff>
--- a/overview_deck/LF Energy High Level Overview.pptx
+++ b/overview_deck/LF Energy High Level Overview.pptx
@@ -25946,7 +25946,7 @@
             <a:tbl>
               <a:tblPr>
                 <a:noFill/>
-                <a:tableStyleId>{74CF3CD3-5AD3-4896-9624-B6345D4F0AB6}</a:tableStyleId>
+                <a:tableStyleId>{C320EC70-FFC7-4695-BD8A-B35883984C6E}</a:tableStyleId>
               </a:tblPr>
               <a:tblGrid>
                 <a:gridCol w="1695200"/>
@@ -26736,7 +26736,7 @@
             <a:tbl>
               <a:tblPr>
                 <a:noFill/>
-                <a:tableStyleId>{74CF3CD3-5AD3-4896-9624-B6345D4F0AB6}</a:tableStyleId>
+                <a:tableStyleId>{C320EC70-FFC7-4695-BD8A-B35883984C6E}</a:tableStyleId>
               </a:tblPr>
               <a:tblGrid>
                 <a:gridCol w="1695200"/>
@@ -27426,7 +27426,7 @@
             <a:tbl>
               <a:tblPr>
                 <a:noFill/>
-                <a:tableStyleId>{74CF3CD3-5AD3-4896-9624-B6345D4F0AB6}</a:tableStyleId>
+                <a:tableStyleId>{C320EC70-FFC7-4695-BD8A-B35883984C6E}</a:tableStyleId>
               </a:tblPr>
               <a:tblGrid>
                 <a:gridCol w="1695200"/>
@@ -28678,7 +28678,7 @@
             <a:tbl>
               <a:tblPr>
                 <a:noFill/>
-                <a:tableStyleId>{74CF3CD3-5AD3-4896-9624-B6345D4F0AB6}</a:tableStyleId>
+                <a:tableStyleId>{C320EC70-FFC7-4695-BD8A-B35883984C6E}</a:tableStyleId>
               </a:tblPr>
               <a:tblGrid>
                 <a:gridCol w="1695200"/>
@@ -29670,7 +29670,7 @@
             <a:tbl>
               <a:tblPr>
                 <a:noFill/>
-                <a:tableStyleId>{74CF3CD3-5AD3-4896-9624-B6345D4F0AB6}</a:tableStyleId>
+                <a:tableStyleId>{C320EC70-FFC7-4695-BD8A-B35883984C6E}</a:tableStyleId>
               </a:tblPr>
               <a:tblGrid>
                 <a:gridCol w="3048000"/>
@@ -33175,7 +33175,7 @@
             <a:tbl>
               <a:tblPr>
                 <a:noFill/>
-                <a:tableStyleId>{74CF3CD3-5AD3-4896-9624-B6345D4F0AB6}</a:tableStyleId>
+                <a:tableStyleId>{C320EC70-FFC7-4695-BD8A-B35883984C6E}</a:tableStyleId>
               </a:tblPr>
               <a:tblGrid>
                 <a:gridCol w="1828800"/>

</xml_diff>

<commit_message>
Update Data Sources from LFX 2026-02-10 (#84)
Update Data Sources from LFX

Signed-off-by: github-actions[bot] <41898282+github-actions[bot]@users.noreply.github.com>
</commit_message>
<xml_diff>
--- a/overview_deck/LF Energy High Level Overview.pptx
+++ b/overview_deck/LF Energy High Level Overview.pptx
@@ -25946,7 +25946,7 @@
             <a:tbl>
               <a:tblPr>
                 <a:noFill/>
-                <a:tableStyleId>{C320EC70-FFC7-4695-BD8A-B35883984C6E}</a:tableStyleId>
+                <a:tableStyleId>{50C352CE-1B1D-4D2E-B4E8-68B4B13091BA}</a:tableStyleId>
               </a:tblPr>
               <a:tblGrid>
                 <a:gridCol w="1695200"/>
@@ -26736,7 +26736,7 @@
             <a:tbl>
               <a:tblPr>
                 <a:noFill/>
-                <a:tableStyleId>{C320EC70-FFC7-4695-BD8A-B35883984C6E}</a:tableStyleId>
+                <a:tableStyleId>{50C352CE-1B1D-4D2E-B4E8-68B4B13091BA}</a:tableStyleId>
               </a:tblPr>
               <a:tblGrid>
                 <a:gridCol w="1695200"/>
@@ -27426,7 +27426,7 @@
             <a:tbl>
               <a:tblPr>
                 <a:noFill/>
-                <a:tableStyleId>{C320EC70-FFC7-4695-BD8A-B35883984C6E}</a:tableStyleId>
+                <a:tableStyleId>{50C352CE-1B1D-4D2E-B4E8-68B4B13091BA}</a:tableStyleId>
               </a:tblPr>
               <a:tblGrid>
                 <a:gridCol w="1695200"/>
@@ -28678,7 +28678,7 @@
             <a:tbl>
               <a:tblPr>
                 <a:noFill/>
-                <a:tableStyleId>{C320EC70-FFC7-4695-BD8A-B35883984C6E}</a:tableStyleId>
+                <a:tableStyleId>{50C352CE-1B1D-4D2E-B4E8-68B4B13091BA}</a:tableStyleId>
               </a:tblPr>
               <a:tblGrid>
                 <a:gridCol w="1695200"/>
@@ -29670,7 +29670,7 @@
             <a:tbl>
               <a:tblPr>
                 <a:noFill/>
-                <a:tableStyleId>{C320EC70-FFC7-4695-BD8A-B35883984C6E}</a:tableStyleId>
+                <a:tableStyleId>{50C352CE-1B1D-4D2E-B4E8-68B4B13091BA}</a:tableStyleId>
               </a:tblPr>
               <a:tblGrid>
                 <a:gridCol w="3048000"/>
@@ -33175,7 +33175,7 @@
             <a:tbl>
               <a:tblPr>
                 <a:noFill/>
-                <a:tableStyleId>{C320EC70-FFC7-4695-BD8A-B35883984C6E}</a:tableStyleId>
+                <a:tableStyleId>{50C352CE-1B1D-4D2E-B4E8-68B4B13091BA}</a:tableStyleId>
               </a:tblPr>
               <a:tblGrid>
                 <a:gridCol w="1828800"/>

</xml_diff>

<commit_message>
Update Data Sources from LFX 2026-02-11 (#85)
Update Data Sources from LFX

Signed-off-by: github-actions[bot] <41898282+github-actions[bot]@users.noreply.github.com>
</commit_message>
<xml_diff>
--- a/overview_deck/LF Energy High Level Overview.pptx
+++ b/overview_deck/LF Energy High Level Overview.pptx
@@ -25946,7 +25946,7 @@
             <a:tbl>
               <a:tblPr>
                 <a:noFill/>
-                <a:tableStyleId>{50C352CE-1B1D-4D2E-B4E8-68B4B13091BA}</a:tableStyleId>
+                <a:tableStyleId>{27CCD006-CB68-44EF-8F73-6356A743C068}</a:tableStyleId>
               </a:tblPr>
               <a:tblGrid>
                 <a:gridCol w="1695200"/>
@@ -26736,7 +26736,7 @@
             <a:tbl>
               <a:tblPr>
                 <a:noFill/>
-                <a:tableStyleId>{50C352CE-1B1D-4D2E-B4E8-68B4B13091BA}</a:tableStyleId>
+                <a:tableStyleId>{27CCD006-CB68-44EF-8F73-6356A743C068}</a:tableStyleId>
               </a:tblPr>
               <a:tblGrid>
                 <a:gridCol w="1695200"/>
@@ -27426,7 +27426,7 @@
             <a:tbl>
               <a:tblPr>
                 <a:noFill/>
-                <a:tableStyleId>{50C352CE-1B1D-4D2E-B4E8-68B4B13091BA}</a:tableStyleId>
+                <a:tableStyleId>{27CCD006-CB68-44EF-8F73-6356A743C068}</a:tableStyleId>
               </a:tblPr>
               <a:tblGrid>
                 <a:gridCol w="1695200"/>
@@ -28678,7 +28678,7 @@
             <a:tbl>
               <a:tblPr>
                 <a:noFill/>
-                <a:tableStyleId>{50C352CE-1B1D-4D2E-B4E8-68B4B13091BA}</a:tableStyleId>
+                <a:tableStyleId>{27CCD006-CB68-44EF-8F73-6356A743C068}</a:tableStyleId>
               </a:tblPr>
               <a:tblGrid>
                 <a:gridCol w="1695200"/>
@@ -29670,7 +29670,7 @@
             <a:tbl>
               <a:tblPr>
                 <a:noFill/>
-                <a:tableStyleId>{50C352CE-1B1D-4D2E-B4E8-68B4B13091BA}</a:tableStyleId>
+                <a:tableStyleId>{27CCD006-CB68-44EF-8F73-6356A743C068}</a:tableStyleId>
               </a:tblPr>
               <a:tblGrid>
                 <a:gridCol w="3048000"/>
@@ -33175,7 +33175,7 @@
             <a:tbl>
               <a:tblPr>
                 <a:noFill/>
-                <a:tableStyleId>{50C352CE-1B1D-4D2E-B4E8-68B4B13091BA}</a:tableStyleId>
+                <a:tableStyleId>{27CCD006-CB68-44EF-8F73-6356A743C068}</a:tableStyleId>
               </a:tblPr>
               <a:tblGrid>
                 <a:gridCol w="1828800"/>

</xml_diff>

<commit_message>
Update Data Sources from LFX 2026-02-12 (#86)
Update Data Sources from LFX

Signed-off-by: github-actions[bot] <41898282+github-actions[bot]@users.noreply.github.com>
</commit_message>
<xml_diff>
--- a/overview_deck/LF Energy High Level Overview.pptx
+++ b/overview_deck/LF Energy High Level Overview.pptx
@@ -25946,7 +25946,7 @@
             <a:tbl>
               <a:tblPr>
                 <a:noFill/>
-                <a:tableStyleId>{27CCD006-CB68-44EF-8F73-6356A743C068}</a:tableStyleId>
+                <a:tableStyleId>{D68A6CE3-77B7-4DC6-AE46-14005A626D47}</a:tableStyleId>
               </a:tblPr>
               <a:tblGrid>
                 <a:gridCol w="1695200"/>
@@ -26736,7 +26736,7 @@
             <a:tbl>
               <a:tblPr>
                 <a:noFill/>
-                <a:tableStyleId>{27CCD006-CB68-44EF-8F73-6356A743C068}</a:tableStyleId>
+                <a:tableStyleId>{D68A6CE3-77B7-4DC6-AE46-14005A626D47}</a:tableStyleId>
               </a:tblPr>
               <a:tblGrid>
                 <a:gridCol w="1695200"/>
@@ -27426,7 +27426,7 @@
             <a:tbl>
               <a:tblPr>
                 <a:noFill/>
-                <a:tableStyleId>{27CCD006-CB68-44EF-8F73-6356A743C068}</a:tableStyleId>
+                <a:tableStyleId>{D68A6CE3-77B7-4DC6-AE46-14005A626D47}</a:tableStyleId>
               </a:tblPr>
               <a:tblGrid>
                 <a:gridCol w="1695200"/>
@@ -28678,7 +28678,7 @@
             <a:tbl>
               <a:tblPr>
                 <a:noFill/>
-                <a:tableStyleId>{27CCD006-CB68-44EF-8F73-6356A743C068}</a:tableStyleId>
+                <a:tableStyleId>{D68A6CE3-77B7-4DC6-AE46-14005A626D47}</a:tableStyleId>
               </a:tblPr>
               <a:tblGrid>
                 <a:gridCol w="1695200"/>
@@ -29670,7 +29670,7 @@
             <a:tbl>
               <a:tblPr>
                 <a:noFill/>
-                <a:tableStyleId>{27CCD006-CB68-44EF-8F73-6356A743C068}</a:tableStyleId>
+                <a:tableStyleId>{D68A6CE3-77B7-4DC6-AE46-14005A626D47}</a:tableStyleId>
               </a:tblPr>
               <a:tblGrid>
                 <a:gridCol w="3048000"/>
@@ -33175,7 +33175,7 @@
             <a:tbl>
               <a:tblPr>
                 <a:noFill/>
-                <a:tableStyleId>{27CCD006-CB68-44EF-8F73-6356A743C068}</a:tableStyleId>
+                <a:tableStyleId>{D68A6CE3-77B7-4DC6-AE46-14005A626D47}</a:tableStyleId>
               </a:tblPr>
               <a:tblGrid>
                 <a:gridCol w="1828800"/>
@@ -34002,6 +34002,285 @@
 </file>
 
 <file path=ppt/theme/theme1.xml><?xml version="1.0" encoding="utf-8"?>
+<a:theme xmlns:a="http://schemas.openxmlformats.org/drawingml/2006/main" xmlns:r="http://schemas.openxmlformats.org/officeDocument/2006/relationships">
+  <a:themeElements>
+    <a:clrScheme name="Default">
+      <a:dk1>
+        <a:srgbClr val="000000"/>
+      </a:dk1>
+      <a:lt1>
+        <a:srgbClr val="FFFFFF"/>
+      </a:lt1>
+      <a:dk2>
+        <a:srgbClr val="158158"/>
+      </a:dk2>
+      <a:lt2>
+        <a:srgbClr val="F3F3F3"/>
+      </a:lt2>
+      <a:accent1>
+        <a:srgbClr val="058DC7"/>
+      </a:accent1>
+      <a:accent2>
+        <a:srgbClr val="50B432"/>
+      </a:accent2>
+      <a:accent3>
+        <a:srgbClr val="ED561B"/>
+      </a:accent3>
+      <a:accent4>
+        <a:srgbClr val="EDEF00"/>
+      </a:accent4>
+      <a:accent5>
+        <a:srgbClr val="24CBE5"/>
+      </a:accent5>
+      <a:accent6>
+        <a:srgbClr val="64E572"/>
+      </a:accent6>
+      <a:hlink>
+        <a:srgbClr val="2200CC"/>
+      </a:hlink>
+      <a:folHlink>
+        <a:srgbClr val="551A8B"/>
+      </a:folHlink>
+    </a:clrScheme>
+    <a:fontScheme name="Office">
+      <a:majorFont>
+        <a:latin typeface="Arial"/>
+        <a:ea typeface=""/>
+        <a:cs typeface=""/>
+        <a:font script="Jpan" typeface="ＭＳ Ｐゴシック"/>
+        <a:font script="Hang" typeface="맑은 고딕"/>
+        <a:font script="Hans" typeface="宋体"/>
+        <a:font script="Hant" typeface="新細明體"/>
+        <a:font script="Arab" typeface="Times New Roman"/>
+        <a:font script="Hebr" typeface="Times New Roman"/>
+        <a:font script="Thai" typeface="Angsana New"/>
+        <a:font script="Ethi" typeface="Nyala"/>
+        <a:font script="Beng" typeface="Vrinda"/>
+        <a:font script="Gujr" typeface="Shruti"/>
+        <a:font script="Khmr" typeface="MoolBoran"/>
+        <a:font script="Knda" typeface="Tunga"/>
+        <a:font script="Guru" typeface="Raavi"/>
+        <a:font script="Cans" typeface="Euphemia"/>
+        <a:font script="Cher" typeface="Plantagenet Cherokee"/>
+        <a:font script="Yiii" typeface="Microsoft Yi Baiti"/>
+        <a:font script="Tibt" typeface="Microsoft Himalaya"/>
+        <a:font script="Thaa" typeface="MV Boli"/>
+        <a:font script="Deva" typeface="Mangal"/>
+        <a:font script="Telu" typeface="Gautami"/>
+        <a:font script="Taml" typeface="Latha"/>
+        <a:font script="Syrc" typeface="Estrangelo Edessa"/>
+        <a:font script="Orya" typeface="Kalinga"/>
+        <a:font script="Mlym" typeface="Kartika"/>
+        <a:font script="Laoo" typeface="DokChampa"/>
+        <a:font script="Sinh" typeface="Iskoola Pota"/>
+        <a:font script="Mong" typeface="Mongolian Baiti"/>
+        <a:font script="Viet" typeface="Times New Roman"/>
+        <a:font script="Uigh" typeface="Microsoft Uighur"/>
+        <a:font script="Geor" typeface="Sylfaen"/>
+      </a:majorFont>
+      <a:minorFont>
+        <a:latin typeface="Arial"/>
+        <a:ea typeface=""/>
+        <a:cs typeface=""/>
+        <a:font script="Jpan" typeface="ＭＳ Ｐゴシック"/>
+        <a:font script="Hang" typeface="맑은 고딕"/>
+        <a:font script="Hans" typeface="宋体"/>
+        <a:font script="Hant" typeface="新細明體"/>
+        <a:font script="Arab" typeface="Arial"/>
+        <a:font script="Hebr" typeface="Arial"/>
+        <a:font script="Thai" typeface="Cordia New"/>
+        <a:font script="Ethi" typeface="Nyala"/>
+        <a:font script="Beng" typeface="Vrinda"/>
+        <a:font script="Gujr" typeface="Shruti"/>
+        <a:font script="Khmr" typeface="DaunPenh"/>
+        <a:font script="Knda" typeface="Tunga"/>
+        <a:font script="Guru" typeface="Raavi"/>
+        <a:font script="Cans" typeface="Euphemia"/>
+        <a:font script="Cher" typeface="Plantagenet Cherokee"/>
+        <a:font script="Yiii" typeface="Microsoft Yi Baiti"/>
+        <a:font script="Tibt" typeface="Microsoft Himalaya"/>
+        <a:font script="Thaa" typeface="MV Boli"/>
+        <a:font script="Deva" typeface="Mangal"/>
+        <a:font script="Telu" typeface="Gautami"/>
+        <a:font script="Taml" typeface="Latha"/>
+        <a:font script="Syrc" typeface="Estrangelo Edessa"/>
+        <a:font script="Orya" typeface="Kalinga"/>
+        <a:font script="Mlym" typeface="Kartika"/>
+        <a:font script="Laoo" typeface="DokChampa"/>
+        <a:font script="Sinh" typeface="Iskoola Pota"/>
+        <a:font script="Mong" typeface="Mongolian Baiti"/>
+        <a:font script="Viet" typeface="Arial"/>
+        <a:font script="Uigh" typeface="Microsoft Uighur"/>
+        <a:font script="Geor" typeface="Sylfaen"/>
+      </a:minorFont>
+    </a:fontScheme>
+    <a:fmtScheme name="Office">
+      <a:fillStyleLst>
+        <a:solidFill>
+          <a:schemeClr val="phClr"/>
+        </a:solidFill>
+        <a:gradFill rotWithShape="1">
+          <a:gsLst>
+            <a:gs pos="0">
+              <a:schemeClr val="phClr">
+                <a:tint val="50000"/>
+                <a:satMod val="300000"/>
+              </a:schemeClr>
+            </a:gs>
+            <a:gs pos="35000">
+              <a:schemeClr val="phClr">
+                <a:tint val="37000"/>
+                <a:satMod val="300000"/>
+              </a:schemeClr>
+            </a:gs>
+            <a:gs pos="100000">
+              <a:schemeClr val="phClr">
+                <a:tint val="15000"/>
+                <a:satMod val="350000"/>
+              </a:schemeClr>
+            </a:gs>
+          </a:gsLst>
+          <a:lin ang="16200000" scaled="1"/>
+        </a:gradFill>
+        <a:gradFill rotWithShape="1">
+          <a:gsLst>
+            <a:gs pos="0">
+              <a:schemeClr val="phClr">
+                <a:tint val="100000"/>
+                <a:shade val="100000"/>
+                <a:satMod val="130000"/>
+              </a:schemeClr>
+            </a:gs>
+            <a:gs pos="100000">
+              <a:schemeClr val="phClr">
+                <a:tint val="50000"/>
+                <a:shade val="100000"/>
+                <a:satMod val="350000"/>
+              </a:schemeClr>
+            </a:gs>
+          </a:gsLst>
+          <a:lin ang="16200000" scaled="0"/>
+        </a:gradFill>
+      </a:fillStyleLst>
+      <a:lnStyleLst>
+        <a:ln w="9525" cap="flat" cmpd="sng" algn="ctr">
+          <a:solidFill>
+            <a:schemeClr val="phClr">
+              <a:shade val="95000"/>
+              <a:satMod val="105000"/>
+            </a:schemeClr>
+          </a:solidFill>
+          <a:prstDash val="solid"/>
+        </a:ln>
+        <a:ln w="25400" cap="flat" cmpd="sng" algn="ctr">
+          <a:solidFill>
+            <a:schemeClr val="phClr"/>
+          </a:solidFill>
+          <a:prstDash val="solid"/>
+        </a:ln>
+        <a:ln w="38100" cap="flat" cmpd="sng" algn="ctr">
+          <a:solidFill>
+            <a:schemeClr val="phClr"/>
+          </a:solidFill>
+          <a:prstDash val="solid"/>
+        </a:ln>
+      </a:lnStyleLst>
+      <a:effectStyleLst>
+        <a:effectStyle>
+          <a:effectLst>
+            <a:outerShdw blurRad="40000" dist="20000" dir="5400000" rotWithShape="0">
+              <a:srgbClr val="000000">
+                <a:alpha val="38000"/>
+              </a:srgbClr>
+            </a:outerShdw>
+          </a:effectLst>
+        </a:effectStyle>
+        <a:effectStyle>
+          <a:effectLst>
+            <a:outerShdw blurRad="40000" dist="23000" dir="5400000" rotWithShape="0">
+              <a:srgbClr val="000000">
+                <a:alpha val="35000"/>
+              </a:srgbClr>
+            </a:outerShdw>
+          </a:effectLst>
+        </a:effectStyle>
+        <a:effectStyle>
+          <a:effectLst>
+            <a:outerShdw blurRad="40000" dist="23000" dir="5400000" rotWithShape="0">
+              <a:srgbClr val="000000">
+                <a:alpha val="35000"/>
+              </a:srgbClr>
+            </a:outerShdw>
+          </a:effectLst>
+          <a:scene3d>
+            <a:camera prst="orthographicFront">
+              <a:rot lat="0" lon="0" rev="0"/>
+            </a:camera>
+            <a:lightRig rig="threePt" dir="t">
+              <a:rot lat="0" lon="0" rev="1200000"/>
+            </a:lightRig>
+          </a:scene3d>
+          <a:sp3d>
+            <a:bevelT w="63500" h="25400"/>
+          </a:sp3d>
+        </a:effectStyle>
+      </a:effectStyleLst>
+      <a:bgFillStyleLst>
+        <a:solidFill>
+          <a:schemeClr val="phClr"/>
+        </a:solidFill>
+        <a:gradFill rotWithShape="1">
+          <a:gsLst>
+            <a:gs pos="0">
+              <a:schemeClr val="phClr">
+                <a:tint val="40000"/>
+                <a:satMod val="350000"/>
+              </a:schemeClr>
+            </a:gs>
+            <a:gs pos="40000">
+              <a:schemeClr val="phClr">
+                <a:tint val="45000"/>
+                <a:shade val="99000"/>
+                <a:satMod val="350000"/>
+              </a:schemeClr>
+            </a:gs>
+            <a:gs pos="100000">
+              <a:schemeClr val="phClr">
+                <a:shade val="20000"/>
+                <a:satMod val="255000"/>
+              </a:schemeClr>
+            </a:gs>
+          </a:gsLst>
+          <a:path path="circle">
+            <a:fillToRect l="50000" t="-80000" r="50000" b="180000"/>
+          </a:path>
+        </a:gradFill>
+        <a:gradFill rotWithShape="1">
+          <a:gsLst>
+            <a:gs pos="0">
+              <a:schemeClr val="phClr">
+                <a:tint val="80000"/>
+                <a:satMod val="300000"/>
+              </a:schemeClr>
+            </a:gs>
+            <a:gs pos="100000">
+              <a:schemeClr val="phClr">
+                <a:shade val="30000"/>
+                <a:satMod val="200000"/>
+              </a:schemeClr>
+            </a:gs>
+          </a:gsLst>
+          <a:path path="circle">
+            <a:fillToRect l="50000" t="50000" r="50000" b="50000"/>
+          </a:path>
+        </a:gradFill>
+      </a:bgFillStyleLst>
+    </a:fmtScheme>
+  </a:themeElements>
+</a:theme>
+</file>
+
+<file path=ppt/theme/theme2.xml><?xml version="1.0" encoding="utf-8"?>
 <a:theme xmlns:a="http://schemas.openxmlformats.org/drawingml/2006/main" xmlns:r="http://schemas.openxmlformats.org/officeDocument/2006/relationships" name="LF Energy Theme 2023">
   <a:themeElements>
     <a:clrScheme name="Geometric">
@@ -34280,7 +34559,7 @@
 </a:theme>
 </file>
 
-<file path=ppt/theme/theme2.xml><?xml version="1.0" encoding="utf-8"?>
+<file path=ppt/theme/theme3.xml><?xml version="1.0" encoding="utf-8"?>
 <a:theme xmlns:a="http://schemas.openxmlformats.org/drawingml/2006/main" xmlns:r="http://schemas.openxmlformats.org/officeDocument/2006/relationships" name="Simple Light">
   <a:themeElements>
     <a:clrScheme name="Simple Light">
@@ -34557,283 +34836,4 @@
     </a:fmtScheme>
   </a:themeElements>
 </a:theme>
-</file>
-
-<file path=ppt/theme/theme3.xml><?xml version="1.0" encoding="utf-8"?>
-<a:theme xmlns:a="http://schemas.openxmlformats.org/drawingml/2006/main" xmlns:r="http://schemas.openxmlformats.org/officeDocument/2006/relationships">
-  <a:themeElements>
-    <a:clrScheme name="Default">
-      <a:dk1>
-        <a:srgbClr val="000000"/>
-      </a:dk1>
-      <a:lt1>
-        <a:srgbClr val="FFFFFF"/>
-      </a:lt1>
-      <a:dk2>
-        <a:srgbClr val="158158"/>
-      </a:dk2>
-      <a:lt2>
-        <a:srgbClr val="F3F3F3"/>
-      </a:lt2>
-      <a:accent1>
-        <a:srgbClr val="058DC7"/>
-      </a:accent1>
-      <a:accent2>
-        <a:srgbClr val="50B432"/>
-      </a:accent2>
-      <a:accent3>
-        <a:srgbClr val="ED561B"/>
-      </a:accent3>
-      <a:accent4>
-        <a:srgbClr val="EDEF00"/>
-      </a:accent4>
-      <a:accent5>
-        <a:srgbClr val="24CBE5"/>
-      </a:accent5>
-      <a:accent6>
-        <a:srgbClr val="64E572"/>
-      </a:accent6>
-      <a:hlink>
-        <a:srgbClr val="2200CC"/>
-      </a:hlink>
-      <a:folHlink>
-        <a:srgbClr val="551A8B"/>
-      </a:folHlink>
-    </a:clrScheme>
-    <a:fontScheme name="Office">
-      <a:majorFont>
-        <a:latin typeface="Arial"/>
-        <a:ea typeface=""/>
-        <a:cs typeface=""/>
-        <a:font script="Jpan" typeface="ＭＳ Ｐゴシック"/>
-        <a:font script="Hang" typeface="맑은 고딕"/>
-        <a:font script="Hans" typeface="宋体"/>
-        <a:font script="Hant" typeface="新細明體"/>
-        <a:font script="Arab" typeface="Times New Roman"/>
-        <a:font script="Hebr" typeface="Times New Roman"/>
-        <a:font script="Thai" typeface="Angsana New"/>
-        <a:font script="Ethi" typeface="Nyala"/>
-        <a:font script="Beng" typeface="Vrinda"/>
-        <a:font script="Gujr" typeface="Shruti"/>
-        <a:font script="Khmr" typeface="MoolBoran"/>
-        <a:font script="Knda" typeface="Tunga"/>
-        <a:font script="Guru" typeface="Raavi"/>
-        <a:font script="Cans" typeface="Euphemia"/>
-        <a:font script="Cher" typeface="Plantagenet Cherokee"/>
-        <a:font script="Yiii" typeface="Microsoft Yi Baiti"/>
-        <a:font script="Tibt" typeface="Microsoft Himalaya"/>
-        <a:font script="Thaa" typeface="MV Boli"/>
-        <a:font script="Deva" typeface="Mangal"/>
-        <a:font script="Telu" typeface="Gautami"/>
-        <a:font script="Taml" typeface="Latha"/>
-        <a:font script="Syrc" typeface="Estrangelo Edessa"/>
-        <a:font script="Orya" typeface="Kalinga"/>
-        <a:font script="Mlym" typeface="Kartika"/>
-        <a:font script="Laoo" typeface="DokChampa"/>
-        <a:font script="Sinh" typeface="Iskoola Pota"/>
-        <a:font script="Mong" typeface="Mongolian Baiti"/>
-        <a:font script="Viet" typeface="Times New Roman"/>
-        <a:font script="Uigh" typeface="Microsoft Uighur"/>
-        <a:font script="Geor" typeface="Sylfaen"/>
-      </a:majorFont>
-      <a:minorFont>
-        <a:latin typeface="Arial"/>
-        <a:ea typeface=""/>
-        <a:cs typeface=""/>
-        <a:font script="Jpan" typeface="ＭＳ Ｐゴシック"/>
-        <a:font script="Hang" typeface="맑은 고딕"/>
-        <a:font script="Hans" typeface="宋体"/>
-        <a:font script="Hant" typeface="新細明體"/>
-        <a:font script="Arab" typeface="Arial"/>
-        <a:font script="Hebr" typeface="Arial"/>
-        <a:font script="Thai" typeface="Cordia New"/>
-        <a:font script="Ethi" typeface="Nyala"/>
-        <a:font script="Beng" typeface="Vrinda"/>
-        <a:font script="Gujr" typeface="Shruti"/>
-        <a:font script="Khmr" typeface="DaunPenh"/>
-        <a:font script="Knda" typeface="Tunga"/>
-        <a:font script="Guru" typeface="Raavi"/>
-        <a:font script="Cans" typeface="Euphemia"/>
-        <a:font script="Cher" typeface="Plantagenet Cherokee"/>
-        <a:font script="Yiii" typeface="Microsoft Yi Baiti"/>
-        <a:font script="Tibt" typeface="Microsoft Himalaya"/>
-        <a:font script="Thaa" typeface="MV Boli"/>
-        <a:font script="Deva" typeface="Mangal"/>
-        <a:font script="Telu" typeface="Gautami"/>
-        <a:font script="Taml" typeface="Latha"/>
-        <a:font script="Syrc" typeface="Estrangelo Edessa"/>
-        <a:font script="Orya" typeface="Kalinga"/>
-        <a:font script="Mlym" typeface="Kartika"/>
-        <a:font script="Laoo" typeface="DokChampa"/>
-        <a:font script="Sinh" typeface="Iskoola Pota"/>
-        <a:font script="Mong" typeface="Mongolian Baiti"/>
-        <a:font script="Viet" typeface="Arial"/>
-        <a:font script="Uigh" typeface="Microsoft Uighur"/>
-        <a:font script="Geor" typeface="Sylfaen"/>
-      </a:minorFont>
-    </a:fontScheme>
-    <a:fmtScheme name="Office">
-      <a:fillStyleLst>
-        <a:solidFill>
-          <a:schemeClr val="phClr"/>
-        </a:solidFill>
-        <a:gradFill rotWithShape="1">
-          <a:gsLst>
-            <a:gs pos="0">
-              <a:schemeClr val="phClr">
-                <a:tint val="50000"/>
-                <a:satMod val="300000"/>
-              </a:schemeClr>
-            </a:gs>
-            <a:gs pos="35000">
-              <a:schemeClr val="phClr">
-                <a:tint val="37000"/>
-                <a:satMod val="300000"/>
-              </a:schemeClr>
-            </a:gs>
-            <a:gs pos="100000">
-              <a:schemeClr val="phClr">
-                <a:tint val="15000"/>
-                <a:satMod val="350000"/>
-              </a:schemeClr>
-            </a:gs>
-          </a:gsLst>
-          <a:lin ang="16200000" scaled="1"/>
-        </a:gradFill>
-        <a:gradFill rotWithShape="1">
-          <a:gsLst>
-            <a:gs pos="0">
-              <a:schemeClr val="phClr">
-                <a:tint val="100000"/>
-                <a:shade val="100000"/>
-                <a:satMod val="130000"/>
-              </a:schemeClr>
-            </a:gs>
-            <a:gs pos="100000">
-              <a:schemeClr val="phClr">
-                <a:tint val="50000"/>
-                <a:shade val="100000"/>
-                <a:satMod val="350000"/>
-              </a:schemeClr>
-            </a:gs>
-          </a:gsLst>
-          <a:lin ang="16200000" scaled="0"/>
-        </a:gradFill>
-      </a:fillStyleLst>
-      <a:lnStyleLst>
-        <a:ln w="9525" cap="flat" cmpd="sng" algn="ctr">
-          <a:solidFill>
-            <a:schemeClr val="phClr">
-              <a:shade val="95000"/>
-              <a:satMod val="105000"/>
-            </a:schemeClr>
-          </a:solidFill>
-          <a:prstDash val="solid"/>
-        </a:ln>
-        <a:ln w="25400" cap="flat" cmpd="sng" algn="ctr">
-          <a:solidFill>
-            <a:schemeClr val="phClr"/>
-          </a:solidFill>
-          <a:prstDash val="solid"/>
-        </a:ln>
-        <a:ln w="38100" cap="flat" cmpd="sng" algn="ctr">
-          <a:solidFill>
-            <a:schemeClr val="phClr"/>
-          </a:solidFill>
-          <a:prstDash val="solid"/>
-        </a:ln>
-      </a:lnStyleLst>
-      <a:effectStyleLst>
-        <a:effectStyle>
-          <a:effectLst>
-            <a:outerShdw blurRad="40000" dist="20000" dir="5400000" rotWithShape="0">
-              <a:srgbClr val="000000">
-                <a:alpha val="38000"/>
-              </a:srgbClr>
-            </a:outerShdw>
-          </a:effectLst>
-        </a:effectStyle>
-        <a:effectStyle>
-          <a:effectLst>
-            <a:outerShdw blurRad="40000" dist="23000" dir="5400000" rotWithShape="0">
-              <a:srgbClr val="000000">
-                <a:alpha val="35000"/>
-              </a:srgbClr>
-            </a:outerShdw>
-          </a:effectLst>
-        </a:effectStyle>
-        <a:effectStyle>
-          <a:effectLst>
-            <a:outerShdw blurRad="40000" dist="23000" dir="5400000" rotWithShape="0">
-              <a:srgbClr val="000000">
-                <a:alpha val="35000"/>
-              </a:srgbClr>
-            </a:outerShdw>
-          </a:effectLst>
-          <a:scene3d>
-            <a:camera prst="orthographicFront">
-              <a:rot lat="0" lon="0" rev="0"/>
-            </a:camera>
-            <a:lightRig rig="threePt" dir="t">
-              <a:rot lat="0" lon="0" rev="1200000"/>
-            </a:lightRig>
-          </a:scene3d>
-          <a:sp3d>
-            <a:bevelT w="63500" h="25400"/>
-          </a:sp3d>
-        </a:effectStyle>
-      </a:effectStyleLst>
-      <a:bgFillStyleLst>
-        <a:solidFill>
-          <a:schemeClr val="phClr"/>
-        </a:solidFill>
-        <a:gradFill rotWithShape="1">
-          <a:gsLst>
-            <a:gs pos="0">
-              <a:schemeClr val="phClr">
-                <a:tint val="40000"/>
-                <a:satMod val="350000"/>
-              </a:schemeClr>
-            </a:gs>
-            <a:gs pos="40000">
-              <a:schemeClr val="phClr">
-                <a:tint val="45000"/>
-                <a:shade val="99000"/>
-                <a:satMod val="350000"/>
-              </a:schemeClr>
-            </a:gs>
-            <a:gs pos="100000">
-              <a:schemeClr val="phClr">
-                <a:shade val="20000"/>
-                <a:satMod val="255000"/>
-              </a:schemeClr>
-            </a:gs>
-          </a:gsLst>
-          <a:path path="circle">
-            <a:fillToRect l="50000" t="-80000" r="50000" b="180000"/>
-          </a:path>
-        </a:gradFill>
-        <a:gradFill rotWithShape="1">
-          <a:gsLst>
-            <a:gs pos="0">
-              <a:schemeClr val="phClr">
-                <a:tint val="80000"/>
-                <a:satMod val="300000"/>
-              </a:schemeClr>
-            </a:gs>
-            <a:gs pos="100000">
-              <a:schemeClr val="phClr">
-                <a:shade val="30000"/>
-                <a:satMod val="200000"/>
-              </a:schemeClr>
-            </a:gs>
-          </a:gsLst>
-          <a:path path="circle">
-            <a:fillToRect l="50000" t="50000" r="50000" b="50000"/>
-          </a:path>
-        </a:gradFill>
-      </a:bgFillStyleLst>
-    </a:fmtScheme>
-  </a:themeElements>
-</a:theme>
 </file>
</xml_diff>

<commit_message>
Update Data Sources from LFX 2026-02-13 (#87)
Update Data Sources from LFX

Signed-off-by: github-actions[bot] <41898282+github-actions[bot]@users.noreply.github.com>
</commit_message>
<xml_diff>
--- a/overview_deck/LF Energy High Level Overview.pptx
+++ b/overview_deck/LF Energy High Level Overview.pptx
@@ -25946,7 +25946,7 @@
             <a:tbl>
               <a:tblPr>
                 <a:noFill/>
-                <a:tableStyleId>{D68A6CE3-77B7-4DC6-AE46-14005A626D47}</a:tableStyleId>
+                <a:tableStyleId>{19266D9C-3169-4CB3-B0A4-9DD695BD7118}</a:tableStyleId>
               </a:tblPr>
               <a:tblGrid>
                 <a:gridCol w="1695200"/>
@@ -26736,7 +26736,7 @@
             <a:tbl>
               <a:tblPr>
                 <a:noFill/>
-                <a:tableStyleId>{D68A6CE3-77B7-4DC6-AE46-14005A626D47}</a:tableStyleId>
+                <a:tableStyleId>{19266D9C-3169-4CB3-B0A4-9DD695BD7118}</a:tableStyleId>
               </a:tblPr>
               <a:tblGrid>
                 <a:gridCol w="1695200"/>
@@ -27426,7 +27426,7 @@
             <a:tbl>
               <a:tblPr>
                 <a:noFill/>
-                <a:tableStyleId>{D68A6CE3-77B7-4DC6-AE46-14005A626D47}</a:tableStyleId>
+                <a:tableStyleId>{19266D9C-3169-4CB3-B0A4-9DD695BD7118}</a:tableStyleId>
               </a:tblPr>
               <a:tblGrid>
                 <a:gridCol w="1695200"/>
@@ -28678,7 +28678,7 @@
             <a:tbl>
               <a:tblPr>
                 <a:noFill/>
-                <a:tableStyleId>{D68A6CE3-77B7-4DC6-AE46-14005A626D47}</a:tableStyleId>
+                <a:tableStyleId>{19266D9C-3169-4CB3-B0A4-9DD695BD7118}</a:tableStyleId>
               </a:tblPr>
               <a:tblGrid>
                 <a:gridCol w="1695200"/>
@@ -29670,7 +29670,7 @@
             <a:tbl>
               <a:tblPr>
                 <a:noFill/>
-                <a:tableStyleId>{D68A6CE3-77B7-4DC6-AE46-14005A626D47}</a:tableStyleId>
+                <a:tableStyleId>{19266D9C-3169-4CB3-B0A4-9DD695BD7118}</a:tableStyleId>
               </a:tblPr>
               <a:tblGrid>
                 <a:gridCol w="3048000"/>
@@ -33175,7 +33175,7 @@
             <a:tbl>
               <a:tblPr>
                 <a:noFill/>
-                <a:tableStyleId>{D68A6CE3-77B7-4DC6-AE46-14005A626D47}</a:tableStyleId>
+                <a:tableStyleId>{19266D9C-3169-4CB3-B0A4-9DD695BD7118}</a:tableStyleId>
               </a:tblPr>
               <a:tblGrid>
                 <a:gridCol w="1828800"/>
@@ -34002,6 +34002,285 @@
 </file>
 
 <file path=ppt/theme/theme1.xml><?xml version="1.0" encoding="utf-8"?>
+<a:theme xmlns:a="http://schemas.openxmlformats.org/drawingml/2006/main" xmlns:r="http://schemas.openxmlformats.org/officeDocument/2006/relationships" name="Simple Light">
+  <a:themeElements>
+    <a:clrScheme name="Simple Light">
+      <a:dk1>
+        <a:srgbClr val="000000"/>
+      </a:dk1>
+      <a:lt1>
+        <a:srgbClr val="FFFFFF"/>
+      </a:lt1>
+      <a:dk2>
+        <a:srgbClr val="595959"/>
+      </a:dk2>
+      <a:lt2>
+        <a:srgbClr val="EEEEEE"/>
+      </a:lt2>
+      <a:accent1>
+        <a:srgbClr val="4285F4"/>
+      </a:accent1>
+      <a:accent2>
+        <a:srgbClr val="212121"/>
+      </a:accent2>
+      <a:accent3>
+        <a:srgbClr val="78909C"/>
+      </a:accent3>
+      <a:accent4>
+        <a:srgbClr val="FFAB40"/>
+      </a:accent4>
+      <a:accent5>
+        <a:srgbClr val="0097A7"/>
+      </a:accent5>
+      <a:accent6>
+        <a:srgbClr val="EEFF41"/>
+      </a:accent6>
+      <a:hlink>
+        <a:srgbClr val="0097A7"/>
+      </a:hlink>
+      <a:folHlink>
+        <a:srgbClr val="0097A7"/>
+      </a:folHlink>
+    </a:clrScheme>
+    <a:fontScheme name="Office">
+      <a:majorFont>
+        <a:latin typeface="Arial"/>
+        <a:ea typeface=""/>
+        <a:cs typeface=""/>
+        <a:font script="Jpan" typeface="ＭＳ Ｐゴシック"/>
+        <a:font script="Hang" typeface="맑은 고딕"/>
+        <a:font script="Hans" typeface="宋体"/>
+        <a:font script="Hant" typeface="新細明體"/>
+        <a:font script="Arab" typeface="Times New Roman"/>
+        <a:font script="Hebr" typeface="Times New Roman"/>
+        <a:font script="Thai" typeface="Angsana New"/>
+        <a:font script="Ethi" typeface="Nyala"/>
+        <a:font script="Beng" typeface="Vrinda"/>
+        <a:font script="Gujr" typeface="Shruti"/>
+        <a:font script="Khmr" typeface="MoolBoran"/>
+        <a:font script="Knda" typeface="Tunga"/>
+        <a:font script="Guru" typeface="Raavi"/>
+        <a:font script="Cans" typeface="Euphemia"/>
+        <a:font script="Cher" typeface="Plantagenet Cherokee"/>
+        <a:font script="Yiii" typeface="Microsoft Yi Baiti"/>
+        <a:font script="Tibt" typeface="Microsoft Himalaya"/>
+        <a:font script="Thaa" typeface="MV Boli"/>
+        <a:font script="Deva" typeface="Mangal"/>
+        <a:font script="Telu" typeface="Gautami"/>
+        <a:font script="Taml" typeface="Latha"/>
+        <a:font script="Syrc" typeface="Estrangelo Edessa"/>
+        <a:font script="Orya" typeface="Kalinga"/>
+        <a:font script="Mlym" typeface="Kartika"/>
+        <a:font script="Laoo" typeface="DokChampa"/>
+        <a:font script="Sinh" typeface="Iskoola Pota"/>
+        <a:font script="Mong" typeface="Mongolian Baiti"/>
+        <a:font script="Viet" typeface="Times New Roman"/>
+        <a:font script="Uigh" typeface="Microsoft Uighur"/>
+        <a:font script="Geor" typeface="Sylfaen"/>
+      </a:majorFont>
+      <a:minorFont>
+        <a:latin typeface="Arial"/>
+        <a:ea typeface=""/>
+        <a:cs typeface=""/>
+        <a:font script="Jpan" typeface="ＭＳ Ｐゴシック"/>
+        <a:font script="Hang" typeface="맑은 고딕"/>
+        <a:font script="Hans" typeface="宋体"/>
+        <a:font script="Hant" typeface="新細明體"/>
+        <a:font script="Arab" typeface="Arial"/>
+        <a:font script="Hebr" typeface="Arial"/>
+        <a:font script="Thai" typeface="Cordia New"/>
+        <a:font script="Ethi" typeface="Nyala"/>
+        <a:font script="Beng" typeface="Vrinda"/>
+        <a:font script="Gujr" typeface="Shruti"/>
+        <a:font script="Khmr" typeface="DaunPenh"/>
+        <a:font script="Knda" typeface="Tunga"/>
+        <a:font script="Guru" typeface="Raavi"/>
+        <a:font script="Cans" typeface="Euphemia"/>
+        <a:font script="Cher" typeface="Plantagenet Cherokee"/>
+        <a:font script="Yiii" typeface="Microsoft Yi Baiti"/>
+        <a:font script="Tibt" typeface="Microsoft Himalaya"/>
+        <a:font script="Thaa" typeface="MV Boli"/>
+        <a:font script="Deva" typeface="Mangal"/>
+        <a:font script="Telu" typeface="Gautami"/>
+        <a:font script="Taml" typeface="Latha"/>
+        <a:font script="Syrc" typeface="Estrangelo Edessa"/>
+        <a:font script="Orya" typeface="Kalinga"/>
+        <a:font script="Mlym" typeface="Kartika"/>
+        <a:font script="Laoo" typeface="DokChampa"/>
+        <a:font script="Sinh" typeface="Iskoola Pota"/>
+        <a:font script="Mong" typeface="Mongolian Baiti"/>
+        <a:font script="Viet" typeface="Arial"/>
+        <a:font script="Uigh" typeface="Microsoft Uighur"/>
+        <a:font script="Geor" typeface="Sylfaen"/>
+      </a:minorFont>
+    </a:fontScheme>
+    <a:fmtScheme name="Office">
+      <a:fillStyleLst>
+        <a:solidFill>
+          <a:schemeClr val="phClr"/>
+        </a:solidFill>
+        <a:gradFill rotWithShape="1">
+          <a:gsLst>
+            <a:gs pos="0">
+              <a:schemeClr val="phClr">
+                <a:tint val="50000"/>
+                <a:satMod val="300000"/>
+              </a:schemeClr>
+            </a:gs>
+            <a:gs pos="35000">
+              <a:schemeClr val="phClr">
+                <a:tint val="37000"/>
+                <a:satMod val="300000"/>
+              </a:schemeClr>
+            </a:gs>
+            <a:gs pos="100000">
+              <a:schemeClr val="phClr">
+                <a:tint val="15000"/>
+                <a:satMod val="350000"/>
+              </a:schemeClr>
+            </a:gs>
+          </a:gsLst>
+          <a:lin ang="16200000" scaled="1"/>
+        </a:gradFill>
+        <a:gradFill rotWithShape="1">
+          <a:gsLst>
+            <a:gs pos="0">
+              <a:schemeClr val="phClr">
+                <a:tint val="100000"/>
+                <a:shade val="100000"/>
+                <a:satMod val="130000"/>
+              </a:schemeClr>
+            </a:gs>
+            <a:gs pos="100000">
+              <a:schemeClr val="phClr">
+                <a:tint val="50000"/>
+                <a:shade val="100000"/>
+                <a:satMod val="350000"/>
+              </a:schemeClr>
+            </a:gs>
+          </a:gsLst>
+          <a:lin ang="16200000" scaled="0"/>
+        </a:gradFill>
+      </a:fillStyleLst>
+      <a:lnStyleLst>
+        <a:ln w="9525" cap="flat" cmpd="sng" algn="ctr">
+          <a:solidFill>
+            <a:schemeClr val="phClr">
+              <a:shade val="95000"/>
+              <a:satMod val="105000"/>
+            </a:schemeClr>
+          </a:solidFill>
+          <a:prstDash val="solid"/>
+        </a:ln>
+        <a:ln w="25400" cap="flat" cmpd="sng" algn="ctr">
+          <a:solidFill>
+            <a:schemeClr val="phClr"/>
+          </a:solidFill>
+          <a:prstDash val="solid"/>
+        </a:ln>
+        <a:ln w="38100" cap="flat" cmpd="sng" algn="ctr">
+          <a:solidFill>
+            <a:schemeClr val="phClr"/>
+          </a:solidFill>
+          <a:prstDash val="solid"/>
+        </a:ln>
+      </a:lnStyleLst>
+      <a:effectStyleLst>
+        <a:effectStyle>
+          <a:effectLst>
+            <a:outerShdw blurRad="40000" dist="20000" dir="5400000" rotWithShape="0">
+              <a:srgbClr val="000000">
+                <a:alpha val="38000"/>
+              </a:srgbClr>
+            </a:outerShdw>
+          </a:effectLst>
+        </a:effectStyle>
+        <a:effectStyle>
+          <a:effectLst>
+            <a:outerShdw blurRad="40000" dist="23000" dir="5400000" rotWithShape="0">
+              <a:srgbClr val="000000">
+                <a:alpha val="35000"/>
+              </a:srgbClr>
+            </a:outerShdw>
+          </a:effectLst>
+        </a:effectStyle>
+        <a:effectStyle>
+          <a:effectLst>
+            <a:outerShdw blurRad="40000" dist="23000" dir="5400000" rotWithShape="0">
+              <a:srgbClr val="000000">
+                <a:alpha val="35000"/>
+              </a:srgbClr>
+            </a:outerShdw>
+          </a:effectLst>
+          <a:scene3d>
+            <a:camera prst="orthographicFront">
+              <a:rot lat="0" lon="0" rev="0"/>
+            </a:camera>
+            <a:lightRig rig="threePt" dir="t">
+              <a:rot lat="0" lon="0" rev="1200000"/>
+            </a:lightRig>
+          </a:scene3d>
+          <a:sp3d>
+            <a:bevelT w="63500" h="25400"/>
+          </a:sp3d>
+        </a:effectStyle>
+      </a:effectStyleLst>
+      <a:bgFillStyleLst>
+        <a:solidFill>
+          <a:schemeClr val="phClr"/>
+        </a:solidFill>
+        <a:gradFill rotWithShape="1">
+          <a:gsLst>
+            <a:gs pos="0">
+              <a:schemeClr val="phClr">
+                <a:tint val="40000"/>
+                <a:satMod val="350000"/>
+              </a:schemeClr>
+            </a:gs>
+            <a:gs pos="40000">
+              <a:schemeClr val="phClr">
+                <a:tint val="45000"/>
+                <a:shade val="99000"/>
+                <a:satMod val="350000"/>
+              </a:schemeClr>
+            </a:gs>
+            <a:gs pos="100000">
+              <a:schemeClr val="phClr">
+                <a:shade val="20000"/>
+                <a:satMod val="255000"/>
+              </a:schemeClr>
+            </a:gs>
+          </a:gsLst>
+          <a:path path="circle">
+            <a:fillToRect l="50000" t="-80000" r="50000" b="180000"/>
+          </a:path>
+        </a:gradFill>
+        <a:gradFill rotWithShape="1">
+          <a:gsLst>
+            <a:gs pos="0">
+              <a:schemeClr val="phClr">
+                <a:tint val="80000"/>
+                <a:satMod val="300000"/>
+              </a:schemeClr>
+            </a:gs>
+            <a:gs pos="100000">
+              <a:schemeClr val="phClr">
+                <a:shade val="30000"/>
+                <a:satMod val="200000"/>
+              </a:schemeClr>
+            </a:gs>
+          </a:gsLst>
+          <a:path path="circle">
+            <a:fillToRect l="50000" t="50000" r="50000" b="50000"/>
+          </a:path>
+        </a:gradFill>
+      </a:bgFillStyleLst>
+    </a:fmtScheme>
+  </a:themeElements>
+</a:theme>
+</file>
+
+<file path=ppt/theme/theme2.xml><?xml version="1.0" encoding="utf-8"?>
 <a:theme xmlns:a="http://schemas.openxmlformats.org/drawingml/2006/main" xmlns:r="http://schemas.openxmlformats.org/officeDocument/2006/relationships">
   <a:themeElements>
     <a:clrScheme name="Default">
@@ -34280,7 +34559,7 @@
 </a:theme>
 </file>
 
-<file path=ppt/theme/theme2.xml><?xml version="1.0" encoding="utf-8"?>
+<file path=ppt/theme/theme3.xml><?xml version="1.0" encoding="utf-8"?>
 <a:theme xmlns:a="http://schemas.openxmlformats.org/drawingml/2006/main" xmlns:r="http://schemas.openxmlformats.org/officeDocument/2006/relationships" name="LF Energy Theme 2023">
   <a:themeElements>
     <a:clrScheme name="Geometric">
@@ -34557,283 +34836,4 @@
     </a:fmtScheme>
   </a:themeElements>
 </a:theme>
-</file>
-
-<file path=ppt/theme/theme3.xml><?xml version="1.0" encoding="utf-8"?>
-<a:theme xmlns:a="http://schemas.openxmlformats.org/drawingml/2006/main" xmlns:r="http://schemas.openxmlformats.org/officeDocument/2006/relationships" name="Simple Light">
-  <a:themeElements>
-    <a:clrScheme name="Simple Light">
-      <a:dk1>
-        <a:srgbClr val="000000"/>
-      </a:dk1>
-      <a:lt1>
-        <a:srgbClr val="FFFFFF"/>
-      </a:lt1>
-      <a:dk2>
-        <a:srgbClr val="595959"/>
-      </a:dk2>
-      <a:lt2>
-        <a:srgbClr val="EEEEEE"/>
-      </a:lt2>
-      <a:accent1>
-        <a:srgbClr val="4285F4"/>
-      </a:accent1>
-      <a:accent2>
-        <a:srgbClr val="212121"/>
-      </a:accent2>
-      <a:accent3>
-        <a:srgbClr val="78909C"/>
-      </a:accent3>
-      <a:accent4>
-        <a:srgbClr val="FFAB40"/>
-      </a:accent4>
-      <a:accent5>
-        <a:srgbClr val="0097A7"/>
-      </a:accent5>
-      <a:accent6>
-        <a:srgbClr val="EEFF41"/>
-      </a:accent6>
-      <a:hlink>
-        <a:srgbClr val="0097A7"/>
-      </a:hlink>
-      <a:folHlink>
-        <a:srgbClr val="0097A7"/>
-      </a:folHlink>
-    </a:clrScheme>
-    <a:fontScheme name="Office">
-      <a:majorFont>
-        <a:latin typeface="Arial"/>
-        <a:ea typeface=""/>
-        <a:cs typeface=""/>
-        <a:font script="Jpan" typeface="ＭＳ Ｐゴシック"/>
-        <a:font script="Hang" typeface="맑은 고딕"/>
-        <a:font script="Hans" typeface="宋体"/>
-        <a:font script="Hant" typeface="新細明體"/>
-        <a:font script="Arab" typeface="Times New Roman"/>
-        <a:font script="Hebr" typeface="Times New Roman"/>
-        <a:font script="Thai" typeface="Angsana New"/>
-        <a:font script="Ethi" typeface="Nyala"/>
-        <a:font script="Beng" typeface="Vrinda"/>
-        <a:font script="Gujr" typeface="Shruti"/>
-        <a:font script="Khmr" typeface="MoolBoran"/>
-        <a:font script="Knda" typeface="Tunga"/>
-        <a:font script="Guru" typeface="Raavi"/>
-        <a:font script="Cans" typeface="Euphemia"/>
-        <a:font script="Cher" typeface="Plantagenet Cherokee"/>
-        <a:font script="Yiii" typeface="Microsoft Yi Baiti"/>
-        <a:font script="Tibt" typeface="Microsoft Himalaya"/>
-        <a:font script="Thaa" typeface="MV Boli"/>
-        <a:font script="Deva" typeface="Mangal"/>
-        <a:font script="Telu" typeface="Gautami"/>
-        <a:font script="Taml" typeface="Latha"/>
-        <a:font script="Syrc" typeface="Estrangelo Edessa"/>
-        <a:font script="Orya" typeface="Kalinga"/>
-        <a:font script="Mlym" typeface="Kartika"/>
-        <a:font script="Laoo" typeface="DokChampa"/>
-        <a:font script="Sinh" typeface="Iskoola Pota"/>
-        <a:font script="Mong" typeface="Mongolian Baiti"/>
-        <a:font script="Viet" typeface="Times New Roman"/>
-        <a:font script="Uigh" typeface="Microsoft Uighur"/>
-        <a:font script="Geor" typeface="Sylfaen"/>
-      </a:majorFont>
-      <a:minorFont>
-        <a:latin typeface="Arial"/>
-        <a:ea typeface=""/>
-        <a:cs typeface=""/>
-        <a:font script="Jpan" typeface="ＭＳ Ｐゴシック"/>
-        <a:font script="Hang" typeface="맑은 고딕"/>
-        <a:font script="Hans" typeface="宋体"/>
-        <a:font script="Hant" typeface="新細明體"/>
-        <a:font script="Arab" typeface="Arial"/>
-        <a:font script="Hebr" typeface="Arial"/>
-        <a:font script="Thai" typeface="Cordia New"/>
-        <a:font script="Ethi" typeface="Nyala"/>
-        <a:font script="Beng" typeface="Vrinda"/>
-        <a:font script="Gujr" typeface="Shruti"/>
-        <a:font script="Khmr" typeface="DaunPenh"/>
-        <a:font script="Knda" typeface="Tunga"/>
-        <a:font script="Guru" typeface="Raavi"/>
-        <a:font script="Cans" typeface="Euphemia"/>
-        <a:font script="Cher" typeface="Plantagenet Cherokee"/>
-        <a:font script="Yiii" typeface="Microsoft Yi Baiti"/>
-        <a:font script="Tibt" typeface="Microsoft Himalaya"/>
-        <a:font script="Thaa" typeface="MV Boli"/>
-        <a:font script="Deva" typeface="Mangal"/>
-        <a:font script="Telu" typeface="Gautami"/>
-        <a:font script="Taml" typeface="Latha"/>
-        <a:font script="Syrc" typeface="Estrangelo Edessa"/>
-        <a:font script="Orya" typeface="Kalinga"/>
-        <a:font script="Mlym" typeface="Kartika"/>
-        <a:font script="Laoo" typeface="DokChampa"/>
-        <a:font script="Sinh" typeface="Iskoola Pota"/>
-        <a:font script="Mong" typeface="Mongolian Baiti"/>
-        <a:font script="Viet" typeface="Arial"/>
-        <a:font script="Uigh" typeface="Microsoft Uighur"/>
-        <a:font script="Geor" typeface="Sylfaen"/>
-      </a:minorFont>
-    </a:fontScheme>
-    <a:fmtScheme name="Office">
-      <a:fillStyleLst>
-        <a:solidFill>
-          <a:schemeClr val="phClr"/>
-        </a:solidFill>
-        <a:gradFill rotWithShape="1">
-          <a:gsLst>
-            <a:gs pos="0">
-              <a:schemeClr val="phClr">
-                <a:tint val="50000"/>
-                <a:satMod val="300000"/>
-              </a:schemeClr>
-            </a:gs>
-            <a:gs pos="35000">
-              <a:schemeClr val="phClr">
-                <a:tint val="37000"/>
-                <a:satMod val="300000"/>
-              </a:schemeClr>
-            </a:gs>
-            <a:gs pos="100000">
-              <a:schemeClr val="phClr">
-                <a:tint val="15000"/>
-                <a:satMod val="350000"/>
-              </a:schemeClr>
-            </a:gs>
-          </a:gsLst>
-          <a:lin ang="16200000" scaled="1"/>
-        </a:gradFill>
-        <a:gradFill rotWithShape="1">
-          <a:gsLst>
-            <a:gs pos="0">
-              <a:schemeClr val="phClr">
-                <a:tint val="100000"/>
-                <a:shade val="100000"/>
-                <a:satMod val="130000"/>
-              </a:schemeClr>
-            </a:gs>
-            <a:gs pos="100000">
-              <a:schemeClr val="phClr">
-                <a:tint val="50000"/>
-                <a:shade val="100000"/>
-                <a:satMod val="350000"/>
-              </a:schemeClr>
-            </a:gs>
-          </a:gsLst>
-          <a:lin ang="16200000" scaled="0"/>
-        </a:gradFill>
-      </a:fillStyleLst>
-      <a:lnStyleLst>
-        <a:ln w="9525" cap="flat" cmpd="sng" algn="ctr">
-          <a:solidFill>
-            <a:schemeClr val="phClr">
-              <a:shade val="95000"/>
-              <a:satMod val="105000"/>
-            </a:schemeClr>
-          </a:solidFill>
-          <a:prstDash val="solid"/>
-        </a:ln>
-        <a:ln w="25400" cap="flat" cmpd="sng" algn="ctr">
-          <a:solidFill>
-            <a:schemeClr val="phClr"/>
-          </a:solidFill>
-          <a:prstDash val="solid"/>
-        </a:ln>
-        <a:ln w="38100" cap="flat" cmpd="sng" algn="ctr">
-          <a:solidFill>
-            <a:schemeClr val="phClr"/>
-          </a:solidFill>
-          <a:prstDash val="solid"/>
-        </a:ln>
-      </a:lnStyleLst>
-      <a:effectStyleLst>
-        <a:effectStyle>
-          <a:effectLst>
-            <a:outerShdw blurRad="40000" dist="20000" dir="5400000" rotWithShape="0">
-              <a:srgbClr val="000000">
-                <a:alpha val="38000"/>
-              </a:srgbClr>
-            </a:outerShdw>
-          </a:effectLst>
-        </a:effectStyle>
-        <a:effectStyle>
-          <a:effectLst>
-            <a:outerShdw blurRad="40000" dist="23000" dir="5400000" rotWithShape="0">
-              <a:srgbClr val="000000">
-                <a:alpha val="35000"/>
-              </a:srgbClr>
-            </a:outerShdw>
-          </a:effectLst>
-        </a:effectStyle>
-        <a:effectStyle>
-          <a:effectLst>
-            <a:outerShdw blurRad="40000" dist="23000" dir="5400000" rotWithShape="0">
-              <a:srgbClr val="000000">
-                <a:alpha val="35000"/>
-              </a:srgbClr>
-            </a:outerShdw>
-          </a:effectLst>
-          <a:scene3d>
-            <a:camera prst="orthographicFront">
-              <a:rot lat="0" lon="0" rev="0"/>
-            </a:camera>
-            <a:lightRig rig="threePt" dir="t">
-              <a:rot lat="0" lon="0" rev="1200000"/>
-            </a:lightRig>
-          </a:scene3d>
-          <a:sp3d>
-            <a:bevelT w="63500" h="25400"/>
-          </a:sp3d>
-        </a:effectStyle>
-      </a:effectStyleLst>
-      <a:bgFillStyleLst>
-        <a:solidFill>
-          <a:schemeClr val="phClr"/>
-        </a:solidFill>
-        <a:gradFill rotWithShape="1">
-          <a:gsLst>
-            <a:gs pos="0">
-              <a:schemeClr val="phClr">
-                <a:tint val="40000"/>
-                <a:satMod val="350000"/>
-              </a:schemeClr>
-            </a:gs>
-            <a:gs pos="40000">
-              <a:schemeClr val="phClr">
-                <a:tint val="45000"/>
-                <a:shade val="99000"/>
-                <a:satMod val="350000"/>
-              </a:schemeClr>
-            </a:gs>
-            <a:gs pos="100000">
-              <a:schemeClr val="phClr">
-                <a:shade val="20000"/>
-                <a:satMod val="255000"/>
-              </a:schemeClr>
-            </a:gs>
-          </a:gsLst>
-          <a:path path="circle">
-            <a:fillToRect l="50000" t="-80000" r="50000" b="180000"/>
-          </a:path>
-        </a:gradFill>
-        <a:gradFill rotWithShape="1">
-          <a:gsLst>
-            <a:gs pos="0">
-              <a:schemeClr val="phClr">
-                <a:tint val="80000"/>
-                <a:satMod val="300000"/>
-              </a:schemeClr>
-            </a:gs>
-            <a:gs pos="100000">
-              <a:schemeClr val="phClr">
-                <a:shade val="30000"/>
-                <a:satMod val="200000"/>
-              </a:schemeClr>
-            </a:gs>
-          </a:gsLst>
-          <a:path path="circle">
-            <a:fillToRect l="50000" t="50000" r="50000" b="50000"/>
-          </a:path>
-        </a:gradFill>
-      </a:bgFillStyleLst>
-    </a:fmtScheme>
-  </a:themeElements>
-</a:theme>
 </file>
</xml_diff>

<commit_message>
Update Data Sources from LFX 2026-02-14 (#88)
Update Data Sources from LFX

Signed-off-by: github-actions[bot] <41898282+github-actions[bot]@users.noreply.github.com>
</commit_message>
<xml_diff>
--- a/overview_deck/LF Energy High Level Overview.pptx
+++ b/overview_deck/LF Energy High Level Overview.pptx
@@ -25946,7 +25946,7 @@
             <a:tbl>
               <a:tblPr>
                 <a:noFill/>
-                <a:tableStyleId>{19266D9C-3169-4CB3-B0A4-9DD695BD7118}</a:tableStyleId>
+                <a:tableStyleId>{A1FA7028-C1A7-44A9-B84D-1D3E6534E97C}</a:tableStyleId>
               </a:tblPr>
               <a:tblGrid>
                 <a:gridCol w="1695200"/>
@@ -26736,7 +26736,7 @@
             <a:tbl>
               <a:tblPr>
                 <a:noFill/>
-                <a:tableStyleId>{19266D9C-3169-4CB3-B0A4-9DD695BD7118}</a:tableStyleId>
+                <a:tableStyleId>{A1FA7028-C1A7-44A9-B84D-1D3E6534E97C}</a:tableStyleId>
               </a:tblPr>
               <a:tblGrid>
                 <a:gridCol w="1695200"/>
@@ -27426,7 +27426,7 @@
             <a:tbl>
               <a:tblPr>
                 <a:noFill/>
-                <a:tableStyleId>{19266D9C-3169-4CB3-B0A4-9DD695BD7118}</a:tableStyleId>
+                <a:tableStyleId>{A1FA7028-C1A7-44A9-B84D-1D3E6534E97C}</a:tableStyleId>
               </a:tblPr>
               <a:tblGrid>
                 <a:gridCol w="1695200"/>
@@ -28678,7 +28678,7 @@
             <a:tbl>
               <a:tblPr>
                 <a:noFill/>
-                <a:tableStyleId>{19266D9C-3169-4CB3-B0A4-9DD695BD7118}</a:tableStyleId>
+                <a:tableStyleId>{A1FA7028-C1A7-44A9-B84D-1D3E6534E97C}</a:tableStyleId>
               </a:tblPr>
               <a:tblGrid>
                 <a:gridCol w="1695200"/>
@@ -29670,7 +29670,7 @@
             <a:tbl>
               <a:tblPr>
                 <a:noFill/>
-                <a:tableStyleId>{19266D9C-3169-4CB3-B0A4-9DD695BD7118}</a:tableStyleId>
+                <a:tableStyleId>{A1FA7028-C1A7-44A9-B84D-1D3E6534E97C}</a:tableStyleId>
               </a:tblPr>
               <a:tblGrid>
                 <a:gridCol w="3048000"/>
@@ -33175,7 +33175,7 @@
             <a:tbl>
               <a:tblPr>
                 <a:noFill/>
-                <a:tableStyleId>{19266D9C-3169-4CB3-B0A4-9DD695BD7118}</a:tableStyleId>
+                <a:tableStyleId>{A1FA7028-C1A7-44A9-B84D-1D3E6534E97C}</a:tableStyleId>
               </a:tblPr>
               <a:tblGrid>
                 <a:gridCol w="1828800"/>
@@ -34002,285 +34002,6 @@
 </file>
 
 <file path=ppt/theme/theme1.xml><?xml version="1.0" encoding="utf-8"?>
-<a:theme xmlns:a="http://schemas.openxmlformats.org/drawingml/2006/main" xmlns:r="http://schemas.openxmlformats.org/officeDocument/2006/relationships" name="Simple Light">
-  <a:themeElements>
-    <a:clrScheme name="Simple Light">
-      <a:dk1>
-        <a:srgbClr val="000000"/>
-      </a:dk1>
-      <a:lt1>
-        <a:srgbClr val="FFFFFF"/>
-      </a:lt1>
-      <a:dk2>
-        <a:srgbClr val="595959"/>
-      </a:dk2>
-      <a:lt2>
-        <a:srgbClr val="EEEEEE"/>
-      </a:lt2>
-      <a:accent1>
-        <a:srgbClr val="4285F4"/>
-      </a:accent1>
-      <a:accent2>
-        <a:srgbClr val="212121"/>
-      </a:accent2>
-      <a:accent3>
-        <a:srgbClr val="78909C"/>
-      </a:accent3>
-      <a:accent4>
-        <a:srgbClr val="FFAB40"/>
-      </a:accent4>
-      <a:accent5>
-        <a:srgbClr val="0097A7"/>
-      </a:accent5>
-      <a:accent6>
-        <a:srgbClr val="EEFF41"/>
-      </a:accent6>
-      <a:hlink>
-        <a:srgbClr val="0097A7"/>
-      </a:hlink>
-      <a:folHlink>
-        <a:srgbClr val="0097A7"/>
-      </a:folHlink>
-    </a:clrScheme>
-    <a:fontScheme name="Office">
-      <a:majorFont>
-        <a:latin typeface="Arial"/>
-        <a:ea typeface=""/>
-        <a:cs typeface=""/>
-        <a:font script="Jpan" typeface="ＭＳ Ｐゴシック"/>
-        <a:font script="Hang" typeface="맑은 고딕"/>
-        <a:font script="Hans" typeface="宋体"/>
-        <a:font script="Hant" typeface="新細明體"/>
-        <a:font script="Arab" typeface="Times New Roman"/>
-        <a:font script="Hebr" typeface="Times New Roman"/>
-        <a:font script="Thai" typeface="Angsana New"/>
-        <a:font script="Ethi" typeface="Nyala"/>
-        <a:font script="Beng" typeface="Vrinda"/>
-        <a:font script="Gujr" typeface="Shruti"/>
-        <a:font script="Khmr" typeface="MoolBoran"/>
-        <a:font script="Knda" typeface="Tunga"/>
-        <a:font script="Guru" typeface="Raavi"/>
-        <a:font script="Cans" typeface="Euphemia"/>
-        <a:font script="Cher" typeface="Plantagenet Cherokee"/>
-        <a:font script="Yiii" typeface="Microsoft Yi Baiti"/>
-        <a:font script="Tibt" typeface="Microsoft Himalaya"/>
-        <a:font script="Thaa" typeface="MV Boli"/>
-        <a:font script="Deva" typeface="Mangal"/>
-        <a:font script="Telu" typeface="Gautami"/>
-        <a:font script="Taml" typeface="Latha"/>
-        <a:font script="Syrc" typeface="Estrangelo Edessa"/>
-        <a:font script="Orya" typeface="Kalinga"/>
-        <a:font script="Mlym" typeface="Kartika"/>
-        <a:font script="Laoo" typeface="DokChampa"/>
-        <a:font script="Sinh" typeface="Iskoola Pota"/>
-        <a:font script="Mong" typeface="Mongolian Baiti"/>
-        <a:font script="Viet" typeface="Times New Roman"/>
-        <a:font script="Uigh" typeface="Microsoft Uighur"/>
-        <a:font script="Geor" typeface="Sylfaen"/>
-      </a:majorFont>
-      <a:minorFont>
-        <a:latin typeface="Arial"/>
-        <a:ea typeface=""/>
-        <a:cs typeface=""/>
-        <a:font script="Jpan" typeface="ＭＳ Ｐゴシック"/>
-        <a:font script="Hang" typeface="맑은 고딕"/>
-        <a:font script="Hans" typeface="宋体"/>
-        <a:font script="Hant" typeface="新細明體"/>
-        <a:font script="Arab" typeface="Arial"/>
-        <a:font script="Hebr" typeface="Arial"/>
-        <a:font script="Thai" typeface="Cordia New"/>
-        <a:font script="Ethi" typeface="Nyala"/>
-        <a:font script="Beng" typeface="Vrinda"/>
-        <a:font script="Gujr" typeface="Shruti"/>
-        <a:font script="Khmr" typeface="DaunPenh"/>
-        <a:font script="Knda" typeface="Tunga"/>
-        <a:font script="Guru" typeface="Raavi"/>
-        <a:font script="Cans" typeface="Euphemia"/>
-        <a:font script="Cher" typeface="Plantagenet Cherokee"/>
-        <a:font script="Yiii" typeface="Microsoft Yi Baiti"/>
-        <a:font script="Tibt" typeface="Microsoft Himalaya"/>
-        <a:font script="Thaa" typeface="MV Boli"/>
-        <a:font script="Deva" typeface="Mangal"/>
-        <a:font script="Telu" typeface="Gautami"/>
-        <a:font script="Taml" typeface="Latha"/>
-        <a:font script="Syrc" typeface="Estrangelo Edessa"/>
-        <a:font script="Orya" typeface="Kalinga"/>
-        <a:font script="Mlym" typeface="Kartika"/>
-        <a:font script="Laoo" typeface="DokChampa"/>
-        <a:font script="Sinh" typeface="Iskoola Pota"/>
-        <a:font script="Mong" typeface="Mongolian Baiti"/>
-        <a:font script="Viet" typeface="Arial"/>
-        <a:font script="Uigh" typeface="Microsoft Uighur"/>
-        <a:font script="Geor" typeface="Sylfaen"/>
-      </a:minorFont>
-    </a:fontScheme>
-    <a:fmtScheme name="Office">
-      <a:fillStyleLst>
-        <a:solidFill>
-          <a:schemeClr val="phClr"/>
-        </a:solidFill>
-        <a:gradFill rotWithShape="1">
-          <a:gsLst>
-            <a:gs pos="0">
-              <a:schemeClr val="phClr">
-                <a:tint val="50000"/>
-                <a:satMod val="300000"/>
-              </a:schemeClr>
-            </a:gs>
-            <a:gs pos="35000">
-              <a:schemeClr val="phClr">
-                <a:tint val="37000"/>
-                <a:satMod val="300000"/>
-              </a:schemeClr>
-            </a:gs>
-            <a:gs pos="100000">
-              <a:schemeClr val="phClr">
-                <a:tint val="15000"/>
-                <a:satMod val="350000"/>
-              </a:schemeClr>
-            </a:gs>
-          </a:gsLst>
-          <a:lin ang="16200000" scaled="1"/>
-        </a:gradFill>
-        <a:gradFill rotWithShape="1">
-          <a:gsLst>
-            <a:gs pos="0">
-              <a:schemeClr val="phClr">
-                <a:tint val="100000"/>
-                <a:shade val="100000"/>
-                <a:satMod val="130000"/>
-              </a:schemeClr>
-            </a:gs>
-            <a:gs pos="100000">
-              <a:schemeClr val="phClr">
-                <a:tint val="50000"/>
-                <a:shade val="100000"/>
-                <a:satMod val="350000"/>
-              </a:schemeClr>
-            </a:gs>
-          </a:gsLst>
-          <a:lin ang="16200000" scaled="0"/>
-        </a:gradFill>
-      </a:fillStyleLst>
-      <a:lnStyleLst>
-        <a:ln w="9525" cap="flat" cmpd="sng" algn="ctr">
-          <a:solidFill>
-            <a:schemeClr val="phClr">
-              <a:shade val="95000"/>
-              <a:satMod val="105000"/>
-            </a:schemeClr>
-          </a:solidFill>
-          <a:prstDash val="solid"/>
-        </a:ln>
-        <a:ln w="25400" cap="flat" cmpd="sng" algn="ctr">
-          <a:solidFill>
-            <a:schemeClr val="phClr"/>
-          </a:solidFill>
-          <a:prstDash val="solid"/>
-        </a:ln>
-        <a:ln w="38100" cap="flat" cmpd="sng" algn="ctr">
-          <a:solidFill>
-            <a:schemeClr val="phClr"/>
-          </a:solidFill>
-          <a:prstDash val="solid"/>
-        </a:ln>
-      </a:lnStyleLst>
-      <a:effectStyleLst>
-        <a:effectStyle>
-          <a:effectLst>
-            <a:outerShdw blurRad="40000" dist="20000" dir="5400000" rotWithShape="0">
-              <a:srgbClr val="000000">
-                <a:alpha val="38000"/>
-              </a:srgbClr>
-            </a:outerShdw>
-          </a:effectLst>
-        </a:effectStyle>
-        <a:effectStyle>
-          <a:effectLst>
-            <a:outerShdw blurRad="40000" dist="23000" dir="5400000" rotWithShape="0">
-              <a:srgbClr val="000000">
-                <a:alpha val="35000"/>
-              </a:srgbClr>
-            </a:outerShdw>
-          </a:effectLst>
-        </a:effectStyle>
-        <a:effectStyle>
-          <a:effectLst>
-            <a:outerShdw blurRad="40000" dist="23000" dir="5400000" rotWithShape="0">
-              <a:srgbClr val="000000">
-                <a:alpha val="35000"/>
-              </a:srgbClr>
-            </a:outerShdw>
-          </a:effectLst>
-          <a:scene3d>
-            <a:camera prst="orthographicFront">
-              <a:rot lat="0" lon="0" rev="0"/>
-            </a:camera>
-            <a:lightRig rig="threePt" dir="t">
-              <a:rot lat="0" lon="0" rev="1200000"/>
-            </a:lightRig>
-          </a:scene3d>
-          <a:sp3d>
-            <a:bevelT w="63500" h="25400"/>
-          </a:sp3d>
-        </a:effectStyle>
-      </a:effectStyleLst>
-      <a:bgFillStyleLst>
-        <a:solidFill>
-          <a:schemeClr val="phClr"/>
-        </a:solidFill>
-        <a:gradFill rotWithShape="1">
-          <a:gsLst>
-            <a:gs pos="0">
-              <a:schemeClr val="phClr">
-                <a:tint val="40000"/>
-                <a:satMod val="350000"/>
-              </a:schemeClr>
-            </a:gs>
-            <a:gs pos="40000">
-              <a:schemeClr val="phClr">
-                <a:tint val="45000"/>
-                <a:shade val="99000"/>
-                <a:satMod val="350000"/>
-              </a:schemeClr>
-            </a:gs>
-            <a:gs pos="100000">
-              <a:schemeClr val="phClr">
-                <a:shade val="20000"/>
-                <a:satMod val="255000"/>
-              </a:schemeClr>
-            </a:gs>
-          </a:gsLst>
-          <a:path path="circle">
-            <a:fillToRect l="50000" t="-80000" r="50000" b="180000"/>
-          </a:path>
-        </a:gradFill>
-        <a:gradFill rotWithShape="1">
-          <a:gsLst>
-            <a:gs pos="0">
-              <a:schemeClr val="phClr">
-                <a:tint val="80000"/>
-                <a:satMod val="300000"/>
-              </a:schemeClr>
-            </a:gs>
-            <a:gs pos="100000">
-              <a:schemeClr val="phClr">
-                <a:shade val="30000"/>
-                <a:satMod val="200000"/>
-              </a:schemeClr>
-            </a:gs>
-          </a:gsLst>
-          <a:path path="circle">
-            <a:fillToRect l="50000" t="50000" r="50000" b="50000"/>
-          </a:path>
-        </a:gradFill>
-      </a:bgFillStyleLst>
-    </a:fmtScheme>
-  </a:themeElements>
-</a:theme>
-</file>
-
-<file path=ppt/theme/theme2.xml><?xml version="1.0" encoding="utf-8"?>
 <a:theme xmlns:a="http://schemas.openxmlformats.org/drawingml/2006/main" xmlns:r="http://schemas.openxmlformats.org/officeDocument/2006/relationships">
   <a:themeElements>
     <a:clrScheme name="Default">
@@ -34559,7 +34280,7 @@
 </a:theme>
 </file>
 
-<file path=ppt/theme/theme3.xml><?xml version="1.0" encoding="utf-8"?>
+<file path=ppt/theme/theme2.xml><?xml version="1.0" encoding="utf-8"?>
 <a:theme xmlns:a="http://schemas.openxmlformats.org/drawingml/2006/main" xmlns:r="http://schemas.openxmlformats.org/officeDocument/2006/relationships" name="LF Energy Theme 2023">
   <a:themeElements>
     <a:clrScheme name="Geometric">
@@ -34836,4 +34557,283 @@
     </a:fmtScheme>
   </a:themeElements>
 </a:theme>
+</file>
+
+<file path=ppt/theme/theme3.xml><?xml version="1.0" encoding="utf-8"?>
+<a:theme xmlns:a="http://schemas.openxmlformats.org/drawingml/2006/main" xmlns:r="http://schemas.openxmlformats.org/officeDocument/2006/relationships" name="Simple Light">
+  <a:themeElements>
+    <a:clrScheme name="Simple Light">
+      <a:dk1>
+        <a:srgbClr val="000000"/>
+      </a:dk1>
+      <a:lt1>
+        <a:srgbClr val="FFFFFF"/>
+      </a:lt1>
+      <a:dk2>
+        <a:srgbClr val="595959"/>
+      </a:dk2>
+      <a:lt2>
+        <a:srgbClr val="EEEEEE"/>
+      </a:lt2>
+      <a:accent1>
+        <a:srgbClr val="4285F4"/>
+      </a:accent1>
+      <a:accent2>
+        <a:srgbClr val="212121"/>
+      </a:accent2>
+      <a:accent3>
+        <a:srgbClr val="78909C"/>
+      </a:accent3>
+      <a:accent4>
+        <a:srgbClr val="FFAB40"/>
+      </a:accent4>
+      <a:accent5>
+        <a:srgbClr val="0097A7"/>
+      </a:accent5>
+      <a:accent6>
+        <a:srgbClr val="EEFF41"/>
+      </a:accent6>
+      <a:hlink>
+        <a:srgbClr val="0097A7"/>
+      </a:hlink>
+      <a:folHlink>
+        <a:srgbClr val="0097A7"/>
+      </a:folHlink>
+    </a:clrScheme>
+    <a:fontScheme name="Office">
+      <a:majorFont>
+        <a:latin typeface="Arial"/>
+        <a:ea typeface=""/>
+        <a:cs typeface=""/>
+        <a:font script="Jpan" typeface="ＭＳ Ｐゴシック"/>
+        <a:font script="Hang" typeface="맑은 고딕"/>
+        <a:font script="Hans" typeface="宋体"/>
+        <a:font script="Hant" typeface="新細明體"/>
+        <a:font script="Arab" typeface="Times New Roman"/>
+        <a:font script="Hebr" typeface="Times New Roman"/>
+        <a:font script="Thai" typeface="Angsana New"/>
+        <a:font script="Ethi" typeface="Nyala"/>
+        <a:font script="Beng" typeface="Vrinda"/>
+        <a:font script="Gujr" typeface="Shruti"/>
+        <a:font script="Khmr" typeface="MoolBoran"/>
+        <a:font script="Knda" typeface="Tunga"/>
+        <a:font script="Guru" typeface="Raavi"/>
+        <a:font script="Cans" typeface="Euphemia"/>
+        <a:font script="Cher" typeface="Plantagenet Cherokee"/>
+        <a:font script="Yiii" typeface="Microsoft Yi Baiti"/>
+        <a:font script="Tibt" typeface="Microsoft Himalaya"/>
+        <a:font script="Thaa" typeface="MV Boli"/>
+        <a:font script="Deva" typeface="Mangal"/>
+        <a:font script="Telu" typeface="Gautami"/>
+        <a:font script="Taml" typeface="Latha"/>
+        <a:font script="Syrc" typeface="Estrangelo Edessa"/>
+        <a:font script="Orya" typeface="Kalinga"/>
+        <a:font script="Mlym" typeface="Kartika"/>
+        <a:font script="Laoo" typeface="DokChampa"/>
+        <a:font script="Sinh" typeface="Iskoola Pota"/>
+        <a:font script="Mong" typeface="Mongolian Baiti"/>
+        <a:font script="Viet" typeface="Times New Roman"/>
+        <a:font script="Uigh" typeface="Microsoft Uighur"/>
+        <a:font script="Geor" typeface="Sylfaen"/>
+      </a:majorFont>
+      <a:minorFont>
+        <a:latin typeface="Arial"/>
+        <a:ea typeface=""/>
+        <a:cs typeface=""/>
+        <a:font script="Jpan" typeface="ＭＳ Ｐゴシック"/>
+        <a:font script="Hang" typeface="맑은 고딕"/>
+        <a:font script="Hans" typeface="宋体"/>
+        <a:font script="Hant" typeface="新細明體"/>
+        <a:font script="Arab" typeface="Arial"/>
+        <a:font script="Hebr" typeface="Arial"/>
+        <a:font script="Thai" typeface="Cordia New"/>
+        <a:font script="Ethi" typeface="Nyala"/>
+        <a:font script="Beng" typeface="Vrinda"/>
+        <a:font script="Gujr" typeface="Shruti"/>
+        <a:font script="Khmr" typeface="DaunPenh"/>
+        <a:font script="Knda" typeface="Tunga"/>
+        <a:font script="Guru" typeface="Raavi"/>
+        <a:font script="Cans" typeface="Euphemia"/>
+        <a:font script="Cher" typeface="Plantagenet Cherokee"/>
+        <a:font script="Yiii" typeface="Microsoft Yi Baiti"/>
+        <a:font script="Tibt" typeface="Microsoft Himalaya"/>
+        <a:font script="Thaa" typeface="MV Boli"/>
+        <a:font script="Deva" typeface="Mangal"/>
+        <a:font script="Telu" typeface="Gautami"/>
+        <a:font script="Taml" typeface="Latha"/>
+        <a:font script="Syrc" typeface="Estrangelo Edessa"/>
+        <a:font script="Orya" typeface="Kalinga"/>
+        <a:font script="Mlym" typeface="Kartika"/>
+        <a:font script="Laoo" typeface="DokChampa"/>
+        <a:font script="Sinh" typeface="Iskoola Pota"/>
+        <a:font script="Mong" typeface="Mongolian Baiti"/>
+        <a:font script="Viet" typeface="Arial"/>
+        <a:font script="Uigh" typeface="Microsoft Uighur"/>
+        <a:font script="Geor" typeface="Sylfaen"/>
+      </a:minorFont>
+    </a:fontScheme>
+    <a:fmtScheme name="Office">
+      <a:fillStyleLst>
+        <a:solidFill>
+          <a:schemeClr val="phClr"/>
+        </a:solidFill>
+        <a:gradFill rotWithShape="1">
+          <a:gsLst>
+            <a:gs pos="0">
+              <a:schemeClr val="phClr">
+                <a:tint val="50000"/>
+                <a:satMod val="300000"/>
+              </a:schemeClr>
+            </a:gs>
+            <a:gs pos="35000">
+              <a:schemeClr val="phClr">
+                <a:tint val="37000"/>
+                <a:satMod val="300000"/>
+              </a:schemeClr>
+            </a:gs>
+            <a:gs pos="100000">
+              <a:schemeClr val="phClr">
+                <a:tint val="15000"/>
+                <a:satMod val="350000"/>
+              </a:schemeClr>
+            </a:gs>
+          </a:gsLst>
+          <a:lin ang="16200000" scaled="1"/>
+        </a:gradFill>
+        <a:gradFill rotWithShape="1">
+          <a:gsLst>
+            <a:gs pos="0">
+              <a:schemeClr val="phClr">
+                <a:tint val="100000"/>
+                <a:shade val="100000"/>
+                <a:satMod val="130000"/>
+              </a:schemeClr>
+            </a:gs>
+            <a:gs pos="100000">
+              <a:schemeClr val="phClr">
+                <a:tint val="50000"/>
+                <a:shade val="100000"/>
+                <a:satMod val="350000"/>
+              </a:schemeClr>
+            </a:gs>
+          </a:gsLst>
+          <a:lin ang="16200000" scaled="0"/>
+        </a:gradFill>
+      </a:fillStyleLst>
+      <a:lnStyleLst>
+        <a:ln w="9525" cap="flat" cmpd="sng" algn="ctr">
+          <a:solidFill>
+            <a:schemeClr val="phClr">
+              <a:shade val="95000"/>
+              <a:satMod val="105000"/>
+            </a:schemeClr>
+          </a:solidFill>
+          <a:prstDash val="solid"/>
+        </a:ln>
+        <a:ln w="25400" cap="flat" cmpd="sng" algn="ctr">
+          <a:solidFill>
+            <a:schemeClr val="phClr"/>
+          </a:solidFill>
+          <a:prstDash val="solid"/>
+        </a:ln>
+        <a:ln w="38100" cap="flat" cmpd="sng" algn="ctr">
+          <a:solidFill>
+            <a:schemeClr val="phClr"/>
+          </a:solidFill>
+          <a:prstDash val="solid"/>
+        </a:ln>
+      </a:lnStyleLst>
+      <a:effectStyleLst>
+        <a:effectStyle>
+          <a:effectLst>
+            <a:outerShdw blurRad="40000" dist="20000" dir="5400000" rotWithShape="0">
+              <a:srgbClr val="000000">
+                <a:alpha val="38000"/>
+              </a:srgbClr>
+            </a:outerShdw>
+          </a:effectLst>
+        </a:effectStyle>
+        <a:effectStyle>
+          <a:effectLst>
+            <a:outerShdw blurRad="40000" dist="23000" dir="5400000" rotWithShape="0">
+              <a:srgbClr val="000000">
+                <a:alpha val="35000"/>
+              </a:srgbClr>
+            </a:outerShdw>
+          </a:effectLst>
+        </a:effectStyle>
+        <a:effectStyle>
+          <a:effectLst>
+            <a:outerShdw blurRad="40000" dist="23000" dir="5400000" rotWithShape="0">
+              <a:srgbClr val="000000">
+                <a:alpha val="35000"/>
+              </a:srgbClr>
+            </a:outerShdw>
+          </a:effectLst>
+          <a:scene3d>
+            <a:camera prst="orthographicFront">
+              <a:rot lat="0" lon="0" rev="0"/>
+            </a:camera>
+            <a:lightRig rig="threePt" dir="t">
+              <a:rot lat="0" lon="0" rev="1200000"/>
+            </a:lightRig>
+          </a:scene3d>
+          <a:sp3d>
+            <a:bevelT w="63500" h="25400"/>
+          </a:sp3d>
+        </a:effectStyle>
+      </a:effectStyleLst>
+      <a:bgFillStyleLst>
+        <a:solidFill>
+          <a:schemeClr val="phClr"/>
+        </a:solidFill>
+        <a:gradFill rotWithShape="1">
+          <a:gsLst>
+            <a:gs pos="0">
+              <a:schemeClr val="phClr">
+                <a:tint val="40000"/>
+                <a:satMod val="350000"/>
+              </a:schemeClr>
+            </a:gs>
+            <a:gs pos="40000">
+              <a:schemeClr val="phClr">
+                <a:tint val="45000"/>
+                <a:shade val="99000"/>
+                <a:satMod val="350000"/>
+              </a:schemeClr>
+            </a:gs>
+            <a:gs pos="100000">
+              <a:schemeClr val="phClr">
+                <a:shade val="20000"/>
+                <a:satMod val="255000"/>
+              </a:schemeClr>
+            </a:gs>
+          </a:gsLst>
+          <a:path path="circle">
+            <a:fillToRect l="50000" t="-80000" r="50000" b="180000"/>
+          </a:path>
+        </a:gradFill>
+        <a:gradFill rotWithShape="1">
+          <a:gsLst>
+            <a:gs pos="0">
+              <a:schemeClr val="phClr">
+                <a:tint val="80000"/>
+                <a:satMod val="300000"/>
+              </a:schemeClr>
+            </a:gs>
+            <a:gs pos="100000">
+              <a:schemeClr val="phClr">
+                <a:shade val="30000"/>
+                <a:satMod val="200000"/>
+              </a:schemeClr>
+            </a:gs>
+          </a:gsLst>
+          <a:path path="circle">
+            <a:fillToRect l="50000" t="50000" r="50000" b="50000"/>
+          </a:path>
+        </a:gradFill>
+      </a:bgFillStyleLst>
+    </a:fmtScheme>
+  </a:themeElements>
+</a:theme>
 </file>
</xml_diff>

<commit_message>
Update Data Sources from LFX 2026-02-15 (#89)
Update Data Sources from LFX

Signed-off-by: github-actions[bot] <41898282+github-actions[bot]@users.noreply.github.com>
</commit_message>
<xml_diff>
--- a/overview_deck/LF Energy High Level Overview.pptx
+++ b/overview_deck/LF Energy High Level Overview.pptx
@@ -25946,7 +25946,7 @@
             <a:tbl>
               <a:tblPr>
                 <a:noFill/>
-                <a:tableStyleId>{A1FA7028-C1A7-44A9-B84D-1D3E6534E97C}</a:tableStyleId>
+                <a:tableStyleId>{AA5A75A7-0268-4E23-BE90-BAA816196550}</a:tableStyleId>
               </a:tblPr>
               <a:tblGrid>
                 <a:gridCol w="1695200"/>
@@ -26736,7 +26736,7 @@
             <a:tbl>
               <a:tblPr>
                 <a:noFill/>
-                <a:tableStyleId>{A1FA7028-C1A7-44A9-B84D-1D3E6534E97C}</a:tableStyleId>
+                <a:tableStyleId>{AA5A75A7-0268-4E23-BE90-BAA816196550}</a:tableStyleId>
               </a:tblPr>
               <a:tblGrid>
                 <a:gridCol w="1695200"/>
@@ -27426,7 +27426,7 @@
             <a:tbl>
               <a:tblPr>
                 <a:noFill/>
-                <a:tableStyleId>{A1FA7028-C1A7-44A9-B84D-1D3E6534E97C}</a:tableStyleId>
+                <a:tableStyleId>{AA5A75A7-0268-4E23-BE90-BAA816196550}</a:tableStyleId>
               </a:tblPr>
               <a:tblGrid>
                 <a:gridCol w="1695200"/>
@@ -28678,7 +28678,7 @@
             <a:tbl>
               <a:tblPr>
                 <a:noFill/>
-                <a:tableStyleId>{A1FA7028-C1A7-44A9-B84D-1D3E6534E97C}</a:tableStyleId>
+                <a:tableStyleId>{AA5A75A7-0268-4E23-BE90-BAA816196550}</a:tableStyleId>
               </a:tblPr>
               <a:tblGrid>
                 <a:gridCol w="1695200"/>
@@ -29670,7 +29670,7 @@
             <a:tbl>
               <a:tblPr>
                 <a:noFill/>
-                <a:tableStyleId>{A1FA7028-C1A7-44A9-B84D-1D3E6534E97C}</a:tableStyleId>
+                <a:tableStyleId>{AA5A75A7-0268-4E23-BE90-BAA816196550}</a:tableStyleId>
               </a:tblPr>
               <a:tblGrid>
                 <a:gridCol w="3048000"/>
@@ -33175,7 +33175,7 @@
             <a:tbl>
               <a:tblPr>
                 <a:noFill/>
-                <a:tableStyleId>{A1FA7028-C1A7-44A9-B84D-1D3E6534E97C}</a:tableStyleId>
+                <a:tableStyleId>{AA5A75A7-0268-4E23-BE90-BAA816196550}</a:tableStyleId>
               </a:tblPr>
               <a:tblGrid>
                 <a:gridCol w="1828800"/>

</xml_diff>

<commit_message>
Update Data Sources from LFX 2026-02-16 (#90)
Update Data Sources from LFX

Signed-off-by: github-actions[bot] <41898282+github-actions[bot]@users.noreply.github.com>
</commit_message>
<xml_diff>
--- a/overview_deck/LF Energy High Level Overview.pptx
+++ b/overview_deck/LF Energy High Level Overview.pptx
@@ -25946,7 +25946,7 @@
             <a:tbl>
               <a:tblPr>
                 <a:noFill/>
-                <a:tableStyleId>{AA5A75A7-0268-4E23-BE90-BAA816196550}</a:tableStyleId>
+                <a:tableStyleId>{48338D13-A9CA-4A3B-89B7-9073ACB4FE37}</a:tableStyleId>
               </a:tblPr>
               <a:tblGrid>
                 <a:gridCol w="1695200"/>
@@ -26736,7 +26736,7 @@
             <a:tbl>
               <a:tblPr>
                 <a:noFill/>
-                <a:tableStyleId>{AA5A75A7-0268-4E23-BE90-BAA816196550}</a:tableStyleId>
+                <a:tableStyleId>{48338D13-A9CA-4A3B-89B7-9073ACB4FE37}</a:tableStyleId>
               </a:tblPr>
               <a:tblGrid>
                 <a:gridCol w="1695200"/>
@@ -27426,7 +27426,7 @@
             <a:tbl>
               <a:tblPr>
                 <a:noFill/>
-                <a:tableStyleId>{AA5A75A7-0268-4E23-BE90-BAA816196550}</a:tableStyleId>
+                <a:tableStyleId>{48338D13-A9CA-4A3B-89B7-9073ACB4FE37}</a:tableStyleId>
               </a:tblPr>
               <a:tblGrid>
                 <a:gridCol w="1695200"/>
@@ -28678,7 +28678,7 @@
             <a:tbl>
               <a:tblPr>
                 <a:noFill/>
-                <a:tableStyleId>{AA5A75A7-0268-4E23-BE90-BAA816196550}</a:tableStyleId>
+                <a:tableStyleId>{48338D13-A9CA-4A3B-89B7-9073ACB4FE37}</a:tableStyleId>
               </a:tblPr>
               <a:tblGrid>
                 <a:gridCol w="1695200"/>
@@ -29670,7 +29670,7 @@
             <a:tbl>
               <a:tblPr>
                 <a:noFill/>
-                <a:tableStyleId>{AA5A75A7-0268-4E23-BE90-BAA816196550}</a:tableStyleId>
+                <a:tableStyleId>{48338D13-A9CA-4A3B-89B7-9073ACB4FE37}</a:tableStyleId>
               </a:tblPr>
               <a:tblGrid>
                 <a:gridCol w="3048000"/>
@@ -33175,7 +33175,7 @@
             <a:tbl>
               <a:tblPr>
                 <a:noFill/>
-                <a:tableStyleId>{AA5A75A7-0268-4E23-BE90-BAA816196550}</a:tableStyleId>
+                <a:tableStyleId>{48338D13-A9CA-4A3B-89B7-9073ACB4FE37}</a:tableStyleId>
               </a:tblPr>
               <a:tblGrid>
                 <a:gridCol w="1828800"/>
@@ -34281,6 +34281,285 @@
 </file>
 
 <file path=ppt/theme/theme2.xml><?xml version="1.0" encoding="utf-8"?>
+<a:theme xmlns:a="http://schemas.openxmlformats.org/drawingml/2006/main" xmlns:r="http://schemas.openxmlformats.org/officeDocument/2006/relationships" name="Simple Light">
+  <a:themeElements>
+    <a:clrScheme name="Simple Light">
+      <a:dk1>
+        <a:srgbClr val="000000"/>
+      </a:dk1>
+      <a:lt1>
+        <a:srgbClr val="FFFFFF"/>
+      </a:lt1>
+      <a:dk2>
+        <a:srgbClr val="595959"/>
+      </a:dk2>
+      <a:lt2>
+        <a:srgbClr val="EEEEEE"/>
+      </a:lt2>
+      <a:accent1>
+        <a:srgbClr val="4285F4"/>
+      </a:accent1>
+      <a:accent2>
+        <a:srgbClr val="212121"/>
+      </a:accent2>
+      <a:accent3>
+        <a:srgbClr val="78909C"/>
+      </a:accent3>
+      <a:accent4>
+        <a:srgbClr val="FFAB40"/>
+      </a:accent4>
+      <a:accent5>
+        <a:srgbClr val="0097A7"/>
+      </a:accent5>
+      <a:accent6>
+        <a:srgbClr val="EEFF41"/>
+      </a:accent6>
+      <a:hlink>
+        <a:srgbClr val="0097A7"/>
+      </a:hlink>
+      <a:folHlink>
+        <a:srgbClr val="0097A7"/>
+      </a:folHlink>
+    </a:clrScheme>
+    <a:fontScheme name="Office">
+      <a:majorFont>
+        <a:latin typeface="Arial"/>
+        <a:ea typeface=""/>
+        <a:cs typeface=""/>
+        <a:font script="Jpan" typeface="ＭＳ Ｐゴシック"/>
+        <a:font script="Hang" typeface="맑은 고딕"/>
+        <a:font script="Hans" typeface="宋体"/>
+        <a:font script="Hant" typeface="新細明體"/>
+        <a:font script="Arab" typeface="Times New Roman"/>
+        <a:font script="Hebr" typeface="Times New Roman"/>
+        <a:font script="Thai" typeface="Angsana New"/>
+        <a:font script="Ethi" typeface="Nyala"/>
+        <a:font script="Beng" typeface="Vrinda"/>
+        <a:font script="Gujr" typeface="Shruti"/>
+        <a:font script="Khmr" typeface="MoolBoran"/>
+        <a:font script="Knda" typeface="Tunga"/>
+        <a:font script="Guru" typeface="Raavi"/>
+        <a:font script="Cans" typeface="Euphemia"/>
+        <a:font script="Cher" typeface="Plantagenet Cherokee"/>
+        <a:font script="Yiii" typeface="Microsoft Yi Baiti"/>
+        <a:font script="Tibt" typeface="Microsoft Himalaya"/>
+        <a:font script="Thaa" typeface="MV Boli"/>
+        <a:font script="Deva" typeface="Mangal"/>
+        <a:font script="Telu" typeface="Gautami"/>
+        <a:font script="Taml" typeface="Latha"/>
+        <a:font script="Syrc" typeface="Estrangelo Edessa"/>
+        <a:font script="Orya" typeface="Kalinga"/>
+        <a:font script="Mlym" typeface="Kartika"/>
+        <a:font script="Laoo" typeface="DokChampa"/>
+        <a:font script="Sinh" typeface="Iskoola Pota"/>
+        <a:font script="Mong" typeface="Mongolian Baiti"/>
+        <a:font script="Viet" typeface="Times New Roman"/>
+        <a:font script="Uigh" typeface="Microsoft Uighur"/>
+        <a:font script="Geor" typeface="Sylfaen"/>
+      </a:majorFont>
+      <a:minorFont>
+        <a:latin typeface="Arial"/>
+        <a:ea typeface=""/>
+        <a:cs typeface=""/>
+        <a:font script="Jpan" typeface="ＭＳ Ｐゴシック"/>
+        <a:font script="Hang" typeface="맑은 고딕"/>
+        <a:font script="Hans" typeface="宋体"/>
+        <a:font script="Hant" typeface="新細明體"/>
+        <a:font script="Arab" typeface="Arial"/>
+        <a:font script="Hebr" typeface="Arial"/>
+        <a:font script="Thai" typeface="Cordia New"/>
+        <a:font script="Ethi" typeface="Nyala"/>
+        <a:font script="Beng" typeface="Vrinda"/>
+        <a:font script="Gujr" typeface="Shruti"/>
+        <a:font script="Khmr" typeface="DaunPenh"/>
+        <a:font script="Knda" typeface="Tunga"/>
+        <a:font script="Guru" typeface="Raavi"/>
+        <a:font script="Cans" typeface="Euphemia"/>
+        <a:font script="Cher" typeface="Plantagenet Cherokee"/>
+        <a:font script="Yiii" typeface="Microsoft Yi Baiti"/>
+        <a:font script="Tibt" typeface="Microsoft Himalaya"/>
+        <a:font script="Thaa" typeface="MV Boli"/>
+        <a:font script="Deva" typeface="Mangal"/>
+        <a:font script="Telu" typeface="Gautami"/>
+        <a:font script="Taml" typeface="Latha"/>
+        <a:font script="Syrc" typeface="Estrangelo Edessa"/>
+        <a:font script="Orya" typeface="Kalinga"/>
+        <a:font script="Mlym" typeface="Kartika"/>
+        <a:font script="Laoo" typeface="DokChampa"/>
+        <a:font script="Sinh" typeface="Iskoola Pota"/>
+        <a:font script="Mong" typeface="Mongolian Baiti"/>
+        <a:font script="Viet" typeface="Arial"/>
+        <a:font script="Uigh" typeface="Microsoft Uighur"/>
+        <a:font script="Geor" typeface="Sylfaen"/>
+      </a:minorFont>
+    </a:fontScheme>
+    <a:fmtScheme name="Office">
+      <a:fillStyleLst>
+        <a:solidFill>
+          <a:schemeClr val="phClr"/>
+        </a:solidFill>
+        <a:gradFill rotWithShape="1">
+          <a:gsLst>
+            <a:gs pos="0">
+              <a:schemeClr val="phClr">
+                <a:tint val="50000"/>
+                <a:satMod val="300000"/>
+              </a:schemeClr>
+            </a:gs>
+            <a:gs pos="35000">
+              <a:schemeClr val="phClr">
+                <a:tint val="37000"/>
+                <a:satMod val="300000"/>
+              </a:schemeClr>
+            </a:gs>
+            <a:gs pos="100000">
+              <a:schemeClr val="phClr">
+                <a:tint val="15000"/>
+                <a:satMod val="350000"/>
+              </a:schemeClr>
+            </a:gs>
+          </a:gsLst>
+          <a:lin ang="16200000" scaled="1"/>
+        </a:gradFill>
+        <a:gradFill rotWithShape="1">
+          <a:gsLst>
+            <a:gs pos="0">
+              <a:schemeClr val="phClr">
+                <a:tint val="100000"/>
+                <a:shade val="100000"/>
+                <a:satMod val="130000"/>
+              </a:schemeClr>
+            </a:gs>
+            <a:gs pos="100000">
+              <a:schemeClr val="phClr">
+                <a:tint val="50000"/>
+                <a:shade val="100000"/>
+                <a:satMod val="350000"/>
+              </a:schemeClr>
+            </a:gs>
+          </a:gsLst>
+          <a:lin ang="16200000" scaled="0"/>
+        </a:gradFill>
+      </a:fillStyleLst>
+      <a:lnStyleLst>
+        <a:ln w="9525" cap="flat" cmpd="sng" algn="ctr">
+          <a:solidFill>
+            <a:schemeClr val="phClr">
+              <a:shade val="95000"/>
+              <a:satMod val="105000"/>
+            </a:schemeClr>
+          </a:solidFill>
+          <a:prstDash val="solid"/>
+        </a:ln>
+        <a:ln w="25400" cap="flat" cmpd="sng" algn="ctr">
+          <a:solidFill>
+            <a:schemeClr val="phClr"/>
+          </a:solidFill>
+          <a:prstDash val="solid"/>
+        </a:ln>
+        <a:ln w="38100" cap="flat" cmpd="sng" algn="ctr">
+          <a:solidFill>
+            <a:schemeClr val="phClr"/>
+          </a:solidFill>
+          <a:prstDash val="solid"/>
+        </a:ln>
+      </a:lnStyleLst>
+      <a:effectStyleLst>
+        <a:effectStyle>
+          <a:effectLst>
+            <a:outerShdw blurRad="40000" dist="20000" dir="5400000" rotWithShape="0">
+              <a:srgbClr val="000000">
+                <a:alpha val="38000"/>
+              </a:srgbClr>
+            </a:outerShdw>
+          </a:effectLst>
+        </a:effectStyle>
+        <a:effectStyle>
+          <a:effectLst>
+            <a:outerShdw blurRad="40000" dist="23000" dir="5400000" rotWithShape="0">
+              <a:srgbClr val="000000">
+                <a:alpha val="35000"/>
+              </a:srgbClr>
+            </a:outerShdw>
+          </a:effectLst>
+        </a:effectStyle>
+        <a:effectStyle>
+          <a:effectLst>
+            <a:outerShdw blurRad="40000" dist="23000" dir="5400000" rotWithShape="0">
+              <a:srgbClr val="000000">
+                <a:alpha val="35000"/>
+              </a:srgbClr>
+            </a:outerShdw>
+          </a:effectLst>
+          <a:scene3d>
+            <a:camera prst="orthographicFront">
+              <a:rot lat="0" lon="0" rev="0"/>
+            </a:camera>
+            <a:lightRig rig="threePt" dir="t">
+              <a:rot lat="0" lon="0" rev="1200000"/>
+            </a:lightRig>
+          </a:scene3d>
+          <a:sp3d>
+            <a:bevelT w="63500" h="25400"/>
+          </a:sp3d>
+        </a:effectStyle>
+      </a:effectStyleLst>
+      <a:bgFillStyleLst>
+        <a:solidFill>
+          <a:schemeClr val="phClr"/>
+        </a:solidFill>
+        <a:gradFill rotWithShape="1">
+          <a:gsLst>
+            <a:gs pos="0">
+              <a:schemeClr val="phClr">
+                <a:tint val="40000"/>
+                <a:satMod val="350000"/>
+              </a:schemeClr>
+            </a:gs>
+            <a:gs pos="40000">
+              <a:schemeClr val="phClr">
+                <a:tint val="45000"/>
+                <a:shade val="99000"/>
+                <a:satMod val="350000"/>
+              </a:schemeClr>
+            </a:gs>
+            <a:gs pos="100000">
+              <a:schemeClr val="phClr">
+                <a:shade val="20000"/>
+                <a:satMod val="255000"/>
+              </a:schemeClr>
+            </a:gs>
+          </a:gsLst>
+          <a:path path="circle">
+            <a:fillToRect l="50000" t="-80000" r="50000" b="180000"/>
+          </a:path>
+        </a:gradFill>
+        <a:gradFill rotWithShape="1">
+          <a:gsLst>
+            <a:gs pos="0">
+              <a:schemeClr val="phClr">
+                <a:tint val="80000"/>
+                <a:satMod val="300000"/>
+              </a:schemeClr>
+            </a:gs>
+            <a:gs pos="100000">
+              <a:schemeClr val="phClr">
+                <a:shade val="30000"/>
+                <a:satMod val="200000"/>
+              </a:schemeClr>
+            </a:gs>
+          </a:gsLst>
+          <a:path path="circle">
+            <a:fillToRect l="50000" t="50000" r="50000" b="50000"/>
+          </a:path>
+        </a:gradFill>
+      </a:bgFillStyleLst>
+    </a:fmtScheme>
+  </a:themeElements>
+</a:theme>
+</file>
+
+<file path=ppt/theme/theme3.xml><?xml version="1.0" encoding="utf-8"?>
 <a:theme xmlns:a="http://schemas.openxmlformats.org/drawingml/2006/main" xmlns:r="http://schemas.openxmlformats.org/officeDocument/2006/relationships" name="LF Energy Theme 2023">
   <a:themeElements>
     <a:clrScheme name="Geometric">
@@ -34557,283 +34836,4 @@
     </a:fmtScheme>
   </a:themeElements>
 </a:theme>
-</file>
-
-<file path=ppt/theme/theme3.xml><?xml version="1.0" encoding="utf-8"?>
-<a:theme xmlns:a="http://schemas.openxmlformats.org/drawingml/2006/main" xmlns:r="http://schemas.openxmlformats.org/officeDocument/2006/relationships" name="Simple Light">
-  <a:themeElements>
-    <a:clrScheme name="Simple Light">
-      <a:dk1>
-        <a:srgbClr val="000000"/>
-      </a:dk1>
-      <a:lt1>
-        <a:srgbClr val="FFFFFF"/>
-      </a:lt1>
-      <a:dk2>
-        <a:srgbClr val="595959"/>
-      </a:dk2>
-      <a:lt2>
-        <a:srgbClr val="EEEEEE"/>
-      </a:lt2>
-      <a:accent1>
-        <a:srgbClr val="4285F4"/>
-      </a:accent1>
-      <a:accent2>
-        <a:srgbClr val="212121"/>
-      </a:accent2>
-      <a:accent3>
-        <a:srgbClr val="78909C"/>
-      </a:accent3>
-      <a:accent4>
-        <a:srgbClr val="FFAB40"/>
-      </a:accent4>
-      <a:accent5>
-        <a:srgbClr val="0097A7"/>
-      </a:accent5>
-      <a:accent6>
-        <a:srgbClr val="EEFF41"/>
-      </a:accent6>
-      <a:hlink>
-        <a:srgbClr val="0097A7"/>
-      </a:hlink>
-      <a:folHlink>
-        <a:srgbClr val="0097A7"/>
-      </a:folHlink>
-    </a:clrScheme>
-    <a:fontScheme name="Office">
-      <a:majorFont>
-        <a:latin typeface="Arial"/>
-        <a:ea typeface=""/>
-        <a:cs typeface=""/>
-        <a:font script="Jpan" typeface="ＭＳ Ｐゴシック"/>
-        <a:font script="Hang" typeface="맑은 고딕"/>
-        <a:font script="Hans" typeface="宋体"/>
-        <a:font script="Hant" typeface="新細明體"/>
-        <a:font script="Arab" typeface="Times New Roman"/>
-        <a:font script="Hebr" typeface="Times New Roman"/>
-        <a:font script="Thai" typeface="Angsana New"/>
-        <a:font script="Ethi" typeface="Nyala"/>
-        <a:font script="Beng" typeface="Vrinda"/>
-        <a:font script="Gujr" typeface="Shruti"/>
-        <a:font script="Khmr" typeface="MoolBoran"/>
-        <a:font script="Knda" typeface="Tunga"/>
-        <a:font script="Guru" typeface="Raavi"/>
-        <a:font script="Cans" typeface="Euphemia"/>
-        <a:font script="Cher" typeface="Plantagenet Cherokee"/>
-        <a:font script="Yiii" typeface="Microsoft Yi Baiti"/>
-        <a:font script="Tibt" typeface="Microsoft Himalaya"/>
-        <a:font script="Thaa" typeface="MV Boli"/>
-        <a:font script="Deva" typeface="Mangal"/>
-        <a:font script="Telu" typeface="Gautami"/>
-        <a:font script="Taml" typeface="Latha"/>
-        <a:font script="Syrc" typeface="Estrangelo Edessa"/>
-        <a:font script="Orya" typeface="Kalinga"/>
-        <a:font script="Mlym" typeface="Kartika"/>
-        <a:font script="Laoo" typeface="DokChampa"/>
-        <a:font script="Sinh" typeface="Iskoola Pota"/>
-        <a:font script="Mong" typeface="Mongolian Baiti"/>
-        <a:font script="Viet" typeface="Times New Roman"/>
-        <a:font script="Uigh" typeface="Microsoft Uighur"/>
-        <a:font script="Geor" typeface="Sylfaen"/>
-      </a:majorFont>
-      <a:minorFont>
-        <a:latin typeface="Arial"/>
-        <a:ea typeface=""/>
-        <a:cs typeface=""/>
-        <a:font script="Jpan" typeface="ＭＳ Ｐゴシック"/>
-        <a:font script="Hang" typeface="맑은 고딕"/>
-        <a:font script="Hans" typeface="宋体"/>
-        <a:font script="Hant" typeface="新細明體"/>
-        <a:font script="Arab" typeface="Arial"/>
-        <a:font script="Hebr" typeface="Arial"/>
-        <a:font script="Thai" typeface="Cordia New"/>
-        <a:font script="Ethi" typeface="Nyala"/>
-        <a:font script="Beng" typeface="Vrinda"/>
-        <a:font script="Gujr" typeface="Shruti"/>
-        <a:font script="Khmr" typeface="DaunPenh"/>
-        <a:font script="Knda" typeface="Tunga"/>
-        <a:font script="Guru" typeface="Raavi"/>
-        <a:font script="Cans" typeface="Euphemia"/>
-        <a:font script="Cher" typeface="Plantagenet Cherokee"/>
-        <a:font script="Yiii" typeface="Microsoft Yi Baiti"/>
-        <a:font script="Tibt" typeface="Microsoft Himalaya"/>
-        <a:font script="Thaa" typeface="MV Boli"/>
-        <a:font script="Deva" typeface="Mangal"/>
-        <a:font script="Telu" typeface="Gautami"/>
-        <a:font script="Taml" typeface="Latha"/>
-        <a:font script="Syrc" typeface="Estrangelo Edessa"/>
-        <a:font script="Orya" typeface="Kalinga"/>
-        <a:font script="Mlym" typeface="Kartika"/>
-        <a:font script="Laoo" typeface="DokChampa"/>
-        <a:font script="Sinh" typeface="Iskoola Pota"/>
-        <a:font script="Mong" typeface="Mongolian Baiti"/>
-        <a:font script="Viet" typeface="Arial"/>
-        <a:font script="Uigh" typeface="Microsoft Uighur"/>
-        <a:font script="Geor" typeface="Sylfaen"/>
-      </a:minorFont>
-    </a:fontScheme>
-    <a:fmtScheme name="Office">
-      <a:fillStyleLst>
-        <a:solidFill>
-          <a:schemeClr val="phClr"/>
-        </a:solidFill>
-        <a:gradFill rotWithShape="1">
-          <a:gsLst>
-            <a:gs pos="0">
-              <a:schemeClr val="phClr">
-                <a:tint val="50000"/>
-                <a:satMod val="300000"/>
-              </a:schemeClr>
-            </a:gs>
-            <a:gs pos="35000">
-              <a:schemeClr val="phClr">
-                <a:tint val="37000"/>
-                <a:satMod val="300000"/>
-              </a:schemeClr>
-            </a:gs>
-            <a:gs pos="100000">
-              <a:schemeClr val="phClr">
-                <a:tint val="15000"/>
-                <a:satMod val="350000"/>
-              </a:schemeClr>
-            </a:gs>
-          </a:gsLst>
-          <a:lin ang="16200000" scaled="1"/>
-        </a:gradFill>
-        <a:gradFill rotWithShape="1">
-          <a:gsLst>
-            <a:gs pos="0">
-              <a:schemeClr val="phClr">
-                <a:tint val="100000"/>
-                <a:shade val="100000"/>
-                <a:satMod val="130000"/>
-              </a:schemeClr>
-            </a:gs>
-            <a:gs pos="100000">
-              <a:schemeClr val="phClr">
-                <a:tint val="50000"/>
-                <a:shade val="100000"/>
-                <a:satMod val="350000"/>
-              </a:schemeClr>
-            </a:gs>
-          </a:gsLst>
-          <a:lin ang="16200000" scaled="0"/>
-        </a:gradFill>
-      </a:fillStyleLst>
-      <a:lnStyleLst>
-        <a:ln w="9525" cap="flat" cmpd="sng" algn="ctr">
-          <a:solidFill>
-            <a:schemeClr val="phClr">
-              <a:shade val="95000"/>
-              <a:satMod val="105000"/>
-            </a:schemeClr>
-          </a:solidFill>
-          <a:prstDash val="solid"/>
-        </a:ln>
-        <a:ln w="25400" cap="flat" cmpd="sng" algn="ctr">
-          <a:solidFill>
-            <a:schemeClr val="phClr"/>
-          </a:solidFill>
-          <a:prstDash val="solid"/>
-        </a:ln>
-        <a:ln w="38100" cap="flat" cmpd="sng" algn="ctr">
-          <a:solidFill>
-            <a:schemeClr val="phClr"/>
-          </a:solidFill>
-          <a:prstDash val="solid"/>
-        </a:ln>
-      </a:lnStyleLst>
-      <a:effectStyleLst>
-        <a:effectStyle>
-          <a:effectLst>
-            <a:outerShdw blurRad="40000" dist="20000" dir="5400000" rotWithShape="0">
-              <a:srgbClr val="000000">
-                <a:alpha val="38000"/>
-              </a:srgbClr>
-            </a:outerShdw>
-          </a:effectLst>
-        </a:effectStyle>
-        <a:effectStyle>
-          <a:effectLst>
-            <a:outerShdw blurRad="40000" dist="23000" dir="5400000" rotWithShape="0">
-              <a:srgbClr val="000000">
-                <a:alpha val="35000"/>
-              </a:srgbClr>
-            </a:outerShdw>
-          </a:effectLst>
-        </a:effectStyle>
-        <a:effectStyle>
-          <a:effectLst>
-            <a:outerShdw blurRad="40000" dist="23000" dir="5400000" rotWithShape="0">
-              <a:srgbClr val="000000">
-                <a:alpha val="35000"/>
-              </a:srgbClr>
-            </a:outerShdw>
-          </a:effectLst>
-          <a:scene3d>
-            <a:camera prst="orthographicFront">
-              <a:rot lat="0" lon="0" rev="0"/>
-            </a:camera>
-            <a:lightRig rig="threePt" dir="t">
-              <a:rot lat="0" lon="0" rev="1200000"/>
-            </a:lightRig>
-          </a:scene3d>
-          <a:sp3d>
-            <a:bevelT w="63500" h="25400"/>
-          </a:sp3d>
-        </a:effectStyle>
-      </a:effectStyleLst>
-      <a:bgFillStyleLst>
-        <a:solidFill>
-          <a:schemeClr val="phClr"/>
-        </a:solidFill>
-        <a:gradFill rotWithShape="1">
-          <a:gsLst>
-            <a:gs pos="0">
-              <a:schemeClr val="phClr">
-                <a:tint val="40000"/>
-                <a:satMod val="350000"/>
-              </a:schemeClr>
-            </a:gs>
-            <a:gs pos="40000">
-              <a:schemeClr val="phClr">
-                <a:tint val="45000"/>
-                <a:shade val="99000"/>
-                <a:satMod val="350000"/>
-              </a:schemeClr>
-            </a:gs>
-            <a:gs pos="100000">
-              <a:schemeClr val="phClr">
-                <a:shade val="20000"/>
-                <a:satMod val="255000"/>
-              </a:schemeClr>
-            </a:gs>
-          </a:gsLst>
-          <a:path path="circle">
-            <a:fillToRect l="50000" t="-80000" r="50000" b="180000"/>
-          </a:path>
-        </a:gradFill>
-        <a:gradFill rotWithShape="1">
-          <a:gsLst>
-            <a:gs pos="0">
-              <a:schemeClr val="phClr">
-                <a:tint val="80000"/>
-                <a:satMod val="300000"/>
-              </a:schemeClr>
-            </a:gs>
-            <a:gs pos="100000">
-              <a:schemeClr val="phClr">
-                <a:shade val="30000"/>
-                <a:satMod val="200000"/>
-              </a:schemeClr>
-            </a:gs>
-          </a:gsLst>
-          <a:path path="circle">
-            <a:fillToRect l="50000" t="50000" r="50000" b="50000"/>
-          </a:path>
-        </a:gradFill>
-      </a:bgFillStyleLst>
-    </a:fmtScheme>
-  </a:themeElements>
-</a:theme>
 </file>
</xml_diff>

<commit_message>
Update Data Sources from LFX 2026-02-17 (#91)
Update Data Sources from LFX

Signed-off-by: github-actions[bot] <41898282+github-actions[bot]@users.noreply.github.com>
</commit_message>
<xml_diff>
--- a/overview_deck/LF Energy High Level Overview.pptx
+++ b/overview_deck/LF Energy High Level Overview.pptx
@@ -25946,7 +25946,7 @@
             <a:tbl>
               <a:tblPr>
                 <a:noFill/>
-                <a:tableStyleId>{48338D13-A9CA-4A3B-89B7-9073ACB4FE37}</a:tableStyleId>
+                <a:tableStyleId>{631E9890-4A1E-43CC-99DB-8398D616D4D7}</a:tableStyleId>
               </a:tblPr>
               <a:tblGrid>
                 <a:gridCol w="1695200"/>
@@ -26736,7 +26736,7 @@
             <a:tbl>
               <a:tblPr>
                 <a:noFill/>
-                <a:tableStyleId>{48338D13-A9CA-4A3B-89B7-9073ACB4FE37}</a:tableStyleId>
+                <a:tableStyleId>{631E9890-4A1E-43CC-99DB-8398D616D4D7}</a:tableStyleId>
               </a:tblPr>
               <a:tblGrid>
                 <a:gridCol w="1695200"/>
@@ -27426,7 +27426,7 @@
             <a:tbl>
               <a:tblPr>
                 <a:noFill/>
-                <a:tableStyleId>{48338D13-A9CA-4A3B-89B7-9073ACB4FE37}</a:tableStyleId>
+                <a:tableStyleId>{631E9890-4A1E-43CC-99DB-8398D616D4D7}</a:tableStyleId>
               </a:tblPr>
               <a:tblGrid>
                 <a:gridCol w="1695200"/>
@@ -28678,7 +28678,7 @@
             <a:tbl>
               <a:tblPr>
                 <a:noFill/>
-                <a:tableStyleId>{48338D13-A9CA-4A3B-89B7-9073ACB4FE37}</a:tableStyleId>
+                <a:tableStyleId>{631E9890-4A1E-43CC-99DB-8398D616D4D7}</a:tableStyleId>
               </a:tblPr>
               <a:tblGrid>
                 <a:gridCol w="1695200"/>
@@ -29670,7 +29670,7 @@
             <a:tbl>
               <a:tblPr>
                 <a:noFill/>
-                <a:tableStyleId>{48338D13-A9CA-4A3B-89B7-9073ACB4FE37}</a:tableStyleId>
+                <a:tableStyleId>{631E9890-4A1E-43CC-99DB-8398D616D4D7}</a:tableStyleId>
               </a:tblPr>
               <a:tblGrid>
                 <a:gridCol w="3048000"/>
@@ -33175,7 +33175,7 @@
             <a:tbl>
               <a:tblPr>
                 <a:noFill/>
-                <a:tableStyleId>{48338D13-A9CA-4A3B-89B7-9073ACB4FE37}</a:tableStyleId>
+                <a:tableStyleId>{631E9890-4A1E-43CC-99DB-8398D616D4D7}</a:tableStyleId>
               </a:tblPr>
               <a:tblGrid>
                 <a:gridCol w="1828800"/>

</xml_diff>

<commit_message>
Update Data Sources from LFX 2026-02-18 (#92)
Update Data Sources from LFX

Signed-off-by: github-actions[bot] <41898282+github-actions[bot]@users.noreply.github.com>
</commit_message>
<xml_diff>
--- a/overview_deck/LF Energy High Level Overview.pptx
+++ b/overview_deck/LF Energy High Level Overview.pptx
@@ -25946,7 +25946,7 @@
             <a:tbl>
               <a:tblPr>
                 <a:noFill/>
-                <a:tableStyleId>{631E9890-4A1E-43CC-99DB-8398D616D4D7}</a:tableStyleId>
+                <a:tableStyleId>{7883B356-9FE4-4F30-BD6A-E8E2A0FFFCA9}</a:tableStyleId>
               </a:tblPr>
               <a:tblGrid>
                 <a:gridCol w="1695200"/>
@@ -26736,7 +26736,7 @@
             <a:tbl>
               <a:tblPr>
                 <a:noFill/>
-                <a:tableStyleId>{631E9890-4A1E-43CC-99DB-8398D616D4D7}</a:tableStyleId>
+                <a:tableStyleId>{7883B356-9FE4-4F30-BD6A-E8E2A0FFFCA9}</a:tableStyleId>
               </a:tblPr>
               <a:tblGrid>
                 <a:gridCol w="1695200"/>
@@ -27426,7 +27426,7 @@
             <a:tbl>
               <a:tblPr>
                 <a:noFill/>
-                <a:tableStyleId>{631E9890-4A1E-43CC-99DB-8398D616D4D7}</a:tableStyleId>
+                <a:tableStyleId>{7883B356-9FE4-4F30-BD6A-E8E2A0FFFCA9}</a:tableStyleId>
               </a:tblPr>
               <a:tblGrid>
                 <a:gridCol w="1695200"/>
@@ -28678,7 +28678,7 @@
             <a:tbl>
               <a:tblPr>
                 <a:noFill/>
-                <a:tableStyleId>{631E9890-4A1E-43CC-99DB-8398D616D4D7}</a:tableStyleId>
+                <a:tableStyleId>{7883B356-9FE4-4F30-BD6A-E8E2A0FFFCA9}</a:tableStyleId>
               </a:tblPr>
               <a:tblGrid>
                 <a:gridCol w="1695200"/>
@@ -29670,7 +29670,7 @@
             <a:tbl>
               <a:tblPr>
                 <a:noFill/>
-                <a:tableStyleId>{631E9890-4A1E-43CC-99DB-8398D616D4D7}</a:tableStyleId>
+                <a:tableStyleId>{7883B356-9FE4-4F30-BD6A-E8E2A0FFFCA9}</a:tableStyleId>
               </a:tblPr>
               <a:tblGrid>
                 <a:gridCol w="3048000"/>
@@ -33175,7 +33175,7 @@
             <a:tbl>
               <a:tblPr>
                 <a:noFill/>
-                <a:tableStyleId>{631E9890-4A1E-43CC-99DB-8398D616D4D7}</a:tableStyleId>
+                <a:tableStyleId>{7883B356-9FE4-4F30-BD6A-E8E2A0FFFCA9}</a:tableStyleId>
               </a:tblPr>
               <a:tblGrid>
                 <a:gridCol w="1828800"/>
@@ -34002,9 +34002,9 @@
 </file>
 
 <file path=ppt/theme/theme1.xml><?xml version="1.0" encoding="utf-8"?>
-<a:theme xmlns:a="http://schemas.openxmlformats.org/drawingml/2006/main" xmlns:r="http://schemas.openxmlformats.org/officeDocument/2006/relationships">
+<a:theme xmlns:a="http://schemas.openxmlformats.org/drawingml/2006/main" xmlns:r="http://schemas.openxmlformats.org/officeDocument/2006/relationships" name="Simple Light">
   <a:themeElements>
-    <a:clrScheme name="Default">
+    <a:clrScheme name="Simple Light">
       <a:dk1>
         <a:srgbClr val="000000"/>
       </a:dk1>
@@ -34012,34 +34012,34 @@
         <a:srgbClr val="FFFFFF"/>
       </a:lt1>
       <a:dk2>
-        <a:srgbClr val="158158"/>
+        <a:srgbClr val="595959"/>
       </a:dk2>
       <a:lt2>
-        <a:srgbClr val="F3F3F3"/>
+        <a:srgbClr val="EEEEEE"/>
       </a:lt2>
       <a:accent1>
-        <a:srgbClr val="058DC7"/>
+        <a:srgbClr val="4285F4"/>
       </a:accent1>
       <a:accent2>
-        <a:srgbClr val="50B432"/>
+        <a:srgbClr val="212121"/>
       </a:accent2>
       <a:accent3>
-        <a:srgbClr val="ED561B"/>
+        <a:srgbClr val="78909C"/>
       </a:accent3>
       <a:accent4>
-        <a:srgbClr val="EDEF00"/>
+        <a:srgbClr val="FFAB40"/>
       </a:accent4>
       <a:accent5>
-        <a:srgbClr val="24CBE5"/>
+        <a:srgbClr val="0097A7"/>
       </a:accent5>
       <a:accent6>
-        <a:srgbClr val="64E572"/>
+        <a:srgbClr val="EEFF41"/>
       </a:accent6>
       <a:hlink>
-        <a:srgbClr val="2200CC"/>
+        <a:srgbClr val="0097A7"/>
       </a:hlink>
       <a:folHlink>
-        <a:srgbClr val="551A8B"/>
+        <a:srgbClr val="0097A7"/>
       </a:folHlink>
     </a:clrScheme>
     <a:fontScheme name="Office">
@@ -34281,9 +34281,9 @@
 </file>
 
 <file path=ppt/theme/theme2.xml><?xml version="1.0" encoding="utf-8"?>
-<a:theme xmlns:a="http://schemas.openxmlformats.org/drawingml/2006/main" xmlns:r="http://schemas.openxmlformats.org/officeDocument/2006/relationships" name="Simple Light">
+<a:theme xmlns:a="http://schemas.openxmlformats.org/drawingml/2006/main" xmlns:r="http://schemas.openxmlformats.org/officeDocument/2006/relationships">
   <a:themeElements>
-    <a:clrScheme name="Simple Light">
+    <a:clrScheme name="Default">
       <a:dk1>
         <a:srgbClr val="000000"/>
       </a:dk1>
@@ -34291,34 +34291,34 @@
         <a:srgbClr val="FFFFFF"/>
       </a:lt1>
       <a:dk2>
-        <a:srgbClr val="595959"/>
+        <a:srgbClr val="158158"/>
       </a:dk2>
       <a:lt2>
-        <a:srgbClr val="EEEEEE"/>
+        <a:srgbClr val="F3F3F3"/>
       </a:lt2>
       <a:accent1>
-        <a:srgbClr val="4285F4"/>
+        <a:srgbClr val="058DC7"/>
       </a:accent1>
       <a:accent2>
-        <a:srgbClr val="212121"/>
+        <a:srgbClr val="50B432"/>
       </a:accent2>
       <a:accent3>
-        <a:srgbClr val="78909C"/>
+        <a:srgbClr val="ED561B"/>
       </a:accent3>
       <a:accent4>
-        <a:srgbClr val="FFAB40"/>
+        <a:srgbClr val="EDEF00"/>
       </a:accent4>
       <a:accent5>
-        <a:srgbClr val="0097A7"/>
+        <a:srgbClr val="24CBE5"/>
       </a:accent5>
       <a:accent6>
-        <a:srgbClr val="EEFF41"/>
+        <a:srgbClr val="64E572"/>
       </a:accent6>
       <a:hlink>
-        <a:srgbClr val="0097A7"/>
+        <a:srgbClr val="2200CC"/>
       </a:hlink>
       <a:folHlink>
-        <a:srgbClr val="0097A7"/>
+        <a:srgbClr val="551A8B"/>
       </a:folHlink>
     </a:clrScheme>
     <a:fontScheme name="Office">

</xml_diff>

<commit_message>
Update Data Sources from LFX 2026-02-19 (#93)
Update Data Sources from LFX

Signed-off-by: github-actions[bot] <41898282+github-actions[bot]@users.noreply.github.com>
</commit_message>
<xml_diff>
--- a/overview_deck/LF Energy High Level Overview.pptx
+++ b/overview_deck/LF Energy High Level Overview.pptx
@@ -25946,7 +25946,7 @@
             <a:tbl>
               <a:tblPr>
                 <a:noFill/>
-                <a:tableStyleId>{7883B356-9FE4-4F30-BD6A-E8E2A0FFFCA9}</a:tableStyleId>
+                <a:tableStyleId>{63E0C454-3585-45E7-966D-AA68C5263759}</a:tableStyleId>
               </a:tblPr>
               <a:tblGrid>
                 <a:gridCol w="1695200"/>
@@ -26736,7 +26736,7 @@
             <a:tbl>
               <a:tblPr>
                 <a:noFill/>
-                <a:tableStyleId>{7883B356-9FE4-4F30-BD6A-E8E2A0FFFCA9}</a:tableStyleId>
+                <a:tableStyleId>{63E0C454-3585-45E7-966D-AA68C5263759}</a:tableStyleId>
               </a:tblPr>
               <a:tblGrid>
                 <a:gridCol w="1695200"/>
@@ -27426,7 +27426,7 @@
             <a:tbl>
               <a:tblPr>
                 <a:noFill/>
-                <a:tableStyleId>{7883B356-9FE4-4F30-BD6A-E8E2A0FFFCA9}</a:tableStyleId>
+                <a:tableStyleId>{63E0C454-3585-45E7-966D-AA68C5263759}</a:tableStyleId>
               </a:tblPr>
               <a:tblGrid>
                 <a:gridCol w="1695200"/>
@@ -28678,7 +28678,7 @@
             <a:tbl>
               <a:tblPr>
                 <a:noFill/>
-                <a:tableStyleId>{7883B356-9FE4-4F30-BD6A-E8E2A0FFFCA9}</a:tableStyleId>
+                <a:tableStyleId>{63E0C454-3585-45E7-966D-AA68C5263759}</a:tableStyleId>
               </a:tblPr>
               <a:tblGrid>
                 <a:gridCol w="1695200"/>
@@ -29670,7 +29670,7 @@
             <a:tbl>
               <a:tblPr>
                 <a:noFill/>
-                <a:tableStyleId>{7883B356-9FE4-4F30-BD6A-E8E2A0FFFCA9}</a:tableStyleId>
+                <a:tableStyleId>{63E0C454-3585-45E7-966D-AA68C5263759}</a:tableStyleId>
               </a:tblPr>
               <a:tblGrid>
                 <a:gridCol w="3048000"/>
@@ -33175,7 +33175,7 @@
             <a:tbl>
               <a:tblPr>
                 <a:noFill/>
-                <a:tableStyleId>{7883B356-9FE4-4F30-BD6A-E8E2A0FFFCA9}</a:tableStyleId>
+                <a:tableStyleId>{63E0C454-3585-45E7-966D-AA68C5263759}</a:tableStyleId>
               </a:tblPr>
               <a:tblGrid>
                 <a:gridCol w="1828800"/>
@@ -34002,6 +34002,285 @@
 </file>
 
 <file path=ppt/theme/theme1.xml><?xml version="1.0" encoding="utf-8"?>
+<a:theme xmlns:a="http://schemas.openxmlformats.org/drawingml/2006/main" xmlns:r="http://schemas.openxmlformats.org/officeDocument/2006/relationships" name="LF Energy Theme 2023">
+  <a:themeElements>
+    <a:clrScheme name="Geometric">
+      <a:dk1>
+        <a:srgbClr val="222222"/>
+      </a:dk1>
+      <a:lt1>
+        <a:srgbClr val="FFFFFF"/>
+      </a:lt1>
+      <a:dk2>
+        <a:srgbClr val="434343"/>
+      </a:dk2>
+      <a:lt2>
+        <a:srgbClr val="999999"/>
+      </a:lt2>
+      <a:accent1>
+        <a:srgbClr val="003778"/>
+      </a:accent1>
+      <a:accent2>
+        <a:srgbClr val="0094FF"/>
+      </a:accent2>
+      <a:accent3>
+        <a:srgbClr val="5B1DE7"/>
+      </a:accent3>
+      <a:accent4>
+        <a:srgbClr val="12E2E2"/>
+      </a:accent4>
+      <a:accent5>
+        <a:srgbClr val="FF00AA"/>
+      </a:accent5>
+      <a:accent6>
+        <a:srgbClr val="ACDE1F"/>
+      </a:accent6>
+      <a:hlink>
+        <a:srgbClr val="0077CC"/>
+      </a:hlink>
+      <a:folHlink>
+        <a:srgbClr val="F06292"/>
+      </a:folHlink>
+    </a:clrScheme>
+    <a:fontScheme name="Office">
+      <a:majorFont>
+        <a:latin typeface="Arial"/>
+        <a:ea typeface=""/>
+        <a:cs typeface=""/>
+        <a:font script="Jpan" typeface="ＭＳ Ｐゴシック"/>
+        <a:font script="Hang" typeface="맑은 고딕"/>
+        <a:font script="Hans" typeface="宋体"/>
+        <a:font script="Hant" typeface="新細明體"/>
+        <a:font script="Arab" typeface="Times New Roman"/>
+        <a:font script="Hebr" typeface="Times New Roman"/>
+        <a:font script="Thai" typeface="Angsana New"/>
+        <a:font script="Ethi" typeface="Nyala"/>
+        <a:font script="Beng" typeface="Vrinda"/>
+        <a:font script="Gujr" typeface="Shruti"/>
+        <a:font script="Khmr" typeface="MoolBoran"/>
+        <a:font script="Knda" typeface="Tunga"/>
+        <a:font script="Guru" typeface="Raavi"/>
+        <a:font script="Cans" typeface="Euphemia"/>
+        <a:font script="Cher" typeface="Plantagenet Cherokee"/>
+        <a:font script="Yiii" typeface="Microsoft Yi Baiti"/>
+        <a:font script="Tibt" typeface="Microsoft Himalaya"/>
+        <a:font script="Thaa" typeface="MV Boli"/>
+        <a:font script="Deva" typeface="Mangal"/>
+        <a:font script="Telu" typeface="Gautami"/>
+        <a:font script="Taml" typeface="Latha"/>
+        <a:font script="Syrc" typeface="Estrangelo Edessa"/>
+        <a:font script="Orya" typeface="Kalinga"/>
+        <a:font script="Mlym" typeface="Kartika"/>
+        <a:font script="Laoo" typeface="DokChampa"/>
+        <a:font script="Sinh" typeface="Iskoola Pota"/>
+        <a:font script="Mong" typeface="Mongolian Baiti"/>
+        <a:font script="Viet" typeface="Times New Roman"/>
+        <a:font script="Uigh" typeface="Microsoft Uighur"/>
+        <a:font script="Geor" typeface="Sylfaen"/>
+      </a:majorFont>
+      <a:minorFont>
+        <a:latin typeface="Arial"/>
+        <a:ea typeface=""/>
+        <a:cs typeface=""/>
+        <a:font script="Jpan" typeface="ＭＳ Ｐゴシック"/>
+        <a:font script="Hang" typeface="맑은 고딕"/>
+        <a:font script="Hans" typeface="宋体"/>
+        <a:font script="Hant" typeface="新細明體"/>
+        <a:font script="Arab" typeface="Arial"/>
+        <a:font script="Hebr" typeface="Arial"/>
+        <a:font script="Thai" typeface="Cordia New"/>
+        <a:font script="Ethi" typeface="Nyala"/>
+        <a:font script="Beng" typeface="Vrinda"/>
+        <a:font script="Gujr" typeface="Shruti"/>
+        <a:font script="Khmr" typeface="DaunPenh"/>
+        <a:font script="Knda" typeface="Tunga"/>
+        <a:font script="Guru" typeface="Raavi"/>
+        <a:font script="Cans" typeface="Euphemia"/>
+        <a:font script="Cher" typeface="Plantagenet Cherokee"/>
+        <a:font script="Yiii" typeface="Microsoft Yi Baiti"/>
+        <a:font script="Tibt" typeface="Microsoft Himalaya"/>
+        <a:font script="Thaa" typeface="MV Boli"/>
+        <a:font script="Deva" typeface="Mangal"/>
+        <a:font script="Telu" typeface="Gautami"/>
+        <a:font script="Taml" typeface="Latha"/>
+        <a:font script="Syrc" typeface="Estrangelo Edessa"/>
+        <a:font script="Orya" typeface="Kalinga"/>
+        <a:font script="Mlym" typeface="Kartika"/>
+        <a:font script="Laoo" typeface="DokChampa"/>
+        <a:font script="Sinh" typeface="Iskoola Pota"/>
+        <a:font script="Mong" typeface="Mongolian Baiti"/>
+        <a:font script="Viet" typeface="Arial"/>
+        <a:font script="Uigh" typeface="Microsoft Uighur"/>
+        <a:font script="Geor" typeface="Sylfaen"/>
+      </a:minorFont>
+    </a:fontScheme>
+    <a:fmtScheme name="Office">
+      <a:fillStyleLst>
+        <a:solidFill>
+          <a:schemeClr val="phClr"/>
+        </a:solidFill>
+        <a:gradFill rotWithShape="1">
+          <a:gsLst>
+            <a:gs pos="0">
+              <a:schemeClr val="phClr">
+                <a:tint val="50000"/>
+                <a:satMod val="300000"/>
+              </a:schemeClr>
+            </a:gs>
+            <a:gs pos="35000">
+              <a:schemeClr val="phClr">
+                <a:tint val="37000"/>
+                <a:satMod val="300000"/>
+              </a:schemeClr>
+            </a:gs>
+            <a:gs pos="100000">
+              <a:schemeClr val="phClr">
+                <a:tint val="15000"/>
+                <a:satMod val="350000"/>
+              </a:schemeClr>
+            </a:gs>
+          </a:gsLst>
+          <a:lin ang="16200000" scaled="1"/>
+        </a:gradFill>
+        <a:gradFill rotWithShape="1">
+          <a:gsLst>
+            <a:gs pos="0">
+              <a:schemeClr val="phClr">
+                <a:tint val="100000"/>
+                <a:shade val="100000"/>
+                <a:satMod val="130000"/>
+              </a:schemeClr>
+            </a:gs>
+            <a:gs pos="100000">
+              <a:schemeClr val="phClr">
+                <a:tint val="50000"/>
+                <a:shade val="100000"/>
+                <a:satMod val="350000"/>
+              </a:schemeClr>
+            </a:gs>
+          </a:gsLst>
+          <a:lin ang="16200000" scaled="0"/>
+        </a:gradFill>
+      </a:fillStyleLst>
+      <a:lnStyleLst>
+        <a:ln w="9525" cap="flat" cmpd="sng" algn="ctr">
+          <a:solidFill>
+            <a:schemeClr val="phClr">
+              <a:shade val="95000"/>
+              <a:satMod val="105000"/>
+            </a:schemeClr>
+          </a:solidFill>
+          <a:prstDash val="solid"/>
+        </a:ln>
+        <a:ln w="25400" cap="flat" cmpd="sng" algn="ctr">
+          <a:solidFill>
+            <a:schemeClr val="phClr"/>
+          </a:solidFill>
+          <a:prstDash val="solid"/>
+        </a:ln>
+        <a:ln w="38100" cap="flat" cmpd="sng" algn="ctr">
+          <a:solidFill>
+            <a:schemeClr val="phClr"/>
+          </a:solidFill>
+          <a:prstDash val="solid"/>
+        </a:ln>
+      </a:lnStyleLst>
+      <a:effectStyleLst>
+        <a:effectStyle>
+          <a:effectLst>
+            <a:outerShdw blurRad="40000" dist="20000" dir="5400000" rotWithShape="0">
+              <a:srgbClr val="000000">
+                <a:alpha val="38000"/>
+              </a:srgbClr>
+            </a:outerShdw>
+          </a:effectLst>
+        </a:effectStyle>
+        <a:effectStyle>
+          <a:effectLst>
+            <a:outerShdw blurRad="40000" dist="23000" dir="5400000" rotWithShape="0">
+              <a:srgbClr val="000000">
+                <a:alpha val="35000"/>
+              </a:srgbClr>
+            </a:outerShdw>
+          </a:effectLst>
+        </a:effectStyle>
+        <a:effectStyle>
+          <a:effectLst>
+            <a:outerShdw blurRad="40000" dist="23000" dir="5400000" rotWithShape="0">
+              <a:srgbClr val="000000">
+                <a:alpha val="35000"/>
+              </a:srgbClr>
+            </a:outerShdw>
+          </a:effectLst>
+          <a:scene3d>
+            <a:camera prst="orthographicFront">
+              <a:rot lat="0" lon="0" rev="0"/>
+            </a:camera>
+            <a:lightRig rig="threePt" dir="t">
+              <a:rot lat="0" lon="0" rev="1200000"/>
+            </a:lightRig>
+          </a:scene3d>
+          <a:sp3d>
+            <a:bevelT w="63500" h="25400"/>
+          </a:sp3d>
+        </a:effectStyle>
+      </a:effectStyleLst>
+      <a:bgFillStyleLst>
+        <a:solidFill>
+          <a:schemeClr val="phClr"/>
+        </a:solidFill>
+        <a:gradFill rotWithShape="1">
+          <a:gsLst>
+            <a:gs pos="0">
+              <a:schemeClr val="phClr">
+                <a:tint val="40000"/>
+                <a:satMod val="350000"/>
+              </a:schemeClr>
+            </a:gs>
+            <a:gs pos="40000">
+              <a:schemeClr val="phClr">
+                <a:tint val="45000"/>
+                <a:shade val="99000"/>
+                <a:satMod val="350000"/>
+              </a:schemeClr>
+            </a:gs>
+            <a:gs pos="100000">
+              <a:schemeClr val="phClr">
+                <a:shade val="20000"/>
+                <a:satMod val="255000"/>
+              </a:schemeClr>
+            </a:gs>
+          </a:gsLst>
+          <a:path path="circle">
+            <a:fillToRect l="50000" t="-80000" r="50000" b="180000"/>
+          </a:path>
+        </a:gradFill>
+        <a:gradFill rotWithShape="1">
+          <a:gsLst>
+            <a:gs pos="0">
+              <a:schemeClr val="phClr">
+                <a:tint val="80000"/>
+                <a:satMod val="300000"/>
+              </a:schemeClr>
+            </a:gs>
+            <a:gs pos="100000">
+              <a:schemeClr val="phClr">
+                <a:shade val="30000"/>
+                <a:satMod val="200000"/>
+              </a:schemeClr>
+            </a:gs>
+          </a:gsLst>
+          <a:path path="circle">
+            <a:fillToRect l="50000" t="50000" r="50000" b="50000"/>
+          </a:path>
+        </a:gradFill>
+      </a:bgFillStyleLst>
+    </a:fmtScheme>
+  </a:themeElements>
+</a:theme>
+</file>
+
+<file path=ppt/theme/theme2.xml><?xml version="1.0" encoding="utf-8"?>
 <a:theme xmlns:a="http://schemas.openxmlformats.org/drawingml/2006/main" xmlns:r="http://schemas.openxmlformats.org/officeDocument/2006/relationships" name="Simple Light">
   <a:themeElements>
     <a:clrScheme name="Simple Light">
@@ -34280,7 +34559,7 @@
 </a:theme>
 </file>
 
-<file path=ppt/theme/theme2.xml><?xml version="1.0" encoding="utf-8"?>
+<file path=ppt/theme/theme3.xml><?xml version="1.0" encoding="utf-8"?>
 <a:theme xmlns:a="http://schemas.openxmlformats.org/drawingml/2006/main" xmlns:r="http://schemas.openxmlformats.org/officeDocument/2006/relationships">
   <a:themeElements>
     <a:clrScheme name="Default">
@@ -34557,283 +34836,4 @@
     </a:fmtScheme>
   </a:themeElements>
 </a:theme>
-</file>
-
-<file path=ppt/theme/theme3.xml><?xml version="1.0" encoding="utf-8"?>
-<a:theme xmlns:a="http://schemas.openxmlformats.org/drawingml/2006/main" xmlns:r="http://schemas.openxmlformats.org/officeDocument/2006/relationships" name="LF Energy Theme 2023">
-  <a:themeElements>
-    <a:clrScheme name="Geometric">
-      <a:dk1>
-        <a:srgbClr val="222222"/>
-      </a:dk1>
-      <a:lt1>
-        <a:srgbClr val="FFFFFF"/>
-      </a:lt1>
-      <a:dk2>
-        <a:srgbClr val="434343"/>
-      </a:dk2>
-      <a:lt2>
-        <a:srgbClr val="999999"/>
-      </a:lt2>
-      <a:accent1>
-        <a:srgbClr val="003778"/>
-      </a:accent1>
-      <a:accent2>
-        <a:srgbClr val="0094FF"/>
-      </a:accent2>
-      <a:accent3>
-        <a:srgbClr val="5B1DE7"/>
-      </a:accent3>
-      <a:accent4>
-        <a:srgbClr val="12E2E2"/>
-      </a:accent4>
-      <a:accent5>
-        <a:srgbClr val="FF00AA"/>
-      </a:accent5>
-      <a:accent6>
-        <a:srgbClr val="ACDE1F"/>
-      </a:accent6>
-      <a:hlink>
-        <a:srgbClr val="0077CC"/>
-      </a:hlink>
-      <a:folHlink>
-        <a:srgbClr val="F06292"/>
-      </a:folHlink>
-    </a:clrScheme>
-    <a:fontScheme name="Office">
-      <a:majorFont>
-        <a:latin typeface="Arial"/>
-        <a:ea typeface=""/>
-        <a:cs typeface=""/>
-        <a:font script="Jpan" typeface="ＭＳ Ｐゴシック"/>
-        <a:font script="Hang" typeface="맑은 고딕"/>
-        <a:font script="Hans" typeface="宋体"/>
-        <a:font script="Hant" typeface="新細明體"/>
-        <a:font script="Arab" typeface="Times New Roman"/>
-        <a:font script="Hebr" typeface="Times New Roman"/>
-        <a:font script="Thai" typeface="Angsana New"/>
-        <a:font script="Ethi" typeface="Nyala"/>
-        <a:font script="Beng" typeface="Vrinda"/>
-        <a:font script="Gujr" typeface="Shruti"/>
-        <a:font script="Khmr" typeface="MoolBoran"/>
-        <a:font script="Knda" typeface="Tunga"/>
-        <a:font script="Guru" typeface="Raavi"/>
-        <a:font script="Cans" typeface="Euphemia"/>
-        <a:font script="Cher" typeface="Plantagenet Cherokee"/>
-        <a:font script="Yiii" typeface="Microsoft Yi Baiti"/>
-        <a:font script="Tibt" typeface="Microsoft Himalaya"/>
-        <a:font script="Thaa" typeface="MV Boli"/>
-        <a:font script="Deva" typeface="Mangal"/>
-        <a:font script="Telu" typeface="Gautami"/>
-        <a:font script="Taml" typeface="Latha"/>
-        <a:font script="Syrc" typeface="Estrangelo Edessa"/>
-        <a:font script="Orya" typeface="Kalinga"/>
-        <a:font script="Mlym" typeface="Kartika"/>
-        <a:font script="Laoo" typeface="DokChampa"/>
-        <a:font script="Sinh" typeface="Iskoola Pota"/>
-        <a:font script="Mong" typeface="Mongolian Baiti"/>
-        <a:font script="Viet" typeface="Times New Roman"/>
-        <a:font script="Uigh" typeface="Microsoft Uighur"/>
-        <a:font script="Geor" typeface="Sylfaen"/>
-      </a:majorFont>
-      <a:minorFont>
-        <a:latin typeface="Arial"/>
-        <a:ea typeface=""/>
-        <a:cs typeface=""/>
-        <a:font script="Jpan" typeface="ＭＳ Ｐゴシック"/>
-        <a:font script="Hang" typeface="맑은 고딕"/>
-        <a:font script="Hans" typeface="宋体"/>
-        <a:font script="Hant" typeface="新細明體"/>
-        <a:font script="Arab" typeface="Arial"/>
-        <a:font script="Hebr" typeface="Arial"/>
-        <a:font script="Thai" typeface="Cordia New"/>
-        <a:font script="Ethi" typeface="Nyala"/>
-        <a:font script="Beng" typeface="Vrinda"/>
-        <a:font script="Gujr" typeface="Shruti"/>
-        <a:font script="Khmr" typeface="DaunPenh"/>
-        <a:font script="Knda" typeface="Tunga"/>
-        <a:font script="Guru" typeface="Raavi"/>
-        <a:font script="Cans" typeface="Euphemia"/>
-        <a:font script="Cher" typeface="Plantagenet Cherokee"/>
-        <a:font script="Yiii" typeface="Microsoft Yi Baiti"/>
-        <a:font script="Tibt" typeface="Microsoft Himalaya"/>
-        <a:font script="Thaa" typeface="MV Boli"/>
-        <a:font script="Deva" typeface="Mangal"/>
-        <a:font script="Telu" typeface="Gautami"/>
-        <a:font script="Taml" typeface="Latha"/>
-        <a:font script="Syrc" typeface="Estrangelo Edessa"/>
-        <a:font script="Orya" typeface="Kalinga"/>
-        <a:font script="Mlym" typeface="Kartika"/>
-        <a:font script="Laoo" typeface="DokChampa"/>
-        <a:font script="Sinh" typeface="Iskoola Pota"/>
-        <a:font script="Mong" typeface="Mongolian Baiti"/>
-        <a:font script="Viet" typeface="Arial"/>
-        <a:font script="Uigh" typeface="Microsoft Uighur"/>
-        <a:font script="Geor" typeface="Sylfaen"/>
-      </a:minorFont>
-    </a:fontScheme>
-    <a:fmtScheme name="Office">
-      <a:fillStyleLst>
-        <a:solidFill>
-          <a:schemeClr val="phClr"/>
-        </a:solidFill>
-        <a:gradFill rotWithShape="1">
-          <a:gsLst>
-            <a:gs pos="0">
-              <a:schemeClr val="phClr">
-                <a:tint val="50000"/>
-                <a:satMod val="300000"/>
-              </a:schemeClr>
-            </a:gs>
-            <a:gs pos="35000">
-              <a:schemeClr val="phClr">
-                <a:tint val="37000"/>
-                <a:satMod val="300000"/>
-              </a:schemeClr>
-            </a:gs>
-            <a:gs pos="100000">
-              <a:schemeClr val="phClr">
-                <a:tint val="15000"/>
-                <a:satMod val="350000"/>
-              </a:schemeClr>
-            </a:gs>
-          </a:gsLst>
-          <a:lin ang="16200000" scaled="1"/>
-        </a:gradFill>
-        <a:gradFill rotWithShape="1">
-          <a:gsLst>
-            <a:gs pos="0">
-              <a:schemeClr val="phClr">
-                <a:tint val="100000"/>
-                <a:shade val="100000"/>
-                <a:satMod val="130000"/>
-              </a:schemeClr>
-            </a:gs>
-            <a:gs pos="100000">
-              <a:schemeClr val="phClr">
-                <a:tint val="50000"/>
-                <a:shade val="100000"/>
-                <a:satMod val="350000"/>
-              </a:schemeClr>
-            </a:gs>
-          </a:gsLst>
-          <a:lin ang="16200000" scaled="0"/>
-        </a:gradFill>
-      </a:fillStyleLst>
-      <a:lnStyleLst>
-        <a:ln w="9525" cap="flat" cmpd="sng" algn="ctr">
-          <a:solidFill>
-            <a:schemeClr val="phClr">
-              <a:shade val="95000"/>
-              <a:satMod val="105000"/>
-            </a:schemeClr>
-          </a:solidFill>
-          <a:prstDash val="solid"/>
-        </a:ln>
-        <a:ln w="25400" cap="flat" cmpd="sng" algn="ctr">
-          <a:solidFill>
-            <a:schemeClr val="phClr"/>
-          </a:solidFill>
-          <a:prstDash val="solid"/>
-        </a:ln>
-        <a:ln w="38100" cap="flat" cmpd="sng" algn="ctr">
-          <a:solidFill>
-            <a:schemeClr val="phClr"/>
-          </a:solidFill>
-          <a:prstDash val="solid"/>
-        </a:ln>
-      </a:lnStyleLst>
-      <a:effectStyleLst>
-        <a:effectStyle>
-          <a:effectLst>
-            <a:outerShdw blurRad="40000" dist="20000" dir="5400000" rotWithShape="0">
-              <a:srgbClr val="000000">
-                <a:alpha val="38000"/>
-              </a:srgbClr>
-            </a:outerShdw>
-          </a:effectLst>
-        </a:effectStyle>
-        <a:effectStyle>
-          <a:effectLst>
-            <a:outerShdw blurRad="40000" dist="23000" dir="5400000" rotWithShape="0">
-              <a:srgbClr val="000000">
-                <a:alpha val="35000"/>
-              </a:srgbClr>
-            </a:outerShdw>
-          </a:effectLst>
-        </a:effectStyle>
-        <a:effectStyle>
-          <a:effectLst>
-            <a:outerShdw blurRad="40000" dist="23000" dir="5400000" rotWithShape="0">
-              <a:srgbClr val="000000">
-                <a:alpha val="35000"/>
-              </a:srgbClr>
-            </a:outerShdw>
-          </a:effectLst>
-          <a:scene3d>
-            <a:camera prst="orthographicFront">
-              <a:rot lat="0" lon="0" rev="0"/>
-            </a:camera>
-            <a:lightRig rig="threePt" dir="t">
-              <a:rot lat="0" lon="0" rev="1200000"/>
-            </a:lightRig>
-          </a:scene3d>
-          <a:sp3d>
-            <a:bevelT w="63500" h="25400"/>
-          </a:sp3d>
-        </a:effectStyle>
-      </a:effectStyleLst>
-      <a:bgFillStyleLst>
-        <a:solidFill>
-          <a:schemeClr val="phClr"/>
-        </a:solidFill>
-        <a:gradFill rotWithShape="1">
-          <a:gsLst>
-            <a:gs pos="0">
-              <a:schemeClr val="phClr">
-                <a:tint val="40000"/>
-                <a:satMod val="350000"/>
-              </a:schemeClr>
-            </a:gs>
-            <a:gs pos="40000">
-              <a:schemeClr val="phClr">
-                <a:tint val="45000"/>
-                <a:shade val="99000"/>
-                <a:satMod val="350000"/>
-              </a:schemeClr>
-            </a:gs>
-            <a:gs pos="100000">
-              <a:schemeClr val="phClr">
-                <a:shade val="20000"/>
-                <a:satMod val="255000"/>
-              </a:schemeClr>
-            </a:gs>
-          </a:gsLst>
-          <a:path path="circle">
-            <a:fillToRect l="50000" t="-80000" r="50000" b="180000"/>
-          </a:path>
-        </a:gradFill>
-        <a:gradFill rotWithShape="1">
-          <a:gsLst>
-            <a:gs pos="0">
-              <a:schemeClr val="phClr">
-                <a:tint val="80000"/>
-                <a:satMod val="300000"/>
-              </a:schemeClr>
-            </a:gs>
-            <a:gs pos="100000">
-              <a:schemeClr val="phClr">
-                <a:shade val="30000"/>
-                <a:satMod val="200000"/>
-              </a:schemeClr>
-            </a:gs>
-          </a:gsLst>
-          <a:path path="circle">
-            <a:fillToRect l="50000" t="50000" r="50000" b="50000"/>
-          </a:path>
-        </a:gradFill>
-      </a:bgFillStyleLst>
-    </a:fmtScheme>
-  </a:themeElements>
-</a:theme>
 </file>
</xml_diff>

<commit_message>
Update Data Sources from LFX 2026-02-20 (#94)
Update Data Sources from LFX

Signed-off-by: github-actions[bot] <41898282+github-actions[bot]@users.noreply.github.com>
</commit_message>
<xml_diff>
--- a/overview_deck/LF Energy High Level Overview.pptx
+++ b/overview_deck/LF Energy High Level Overview.pptx
@@ -25946,7 +25946,7 @@
             <a:tbl>
               <a:tblPr>
                 <a:noFill/>
-                <a:tableStyleId>{63E0C454-3585-45E7-966D-AA68C5263759}</a:tableStyleId>
+                <a:tableStyleId>{E9145D0C-FFB7-4329-9AD6-17DDB7A5F2BF}</a:tableStyleId>
               </a:tblPr>
               <a:tblGrid>
                 <a:gridCol w="1695200"/>
@@ -26736,7 +26736,7 @@
             <a:tbl>
               <a:tblPr>
                 <a:noFill/>
-                <a:tableStyleId>{63E0C454-3585-45E7-966D-AA68C5263759}</a:tableStyleId>
+                <a:tableStyleId>{E9145D0C-FFB7-4329-9AD6-17DDB7A5F2BF}</a:tableStyleId>
               </a:tblPr>
               <a:tblGrid>
                 <a:gridCol w="1695200"/>
@@ -27426,7 +27426,7 @@
             <a:tbl>
               <a:tblPr>
                 <a:noFill/>
-                <a:tableStyleId>{63E0C454-3585-45E7-966D-AA68C5263759}</a:tableStyleId>
+                <a:tableStyleId>{E9145D0C-FFB7-4329-9AD6-17DDB7A5F2BF}</a:tableStyleId>
               </a:tblPr>
               <a:tblGrid>
                 <a:gridCol w="1695200"/>
@@ -28678,7 +28678,7 @@
             <a:tbl>
               <a:tblPr>
                 <a:noFill/>
-                <a:tableStyleId>{63E0C454-3585-45E7-966D-AA68C5263759}</a:tableStyleId>
+                <a:tableStyleId>{E9145D0C-FFB7-4329-9AD6-17DDB7A5F2BF}</a:tableStyleId>
               </a:tblPr>
               <a:tblGrid>
                 <a:gridCol w="1695200"/>
@@ -29670,7 +29670,7 @@
             <a:tbl>
               <a:tblPr>
                 <a:noFill/>
-                <a:tableStyleId>{63E0C454-3585-45E7-966D-AA68C5263759}</a:tableStyleId>
+                <a:tableStyleId>{E9145D0C-FFB7-4329-9AD6-17DDB7A5F2BF}</a:tableStyleId>
               </a:tblPr>
               <a:tblGrid>
                 <a:gridCol w="3048000"/>
@@ -33175,7 +33175,7 @@
             <a:tbl>
               <a:tblPr>
                 <a:noFill/>
-                <a:tableStyleId>{63E0C454-3585-45E7-966D-AA68C5263759}</a:tableStyleId>
+                <a:tableStyleId>{E9145D0C-FFB7-4329-9AD6-17DDB7A5F2BF}</a:tableStyleId>
               </a:tblPr>
               <a:tblGrid>
                 <a:gridCol w="1828800"/>
@@ -34281,6 +34281,285 @@
 </file>
 
 <file path=ppt/theme/theme2.xml><?xml version="1.0" encoding="utf-8"?>
+<a:theme xmlns:a="http://schemas.openxmlformats.org/drawingml/2006/main" xmlns:r="http://schemas.openxmlformats.org/officeDocument/2006/relationships">
+  <a:themeElements>
+    <a:clrScheme name="Default">
+      <a:dk1>
+        <a:srgbClr val="000000"/>
+      </a:dk1>
+      <a:lt1>
+        <a:srgbClr val="FFFFFF"/>
+      </a:lt1>
+      <a:dk2>
+        <a:srgbClr val="158158"/>
+      </a:dk2>
+      <a:lt2>
+        <a:srgbClr val="F3F3F3"/>
+      </a:lt2>
+      <a:accent1>
+        <a:srgbClr val="058DC7"/>
+      </a:accent1>
+      <a:accent2>
+        <a:srgbClr val="50B432"/>
+      </a:accent2>
+      <a:accent3>
+        <a:srgbClr val="ED561B"/>
+      </a:accent3>
+      <a:accent4>
+        <a:srgbClr val="EDEF00"/>
+      </a:accent4>
+      <a:accent5>
+        <a:srgbClr val="24CBE5"/>
+      </a:accent5>
+      <a:accent6>
+        <a:srgbClr val="64E572"/>
+      </a:accent6>
+      <a:hlink>
+        <a:srgbClr val="2200CC"/>
+      </a:hlink>
+      <a:folHlink>
+        <a:srgbClr val="551A8B"/>
+      </a:folHlink>
+    </a:clrScheme>
+    <a:fontScheme name="Office">
+      <a:majorFont>
+        <a:latin typeface="Arial"/>
+        <a:ea typeface=""/>
+        <a:cs typeface=""/>
+        <a:font script="Jpan" typeface="ＭＳ Ｐゴシック"/>
+        <a:font script="Hang" typeface="맑은 고딕"/>
+        <a:font script="Hans" typeface="宋体"/>
+        <a:font script="Hant" typeface="新細明體"/>
+        <a:font script="Arab" typeface="Times New Roman"/>
+        <a:font script="Hebr" typeface="Times New Roman"/>
+        <a:font script="Thai" typeface="Angsana New"/>
+        <a:font script="Ethi" typeface="Nyala"/>
+        <a:font script="Beng" typeface="Vrinda"/>
+        <a:font script="Gujr" typeface="Shruti"/>
+        <a:font script="Khmr" typeface="MoolBoran"/>
+        <a:font script="Knda" typeface="Tunga"/>
+        <a:font script="Guru" typeface="Raavi"/>
+        <a:font script="Cans" typeface="Euphemia"/>
+        <a:font script="Cher" typeface="Plantagenet Cherokee"/>
+        <a:font script="Yiii" typeface="Microsoft Yi Baiti"/>
+        <a:font script="Tibt" typeface="Microsoft Himalaya"/>
+        <a:font script="Thaa" typeface="MV Boli"/>
+        <a:font script="Deva" typeface="Mangal"/>
+        <a:font script="Telu" typeface="Gautami"/>
+        <a:font script="Taml" typeface="Latha"/>
+        <a:font script="Syrc" typeface="Estrangelo Edessa"/>
+        <a:font script="Orya" typeface="Kalinga"/>
+        <a:font script="Mlym" typeface="Kartika"/>
+        <a:font script="Laoo" typeface="DokChampa"/>
+        <a:font script="Sinh" typeface="Iskoola Pota"/>
+        <a:font script="Mong" typeface="Mongolian Baiti"/>
+        <a:font script="Viet" typeface="Times New Roman"/>
+        <a:font script="Uigh" typeface="Microsoft Uighur"/>
+        <a:font script="Geor" typeface="Sylfaen"/>
+      </a:majorFont>
+      <a:minorFont>
+        <a:latin typeface="Arial"/>
+        <a:ea typeface=""/>
+        <a:cs typeface=""/>
+        <a:font script="Jpan" typeface="ＭＳ Ｐゴシック"/>
+        <a:font script="Hang" typeface="맑은 고딕"/>
+        <a:font script="Hans" typeface="宋体"/>
+        <a:font script="Hant" typeface="新細明體"/>
+        <a:font script="Arab" typeface="Arial"/>
+        <a:font script="Hebr" typeface="Arial"/>
+        <a:font script="Thai" typeface="Cordia New"/>
+        <a:font script="Ethi" typeface="Nyala"/>
+        <a:font script="Beng" typeface="Vrinda"/>
+        <a:font script="Gujr" typeface="Shruti"/>
+        <a:font script="Khmr" typeface="DaunPenh"/>
+        <a:font script="Knda" typeface="Tunga"/>
+        <a:font script="Guru" typeface="Raavi"/>
+        <a:font script="Cans" typeface="Euphemia"/>
+        <a:font script="Cher" typeface="Plantagenet Cherokee"/>
+        <a:font script="Yiii" typeface="Microsoft Yi Baiti"/>
+        <a:font script="Tibt" typeface="Microsoft Himalaya"/>
+        <a:font script="Thaa" typeface="MV Boli"/>
+        <a:font script="Deva" typeface="Mangal"/>
+        <a:font script="Telu" typeface="Gautami"/>
+        <a:font script="Taml" typeface="Latha"/>
+        <a:font script="Syrc" typeface="Estrangelo Edessa"/>
+        <a:font script="Orya" typeface="Kalinga"/>
+        <a:font script="Mlym" typeface="Kartika"/>
+        <a:font script="Laoo" typeface="DokChampa"/>
+        <a:font script="Sinh" typeface="Iskoola Pota"/>
+        <a:font script="Mong" typeface="Mongolian Baiti"/>
+        <a:font script="Viet" typeface="Arial"/>
+        <a:font script="Uigh" typeface="Microsoft Uighur"/>
+        <a:font script="Geor" typeface="Sylfaen"/>
+      </a:minorFont>
+    </a:fontScheme>
+    <a:fmtScheme name="Office">
+      <a:fillStyleLst>
+        <a:solidFill>
+          <a:schemeClr val="phClr"/>
+        </a:solidFill>
+        <a:gradFill rotWithShape="1">
+          <a:gsLst>
+            <a:gs pos="0">
+              <a:schemeClr val="phClr">
+                <a:tint val="50000"/>
+                <a:satMod val="300000"/>
+              </a:schemeClr>
+            </a:gs>
+            <a:gs pos="35000">
+              <a:schemeClr val="phClr">
+                <a:tint val="37000"/>
+                <a:satMod val="300000"/>
+              </a:schemeClr>
+            </a:gs>
+            <a:gs pos="100000">
+              <a:schemeClr val="phClr">
+                <a:tint val="15000"/>
+                <a:satMod val="350000"/>
+              </a:schemeClr>
+            </a:gs>
+          </a:gsLst>
+          <a:lin ang="16200000" scaled="1"/>
+        </a:gradFill>
+        <a:gradFill rotWithShape="1">
+          <a:gsLst>
+            <a:gs pos="0">
+              <a:schemeClr val="phClr">
+                <a:tint val="100000"/>
+                <a:shade val="100000"/>
+                <a:satMod val="130000"/>
+              </a:schemeClr>
+            </a:gs>
+            <a:gs pos="100000">
+              <a:schemeClr val="phClr">
+                <a:tint val="50000"/>
+                <a:shade val="100000"/>
+                <a:satMod val="350000"/>
+              </a:schemeClr>
+            </a:gs>
+          </a:gsLst>
+          <a:lin ang="16200000" scaled="0"/>
+        </a:gradFill>
+      </a:fillStyleLst>
+      <a:lnStyleLst>
+        <a:ln w="9525" cap="flat" cmpd="sng" algn="ctr">
+          <a:solidFill>
+            <a:schemeClr val="phClr">
+              <a:shade val="95000"/>
+              <a:satMod val="105000"/>
+            </a:schemeClr>
+          </a:solidFill>
+          <a:prstDash val="solid"/>
+        </a:ln>
+        <a:ln w="25400" cap="flat" cmpd="sng" algn="ctr">
+          <a:solidFill>
+            <a:schemeClr val="phClr"/>
+          </a:solidFill>
+          <a:prstDash val="solid"/>
+        </a:ln>
+        <a:ln w="38100" cap="flat" cmpd="sng" algn="ctr">
+          <a:solidFill>
+            <a:schemeClr val="phClr"/>
+          </a:solidFill>
+          <a:prstDash val="solid"/>
+        </a:ln>
+      </a:lnStyleLst>
+      <a:effectStyleLst>
+        <a:effectStyle>
+          <a:effectLst>
+            <a:outerShdw blurRad="40000" dist="20000" dir="5400000" rotWithShape="0">
+              <a:srgbClr val="000000">
+                <a:alpha val="38000"/>
+              </a:srgbClr>
+            </a:outerShdw>
+          </a:effectLst>
+        </a:effectStyle>
+        <a:effectStyle>
+          <a:effectLst>
+            <a:outerShdw blurRad="40000" dist="23000" dir="5400000" rotWithShape="0">
+              <a:srgbClr val="000000">
+                <a:alpha val="35000"/>
+              </a:srgbClr>
+            </a:outerShdw>
+          </a:effectLst>
+        </a:effectStyle>
+        <a:effectStyle>
+          <a:effectLst>
+            <a:outerShdw blurRad="40000" dist="23000" dir="5400000" rotWithShape="0">
+              <a:srgbClr val="000000">
+                <a:alpha val="35000"/>
+              </a:srgbClr>
+            </a:outerShdw>
+          </a:effectLst>
+          <a:scene3d>
+            <a:camera prst="orthographicFront">
+              <a:rot lat="0" lon="0" rev="0"/>
+            </a:camera>
+            <a:lightRig rig="threePt" dir="t">
+              <a:rot lat="0" lon="0" rev="1200000"/>
+            </a:lightRig>
+          </a:scene3d>
+          <a:sp3d>
+            <a:bevelT w="63500" h="25400"/>
+          </a:sp3d>
+        </a:effectStyle>
+      </a:effectStyleLst>
+      <a:bgFillStyleLst>
+        <a:solidFill>
+          <a:schemeClr val="phClr"/>
+        </a:solidFill>
+        <a:gradFill rotWithShape="1">
+          <a:gsLst>
+            <a:gs pos="0">
+              <a:schemeClr val="phClr">
+                <a:tint val="40000"/>
+                <a:satMod val="350000"/>
+              </a:schemeClr>
+            </a:gs>
+            <a:gs pos="40000">
+              <a:schemeClr val="phClr">
+                <a:tint val="45000"/>
+                <a:shade val="99000"/>
+                <a:satMod val="350000"/>
+              </a:schemeClr>
+            </a:gs>
+            <a:gs pos="100000">
+              <a:schemeClr val="phClr">
+                <a:shade val="20000"/>
+                <a:satMod val="255000"/>
+              </a:schemeClr>
+            </a:gs>
+          </a:gsLst>
+          <a:path path="circle">
+            <a:fillToRect l="50000" t="-80000" r="50000" b="180000"/>
+          </a:path>
+        </a:gradFill>
+        <a:gradFill rotWithShape="1">
+          <a:gsLst>
+            <a:gs pos="0">
+              <a:schemeClr val="phClr">
+                <a:tint val="80000"/>
+                <a:satMod val="300000"/>
+              </a:schemeClr>
+            </a:gs>
+            <a:gs pos="100000">
+              <a:schemeClr val="phClr">
+                <a:shade val="30000"/>
+                <a:satMod val="200000"/>
+              </a:schemeClr>
+            </a:gs>
+          </a:gsLst>
+          <a:path path="circle">
+            <a:fillToRect l="50000" t="50000" r="50000" b="50000"/>
+          </a:path>
+        </a:gradFill>
+      </a:bgFillStyleLst>
+    </a:fmtScheme>
+  </a:themeElements>
+</a:theme>
+</file>
+
+<file path=ppt/theme/theme3.xml><?xml version="1.0" encoding="utf-8"?>
 <a:theme xmlns:a="http://schemas.openxmlformats.org/drawingml/2006/main" xmlns:r="http://schemas.openxmlformats.org/officeDocument/2006/relationships" name="Simple Light">
   <a:themeElements>
     <a:clrScheme name="Simple Light">
@@ -34557,283 +34836,4 @@
     </a:fmtScheme>
   </a:themeElements>
 </a:theme>
-</file>
-
-<file path=ppt/theme/theme3.xml><?xml version="1.0" encoding="utf-8"?>
-<a:theme xmlns:a="http://schemas.openxmlformats.org/drawingml/2006/main" xmlns:r="http://schemas.openxmlformats.org/officeDocument/2006/relationships">
-  <a:themeElements>
-    <a:clrScheme name="Default">
-      <a:dk1>
-        <a:srgbClr val="000000"/>
-      </a:dk1>
-      <a:lt1>
-        <a:srgbClr val="FFFFFF"/>
-      </a:lt1>
-      <a:dk2>
-        <a:srgbClr val="158158"/>
-      </a:dk2>
-      <a:lt2>
-        <a:srgbClr val="F3F3F3"/>
-      </a:lt2>
-      <a:accent1>
-        <a:srgbClr val="058DC7"/>
-      </a:accent1>
-      <a:accent2>
-        <a:srgbClr val="50B432"/>
-      </a:accent2>
-      <a:accent3>
-        <a:srgbClr val="ED561B"/>
-      </a:accent3>
-      <a:accent4>
-        <a:srgbClr val="EDEF00"/>
-      </a:accent4>
-      <a:accent5>
-        <a:srgbClr val="24CBE5"/>
-      </a:accent5>
-      <a:accent6>
-        <a:srgbClr val="64E572"/>
-      </a:accent6>
-      <a:hlink>
-        <a:srgbClr val="2200CC"/>
-      </a:hlink>
-      <a:folHlink>
-        <a:srgbClr val="551A8B"/>
-      </a:folHlink>
-    </a:clrScheme>
-    <a:fontScheme name="Office">
-      <a:majorFont>
-        <a:latin typeface="Arial"/>
-        <a:ea typeface=""/>
-        <a:cs typeface=""/>
-        <a:font script="Jpan" typeface="ＭＳ Ｐゴシック"/>
-        <a:font script="Hang" typeface="맑은 고딕"/>
-        <a:font script="Hans" typeface="宋体"/>
-        <a:font script="Hant" typeface="新細明體"/>
-        <a:font script="Arab" typeface="Times New Roman"/>
-        <a:font script="Hebr" typeface="Times New Roman"/>
-        <a:font script="Thai" typeface="Angsana New"/>
-        <a:font script="Ethi" typeface="Nyala"/>
-        <a:font script="Beng" typeface="Vrinda"/>
-        <a:font script="Gujr" typeface="Shruti"/>
-        <a:font script="Khmr" typeface="MoolBoran"/>
-        <a:font script="Knda" typeface="Tunga"/>
-        <a:font script="Guru" typeface="Raavi"/>
-        <a:font script="Cans" typeface="Euphemia"/>
-        <a:font script="Cher" typeface="Plantagenet Cherokee"/>
-        <a:font script="Yiii" typeface="Microsoft Yi Baiti"/>
-        <a:font script="Tibt" typeface="Microsoft Himalaya"/>
-        <a:font script="Thaa" typeface="MV Boli"/>
-        <a:font script="Deva" typeface="Mangal"/>
-        <a:font script="Telu" typeface="Gautami"/>
-        <a:font script="Taml" typeface="Latha"/>
-        <a:font script="Syrc" typeface="Estrangelo Edessa"/>
-        <a:font script="Orya" typeface="Kalinga"/>
-        <a:font script="Mlym" typeface="Kartika"/>
-        <a:font script="Laoo" typeface="DokChampa"/>
-        <a:font script="Sinh" typeface="Iskoola Pota"/>
-        <a:font script="Mong" typeface="Mongolian Baiti"/>
-        <a:font script="Viet" typeface="Times New Roman"/>
-        <a:font script="Uigh" typeface="Microsoft Uighur"/>
-        <a:font script="Geor" typeface="Sylfaen"/>
-      </a:majorFont>
-      <a:minorFont>
-        <a:latin typeface="Arial"/>
-        <a:ea typeface=""/>
-        <a:cs typeface=""/>
-        <a:font script="Jpan" typeface="ＭＳ Ｐゴシック"/>
-        <a:font script="Hang" typeface="맑은 고딕"/>
-        <a:font script="Hans" typeface="宋体"/>
-        <a:font script="Hant" typeface="新細明體"/>
-        <a:font script="Arab" typeface="Arial"/>
-        <a:font script="Hebr" typeface="Arial"/>
-        <a:font script="Thai" typeface="Cordia New"/>
-        <a:font script="Ethi" typeface="Nyala"/>
-        <a:font script="Beng" typeface="Vrinda"/>
-        <a:font script="Gujr" typeface="Shruti"/>
-        <a:font script="Khmr" typeface="DaunPenh"/>
-        <a:font script="Knda" typeface="Tunga"/>
-        <a:font script="Guru" typeface="Raavi"/>
-        <a:font script="Cans" typeface="Euphemia"/>
-        <a:font script="Cher" typeface="Plantagenet Cherokee"/>
-        <a:font script="Yiii" typeface="Microsoft Yi Baiti"/>
-        <a:font script="Tibt" typeface="Microsoft Himalaya"/>
-        <a:font script="Thaa" typeface="MV Boli"/>
-        <a:font script="Deva" typeface="Mangal"/>
-        <a:font script="Telu" typeface="Gautami"/>
-        <a:font script="Taml" typeface="Latha"/>
-        <a:font script="Syrc" typeface="Estrangelo Edessa"/>
-        <a:font script="Orya" typeface="Kalinga"/>
-        <a:font script="Mlym" typeface="Kartika"/>
-        <a:font script="Laoo" typeface="DokChampa"/>
-        <a:font script="Sinh" typeface="Iskoola Pota"/>
-        <a:font script="Mong" typeface="Mongolian Baiti"/>
-        <a:font script="Viet" typeface="Arial"/>
-        <a:font script="Uigh" typeface="Microsoft Uighur"/>
-        <a:font script="Geor" typeface="Sylfaen"/>
-      </a:minorFont>
-    </a:fontScheme>
-    <a:fmtScheme name="Office">
-      <a:fillStyleLst>
-        <a:solidFill>
-          <a:schemeClr val="phClr"/>
-        </a:solidFill>
-        <a:gradFill rotWithShape="1">
-          <a:gsLst>
-            <a:gs pos="0">
-              <a:schemeClr val="phClr">
-                <a:tint val="50000"/>
-                <a:satMod val="300000"/>
-              </a:schemeClr>
-            </a:gs>
-            <a:gs pos="35000">
-              <a:schemeClr val="phClr">
-                <a:tint val="37000"/>
-                <a:satMod val="300000"/>
-              </a:schemeClr>
-            </a:gs>
-            <a:gs pos="100000">
-              <a:schemeClr val="phClr">
-                <a:tint val="15000"/>
-                <a:satMod val="350000"/>
-              </a:schemeClr>
-            </a:gs>
-          </a:gsLst>
-          <a:lin ang="16200000" scaled="1"/>
-        </a:gradFill>
-        <a:gradFill rotWithShape="1">
-          <a:gsLst>
-            <a:gs pos="0">
-              <a:schemeClr val="phClr">
-                <a:tint val="100000"/>
-                <a:shade val="100000"/>
-                <a:satMod val="130000"/>
-              </a:schemeClr>
-            </a:gs>
-            <a:gs pos="100000">
-              <a:schemeClr val="phClr">
-                <a:tint val="50000"/>
-                <a:shade val="100000"/>
-                <a:satMod val="350000"/>
-              </a:schemeClr>
-            </a:gs>
-          </a:gsLst>
-          <a:lin ang="16200000" scaled="0"/>
-        </a:gradFill>
-      </a:fillStyleLst>
-      <a:lnStyleLst>
-        <a:ln w="9525" cap="flat" cmpd="sng" algn="ctr">
-          <a:solidFill>
-            <a:schemeClr val="phClr">
-              <a:shade val="95000"/>
-              <a:satMod val="105000"/>
-            </a:schemeClr>
-          </a:solidFill>
-          <a:prstDash val="solid"/>
-        </a:ln>
-        <a:ln w="25400" cap="flat" cmpd="sng" algn="ctr">
-          <a:solidFill>
-            <a:schemeClr val="phClr"/>
-          </a:solidFill>
-          <a:prstDash val="solid"/>
-        </a:ln>
-        <a:ln w="38100" cap="flat" cmpd="sng" algn="ctr">
-          <a:solidFill>
-            <a:schemeClr val="phClr"/>
-          </a:solidFill>
-          <a:prstDash val="solid"/>
-        </a:ln>
-      </a:lnStyleLst>
-      <a:effectStyleLst>
-        <a:effectStyle>
-          <a:effectLst>
-            <a:outerShdw blurRad="40000" dist="20000" dir="5400000" rotWithShape="0">
-              <a:srgbClr val="000000">
-                <a:alpha val="38000"/>
-              </a:srgbClr>
-            </a:outerShdw>
-          </a:effectLst>
-        </a:effectStyle>
-        <a:effectStyle>
-          <a:effectLst>
-            <a:outerShdw blurRad="40000" dist="23000" dir="5400000" rotWithShape="0">
-              <a:srgbClr val="000000">
-                <a:alpha val="35000"/>
-              </a:srgbClr>
-            </a:outerShdw>
-          </a:effectLst>
-        </a:effectStyle>
-        <a:effectStyle>
-          <a:effectLst>
-            <a:outerShdw blurRad="40000" dist="23000" dir="5400000" rotWithShape="0">
-              <a:srgbClr val="000000">
-                <a:alpha val="35000"/>
-              </a:srgbClr>
-            </a:outerShdw>
-          </a:effectLst>
-          <a:scene3d>
-            <a:camera prst="orthographicFront">
-              <a:rot lat="0" lon="0" rev="0"/>
-            </a:camera>
-            <a:lightRig rig="threePt" dir="t">
-              <a:rot lat="0" lon="0" rev="1200000"/>
-            </a:lightRig>
-          </a:scene3d>
-          <a:sp3d>
-            <a:bevelT w="63500" h="25400"/>
-          </a:sp3d>
-        </a:effectStyle>
-      </a:effectStyleLst>
-      <a:bgFillStyleLst>
-        <a:solidFill>
-          <a:schemeClr val="phClr"/>
-        </a:solidFill>
-        <a:gradFill rotWithShape="1">
-          <a:gsLst>
-            <a:gs pos="0">
-              <a:schemeClr val="phClr">
-                <a:tint val="40000"/>
-                <a:satMod val="350000"/>
-              </a:schemeClr>
-            </a:gs>
-            <a:gs pos="40000">
-              <a:schemeClr val="phClr">
-                <a:tint val="45000"/>
-                <a:shade val="99000"/>
-                <a:satMod val="350000"/>
-              </a:schemeClr>
-            </a:gs>
-            <a:gs pos="100000">
-              <a:schemeClr val="phClr">
-                <a:shade val="20000"/>
-                <a:satMod val="255000"/>
-              </a:schemeClr>
-            </a:gs>
-          </a:gsLst>
-          <a:path path="circle">
-            <a:fillToRect l="50000" t="-80000" r="50000" b="180000"/>
-          </a:path>
-        </a:gradFill>
-        <a:gradFill rotWithShape="1">
-          <a:gsLst>
-            <a:gs pos="0">
-              <a:schemeClr val="phClr">
-                <a:tint val="80000"/>
-                <a:satMod val="300000"/>
-              </a:schemeClr>
-            </a:gs>
-            <a:gs pos="100000">
-              <a:schemeClr val="phClr">
-                <a:shade val="30000"/>
-                <a:satMod val="200000"/>
-              </a:schemeClr>
-            </a:gs>
-          </a:gsLst>
-          <a:path path="circle">
-            <a:fillToRect l="50000" t="50000" r="50000" b="50000"/>
-          </a:path>
-        </a:gradFill>
-      </a:bgFillStyleLst>
-    </a:fmtScheme>
-  </a:themeElements>
-</a:theme>
 </file>
</xml_diff>

<commit_message>
Update Data Sources from LFX 2026-02-21 (#95)
Update Data Sources from LFX

Signed-off-by: github-actions[bot] <41898282+github-actions[bot]@users.noreply.github.com>
</commit_message>
<xml_diff>
--- a/overview_deck/LF Energy High Level Overview.pptx
+++ b/overview_deck/LF Energy High Level Overview.pptx
@@ -25946,7 +25946,7 @@
             <a:tbl>
               <a:tblPr>
                 <a:noFill/>
-                <a:tableStyleId>{E9145D0C-FFB7-4329-9AD6-17DDB7A5F2BF}</a:tableStyleId>
+                <a:tableStyleId>{483223DA-87E1-4EE6-8DA5-15799A8F6AF1}</a:tableStyleId>
               </a:tblPr>
               <a:tblGrid>
                 <a:gridCol w="1695200"/>
@@ -26736,7 +26736,7 @@
             <a:tbl>
               <a:tblPr>
                 <a:noFill/>
-                <a:tableStyleId>{E9145D0C-FFB7-4329-9AD6-17DDB7A5F2BF}</a:tableStyleId>
+                <a:tableStyleId>{483223DA-87E1-4EE6-8DA5-15799A8F6AF1}</a:tableStyleId>
               </a:tblPr>
               <a:tblGrid>
                 <a:gridCol w="1695200"/>
@@ -27426,7 +27426,7 @@
             <a:tbl>
               <a:tblPr>
                 <a:noFill/>
-                <a:tableStyleId>{E9145D0C-FFB7-4329-9AD6-17DDB7A5F2BF}</a:tableStyleId>
+                <a:tableStyleId>{483223DA-87E1-4EE6-8DA5-15799A8F6AF1}</a:tableStyleId>
               </a:tblPr>
               <a:tblGrid>
                 <a:gridCol w="1695200"/>
@@ -28678,7 +28678,7 @@
             <a:tbl>
               <a:tblPr>
                 <a:noFill/>
-                <a:tableStyleId>{E9145D0C-FFB7-4329-9AD6-17DDB7A5F2BF}</a:tableStyleId>
+                <a:tableStyleId>{483223DA-87E1-4EE6-8DA5-15799A8F6AF1}</a:tableStyleId>
               </a:tblPr>
               <a:tblGrid>
                 <a:gridCol w="1695200"/>
@@ -29670,7 +29670,7 @@
             <a:tbl>
               <a:tblPr>
                 <a:noFill/>
-                <a:tableStyleId>{E9145D0C-FFB7-4329-9AD6-17DDB7A5F2BF}</a:tableStyleId>
+                <a:tableStyleId>{483223DA-87E1-4EE6-8DA5-15799A8F6AF1}</a:tableStyleId>
               </a:tblPr>
               <a:tblGrid>
                 <a:gridCol w="3048000"/>
@@ -33175,7 +33175,7 @@
             <a:tbl>
               <a:tblPr>
                 <a:noFill/>
-                <a:tableStyleId>{E9145D0C-FFB7-4329-9AD6-17DDB7A5F2BF}</a:tableStyleId>
+                <a:tableStyleId>{483223DA-87E1-4EE6-8DA5-15799A8F6AF1}</a:tableStyleId>
               </a:tblPr>
               <a:tblGrid>
                 <a:gridCol w="1828800"/>
@@ -34281,6 +34281,285 @@
 </file>
 
 <file path=ppt/theme/theme2.xml><?xml version="1.0" encoding="utf-8"?>
+<a:theme xmlns:a="http://schemas.openxmlformats.org/drawingml/2006/main" xmlns:r="http://schemas.openxmlformats.org/officeDocument/2006/relationships" name="Simple Light">
+  <a:themeElements>
+    <a:clrScheme name="Simple Light">
+      <a:dk1>
+        <a:srgbClr val="000000"/>
+      </a:dk1>
+      <a:lt1>
+        <a:srgbClr val="FFFFFF"/>
+      </a:lt1>
+      <a:dk2>
+        <a:srgbClr val="595959"/>
+      </a:dk2>
+      <a:lt2>
+        <a:srgbClr val="EEEEEE"/>
+      </a:lt2>
+      <a:accent1>
+        <a:srgbClr val="4285F4"/>
+      </a:accent1>
+      <a:accent2>
+        <a:srgbClr val="212121"/>
+      </a:accent2>
+      <a:accent3>
+        <a:srgbClr val="78909C"/>
+      </a:accent3>
+      <a:accent4>
+        <a:srgbClr val="FFAB40"/>
+      </a:accent4>
+      <a:accent5>
+        <a:srgbClr val="0097A7"/>
+      </a:accent5>
+      <a:accent6>
+        <a:srgbClr val="EEFF41"/>
+      </a:accent6>
+      <a:hlink>
+        <a:srgbClr val="0097A7"/>
+      </a:hlink>
+      <a:folHlink>
+        <a:srgbClr val="0097A7"/>
+      </a:folHlink>
+    </a:clrScheme>
+    <a:fontScheme name="Office">
+      <a:majorFont>
+        <a:latin typeface="Arial"/>
+        <a:ea typeface=""/>
+        <a:cs typeface=""/>
+        <a:font script="Jpan" typeface="ＭＳ Ｐゴシック"/>
+        <a:font script="Hang" typeface="맑은 고딕"/>
+        <a:font script="Hans" typeface="宋体"/>
+        <a:font script="Hant" typeface="新細明體"/>
+        <a:font script="Arab" typeface="Times New Roman"/>
+        <a:font script="Hebr" typeface="Times New Roman"/>
+        <a:font script="Thai" typeface="Angsana New"/>
+        <a:font script="Ethi" typeface="Nyala"/>
+        <a:font script="Beng" typeface="Vrinda"/>
+        <a:font script="Gujr" typeface="Shruti"/>
+        <a:font script="Khmr" typeface="MoolBoran"/>
+        <a:font script="Knda" typeface="Tunga"/>
+        <a:font script="Guru" typeface="Raavi"/>
+        <a:font script="Cans" typeface="Euphemia"/>
+        <a:font script="Cher" typeface="Plantagenet Cherokee"/>
+        <a:font script="Yiii" typeface="Microsoft Yi Baiti"/>
+        <a:font script="Tibt" typeface="Microsoft Himalaya"/>
+        <a:font script="Thaa" typeface="MV Boli"/>
+        <a:font script="Deva" typeface="Mangal"/>
+        <a:font script="Telu" typeface="Gautami"/>
+        <a:font script="Taml" typeface="Latha"/>
+        <a:font script="Syrc" typeface="Estrangelo Edessa"/>
+        <a:font script="Orya" typeface="Kalinga"/>
+        <a:font script="Mlym" typeface="Kartika"/>
+        <a:font script="Laoo" typeface="DokChampa"/>
+        <a:font script="Sinh" typeface="Iskoola Pota"/>
+        <a:font script="Mong" typeface="Mongolian Baiti"/>
+        <a:font script="Viet" typeface="Times New Roman"/>
+        <a:font script="Uigh" typeface="Microsoft Uighur"/>
+        <a:font script="Geor" typeface="Sylfaen"/>
+      </a:majorFont>
+      <a:minorFont>
+        <a:latin typeface="Arial"/>
+        <a:ea typeface=""/>
+        <a:cs typeface=""/>
+        <a:font script="Jpan" typeface="ＭＳ Ｐゴシック"/>
+        <a:font script="Hang" typeface="맑은 고딕"/>
+        <a:font script="Hans" typeface="宋体"/>
+        <a:font script="Hant" typeface="新細明體"/>
+        <a:font script="Arab" typeface="Arial"/>
+        <a:font script="Hebr" typeface="Arial"/>
+        <a:font script="Thai" typeface="Cordia New"/>
+        <a:font script="Ethi" typeface="Nyala"/>
+        <a:font script="Beng" typeface="Vrinda"/>
+        <a:font script="Gujr" typeface="Shruti"/>
+        <a:font script="Khmr" typeface="DaunPenh"/>
+        <a:font script="Knda" typeface="Tunga"/>
+        <a:font script="Guru" typeface="Raavi"/>
+        <a:font script="Cans" typeface="Euphemia"/>
+        <a:font script="Cher" typeface="Plantagenet Cherokee"/>
+        <a:font script="Yiii" typeface="Microsoft Yi Baiti"/>
+        <a:font script="Tibt" typeface="Microsoft Himalaya"/>
+        <a:font script="Thaa" typeface="MV Boli"/>
+        <a:font script="Deva" typeface="Mangal"/>
+        <a:font script="Telu" typeface="Gautami"/>
+        <a:font script="Taml" typeface="Latha"/>
+        <a:font script="Syrc" typeface="Estrangelo Edessa"/>
+        <a:font script="Orya" typeface="Kalinga"/>
+        <a:font script="Mlym" typeface="Kartika"/>
+        <a:font script="Laoo" typeface="DokChampa"/>
+        <a:font script="Sinh" typeface="Iskoola Pota"/>
+        <a:font script="Mong" typeface="Mongolian Baiti"/>
+        <a:font script="Viet" typeface="Arial"/>
+        <a:font script="Uigh" typeface="Microsoft Uighur"/>
+        <a:font script="Geor" typeface="Sylfaen"/>
+      </a:minorFont>
+    </a:fontScheme>
+    <a:fmtScheme name="Office">
+      <a:fillStyleLst>
+        <a:solidFill>
+          <a:schemeClr val="phClr"/>
+        </a:solidFill>
+        <a:gradFill rotWithShape="1">
+          <a:gsLst>
+            <a:gs pos="0">
+              <a:schemeClr val="phClr">
+                <a:tint val="50000"/>
+                <a:satMod val="300000"/>
+              </a:schemeClr>
+            </a:gs>
+            <a:gs pos="35000">
+              <a:schemeClr val="phClr">
+                <a:tint val="37000"/>
+                <a:satMod val="300000"/>
+              </a:schemeClr>
+            </a:gs>
+            <a:gs pos="100000">
+              <a:schemeClr val="phClr">
+                <a:tint val="15000"/>
+                <a:satMod val="350000"/>
+              </a:schemeClr>
+            </a:gs>
+          </a:gsLst>
+          <a:lin ang="16200000" scaled="1"/>
+        </a:gradFill>
+        <a:gradFill rotWithShape="1">
+          <a:gsLst>
+            <a:gs pos="0">
+              <a:schemeClr val="phClr">
+                <a:tint val="100000"/>
+                <a:shade val="100000"/>
+                <a:satMod val="130000"/>
+              </a:schemeClr>
+            </a:gs>
+            <a:gs pos="100000">
+              <a:schemeClr val="phClr">
+                <a:tint val="50000"/>
+                <a:shade val="100000"/>
+                <a:satMod val="350000"/>
+              </a:schemeClr>
+            </a:gs>
+          </a:gsLst>
+          <a:lin ang="16200000" scaled="0"/>
+        </a:gradFill>
+      </a:fillStyleLst>
+      <a:lnStyleLst>
+        <a:ln w="9525" cap="flat" cmpd="sng" algn="ctr">
+          <a:solidFill>
+            <a:schemeClr val="phClr">
+              <a:shade val="95000"/>
+              <a:satMod val="105000"/>
+            </a:schemeClr>
+          </a:solidFill>
+          <a:prstDash val="solid"/>
+        </a:ln>
+        <a:ln w="25400" cap="flat" cmpd="sng" algn="ctr">
+          <a:solidFill>
+            <a:schemeClr val="phClr"/>
+          </a:solidFill>
+          <a:prstDash val="solid"/>
+        </a:ln>
+        <a:ln w="38100" cap="flat" cmpd="sng" algn="ctr">
+          <a:solidFill>
+            <a:schemeClr val="phClr"/>
+          </a:solidFill>
+          <a:prstDash val="solid"/>
+        </a:ln>
+      </a:lnStyleLst>
+      <a:effectStyleLst>
+        <a:effectStyle>
+          <a:effectLst>
+            <a:outerShdw blurRad="40000" dist="20000" dir="5400000" rotWithShape="0">
+              <a:srgbClr val="000000">
+                <a:alpha val="38000"/>
+              </a:srgbClr>
+            </a:outerShdw>
+          </a:effectLst>
+        </a:effectStyle>
+        <a:effectStyle>
+          <a:effectLst>
+            <a:outerShdw blurRad="40000" dist="23000" dir="5400000" rotWithShape="0">
+              <a:srgbClr val="000000">
+                <a:alpha val="35000"/>
+              </a:srgbClr>
+            </a:outerShdw>
+          </a:effectLst>
+        </a:effectStyle>
+        <a:effectStyle>
+          <a:effectLst>
+            <a:outerShdw blurRad="40000" dist="23000" dir="5400000" rotWithShape="0">
+              <a:srgbClr val="000000">
+                <a:alpha val="35000"/>
+              </a:srgbClr>
+            </a:outerShdw>
+          </a:effectLst>
+          <a:scene3d>
+            <a:camera prst="orthographicFront">
+              <a:rot lat="0" lon="0" rev="0"/>
+            </a:camera>
+            <a:lightRig rig="threePt" dir="t">
+              <a:rot lat="0" lon="0" rev="1200000"/>
+            </a:lightRig>
+          </a:scene3d>
+          <a:sp3d>
+            <a:bevelT w="63500" h="25400"/>
+          </a:sp3d>
+        </a:effectStyle>
+      </a:effectStyleLst>
+      <a:bgFillStyleLst>
+        <a:solidFill>
+          <a:schemeClr val="phClr"/>
+        </a:solidFill>
+        <a:gradFill rotWithShape="1">
+          <a:gsLst>
+            <a:gs pos="0">
+              <a:schemeClr val="phClr">
+                <a:tint val="40000"/>
+                <a:satMod val="350000"/>
+              </a:schemeClr>
+            </a:gs>
+            <a:gs pos="40000">
+              <a:schemeClr val="phClr">
+                <a:tint val="45000"/>
+                <a:shade val="99000"/>
+                <a:satMod val="350000"/>
+              </a:schemeClr>
+            </a:gs>
+            <a:gs pos="100000">
+              <a:schemeClr val="phClr">
+                <a:shade val="20000"/>
+                <a:satMod val="255000"/>
+              </a:schemeClr>
+            </a:gs>
+          </a:gsLst>
+          <a:path path="circle">
+            <a:fillToRect l="50000" t="-80000" r="50000" b="180000"/>
+          </a:path>
+        </a:gradFill>
+        <a:gradFill rotWithShape="1">
+          <a:gsLst>
+            <a:gs pos="0">
+              <a:schemeClr val="phClr">
+                <a:tint val="80000"/>
+                <a:satMod val="300000"/>
+              </a:schemeClr>
+            </a:gs>
+            <a:gs pos="100000">
+              <a:schemeClr val="phClr">
+                <a:shade val="30000"/>
+                <a:satMod val="200000"/>
+              </a:schemeClr>
+            </a:gs>
+          </a:gsLst>
+          <a:path path="circle">
+            <a:fillToRect l="50000" t="50000" r="50000" b="50000"/>
+          </a:path>
+        </a:gradFill>
+      </a:bgFillStyleLst>
+    </a:fmtScheme>
+  </a:themeElements>
+</a:theme>
+</file>
+
+<file path=ppt/theme/theme3.xml><?xml version="1.0" encoding="utf-8"?>
 <a:theme xmlns:a="http://schemas.openxmlformats.org/drawingml/2006/main" xmlns:r="http://schemas.openxmlformats.org/officeDocument/2006/relationships">
   <a:themeElements>
     <a:clrScheme name="Default">
@@ -34557,283 +34836,4 @@
     </a:fmtScheme>
   </a:themeElements>
 </a:theme>
-</file>
-
-<file path=ppt/theme/theme3.xml><?xml version="1.0" encoding="utf-8"?>
-<a:theme xmlns:a="http://schemas.openxmlformats.org/drawingml/2006/main" xmlns:r="http://schemas.openxmlformats.org/officeDocument/2006/relationships" name="Simple Light">
-  <a:themeElements>
-    <a:clrScheme name="Simple Light">
-      <a:dk1>
-        <a:srgbClr val="000000"/>
-      </a:dk1>
-      <a:lt1>
-        <a:srgbClr val="FFFFFF"/>
-      </a:lt1>
-      <a:dk2>
-        <a:srgbClr val="595959"/>
-      </a:dk2>
-      <a:lt2>
-        <a:srgbClr val="EEEEEE"/>
-      </a:lt2>
-      <a:accent1>
-        <a:srgbClr val="4285F4"/>
-      </a:accent1>
-      <a:accent2>
-        <a:srgbClr val="212121"/>
-      </a:accent2>
-      <a:accent3>
-        <a:srgbClr val="78909C"/>
-      </a:accent3>
-      <a:accent4>
-        <a:srgbClr val="FFAB40"/>
-      </a:accent4>
-      <a:accent5>
-        <a:srgbClr val="0097A7"/>
-      </a:accent5>
-      <a:accent6>
-        <a:srgbClr val="EEFF41"/>
-      </a:accent6>
-      <a:hlink>
-        <a:srgbClr val="0097A7"/>
-      </a:hlink>
-      <a:folHlink>
-        <a:srgbClr val="0097A7"/>
-      </a:folHlink>
-    </a:clrScheme>
-    <a:fontScheme name="Office">
-      <a:majorFont>
-        <a:latin typeface="Arial"/>
-        <a:ea typeface=""/>
-        <a:cs typeface=""/>
-        <a:font script="Jpan" typeface="ＭＳ Ｐゴシック"/>
-        <a:font script="Hang" typeface="맑은 고딕"/>
-        <a:font script="Hans" typeface="宋体"/>
-        <a:font script="Hant" typeface="新細明體"/>
-        <a:font script="Arab" typeface="Times New Roman"/>
-        <a:font script="Hebr" typeface="Times New Roman"/>
-        <a:font script="Thai" typeface="Angsana New"/>
-        <a:font script="Ethi" typeface="Nyala"/>
-        <a:font script="Beng" typeface="Vrinda"/>
-        <a:font script="Gujr" typeface="Shruti"/>
-        <a:font script="Khmr" typeface="MoolBoran"/>
-        <a:font script="Knda" typeface="Tunga"/>
-        <a:font script="Guru" typeface="Raavi"/>
-        <a:font script="Cans" typeface="Euphemia"/>
-        <a:font script="Cher" typeface="Plantagenet Cherokee"/>
-        <a:font script="Yiii" typeface="Microsoft Yi Baiti"/>
-        <a:font script="Tibt" typeface="Microsoft Himalaya"/>
-        <a:font script="Thaa" typeface="MV Boli"/>
-        <a:font script="Deva" typeface="Mangal"/>
-        <a:font script="Telu" typeface="Gautami"/>
-        <a:font script="Taml" typeface="Latha"/>
-        <a:font script="Syrc" typeface="Estrangelo Edessa"/>
-        <a:font script="Orya" typeface="Kalinga"/>
-        <a:font script="Mlym" typeface="Kartika"/>
-        <a:font script="Laoo" typeface="DokChampa"/>
-        <a:font script="Sinh" typeface="Iskoola Pota"/>
-        <a:font script="Mong" typeface="Mongolian Baiti"/>
-        <a:font script="Viet" typeface="Times New Roman"/>
-        <a:font script="Uigh" typeface="Microsoft Uighur"/>
-        <a:font script="Geor" typeface="Sylfaen"/>
-      </a:majorFont>
-      <a:minorFont>
-        <a:latin typeface="Arial"/>
-        <a:ea typeface=""/>
-        <a:cs typeface=""/>
-        <a:font script="Jpan" typeface="ＭＳ Ｐゴシック"/>
-        <a:font script="Hang" typeface="맑은 고딕"/>
-        <a:font script="Hans" typeface="宋体"/>
-        <a:font script="Hant" typeface="新細明體"/>
-        <a:font script="Arab" typeface="Arial"/>
-        <a:font script="Hebr" typeface="Arial"/>
-        <a:font script="Thai" typeface="Cordia New"/>
-        <a:font script="Ethi" typeface="Nyala"/>
-        <a:font script="Beng" typeface="Vrinda"/>
-        <a:font script="Gujr" typeface="Shruti"/>
-        <a:font script="Khmr" typeface="DaunPenh"/>
-        <a:font script="Knda" typeface="Tunga"/>
-        <a:font script="Guru" typeface="Raavi"/>
-        <a:font script="Cans" typeface="Euphemia"/>
-        <a:font script="Cher" typeface="Plantagenet Cherokee"/>
-        <a:font script="Yiii" typeface="Microsoft Yi Baiti"/>
-        <a:font script="Tibt" typeface="Microsoft Himalaya"/>
-        <a:font script="Thaa" typeface="MV Boli"/>
-        <a:font script="Deva" typeface="Mangal"/>
-        <a:font script="Telu" typeface="Gautami"/>
-        <a:font script="Taml" typeface="Latha"/>
-        <a:font script="Syrc" typeface="Estrangelo Edessa"/>
-        <a:font script="Orya" typeface="Kalinga"/>
-        <a:font script="Mlym" typeface="Kartika"/>
-        <a:font script="Laoo" typeface="DokChampa"/>
-        <a:font script="Sinh" typeface="Iskoola Pota"/>
-        <a:font script="Mong" typeface="Mongolian Baiti"/>
-        <a:font script="Viet" typeface="Arial"/>
-        <a:font script="Uigh" typeface="Microsoft Uighur"/>
-        <a:font script="Geor" typeface="Sylfaen"/>
-      </a:minorFont>
-    </a:fontScheme>
-    <a:fmtScheme name="Office">
-      <a:fillStyleLst>
-        <a:solidFill>
-          <a:schemeClr val="phClr"/>
-        </a:solidFill>
-        <a:gradFill rotWithShape="1">
-          <a:gsLst>
-            <a:gs pos="0">
-              <a:schemeClr val="phClr">
-                <a:tint val="50000"/>
-                <a:satMod val="300000"/>
-              </a:schemeClr>
-            </a:gs>
-            <a:gs pos="35000">
-              <a:schemeClr val="phClr">
-                <a:tint val="37000"/>
-                <a:satMod val="300000"/>
-              </a:schemeClr>
-            </a:gs>
-            <a:gs pos="100000">
-              <a:schemeClr val="phClr">
-                <a:tint val="15000"/>
-                <a:satMod val="350000"/>
-              </a:schemeClr>
-            </a:gs>
-          </a:gsLst>
-          <a:lin ang="16200000" scaled="1"/>
-        </a:gradFill>
-        <a:gradFill rotWithShape="1">
-          <a:gsLst>
-            <a:gs pos="0">
-              <a:schemeClr val="phClr">
-                <a:tint val="100000"/>
-                <a:shade val="100000"/>
-                <a:satMod val="130000"/>
-              </a:schemeClr>
-            </a:gs>
-            <a:gs pos="100000">
-              <a:schemeClr val="phClr">
-                <a:tint val="50000"/>
-                <a:shade val="100000"/>
-                <a:satMod val="350000"/>
-              </a:schemeClr>
-            </a:gs>
-          </a:gsLst>
-          <a:lin ang="16200000" scaled="0"/>
-        </a:gradFill>
-      </a:fillStyleLst>
-      <a:lnStyleLst>
-        <a:ln w="9525" cap="flat" cmpd="sng" algn="ctr">
-          <a:solidFill>
-            <a:schemeClr val="phClr">
-              <a:shade val="95000"/>
-              <a:satMod val="105000"/>
-            </a:schemeClr>
-          </a:solidFill>
-          <a:prstDash val="solid"/>
-        </a:ln>
-        <a:ln w="25400" cap="flat" cmpd="sng" algn="ctr">
-          <a:solidFill>
-            <a:schemeClr val="phClr"/>
-          </a:solidFill>
-          <a:prstDash val="solid"/>
-        </a:ln>
-        <a:ln w="38100" cap="flat" cmpd="sng" algn="ctr">
-          <a:solidFill>
-            <a:schemeClr val="phClr"/>
-          </a:solidFill>
-          <a:prstDash val="solid"/>
-        </a:ln>
-      </a:lnStyleLst>
-      <a:effectStyleLst>
-        <a:effectStyle>
-          <a:effectLst>
-            <a:outerShdw blurRad="40000" dist="20000" dir="5400000" rotWithShape="0">
-              <a:srgbClr val="000000">
-                <a:alpha val="38000"/>
-              </a:srgbClr>
-            </a:outerShdw>
-          </a:effectLst>
-        </a:effectStyle>
-        <a:effectStyle>
-          <a:effectLst>
-            <a:outerShdw blurRad="40000" dist="23000" dir="5400000" rotWithShape="0">
-              <a:srgbClr val="000000">
-                <a:alpha val="35000"/>
-              </a:srgbClr>
-            </a:outerShdw>
-          </a:effectLst>
-        </a:effectStyle>
-        <a:effectStyle>
-          <a:effectLst>
-            <a:outerShdw blurRad="40000" dist="23000" dir="5400000" rotWithShape="0">
-              <a:srgbClr val="000000">
-                <a:alpha val="35000"/>
-              </a:srgbClr>
-            </a:outerShdw>
-          </a:effectLst>
-          <a:scene3d>
-            <a:camera prst="orthographicFront">
-              <a:rot lat="0" lon="0" rev="0"/>
-            </a:camera>
-            <a:lightRig rig="threePt" dir="t">
-              <a:rot lat="0" lon="0" rev="1200000"/>
-            </a:lightRig>
-          </a:scene3d>
-          <a:sp3d>
-            <a:bevelT w="63500" h="25400"/>
-          </a:sp3d>
-        </a:effectStyle>
-      </a:effectStyleLst>
-      <a:bgFillStyleLst>
-        <a:solidFill>
-          <a:schemeClr val="phClr"/>
-        </a:solidFill>
-        <a:gradFill rotWithShape="1">
-          <a:gsLst>
-            <a:gs pos="0">
-              <a:schemeClr val="phClr">
-                <a:tint val="40000"/>
-                <a:satMod val="350000"/>
-              </a:schemeClr>
-            </a:gs>
-            <a:gs pos="40000">
-              <a:schemeClr val="phClr">
-                <a:tint val="45000"/>
-                <a:shade val="99000"/>
-                <a:satMod val="350000"/>
-              </a:schemeClr>
-            </a:gs>
-            <a:gs pos="100000">
-              <a:schemeClr val="phClr">
-                <a:shade val="20000"/>
-                <a:satMod val="255000"/>
-              </a:schemeClr>
-            </a:gs>
-          </a:gsLst>
-          <a:path path="circle">
-            <a:fillToRect l="50000" t="-80000" r="50000" b="180000"/>
-          </a:path>
-        </a:gradFill>
-        <a:gradFill rotWithShape="1">
-          <a:gsLst>
-            <a:gs pos="0">
-              <a:schemeClr val="phClr">
-                <a:tint val="80000"/>
-                <a:satMod val="300000"/>
-              </a:schemeClr>
-            </a:gs>
-            <a:gs pos="100000">
-              <a:schemeClr val="phClr">
-                <a:shade val="30000"/>
-                <a:satMod val="200000"/>
-              </a:schemeClr>
-            </a:gs>
-          </a:gsLst>
-          <a:path path="circle">
-            <a:fillToRect l="50000" t="50000" r="50000" b="50000"/>
-          </a:path>
-        </a:gradFill>
-      </a:bgFillStyleLst>
-    </a:fmtScheme>
-  </a:themeElements>
-</a:theme>
 </file>
</xml_diff>

<commit_message>
Update Data Sources from LFX 2026-02-22 (#96)
Update Data Sources from LFX

Signed-off-by: github-actions[bot] <41898282+github-actions[bot]@users.noreply.github.com>
</commit_message>
<xml_diff>
--- a/overview_deck/LF Energy High Level Overview.pptx
+++ b/overview_deck/LF Energy High Level Overview.pptx
@@ -25946,7 +25946,7 @@
             <a:tbl>
               <a:tblPr>
                 <a:noFill/>
-                <a:tableStyleId>{483223DA-87E1-4EE6-8DA5-15799A8F6AF1}</a:tableStyleId>
+                <a:tableStyleId>{8FA931E9-57A9-4F2B-8CB2-13A407556EF8}</a:tableStyleId>
               </a:tblPr>
               <a:tblGrid>
                 <a:gridCol w="1695200"/>
@@ -26736,7 +26736,7 @@
             <a:tbl>
               <a:tblPr>
                 <a:noFill/>
-                <a:tableStyleId>{483223DA-87E1-4EE6-8DA5-15799A8F6AF1}</a:tableStyleId>
+                <a:tableStyleId>{8FA931E9-57A9-4F2B-8CB2-13A407556EF8}</a:tableStyleId>
               </a:tblPr>
               <a:tblGrid>
                 <a:gridCol w="1695200"/>
@@ -27426,7 +27426,7 @@
             <a:tbl>
               <a:tblPr>
                 <a:noFill/>
-                <a:tableStyleId>{483223DA-87E1-4EE6-8DA5-15799A8F6AF1}</a:tableStyleId>
+                <a:tableStyleId>{8FA931E9-57A9-4F2B-8CB2-13A407556EF8}</a:tableStyleId>
               </a:tblPr>
               <a:tblGrid>
                 <a:gridCol w="1695200"/>
@@ -28678,7 +28678,7 @@
             <a:tbl>
               <a:tblPr>
                 <a:noFill/>
-                <a:tableStyleId>{483223DA-87E1-4EE6-8DA5-15799A8F6AF1}</a:tableStyleId>
+                <a:tableStyleId>{8FA931E9-57A9-4F2B-8CB2-13A407556EF8}</a:tableStyleId>
               </a:tblPr>
               <a:tblGrid>
                 <a:gridCol w="1695200"/>
@@ -29670,7 +29670,7 @@
             <a:tbl>
               <a:tblPr>
                 <a:noFill/>
-                <a:tableStyleId>{483223DA-87E1-4EE6-8DA5-15799A8F6AF1}</a:tableStyleId>
+                <a:tableStyleId>{8FA931E9-57A9-4F2B-8CB2-13A407556EF8}</a:tableStyleId>
               </a:tblPr>
               <a:tblGrid>
                 <a:gridCol w="3048000"/>
@@ -33175,7 +33175,7 @@
             <a:tbl>
               <a:tblPr>
                 <a:noFill/>
-                <a:tableStyleId>{483223DA-87E1-4EE6-8DA5-15799A8F6AF1}</a:tableStyleId>
+                <a:tableStyleId>{8FA931E9-57A9-4F2B-8CB2-13A407556EF8}</a:tableStyleId>
               </a:tblPr>
               <a:tblGrid>
                 <a:gridCol w="1828800"/>
@@ -34002,44 +34002,44 @@
 </file>
 
 <file path=ppt/theme/theme1.xml><?xml version="1.0" encoding="utf-8"?>
-<a:theme xmlns:a="http://schemas.openxmlformats.org/drawingml/2006/main" xmlns:r="http://schemas.openxmlformats.org/officeDocument/2006/relationships" name="LF Energy Theme 2023">
+<a:theme xmlns:a="http://schemas.openxmlformats.org/drawingml/2006/main" xmlns:r="http://schemas.openxmlformats.org/officeDocument/2006/relationships" name="Simple Light">
   <a:themeElements>
-    <a:clrScheme name="Geometric">
+    <a:clrScheme name="Simple Light">
       <a:dk1>
-        <a:srgbClr val="222222"/>
+        <a:srgbClr val="000000"/>
       </a:dk1>
       <a:lt1>
         <a:srgbClr val="FFFFFF"/>
       </a:lt1>
       <a:dk2>
-        <a:srgbClr val="434343"/>
+        <a:srgbClr val="595959"/>
       </a:dk2>
       <a:lt2>
-        <a:srgbClr val="999999"/>
+        <a:srgbClr val="EEEEEE"/>
       </a:lt2>
       <a:accent1>
-        <a:srgbClr val="003778"/>
+        <a:srgbClr val="4285F4"/>
       </a:accent1>
       <a:accent2>
-        <a:srgbClr val="0094FF"/>
+        <a:srgbClr val="212121"/>
       </a:accent2>
       <a:accent3>
-        <a:srgbClr val="5B1DE7"/>
+        <a:srgbClr val="78909C"/>
       </a:accent3>
       <a:accent4>
-        <a:srgbClr val="12E2E2"/>
+        <a:srgbClr val="FFAB40"/>
       </a:accent4>
       <a:accent5>
-        <a:srgbClr val="FF00AA"/>
+        <a:srgbClr val="0097A7"/>
       </a:accent5>
       <a:accent6>
-        <a:srgbClr val="ACDE1F"/>
+        <a:srgbClr val="EEFF41"/>
       </a:accent6>
       <a:hlink>
-        <a:srgbClr val="0077CC"/>
+        <a:srgbClr val="0097A7"/>
       </a:hlink>
       <a:folHlink>
-        <a:srgbClr val="F06292"/>
+        <a:srgbClr val="0097A7"/>
       </a:folHlink>
     </a:clrScheme>
     <a:fontScheme name="Office">
@@ -34281,44 +34281,44 @@
 </file>
 
 <file path=ppt/theme/theme2.xml><?xml version="1.0" encoding="utf-8"?>
-<a:theme xmlns:a="http://schemas.openxmlformats.org/drawingml/2006/main" xmlns:r="http://schemas.openxmlformats.org/officeDocument/2006/relationships" name="Simple Light">
+<a:theme xmlns:a="http://schemas.openxmlformats.org/drawingml/2006/main" xmlns:r="http://schemas.openxmlformats.org/officeDocument/2006/relationships" name="LF Energy Theme 2023">
   <a:themeElements>
-    <a:clrScheme name="Simple Light">
+    <a:clrScheme name="Geometric">
       <a:dk1>
-        <a:srgbClr val="000000"/>
+        <a:srgbClr val="222222"/>
       </a:dk1>
       <a:lt1>
         <a:srgbClr val="FFFFFF"/>
       </a:lt1>
       <a:dk2>
-        <a:srgbClr val="595959"/>
+        <a:srgbClr val="434343"/>
       </a:dk2>
       <a:lt2>
-        <a:srgbClr val="EEEEEE"/>
+        <a:srgbClr val="999999"/>
       </a:lt2>
       <a:accent1>
-        <a:srgbClr val="4285F4"/>
+        <a:srgbClr val="003778"/>
       </a:accent1>
       <a:accent2>
-        <a:srgbClr val="212121"/>
+        <a:srgbClr val="0094FF"/>
       </a:accent2>
       <a:accent3>
-        <a:srgbClr val="78909C"/>
+        <a:srgbClr val="5B1DE7"/>
       </a:accent3>
       <a:accent4>
-        <a:srgbClr val="FFAB40"/>
+        <a:srgbClr val="12E2E2"/>
       </a:accent4>
       <a:accent5>
-        <a:srgbClr val="0097A7"/>
+        <a:srgbClr val="FF00AA"/>
       </a:accent5>
       <a:accent6>
-        <a:srgbClr val="EEFF41"/>
+        <a:srgbClr val="ACDE1F"/>
       </a:accent6>
       <a:hlink>
-        <a:srgbClr val="0097A7"/>
+        <a:srgbClr val="0077CC"/>
       </a:hlink>
       <a:folHlink>
-        <a:srgbClr val="0097A7"/>
+        <a:srgbClr val="F06292"/>
       </a:folHlink>
     </a:clrScheme>
     <a:fontScheme name="Office">

</xml_diff>

<commit_message>
Update Data Sources from LFX 2026-02-23 (#97)
Update Data Sources from LFX

Signed-off-by: github-actions[bot] <41898282+github-actions[bot]@users.noreply.github.com>
</commit_message>
<xml_diff>
--- a/overview_deck/LF Energy High Level Overview.pptx
+++ b/overview_deck/LF Energy High Level Overview.pptx
@@ -25946,7 +25946,7 @@
             <a:tbl>
               <a:tblPr>
                 <a:noFill/>
-                <a:tableStyleId>{8FA931E9-57A9-4F2B-8CB2-13A407556EF8}</a:tableStyleId>
+                <a:tableStyleId>{928D4016-75EB-4100-83A0-C58B1C6B50E9}</a:tableStyleId>
               </a:tblPr>
               <a:tblGrid>
                 <a:gridCol w="1695200"/>
@@ -26736,7 +26736,7 @@
             <a:tbl>
               <a:tblPr>
                 <a:noFill/>
-                <a:tableStyleId>{8FA931E9-57A9-4F2B-8CB2-13A407556EF8}</a:tableStyleId>
+                <a:tableStyleId>{928D4016-75EB-4100-83A0-C58B1C6B50E9}</a:tableStyleId>
               </a:tblPr>
               <a:tblGrid>
                 <a:gridCol w="1695200"/>
@@ -27426,7 +27426,7 @@
             <a:tbl>
               <a:tblPr>
                 <a:noFill/>
-                <a:tableStyleId>{8FA931E9-57A9-4F2B-8CB2-13A407556EF8}</a:tableStyleId>
+                <a:tableStyleId>{928D4016-75EB-4100-83A0-C58B1C6B50E9}</a:tableStyleId>
               </a:tblPr>
               <a:tblGrid>
                 <a:gridCol w="1695200"/>
@@ -28678,7 +28678,7 @@
             <a:tbl>
               <a:tblPr>
                 <a:noFill/>
-                <a:tableStyleId>{8FA931E9-57A9-4F2B-8CB2-13A407556EF8}</a:tableStyleId>
+                <a:tableStyleId>{928D4016-75EB-4100-83A0-C58B1C6B50E9}</a:tableStyleId>
               </a:tblPr>
               <a:tblGrid>
                 <a:gridCol w="1695200"/>
@@ -29670,7 +29670,7 @@
             <a:tbl>
               <a:tblPr>
                 <a:noFill/>
-                <a:tableStyleId>{8FA931E9-57A9-4F2B-8CB2-13A407556EF8}</a:tableStyleId>
+                <a:tableStyleId>{928D4016-75EB-4100-83A0-C58B1C6B50E9}</a:tableStyleId>
               </a:tblPr>
               <a:tblGrid>
                 <a:gridCol w="3048000"/>
@@ -33175,7 +33175,7 @@
             <a:tbl>
               <a:tblPr>
                 <a:noFill/>
-                <a:tableStyleId>{8FA931E9-57A9-4F2B-8CB2-13A407556EF8}</a:tableStyleId>
+                <a:tableStyleId>{928D4016-75EB-4100-83A0-C58B1C6B50E9}</a:tableStyleId>
               </a:tblPr>
               <a:tblGrid>
                 <a:gridCol w="1828800"/>
@@ -34281,6 +34281,285 @@
 </file>
 
 <file path=ppt/theme/theme2.xml><?xml version="1.0" encoding="utf-8"?>
+<a:theme xmlns:a="http://schemas.openxmlformats.org/drawingml/2006/main" xmlns:r="http://schemas.openxmlformats.org/officeDocument/2006/relationships">
+  <a:themeElements>
+    <a:clrScheme name="Default">
+      <a:dk1>
+        <a:srgbClr val="000000"/>
+      </a:dk1>
+      <a:lt1>
+        <a:srgbClr val="FFFFFF"/>
+      </a:lt1>
+      <a:dk2>
+        <a:srgbClr val="158158"/>
+      </a:dk2>
+      <a:lt2>
+        <a:srgbClr val="F3F3F3"/>
+      </a:lt2>
+      <a:accent1>
+        <a:srgbClr val="058DC7"/>
+      </a:accent1>
+      <a:accent2>
+        <a:srgbClr val="50B432"/>
+      </a:accent2>
+      <a:accent3>
+        <a:srgbClr val="ED561B"/>
+      </a:accent3>
+      <a:accent4>
+        <a:srgbClr val="EDEF00"/>
+      </a:accent4>
+      <a:accent5>
+        <a:srgbClr val="24CBE5"/>
+      </a:accent5>
+      <a:accent6>
+        <a:srgbClr val="64E572"/>
+      </a:accent6>
+      <a:hlink>
+        <a:srgbClr val="2200CC"/>
+      </a:hlink>
+      <a:folHlink>
+        <a:srgbClr val="551A8B"/>
+      </a:folHlink>
+    </a:clrScheme>
+    <a:fontScheme name="Office">
+      <a:majorFont>
+        <a:latin typeface="Arial"/>
+        <a:ea typeface=""/>
+        <a:cs typeface=""/>
+        <a:font script="Jpan" typeface="ＭＳ Ｐゴシック"/>
+        <a:font script="Hang" typeface="맑은 고딕"/>
+        <a:font script="Hans" typeface="宋体"/>
+        <a:font script="Hant" typeface="新細明體"/>
+        <a:font script="Arab" typeface="Times New Roman"/>
+        <a:font script="Hebr" typeface="Times New Roman"/>
+        <a:font script="Thai" typeface="Angsana New"/>
+        <a:font script="Ethi" typeface="Nyala"/>
+        <a:font script="Beng" typeface="Vrinda"/>
+        <a:font script="Gujr" typeface="Shruti"/>
+        <a:font script="Khmr" typeface="MoolBoran"/>
+        <a:font script="Knda" typeface="Tunga"/>
+        <a:font script="Guru" typeface="Raavi"/>
+        <a:font script="Cans" typeface="Euphemia"/>
+        <a:font script="Cher" typeface="Plantagenet Cherokee"/>
+        <a:font script="Yiii" typeface="Microsoft Yi Baiti"/>
+        <a:font script="Tibt" typeface="Microsoft Himalaya"/>
+        <a:font script="Thaa" typeface="MV Boli"/>
+        <a:font script="Deva" typeface="Mangal"/>
+        <a:font script="Telu" typeface="Gautami"/>
+        <a:font script="Taml" typeface="Latha"/>
+        <a:font script="Syrc" typeface="Estrangelo Edessa"/>
+        <a:font script="Orya" typeface="Kalinga"/>
+        <a:font script="Mlym" typeface="Kartika"/>
+        <a:font script="Laoo" typeface="DokChampa"/>
+        <a:font script="Sinh" typeface="Iskoola Pota"/>
+        <a:font script="Mong" typeface="Mongolian Baiti"/>
+        <a:font script="Viet" typeface="Times New Roman"/>
+        <a:font script="Uigh" typeface="Microsoft Uighur"/>
+        <a:font script="Geor" typeface="Sylfaen"/>
+      </a:majorFont>
+      <a:minorFont>
+        <a:latin typeface="Arial"/>
+        <a:ea typeface=""/>
+        <a:cs typeface=""/>
+        <a:font script="Jpan" typeface="ＭＳ Ｐゴシック"/>
+        <a:font script="Hang" typeface="맑은 고딕"/>
+        <a:font script="Hans" typeface="宋体"/>
+        <a:font script="Hant" typeface="新細明體"/>
+        <a:font script="Arab" typeface="Arial"/>
+        <a:font script="Hebr" typeface="Arial"/>
+        <a:font script="Thai" typeface="Cordia New"/>
+        <a:font script="Ethi" typeface="Nyala"/>
+        <a:font script="Beng" typeface="Vrinda"/>
+        <a:font script="Gujr" typeface="Shruti"/>
+        <a:font script="Khmr" typeface="DaunPenh"/>
+        <a:font script="Knda" typeface="Tunga"/>
+        <a:font script="Guru" typeface="Raavi"/>
+        <a:font script="Cans" typeface="Euphemia"/>
+        <a:font script="Cher" typeface="Plantagenet Cherokee"/>
+        <a:font script="Yiii" typeface="Microsoft Yi Baiti"/>
+        <a:font script="Tibt" typeface="Microsoft Himalaya"/>
+        <a:font script="Thaa" typeface="MV Boli"/>
+        <a:font script="Deva" typeface="Mangal"/>
+        <a:font script="Telu" typeface="Gautami"/>
+        <a:font script="Taml" typeface="Latha"/>
+        <a:font script="Syrc" typeface="Estrangelo Edessa"/>
+        <a:font script="Orya" typeface="Kalinga"/>
+        <a:font script="Mlym" typeface="Kartika"/>
+        <a:font script="Laoo" typeface="DokChampa"/>
+        <a:font script="Sinh" typeface="Iskoola Pota"/>
+        <a:font script="Mong" typeface="Mongolian Baiti"/>
+        <a:font script="Viet" typeface="Arial"/>
+        <a:font script="Uigh" typeface="Microsoft Uighur"/>
+        <a:font script="Geor" typeface="Sylfaen"/>
+      </a:minorFont>
+    </a:fontScheme>
+    <a:fmtScheme name="Office">
+      <a:fillStyleLst>
+        <a:solidFill>
+          <a:schemeClr val="phClr"/>
+        </a:solidFill>
+        <a:gradFill rotWithShape="1">
+          <a:gsLst>
+            <a:gs pos="0">
+              <a:schemeClr val="phClr">
+                <a:tint val="50000"/>
+                <a:satMod val="300000"/>
+              </a:schemeClr>
+            </a:gs>
+            <a:gs pos="35000">
+              <a:schemeClr val="phClr">
+                <a:tint val="37000"/>
+                <a:satMod val="300000"/>
+              </a:schemeClr>
+            </a:gs>
+            <a:gs pos="100000">
+              <a:schemeClr val="phClr">
+                <a:tint val="15000"/>
+                <a:satMod val="350000"/>
+              </a:schemeClr>
+            </a:gs>
+          </a:gsLst>
+          <a:lin ang="16200000" scaled="1"/>
+        </a:gradFill>
+        <a:gradFill rotWithShape="1">
+          <a:gsLst>
+            <a:gs pos="0">
+              <a:schemeClr val="phClr">
+                <a:tint val="100000"/>
+                <a:shade val="100000"/>
+                <a:satMod val="130000"/>
+              </a:schemeClr>
+            </a:gs>
+            <a:gs pos="100000">
+              <a:schemeClr val="phClr">
+                <a:tint val="50000"/>
+                <a:shade val="100000"/>
+                <a:satMod val="350000"/>
+              </a:schemeClr>
+            </a:gs>
+          </a:gsLst>
+          <a:lin ang="16200000" scaled="0"/>
+        </a:gradFill>
+      </a:fillStyleLst>
+      <a:lnStyleLst>
+        <a:ln w="9525" cap="flat" cmpd="sng" algn="ctr">
+          <a:solidFill>
+            <a:schemeClr val="phClr">
+              <a:shade val="95000"/>
+              <a:satMod val="105000"/>
+            </a:schemeClr>
+          </a:solidFill>
+          <a:prstDash val="solid"/>
+        </a:ln>
+        <a:ln w="25400" cap="flat" cmpd="sng" algn="ctr">
+          <a:solidFill>
+            <a:schemeClr val="phClr"/>
+          </a:solidFill>
+          <a:prstDash val="solid"/>
+        </a:ln>
+        <a:ln w="38100" cap="flat" cmpd="sng" algn="ctr">
+          <a:solidFill>
+            <a:schemeClr val="phClr"/>
+          </a:solidFill>
+          <a:prstDash val="solid"/>
+        </a:ln>
+      </a:lnStyleLst>
+      <a:effectStyleLst>
+        <a:effectStyle>
+          <a:effectLst>
+            <a:outerShdw blurRad="40000" dist="20000" dir="5400000" rotWithShape="0">
+              <a:srgbClr val="000000">
+                <a:alpha val="38000"/>
+              </a:srgbClr>
+            </a:outerShdw>
+          </a:effectLst>
+        </a:effectStyle>
+        <a:effectStyle>
+          <a:effectLst>
+            <a:outerShdw blurRad="40000" dist="23000" dir="5400000" rotWithShape="0">
+              <a:srgbClr val="000000">
+                <a:alpha val="35000"/>
+              </a:srgbClr>
+            </a:outerShdw>
+          </a:effectLst>
+        </a:effectStyle>
+        <a:effectStyle>
+          <a:effectLst>
+            <a:outerShdw blurRad="40000" dist="23000" dir="5400000" rotWithShape="0">
+              <a:srgbClr val="000000">
+                <a:alpha val="35000"/>
+              </a:srgbClr>
+            </a:outerShdw>
+          </a:effectLst>
+          <a:scene3d>
+            <a:camera prst="orthographicFront">
+              <a:rot lat="0" lon="0" rev="0"/>
+            </a:camera>
+            <a:lightRig rig="threePt" dir="t">
+              <a:rot lat="0" lon="0" rev="1200000"/>
+            </a:lightRig>
+          </a:scene3d>
+          <a:sp3d>
+            <a:bevelT w="63500" h="25400"/>
+          </a:sp3d>
+        </a:effectStyle>
+      </a:effectStyleLst>
+      <a:bgFillStyleLst>
+        <a:solidFill>
+          <a:schemeClr val="phClr"/>
+        </a:solidFill>
+        <a:gradFill rotWithShape="1">
+          <a:gsLst>
+            <a:gs pos="0">
+              <a:schemeClr val="phClr">
+                <a:tint val="40000"/>
+                <a:satMod val="350000"/>
+              </a:schemeClr>
+            </a:gs>
+            <a:gs pos="40000">
+              <a:schemeClr val="phClr">
+                <a:tint val="45000"/>
+                <a:shade val="99000"/>
+                <a:satMod val="350000"/>
+              </a:schemeClr>
+            </a:gs>
+            <a:gs pos="100000">
+              <a:schemeClr val="phClr">
+                <a:shade val="20000"/>
+                <a:satMod val="255000"/>
+              </a:schemeClr>
+            </a:gs>
+          </a:gsLst>
+          <a:path path="circle">
+            <a:fillToRect l="50000" t="-80000" r="50000" b="180000"/>
+          </a:path>
+        </a:gradFill>
+        <a:gradFill rotWithShape="1">
+          <a:gsLst>
+            <a:gs pos="0">
+              <a:schemeClr val="phClr">
+                <a:tint val="80000"/>
+                <a:satMod val="300000"/>
+              </a:schemeClr>
+            </a:gs>
+            <a:gs pos="100000">
+              <a:schemeClr val="phClr">
+                <a:shade val="30000"/>
+                <a:satMod val="200000"/>
+              </a:schemeClr>
+            </a:gs>
+          </a:gsLst>
+          <a:path path="circle">
+            <a:fillToRect l="50000" t="50000" r="50000" b="50000"/>
+          </a:path>
+        </a:gradFill>
+      </a:bgFillStyleLst>
+    </a:fmtScheme>
+  </a:themeElements>
+</a:theme>
+</file>
+
+<file path=ppt/theme/theme3.xml><?xml version="1.0" encoding="utf-8"?>
 <a:theme xmlns:a="http://schemas.openxmlformats.org/drawingml/2006/main" xmlns:r="http://schemas.openxmlformats.org/officeDocument/2006/relationships" name="LF Energy Theme 2023">
   <a:themeElements>
     <a:clrScheme name="Geometric">
@@ -34557,283 +34836,4 @@
     </a:fmtScheme>
   </a:themeElements>
 </a:theme>
-</file>
-
-<file path=ppt/theme/theme3.xml><?xml version="1.0" encoding="utf-8"?>
-<a:theme xmlns:a="http://schemas.openxmlformats.org/drawingml/2006/main" xmlns:r="http://schemas.openxmlformats.org/officeDocument/2006/relationships">
-  <a:themeElements>
-    <a:clrScheme name="Default">
-      <a:dk1>
-        <a:srgbClr val="000000"/>
-      </a:dk1>
-      <a:lt1>
-        <a:srgbClr val="FFFFFF"/>
-      </a:lt1>
-      <a:dk2>
-        <a:srgbClr val="158158"/>
-      </a:dk2>
-      <a:lt2>
-        <a:srgbClr val="F3F3F3"/>
-      </a:lt2>
-      <a:accent1>
-        <a:srgbClr val="058DC7"/>
-      </a:accent1>
-      <a:accent2>
-        <a:srgbClr val="50B432"/>
-      </a:accent2>
-      <a:accent3>
-        <a:srgbClr val="ED561B"/>
-      </a:accent3>
-      <a:accent4>
-        <a:srgbClr val="EDEF00"/>
-      </a:accent4>
-      <a:accent5>
-        <a:srgbClr val="24CBE5"/>
-      </a:accent5>
-      <a:accent6>
-        <a:srgbClr val="64E572"/>
-      </a:accent6>
-      <a:hlink>
-        <a:srgbClr val="2200CC"/>
-      </a:hlink>
-      <a:folHlink>
-        <a:srgbClr val="551A8B"/>
-      </a:folHlink>
-    </a:clrScheme>
-    <a:fontScheme name="Office">
-      <a:majorFont>
-        <a:latin typeface="Arial"/>
-        <a:ea typeface=""/>
-        <a:cs typeface=""/>
-        <a:font script="Jpan" typeface="ＭＳ Ｐゴシック"/>
-        <a:font script="Hang" typeface="맑은 고딕"/>
-        <a:font script="Hans" typeface="宋体"/>
-        <a:font script="Hant" typeface="新細明體"/>
-        <a:font script="Arab" typeface="Times New Roman"/>
-        <a:font script="Hebr" typeface="Times New Roman"/>
-        <a:font script="Thai" typeface="Angsana New"/>
-        <a:font script="Ethi" typeface="Nyala"/>
-        <a:font script="Beng" typeface="Vrinda"/>
-        <a:font script="Gujr" typeface="Shruti"/>
-        <a:font script="Khmr" typeface="MoolBoran"/>
-        <a:font script="Knda" typeface="Tunga"/>
-        <a:font script="Guru" typeface="Raavi"/>
-        <a:font script="Cans" typeface="Euphemia"/>
-        <a:font script="Cher" typeface="Plantagenet Cherokee"/>
-        <a:font script="Yiii" typeface="Microsoft Yi Baiti"/>
-        <a:font script="Tibt" typeface="Microsoft Himalaya"/>
-        <a:font script="Thaa" typeface="MV Boli"/>
-        <a:font script="Deva" typeface="Mangal"/>
-        <a:font script="Telu" typeface="Gautami"/>
-        <a:font script="Taml" typeface="Latha"/>
-        <a:font script="Syrc" typeface="Estrangelo Edessa"/>
-        <a:font script="Orya" typeface="Kalinga"/>
-        <a:font script="Mlym" typeface="Kartika"/>
-        <a:font script="Laoo" typeface="DokChampa"/>
-        <a:font script="Sinh" typeface="Iskoola Pota"/>
-        <a:font script="Mong" typeface="Mongolian Baiti"/>
-        <a:font script="Viet" typeface="Times New Roman"/>
-        <a:font script="Uigh" typeface="Microsoft Uighur"/>
-        <a:font script="Geor" typeface="Sylfaen"/>
-      </a:majorFont>
-      <a:minorFont>
-        <a:latin typeface="Arial"/>
-        <a:ea typeface=""/>
-        <a:cs typeface=""/>
-        <a:font script="Jpan" typeface="ＭＳ Ｐゴシック"/>
-        <a:font script="Hang" typeface="맑은 고딕"/>
-        <a:font script="Hans" typeface="宋体"/>
-        <a:font script="Hant" typeface="新細明體"/>
-        <a:font script="Arab" typeface="Arial"/>
-        <a:font script="Hebr" typeface="Arial"/>
-        <a:font script="Thai" typeface="Cordia New"/>
-        <a:font script="Ethi" typeface="Nyala"/>
-        <a:font script="Beng" typeface="Vrinda"/>
-        <a:font script="Gujr" typeface="Shruti"/>
-        <a:font script="Khmr" typeface="DaunPenh"/>
-        <a:font script="Knda" typeface="Tunga"/>
-        <a:font script="Guru" typeface="Raavi"/>
-        <a:font script="Cans" typeface="Euphemia"/>
-        <a:font script="Cher" typeface="Plantagenet Cherokee"/>
-        <a:font script="Yiii" typeface="Microsoft Yi Baiti"/>
-        <a:font script="Tibt" typeface="Microsoft Himalaya"/>
-        <a:font script="Thaa" typeface="MV Boli"/>
-        <a:font script="Deva" typeface="Mangal"/>
-        <a:font script="Telu" typeface="Gautami"/>
-        <a:font script="Taml" typeface="Latha"/>
-        <a:font script="Syrc" typeface="Estrangelo Edessa"/>
-        <a:font script="Orya" typeface="Kalinga"/>
-        <a:font script="Mlym" typeface="Kartika"/>
-        <a:font script="Laoo" typeface="DokChampa"/>
-        <a:font script="Sinh" typeface="Iskoola Pota"/>
-        <a:font script="Mong" typeface="Mongolian Baiti"/>
-        <a:font script="Viet" typeface="Arial"/>
-        <a:font script="Uigh" typeface="Microsoft Uighur"/>
-        <a:font script="Geor" typeface="Sylfaen"/>
-      </a:minorFont>
-    </a:fontScheme>
-    <a:fmtScheme name="Office">
-      <a:fillStyleLst>
-        <a:solidFill>
-          <a:schemeClr val="phClr"/>
-        </a:solidFill>
-        <a:gradFill rotWithShape="1">
-          <a:gsLst>
-            <a:gs pos="0">
-              <a:schemeClr val="phClr">
-                <a:tint val="50000"/>
-                <a:satMod val="300000"/>
-              </a:schemeClr>
-            </a:gs>
-            <a:gs pos="35000">
-              <a:schemeClr val="phClr">
-                <a:tint val="37000"/>
-                <a:satMod val="300000"/>
-              </a:schemeClr>
-            </a:gs>
-            <a:gs pos="100000">
-              <a:schemeClr val="phClr">
-                <a:tint val="15000"/>
-                <a:satMod val="350000"/>
-              </a:schemeClr>
-            </a:gs>
-          </a:gsLst>
-          <a:lin ang="16200000" scaled="1"/>
-        </a:gradFill>
-        <a:gradFill rotWithShape="1">
-          <a:gsLst>
-            <a:gs pos="0">
-              <a:schemeClr val="phClr">
-                <a:tint val="100000"/>
-                <a:shade val="100000"/>
-                <a:satMod val="130000"/>
-              </a:schemeClr>
-            </a:gs>
-            <a:gs pos="100000">
-              <a:schemeClr val="phClr">
-                <a:tint val="50000"/>
-                <a:shade val="100000"/>
-                <a:satMod val="350000"/>
-              </a:schemeClr>
-            </a:gs>
-          </a:gsLst>
-          <a:lin ang="16200000" scaled="0"/>
-        </a:gradFill>
-      </a:fillStyleLst>
-      <a:lnStyleLst>
-        <a:ln w="9525" cap="flat" cmpd="sng" algn="ctr">
-          <a:solidFill>
-            <a:schemeClr val="phClr">
-              <a:shade val="95000"/>
-              <a:satMod val="105000"/>
-            </a:schemeClr>
-          </a:solidFill>
-          <a:prstDash val="solid"/>
-        </a:ln>
-        <a:ln w="25400" cap="flat" cmpd="sng" algn="ctr">
-          <a:solidFill>
-            <a:schemeClr val="phClr"/>
-          </a:solidFill>
-          <a:prstDash val="solid"/>
-        </a:ln>
-        <a:ln w="38100" cap="flat" cmpd="sng" algn="ctr">
-          <a:solidFill>
-            <a:schemeClr val="phClr"/>
-          </a:solidFill>
-          <a:prstDash val="solid"/>
-        </a:ln>
-      </a:lnStyleLst>
-      <a:effectStyleLst>
-        <a:effectStyle>
-          <a:effectLst>
-            <a:outerShdw blurRad="40000" dist="20000" dir="5400000" rotWithShape="0">
-              <a:srgbClr val="000000">
-                <a:alpha val="38000"/>
-              </a:srgbClr>
-            </a:outerShdw>
-          </a:effectLst>
-        </a:effectStyle>
-        <a:effectStyle>
-          <a:effectLst>
-            <a:outerShdw blurRad="40000" dist="23000" dir="5400000" rotWithShape="0">
-              <a:srgbClr val="000000">
-                <a:alpha val="35000"/>
-              </a:srgbClr>
-            </a:outerShdw>
-          </a:effectLst>
-        </a:effectStyle>
-        <a:effectStyle>
-          <a:effectLst>
-            <a:outerShdw blurRad="40000" dist="23000" dir="5400000" rotWithShape="0">
-              <a:srgbClr val="000000">
-                <a:alpha val="35000"/>
-              </a:srgbClr>
-            </a:outerShdw>
-          </a:effectLst>
-          <a:scene3d>
-            <a:camera prst="orthographicFront">
-              <a:rot lat="0" lon="0" rev="0"/>
-            </a:camera>
-            <a:lightRig rig="threePt" dir="t">
-              <a:rot lat="0" lon="0" rev="1200000"/>
-            </a:lightRig>
-          </a:scene3d>
-          <a:sp3d>
-            <a:bevelT w="63500" h="25400"/>
-          </a:sp3d>
-        </a:effectStyle>
-      </a:effectStyleLst>
-      <a:bgFillStyleLst>
-        <a:solidFill>
-          <a:schemeClr val="phClr"/>
-        </a:solidFill>
-        <a:gradFill rotWithShape="1">
-          <a:gsLst>
-            <a:gs pos="0">
-              <a:schemeClr val="phClr">
-                <a:tint val="40000"/>
-                <a:satMod val="350000"/>
-              </a:schemeClr>
-            </a:gs>
-            <a:gs pos="40000">
-              <a:schemeClr val="phClr">
-                <a:tint val="45000"/>
-                <a:shade val="99000"/>
-                <a:satMod val="350000"/>
-              </a:schemeClr>
-            </a:gs>
-            <a:gs pos="100000">
-              <a:schemeClr val="phClr">
-                <a:shade val="20000"/>
-                <a:satMod val="255000"/>
-              </a:schemeClr>
-            </a:gs>
-          </a:gsLst>
-          <a:path path="circle">
-            <a:fillToRect l="50000" t="-80000" r="50000" b="180000"/>
-          </a:path>
-        </a:gradFill>
-        <a:gradFill rotWithShape="1">
-          <a:gsLst>
-            <a:gs pos="0">
-              <a:schemeClr val="phClr">
-                <a:tint val="80000"/>
-                <a:satMod val="300000"/>
-              </a:schemeClr>
-            </a:gs>
-            <a:gs pos="100000">
-              <a:schemeClr val="phClr">
-                <a:shade val="30000"/>
-                <a:satMod val="200000"/>
-              </a:schemeClr>
-            </a:gs>
-          </a:gsLst>
-          <a:path path="circle">
-            <a:fillToRect l="50000" t="50000" r="50000" b="50000"/>
-          </a:path>
-        </a:gradFill>
-      </a:bgFillStyleLst>
-    </a:fmtScheme>
-  </a:themeElements>
-</a:theme>
 </file>
</xml_diff>

<commit_message>
Update Data Sources from LFX 2026-02-24 (#98)
Update Data Sources from LFX

Signed-off-by: github-actions[bot] <41898282+github-actions[bot]@users.noreply.github.com>
</commit_message>
<xml_diff>
--- a/overview_deck/LF Energy High Level Overview.pptx
+++ b/overview_deck/LF Energy High Level Overview.pptx
@@ -25946,7 +25946,7 @@
             <a:tbl>
               <a:tblPr>
                 <a:noFill/>
-                <a:tableStyleId>{928D4016-75EB-4100-83A0-C58B1C6B50E9}</a:tableStyleId>
+                <a:tableStyleId>{2148295F-C88A-4D38-9292-040BEF2578C8}</a:tableStyleId>
               </a:tblPr>
               <a:tblGrid>
                 <a:gridCol w="1695200"/>
@@ -26736,7 +26736,7 @@
             <a:tbl>
               <a:tblPr>
                 <a:noFill/>
-                <a:tableStyleId>{928D4016-75EB-4100-83A0-C58B1C6B50E9}</a:tableStyleId>
+                <a:tableStyleId>{2148295F-C88A-4D38-9292-040BEF2578C8}</a:tableStyleId>
               </a:tblPr>
               <a:tblGrid>
                 <a:gridCol w="1695200"/>
@@ -27426,7 +27426,7 @@
             <a:tbl>
               <a:tblPr>
                 <a:noFill/>
-                <a:tableStyleId>{928D4016-75EB-4100-83A0-C58B1C6B50E9}</a:tableStyleId>
+                <a:tableStyleId>{2148295F-C88A-4D38-9292-040BEF2578C8}</a:tableStyleId>
               </a:tblPr>
               <a:tblGrid>
                 <a:gridCol w="1695200"/>
@@ -28678,7 +28678,7 @@
             <a:tbl>
               <a:tblPr>
                 <a:noFill/>
-                <a:tableStyleId>{928D4016-75EB-4100-83A0-C58B1C6B50E9}</a:tableStyleId>
+                <a:tableStyleId>{2148295F-C88A-4D38-9292-040BEF2578C8}</a:tableStyleId>
               </a:tblPr>
               <a:tblGrid>
                 <a:gridCol w="1695200"/>
@@ -29670,7 +29670,7 @@
             <a:tbl>
               <a:tblPr>
                 <a:noFill/>
-                <a:tableStyleId>{928D4016-75EB-4100-83A0-C58B1C6B50E9}</a:tableStyleId>
+                <a:tableStyleId>{2148295F-C88A-4D38-9292-040BEF2578C8}</a:tableStyleId>
               </a:tblPr>
               <a:tblGrid>
                 <a:gridCol w="3048000"/>
@@ -33175,7 +33175,7 @@
             <a:tbl>
               <a:tblPr>
                 <a:noFill/>
-                <a:tableStyleId>{928D4016-75EB-4100-83A0-C58B1C6B50E9}</a:tableStyleId>
+                <a:tableStyleId>{2148295F-C88A-4D38-9292-040BEF2578C8}</a:tableStyleId>
               </a:tblPr>
               <a:tblGrid>
                 <a:gridCol w="1828800"/>
@@ -34002,285 +34002,6 @@
 </file>
 
 <file path=ppt/theme/theme1.xml><?xml version="1.0" encoding="utf-8"?>
-<a:theme xmlns:a="http://schemas.openxmlformats.org/drawingml/2006/main" xmlns:r="http://schemas.openxmlformats.org/officeDocument/2006/relationships" name="Simple Light">
-  <a:themeElements>
-    <a:clrScheme name="Simple Light">
-      <a:dk1>
-        <a:srgbClr val="000000"/>
-      </a:dk1>
-      <a:lt1>
-        <a:srgbClr val="FFFFFF"/>
-      </a:lt1>
-      <a:dk2>
-        <a:srgbClr val="595959"/>
-      </a:dk2>
-      <a:lt2>
-        <a:srgbClr val="EEEEEE"/>
-      </a:lt2>
-      <a:accent1>
-        <a:srgbClr val="4285F4"/>
-      </a:accent1>
-      <a:accent2>
-        <a:srgbClr val="212121"/>
-      </a:accent2>
-      <a:accent3>
-        <a:srgbClr val="78909C"/>
-      </a:accent3>
-      <a:accent4>
-        <a:srgbClr val="FFAB40"/>
-      </a:accent4>
-      <a:accent5>
-        <a:srgbClr val="0097A7"/>
-      </a:accent5>
-      <a:accent6>
-        <a:srgbClr val="EEFF41"/>
-      </a:accent6>
-      <a:hlink>
-        <a:srgbClr val="0097A7"/>
-      </a:hlink>
-      <a:folHlink>
-        <a:srgbClr val="0097A7"/>
-      </a:folHlink>
-    </a:clrScheme>
-    <a:fontScheme name="Office">
-      <a:majorFont>
-        <a:latin typeface="Arial"/>
-        <a:ea typeface=""/>
-        <a:cs typeface=""/>
-        <a:font script="Jpan" typeface="ＭＳ Ｐゴシック"/>
-        <a:font script="Hang" typeface="맑은 고딕"/>
-        <a:font script="Hans" typeface="宋体"/>
-        <a:font script="Hant" typeface="新細明體"/>
-        <a:font script="Arab" typeface="Times New Roman"/>
-        <a:font script="Hebr" typeface="Times New Roman"/>
-        <a:font script="Thai" typeface="Angsana New"/>
-        <a:font script="Ethi" typeface="Nyala"/>
-        <a:font script="Beng" typeface="Vrinda"/>
-        <a:font script="Gujr" typeface="Shruti"/>
-        <a:font script="Khmr" typeface="MoolBoran"/>
-        <a:font script="Knda" typeface="Tunga"/>
-        <a:font script="Guru" typeface="Raavi"/>
-        <a:font script="Cans" typeface="Euphemia"/>
-        <a:font script="Cher" typeface="Plantagenet Cherokee"/>
-        <a:font script="Yiii" typeface="Microsoft Yi Baiti"/>
-        <a:font script="Tibt" typeface="Microsoft Himalaya"/>
-        <a:font script="Thaa" typeface="MV Boli"/>
-        <a:font script="Deva" typeface="Mangal"/>
-        <a:font script="Telu" typeface="Gautami"/>
-        <a:font script="Taml" typeface="Latha"/>
-        <a:font script="Syrc" typeface="Estrangelo Edessa"/>
-        <a:font script="Orya" typeface="Kalinga"/>
-        <a:font script="Mlym" typeface="Kartika"/>
-        <a:font script="Laoo" typeface="DokChampa"/>
-        <a:font script="Sinh" typeface="Iskoola Pota"/>
-        <a:font script="Mong" typeface="Mongolian Baiti"/>
-        <a:font script="Viet" typeface="Times New Roman"/>
-        <a:font script="Uigh" typeface="Microsoft Uighur"/>
-        <a:font script="Geor" typeface="Sylfaen"/>
-      </a:majorFont>
-      <a:minorFont>
-        <a:latin typeface="Arial"/>
-        <a:ea typeface=""/>
-        <a:cs typeface=""/>
-        <a:font script="Jpan" typeface="ＭＳ Ｐゴシック"/>
-        <a:font script="Hang" typeface="맑은 고딕"/>
-        <a:font script="Hans" typeface="宋体"/>
-        <a:font script="Hant" typeface="新細明體"/>
-        <a:font script="Arab" typeface="Arial"/>
-        <a:font script="Hebr" typeface="Arial"/>
-        <a:font script="Thai" typeface="Cordia New"/>
-        <a:font script="Ethi" typeface="Nyala"/>
-        <a:font script="Beng" typeface="Vrinda"/>
-        <a:font script="Gujr" typeface="Shruti"/>
-        <a:font script="Khmr" typeface="DaunPenh"/>
-        <a:font script="Knda" typeface="Tunga"/>
-        <a:font script="Guru" typeface="Raavi"/>
-        <a:font script="Cans" typeface="Euphemia"/>
-        <a:font script="Cher" typeface="Plantagenet Cherokee"/>
-        <a:font script="Yiii" typeface="Microsoft Yi Baiti"/>
-        <a:font script="Tibt" typeface="Microsoft Himalaya"/>
-        <a:font script="Thaa" typeface="MV Boli"/>
-        <a:font script="Deva" typeface="Mangal"/>
-        <a:font script="Telu" typeface="Gautami"/>
-        <a:font script="Taml" typeface="Latha"/>
-        <a:font script="Syrc" typeface="Estrangelo Edessa"/>
-        <a:font script="Orya" typeface="Kalinga"/>
-        <a:font script="Mlym" typeface="Kartika"/>
-        <a:font script="Laoo" typeface="DokChampa"/>
-        <a:font script="Sinh" typeface="Iskoola Pota"/>
-        <a:font script="Mong" typeface="Mongolian Baiti"/>
-        <a:font script="Viet" typeface="Arial"/>
-        <a:font script="Uigh" typeface="Microsoft Uighur"/>
-        <a:font script="Geor" typeface="Sylfaen"/>
-      </a:minorFont>
-    </a:fontScheme>
-    <a:fmtScheme name="Office">
-      <a:fillStyleLst>
-        <a:solidFill>
-          <a:schemeClr val="phClr"/>
-        </a:solidFill>
-        <a:gradFill rotWithShape="1">
-          <a:gsLst>
-            <a:gs pos="0">
-              <a:schemeClr val="phClr">
-                <a:tint val="50000"/>
-                <a:satMod val="300000"/>
-              </a:schemeClr>
-            </a:gs>
-            <a:gs pos="35000">
-              <a:schemeClr val="phClr">
-                <a:tint val="37000"/>
-                <a:satMod val="300000"/>
-              </a:schemeClr>
-            </a:gs>
-            <a:gs pos="100000">
-              <a:schemeClr val="phClr">
-                <a:tint val="15000"/>
-                <a:satMod val="350000"/>
-              </a:schemeClr>
-            </a:gs>
-          </a:gsLst>
-          <a:lin ang="16200000" scaled="1"/>
-        </a:gradFill>
-        <a:gradFill rotWithShape="1">
-          <a:gsLst>
-            <a:gs pos="0">
-              <a:schemeClr val="phClr">
-                <a:tint val="100000"/>
-                <a:shade val="100000"/>
-                <a:satMod val="130000"/>
-              </a:schemeClr>
-            </a:gs>
-            <a:gs pos="100000">
-              <a:schemeClr val="phClr">
-                <a:tint val="50000"/>
-                <a:shade val="100000"/>
-                <a:satMod val="350000"/>
-              </a:schemeClr>
-            </a:gs>
-          </a:gsLst>
-          <a:lin ang="16200000" scaled="0"/>
-        </a:gradFill>
-      </a:fillStyleLst>
-      <a:lnStyleLst>
-        <a:ln w="9525" cap="flat" cmpd="sng" algn="ctr">
-          <a:solidFill>
-            <a:schemeClr val="phClr">
-              <a:shade val="95000"/>
-              <a:satMod val="105000"/>
-            </a:schemeClr>
-          </a:solidFill>
-          <a:prstDash val="solid"/>
-        </a:ln>
-        <a:ln w="25400" cap="flat" cmpd="sng" algn="ctr">
-          <a:solidFill>
-            <a:schemeClr val="phClr"/>
-          </a:solidFill>
-          <a:prstDash val="solid"/>
-        </a:ln>
-        <a:ln w="38100" cap="flat" cmpd="sng" algn="ctr">
-          <a:solidFill>
-            <a:schemeClr val="phClr"/>
-          </a:solidFill>
-          <a:prstDash val="solid"/>
-        </a:ln>
-      </a:lnStyleLst>
-      <a:effectStyleLst>
-        <a:effectStyle>
-          <a:effectLst>
-            <a:outerShdw blurRad="40000" dist="20000" dir="5400000" rotWithShape="0">
-              <a:srgbClr val="000000">
-                <a:alpha val="38000"/>
-              </a:srgbClr>
-            </a:outerShdw>
-          </a:effectLst>
-        </a:effectStyle>
-        <a:effectStyle>
-          <a:effectLst>
-            <a:outerShdw blurRad="40000" dist="23000" dir="5400000" rotWithShape="0">
-              <a:srgbClr val="000000">
-                <a:alpha val="35000"/>
-              </a:srgbClr>
-            </a:outerShdw>
-          </a:effectLst>
-        </a:effectStyle>
-        <a:effectStyle>
-          <a:effectLst>
-            <a:outerShdw blurRad="40000" dist="23000" dir="5400000" rotWithShape="0">
-              <a:srgbClr val="000000">
-                <a:alpha val="35000"/>
-              </a:srgbClr>
-            </a:outerShdw>
-          </a:effectLst>
-          <a:scene3d>
-            <a:camera prst="orthographicFront">
-              <a:rot lat="0" lon="0" rev="0"/>
-            </a:camera>
-            <a:lightRig rig="threePt" dir="t">
-              <a:rot lat="0" lon="0" rev="1200000"/>
-            </a:lightRig>
-          </a:scene3d>
-          <a:sp3d>
-            <a:bevelT w="63500" h="25400"/>
-          </a:sp3d>
-        </a:effectStyle>
-      </a:effectStyleLst>
-      <a:bgFillStyleLst>
-        <a:solidFill>
-          <a:schemeClr val="phClr"/>
-        </a:solidFill>
-        <a:gradFill rotWithShape="1">
-          <a:gsLst>
-            <a:gs pos="0">
-              <a:schemeClr val="phClr">
-                <a:tint val="40000"/>
-                <a:satMod val="350000"/>
-              </a:schemeClr>
-            </a:gs>
-            <a:gs pos="40000">
-              <a:schemeClr val="phClr">
-                <a:tint val="45000"/>
-                <a:shade val="99000"/>
-                <a:satMod val="350000"/>
-              </a:schemeClr>
-            </a:gs>
-            <a:gs pos="100000">
-              <a:schemeClr val="phClr">
-                <a:shade val="20000"/>
-                <a:satMod val="255000"/>
-              </a:schemeClr>
-            </a:gs>
-          </a:gsLst>
-          <a:path path="circle">
-            <a:fillToRect l="50000" t="-80000" r="50000" b="180000"/>
-          </a:path>
-        </a:gradFill>
-        <a:gradFill rotWithShape="1">
-          <a:gsLst>
-            <a:gs pos="0">
-              <a:schemeClr val="phClr">
-                <a:tint val="80000"/>
-                <a:satMod val="300000"/>
-              </a:schemeClr>
-            </a:gs>
-            <a:gs pos="100000">
-              <a:schemeClr val="phClr">
-                <a:shade val="30000"/>
-                <a:satMod val="200000"/>
-              </a:schemeClr>
-            </a:gs>
-          </a:gsLst>
-          <a:path path="circle">
-            <a:fillToRect l="50000" t="50000" r="50000" b="50000"/>
-          </a:path>
-        </a:gradFill>
-      </a:bgFillStyleLst>
-    </a:fmtScheme>
-  </a:themeElements>
-</a:theme>
-</file>
-
-<file path=ppt/theme/theme2.xml><?xml version="1.0" encoding="utf-8"?>
 <a:theme xmlns:a="http://schemas.openxmlformats.org/drawingml/2006/main" xmlns:r="http://schemas.openxmlformats.org/officeDocument/2006/relationships">
   <a:themeElements>
     <a:clrScheme name="Default">
@@ -34559,7 +34280,7 @@
 </a:theme>
 </file>
 
-<file path=ppt/theme/theme3.xml><?xml version="1.0" encoding="utf-8"?>
+<file path=ppt/theme/theme2.xml><?xml version="1.0" encoding="utf-8"?>
 <a:theme xmlns:a="http://schemas.openxmlformats.org/drawingml/2006/main" xmlns:r="http://schemas.openxmlformats.org/officeDocument/2006/relationships" name="LF Energy Theme 2023">
   <a:themeElements>
     <a:clrScheme name="Geometric">
@@ -34836,4 +34557,283 @@
     </a:fmtScheme>
   </a:themeElements>
 </a:theme>
+</file>
+
+<file path=ppt/theme/theme3.xml><?xml version="1.0" encoding="utf-8"?>
+<a:theme xmlns:a="http://schemas.openxmlformats.org/drawingml/2006/main" xmlns:r="http://schemas.openxmlformats.org/officeDocument/2006/relationships" name="Simple Light">
+  <a:themeElements>
+    <a:clrScheme name="Simple Light">
+      <a:dk1>
+        <a:srgbClr val="000000"/>
+      </a:dk1>
+      <a:lt1>
+        <a:srgbClr val="FFFFFF"/>
+      </a:lt1>
+      <a:dk2>
+        <a:srgbClr val="595959"/>
+      </a:dk2>
+      <a:lt2>
+        <a:srgbClr val="EEEEEE"/>
+      </a:lt2>
+      <a:accent1>
+        <a:srgbClr val="4285F4"/>
+      </a:accent1>
+      <a:accent2>
+        <a:srgbClr val="212121"/>
+      </a:accent2>
+      <a:accent3>
+        <a:srgbClr val="78909C"/>
+      </a:accent3>
+      <a:accent4>
+        <a:srgbClr val="FFAB40"/>
+      </a:accent4>
+      <a:accent5>
+        <a:srgbClr val="0097A7"/>
+      </a:accent5>
+      <a:accent6>
+        <a:srgbClr val="EEFF41"/>
+      </a:accent6>
+      <a:hlink>
+        <a:srgbClr val="0097A7"/>
+      </a:hlink>
+      <a:folHlink>
+        <a:srgbClr val="0097A7"/>
+      </a:folHlink>
+    </a:clrScheme>
+    <a:fontScheme name="Office">
+      <a:majorFont>
+        <a:latin typeface="Arial"/>
+        <a:ea typeface=""/>
+        <a:cs typeface=""/>
+        <a:font script="Jpan" typeface="ＭＳ Ｐゴシック"/>
+        <a:font script="Hang" typeface="맑은 고딕"/>
+        <a:font script="Hans" typeface="宋体"/>
+        <a:font script="Hant" typeface="新細明體"/>
+        <a:font script="Arab" typeface="Times New Roman"/>
+        <a:font script="Hebr" typeface="Times New Roman"/>
+        <a:font script="Thai" typeface="Angsana New"/>
+        <a:font script="Ethi" typeface="Nyala"/>
+        <a:font script="Beng" typeface="Vrinda"/>
+        <a:font script="Gujr" typeface="Shruti"/>
+        <a:font script="Khmr" typeface="MoolBoran"/>
+        <a:font script="Knda" typeface="Tunga"/>
+        <a:font script="Guru" typeface="Raavi"/>
+        <a:font script="Cans" typeface="Euphemia"/>
+        <a:font script="Cher" typeface="Plantagenet Cherokee"/>
+        <a:font script="Yiii" typeface="Microsoft Yi Baiti"/>
+        <a:font script="Tibt" typeface="Microsoft Himalaya"/>
+        <a:font script="Thaa" typeface="MV Boli"/>
+        <a:font script="Deva" typeface="Mangal"/>
+        <a:font script="Telu" typeface="Gautami"/>
+        <a:font script="Taml" typeface="Latha"/>
+        <a:font script="Syrc" typeface="Estrangelo Edessa"/>
+        <a:font script="Orya" typeface="Kalinga"/>
+        <a:font script="Mlym" typeface="Kartika"/>
+        <a:font script="Laoo" typeface="DokChampa"/>
+        <a:font script="Sinh" typeface="Iskoola Pota"/>
+        <a:font script="Mong" typeface="Mongolian Baiti"/>
+        <a:font script="Viet" typeface="Times New Roman"/>
+        <a:font script="Uigh" typeface="Microsoft Uighur"/>
+        <a:font script="Geor" typeface="Sylfaen"/>
+      </a:majorFont>
+      <a:minorFont>
+        <a:latin typeface="Arial"/>
+        <a:ea typeface=""/>
+        <a:cs typeface=""/>
+        <a:font script="Jpan" typeface="ＭＳ Ｐゴシック"/>
+        <a:font script="Hang" typeface="맑은 고딕"/>
+        <a:font script="Hans" typeface="宋体"/>
+        <a:font script="Hant" typeface="新細明體"/>
+        <a:font script="Arab" typeface="Arial"/>
+        <a:font script="Hebr" typeface="Arial"/>
+        <a:font script="Thai" typeface="Cordia New"/>
+        <a:font script="Ethi" typeface="Nyala"/>
+        <a:font script="Beng" typeface="Vrinda"/>
+        <a:font script="Gujr" typeface="Shruti"/>
+        <a:font script="Khmr" typeface="DaunPenh"/>
+        <a:font script="Knda" typeface="Tunga"/>
+        <a:font script="Guru" typeface="Raavi"/>
+        <a:font script="Cans" typeface="Euphemia"/>
+        <a:font script="Cher" typeface="Plantagenet Cherokee"/>
+        <a:font script="Yiii" typeface="Microsoft Yi Baiti"/>
+        <a:font script="Tibt" typeface="Microsoft Himalaya"/>
+        <a:font script="Thaa" typeface="MV Boli"/>
+        <a:font script="Deva" typeface="Mangal"/>
+        <a:font script="Telu" typeface="Gautami"/>
+        <a:font script="Taml" typeface="Latha"/>
+        <a:font script="Syrc" typeface="Estrangelo Edessa"/>
+        <a:font script="Orya" typeface="Kalinga"/>
+        <a:font script="Mlym" typeface="Kartika"/>
+        <a:font script="Laoo" typeface="DokChampa"/>
+        <a:font script="Sinh" typeface="Iskoola Pota"/>
+        <a:font script="Mong" typeface="Mongolian Baiti"/>
+        <a:font script="Viet" typeface="Arial"/>
+        <a:font script="Uigh" typeface="Microsoft Uighur"/>
+        <a:font script="Geor" typeface="Sylfaen"/>
+      </a:minorFont>
+    </a:fontScheme>
+    <a:fmtScheme name="Office">
+      <a:fillStyleLst>
+        <a:solidFill>
+          <a:schemeClr val="phClr"/>
+        </a:solidFill>
+        <a:gradFill rotWithShape="1">
+          <a:gsLst>
+            <a:gs pos="0">
+              <a:schemeClr val="phClr">
+                <a:tint val="50000"/>
+                <a:satMod val="300000"/>
+              </a:schemeClr>
+            </a:gs>
+            <a:gs pos="35000">
+              <a:schemeClr val="phClr">
+                <a:tint val="37000"/>
+                <a:satMod val="300000"/>
+              </a:schemeClr>
+            </a:gs>
+            <a:gs pos="100000">
+              <a:schemeClr val="phClr">
+                <a:tint val="15000"/>
+                <a:satMod val="350000"/>
+              </a:schemeClr>
+            </a:gs>
+          </a:gsLst>
+          <a:lin ang="16200000" scaled="1"/>
+        </a:gradFill>
+        <a:gradFill rotWithShape="1">
+          <a:gsLst>
+            <a:gs pos="0">
+              <a:schemeClr val="phClr">
+                <a:tint val="100000"/>
+                <a:shade val="100000"/>
+                <a:satMod val="130000"/>
+              </a:schemeClr>
+            </a:gs>
+            <a:gs pos="100000">
+              <a:schemeClr val="phClr">
+                <a:tint val="50000"/>
+                <a:shade val="100000"/>
+                <a:satMod val="350000"/>
+              </a:schemeClr>
+            </a:gs>
+          </a:gsLst>
+          <a:lin ang="16200000" scaled="0"/>
+        </a:gradFill>
+      </a:fillStyleLst>
+      <a:lnStyleLst>
+        <a:ln w="9525" cap="flat" cmpd="sng" algn="ctr">
+          <a:solidFill>
+            <a:schemeClr val="phClr">
+              <a:shade val="95000"/>
+              <a:satMod val="105000"/>
+            </a:schemeClr>
+          </a:solidFill>
+          <a:prstDash val="solid"/>
+        </a:ln>
+        <a:ln w="25400" cap="flat" cmpd="sng" algn="ctr">
+          <a:solidFill>
+            <a:schemeClr val="phClr"/>
+          </a:solidFill>
+          <a:prstDash val="solid"/>
+        </a:ln>
+        <a:ln w="38100" cap="flat" cmpd="sng" algn="ctr">
+          <a:solidFill>
+            <a:schemeClr val="phClr"/>
+          </a:solidFill>
+          <a:prstDash val="solid"/>
+        </a:ln>
+      </a:lnStyleLst>
+      <a:effectStyleLst>
+        <a:effectStyle>
+          <a:effectLst>
+            <a:outerShdw blurRad="40000" dist="20000" dir="5400000" rotWithShape="0">
+              <a:srgbClr val="000000">
+                <a:alpha val="38000"/>
+              </a:srgbClr>
+            </a:outerShdw>
+          </a:effectLst>
+        </a:effectStyle>
+        <a:effectStyle>
+          <a:effectLst>
+            <a:outerShdw blurRad="40000" dist="23000" dir="5400000" rotWithShape="0">
+              <a:srgbClr val="000000">
+                <a:alpha val="35000"/>
+              </a:srgbClr>
+            </a:outerShdw>
+          </a:effectLst>
+        </a:effectStyle>
+        <a:effectStyle>
+          <a:effectLst>
+            <a:outerShdw blurRad="40000" dist="23000" dir="5400000" rotWithShape="0">
+              <a:srgbClr val="000000">
+                <a:alpha val="35000"/>
+              </a:srgbClr>
+            </a:outerShdw>
+          </a:effectLst>
+          <a:scene3d>
+            <a:camera prst="orthographicFront">
+              <a:rot lat="0" lon="0" rev="0"/>
+            </a:camera>
+            <a:lightRig rig="threePt" dir="t">
+              <a:rot lat="0" lon="0" rev="1200000"/>
+            </a:lightRig>
+          </a:scene3d>
+          <a:sp3d>
+            <a:bevelT w="63500" h="25400"/>
+          </a:sp3d>
+        </a:effectStyle>
+      </a:effectStyleLst>
+      <a:bgFillStyleLst>
+        <a:solidFill>
+          <a:schemeClr val="phClr"/>
+        </a:solidFill>
+        <a:gradFill rotWithShape="1">
+          <a:gsLst>
+            <a:gs pos="0">
+              <a:schemeClr val="phClr">
+                <a:tint val="40000"/>
+                <a:satMod val="350000"/>
+              </a:schemeClr>
+            </a:gs>
+            <a:gs pos="40000">
+              <a:schemeClr val="phClr">
+                <a:tint val="45000"/>
+                <a:shade val="99000"/>
+                <a:satMod val="350000"/>
+              </a:schemeClr>
+            </a:gs>
+            <a:gs pos="100000">
+              <a:schemeClr val="phClr">
+                <a:shade val="20000"/>
+                <a:satMod val="255000"/>
+              </a:schemeClr>
+            </a:gs>
+          </a:gsLst>
+          <a:path path="circle">
+            <a:fillToRect l="50000" t="-80000" r="50000" b="180000"/>
+          </a:path>
+        </a:gradFill>
+        <a:gradFill rotWithShape="1">
+          <a:gsLst>
+            <a:gs pos="0">
+              <a:schemeClr val="phClr">
+                <a:tint val="80000"/>
+                <a:satMod val="300000"/>
+              </a:schemeClr>
+            </a:gs>
+            <a:gs pos="100000">
+              <a:schemeClr val="phClr">
+                <a:shade val="30000"/>
+                <a:satMod val="200000"/>
+              </a:schemeClr>
+            </a:gs>
+          </a:gsLst>
+          <a:path path="circle">
+            <a:fillToRect l="50000" t="50000" r="50000" b="50000"/>
+          </a:path>
+        </a:gradFill>
+      </a:bgFillStyleLst>
+    </a:fmtScheme>
+  </a:themeElements>
+</a:theme>
 </file>
</xml_diff>

<commit_message>
Update Data Sources from LFX 2026-02-25 (#99)
Update Data Sources from LFX

Signed-off-by: github-actions[bot] <41898282+github-actions[bot]@users.noreply.github.com>
</commit_message>
<xml_diff>
--- a/overview_deck/LF Energy High Level Overview.pptx
+++ b/overview_deck/LF Energy High Level Overview.pptx
@@ -25946,7 +25946,7 @@
             <a:tbl>
               <a:tblPr>
                 <a:noFill/>
-                <a:tableStyleId>{2148295F-C88A-4D38-9292-040BEF2578C8}</a:tableStyleId>
+                <a:tableStyleId>{29C00761-1278-4D47-A8A2-6FB156EE355D}</a:tableStyleId>
               </a:tblPr>
               <a:tblGrid>
                 <a:gridCol w="1695200"/>
@@ -26736,7 +26736,7 @@
             <a:tbl>
               <a:tblPr>
                 <a:noFill/>
-                <a:tableStyleId>{2148295F-C88A-4D38-9292-040BEF2578C8}</a:tableStyleId>
+                <a:tableStyleId>{29C00761-1278-4D47-A8A2-6FB156EE355D}</a:tableStyleId>
               </a:tblPr>
               <a:tblGrid>
                 <a:gridCol w="1695200"/>
@@ -27426,7 +27426,7 @@
             <a:tbl>
               <a:tblPr>
                 <a:noFill/>
-                <a:tableStyleId>{2148295F-C88A-4D38-9292-040BEF2578C8}</a:tableStyleId>
+                <a:tableStyleId>{29C00761-1278-4D47-A8A2-6FB156EE355D}</a:tableStyleId>
               </a:tblPr>
               <a:tblGrid>
                 <a:gridCol w="1695200"/>
@@ -28678,7 +28678,7 @@
             <a:tbl>
               <a:tblPr>
                 <a:noFill/>
-                <a:tableStyleId>{2148295F-C88A-4D38-9292-040BEF2578C8}</a:tableStyleId>
+                <a:tableStyleId>{29C00761-1278-4D47-A8A2-6FB156EE355D}</a:tableStyleId>
               </a:tblPr>
               <a:tblGrid>
                 <a:gridCol w="1695200"/>
@@ -29670,7 +29670,7 @@
             <a:tbl>
               <a:tblPr>
                 <a:noFill/>
-                <a:tableStyleId>{2148295F-C88A-4D38-9292-040BEF2578C8}</a:tableStyleId>
+                <a:tableStyleId>{29C00761-1278-4D47-A8A2-6FB156EE355D}</a:tableStyleId>
               </a:tblPr>
               <a:tblGrid>
                 <a:gridCol w="3048000"/>
@@ -33175,7 +33175,7 @@
             <a:tbl>
               <a:tblPr>
                 <a:noFill/>
-                <a:tableStyleId>{2148295F-C88A-4D38-9292-040BEF2578C8}</a:tableStyleId>
+                <a:tableStyleId>{29C00761-1278-4D47-A8A2-6FB156EE355D}</a:tableStyleId>
               </a:tblPr>
               <a:tblGrid>
                 <a:gridCol w="1828800"/>
@@ -34281,6 +34281,285 @@
 </file>
 
 <file path=ppt/theme/theme2.xml><?xml version="1.0" encoding="utf-8"?>
+<a:theme xmlns:a="http://schemas.openxmlformats.org/drawingml/2006/main" xmlns:r="http://schemas.openxmlformats.org/officeDocument/2006/relationships" name="Simple Light">
+  <a:themeElements>
+    <a:clrScheme name="Simple Light">
+      <a:dk1>
+        <a:srgbClr val="000000"/>
+      </a:dk1>
+      <a:lt1>
+        <a:srgbClr val="FFFFFF"/>
+      </a:lt1>
+      <a:dk2>
+        <a:srgbClr val="595959"/>
+      </a:dk2>
+      <a:lt2>
+        <a:srgbClr val="EEEEEE"/>
+      </a:lt2>
+      <a:accent1>
+        <a:srgbClr val="4285F4"/>
+      </a:accent1>
+      <a:accent2>
+        <a:srgbClr val="212121"/>
+      </a:accent2>
+      <a:accent3>
+        <a:srgbClr val="78909C"/>
+      </a:accent3>
+      <a:accent4>
+        <a:srgbClr val="FFAB40"/>
+      </a:accent4>
+      <a:accent5>
+        <a:srgbClr val="0097A7"/>
+      </a:accent5>
+      <a:accent6>
+        <a:srgbClr val="EEFF41"/>
+      </a:accent6>
+      <a:hlink>
+        <a:srgbClr val="0097A7"/>
+      </a:hlink>
+      <a:folHlink>
+        <a:srgbClr val="0097A7"/>
+      </a:folHlink>
+    </a:clrScheme>
+    <a:fontScheme name="Office">
+      <a:majorFont>
+        <a:latin typeface="Arial"/>
+        <a:ea typeface=""/>
+        <a:cs typeface=""/>
+        <a:font script="Jpan" typeface="ＭＳ Ｐゴシック"/>
+        <a:font script="Hang" typeface="맑은 고딕"/>
+        <a:font script="Hans" typeface="宋体"/>
+        <a:font script="Hant" typeface="新細明體"/>
+        <a:font script="Arab" typeface="Times New Roman"/>
+        <a:font script="Hebr" typeface="Times New Roman"/>
+        <a:font script="Thai" typeface="Angsana New"/>
+        <a:font script="Ethi" typeface="Nyala"/>
+        <a:font script="Beng" typeface="Vrinda"/>
+        <a:font script="Gujr" typeface="Shruti"/>
+        <a:font script="Khmr" typeface="MoolBoran"/>
+        <a:font script="Knda" typeface="Tunga"/>
+        <a:font script="Guru" typeface="Raavi"/>
+        <a:font script="Cans" typeface="Euphemia"/>
+        <a:font script="Cher" typeface="Plantagenet Cherokee"/>
+        <a:font script="Yiii" typeface="Microsoft Yi Baiti"/>
+        <a:font script="Tibt" typeface="Microsoft Himalaya"/>
+        <a:font script="Thaa" typeface="MV Boli"/>
+        <a:font script="Deva" typeface="Mangal"/>
+        <a:font script="Telu" typeface="Gautami"/>
+        <a:font script="Taml" typeface="Latha"/>
+        <a:font script="Syrc" typeface="Estrangelo Edessa"/>
+        <a:font script="Orya" typeface="Kalinga"/>
+        <a:font script="Mlym" typeface="Kartika"/>
+        <a:font script="Laoo" typeface="DokChampa"/>
+        <a:font script="Sinh" typeface="Iskoola Pota"/>
+        <a:font script="Mong" typeface="Mongolian Baiti"/>
+        <a:font script="Viet" typeface="Times New Roman"/>
+        <a:font script="Uigh" typeface="Microsoft Uighur"/>
+        <a:font script="Geor" typeface="Sylfaen"/>
+      </a:majorFont>
+      <a:minorFont>
+        <a:latin typeface="Arial"/>
+        <a:ea typeface=""/>
+        <a:cs typeface=""/>
+        <a:font script="Jpan" typeface="ＭＳ Ｐゴシック"/>
+        <a:font script="Hang" typeface="맑은 고딕"/>
+        <a:font script="Hans" typeface="宋体"/>
+        <a:font script="Hant" typeface="新細明體"/>
+        <a:font script="Arab" typeface="Arial"/>
+        <a:font script="Hebr" typeface="Arial"/>
+        <a:font script="Thai" typeface="Cordia New"/>
+        <a:font script="Ethi" typeface="Nyala"/>
+        <a:font script="Beng" typeface="Vrinda"/>
+        <a:font script="Gujr" typeface="Shruti"/>
+        <a:font script="Khmr" typeface="DaunPenh"/>
+        <a:font script="Knda" typeface="Tunga"/>
+        <a:font script="Guru" typeface="Raavi"/>
+        <a:font script="Cans" typeface="Euphemia"/>
+        <a:font script="Cher" typeface="Plantagenet Cherokee"/>
+        <a:font script="Yiii" typeface="Microsoft Yi Baiti"/>
+        <a:font script="Tibt" typeface="Microsoft Himalaya"/>
+        <a:font script="Thaa" typeface="MV Boli"/>
+        <a:font script="Deva" typeface="Mangal"/>
+        <a:font script="Telu" typeface="Gautami"/>
+        <a:font script="Taml" typeface="Latha"/>
+        <a:font script="Syrc" typeface="Estrangelo Edessa"/>
+        <a:font script="Orya" typeface="Kalinga"/>
+        <a:font script="Mlym" typeface="Kartika"/>
+        <a:font script="Laoo" typeface="DokChampa"/>
+        <a:font script="Sinh" typeface="Iskoola Pota"/>
+        <a:font script="Mong" typeface="Mongolian Baiti"/>
+        <a:font script="Viet" typeface="Arial"/>
+        <a:font script="Uigh" typeface="Microsoft Uighur"/>
+        <a:font script="Geor" typeface="Sylfaen"/>
+      </a:minorFont>
+    </a:fontScheme>
+    <a:fmtScheme name="Office">
+      <a:fillStyleLst>
+        <a:solidFill>
+          <a:schemeClr val="phClr"/>
+        </a:solidFill>
+        <a:gradFill rotWithShape="1">
+          <a:gsLst>
+            <a:gs pos="0">
+              <a:schemeClr val="phClr">
+                <a:tint val="50000"/>
+                <a:satMod val="300000"/>
+              </a:schemeClr>
+            </a:gs>
+            <a:gs pos="35000">
+              <a:schemeClr val="phClr">
+                <a:tint val="37000"/>
+                <a:satMod val="300000"/>
+              </a:schemeClr>
+            </a:gs>
+            <a:gs pos="100000">
+              <a:schemeClr val="phClr">
+                <a:tint val="15000"/>
+                <a:satMod val="350000"/>
+              </a:schemeClr>
+            </a:gs>
+          </a:gsLst>
+          <a:lin ang="16200000" scaled="1"/>
+        </a:gradFill>
+        <a:gradFill rotWithShape="1">
+          <a:gsLst>
+            <a:gs pos="0">
+              <a:schemeClr val="phClr">
+                <a:tint val="100000"/>
+                <a:shade val="100000"/>
+                <a:satMod val="130000"/>
+              </a:schemeClr>
+            </a:gs>
+            <a:gs pos="100000">
+              <a:schemeClr val="phClr">
+                <a:tint val="50000"/>
+                <a:shade val="100000"/>
+                <a:satMod val="350000"/>
+              </a:schemeClr>
+            </a:gs>
+          </a:gsLst>
+          <a:lin ang="16200000" scaled="0"/>
+        </a:gradFill>
+      </a:fillStyleLst>
+      <a:lnStyleLst>
+        <a:ln w="9525" cap="flat" cmpd="sng" algn="ctr">
+          <a:solidFill>
+            <a:schemeClr val="phClr">
+              <a:shade val="95000"/>
+              <a:satMod val="105000"/>
+            </a:schemeClr>
+          </a:solidFill>
+          <a:prstDash val="solid"/>
+        </a:ln>
+        <a:ln w="25400" cap="flat" cmpd="sng" algn="ctr">
+          <a:solidFill>
+            <a:schemeClr val="phClr"/>
+          </a:solidFill>
+          <a:prstDash val="solid"/>
+        </a:ln>
+        <a:ln w="38100" cap="flat" cmpd="sng" algn="ctr">
+          <a:solidFill>
+            <a:schemeClr val="phClr"/>
+          </a:solidFill>
+          <a:prstDash val="solid"/>
+        </a:ln>
+      </a:lnStyleLst>
+      <a:effectStyleLst>
+        <a:effectStyle>
+          <a:effectLst>
+            <a:outerShdw blurRad="40000" dist="20000" dir="5400000" rotWithShape="0">
+              <a:srgbClr val="000000">
+                <a:alpha val="38000"/>
+              </a:srgbClr>
+            </a:outerShdw>
+          </a:effectLst>
+        </a:effectStyle>
+        <a:effectStyle>
+          <a:effectLst>
+            <a:outerShdw blurRad="40000" dist="23000" dir="5400000" rotWithShape="0">
+              <a:srgbClr val="000000">
+                <a:alpha val="35000"/>
+              </a:srgbClr>
+            </a:outerShdw>
+          </a:effectLst>
+        </a:effectStyle>
+        <a:effectStyle>
+          <a:effectLst>
+            <a:outerShdw blurRad="40000" dist="23000" dir="5400000" rotWithShape="0">
+              <a:srgbClr val="000000">
+                <a:alpha val="35000"/>
+              </a:srgbClr>
+            </a:outerShdw>
+          </a:effectLst>
+          <a:scene3d>
+            <a:camera prst="orthographicFront">
+              <a:rot lat="0" lon="0" rev="0"/>
+            </a:camera>
+            <a:lightRig rig="threePt" dir="t">
+              <a:rot lat="0" lon="0" rev="1200000"/>
+            </a:lightRig>
+          </a:scene3d>
+          <a:sp3d>
+            <a:bevelT w="63500" h="25400"/>
+          </a:sp3d>
+        </a:effectStyle>
+      </a:effectStyleLst>
+      <a:bgFillStyleLst>
+        <a:solidFill>
+          <a:schemeClr val="phClr"/>
+        </a:solidFill>
+        <a:gradFill rotWithShape="1">
+          <a:gsLst>
+            <a:gs pos="0">
+              <a:schemeClr val="phClr">
+                <a:tint val="40000"/>
+                <a:satMod val="350000"/>
+              </a:schemeClr>
+            </a:gs>
+            <a:gs pos="40000">
+              <a:schemeClr val="phClr">
+                <a:tint val="45000"/>
+                <a:shade val="99000"/>
+                <a:satMod val="350000"/>
+              </a:schemeClr>
+            </a:gs>
+            <a:gs pos="100000">
+              <a:schemeClr val="phClr">
+                <a:shade val="20000"/>
+                <a:satMod val="255000"/>
+              </a:schemeClr>
+            </a:gs>
+          </a:gsLst>
+          <a:path path="circle">
+            <a:fillToRect l="50000" t="-80000" r="50000" b="180000"/>
+          </a:path>
+        </a:gradFill>
+        <a:gradFill rotWithShape="1">
+          <a:gsLst>
+            <a:gs pos="0">
+              <a:schemeClr val="phClr">
+                <a:tint val="80000"/>
+                <a:satMod val="300000"/>
+              </a:schemeClr>
+            </a:gs>
+            <a:gs pos="100000">
+              <a:schemeClr val="phClr">
+                <a:shade val="30000"/>
+                <a:satMod val="200000"/>
+              </a:schemeClr>
+            </a:gs>
+          </a:gsLst>
+          <a:path path="circle">
+            <a:fillToRect l="50000" t="50000" r="50000" b="50000"/>
+          </a:path>
+        </a:gradFill>
+      </a:bgFillStyleLst>
+    </a:fmtScheme>
+  </a:themeElements>
+</a:theme>
+</file>
+
+<file path=ppt/theme/theme3.xml><?xml version="1.0" encoding="utf-8"?>
 <a:theme xmlns:a="http://schemas.openxmlformats.org/drawingml/2006/main" xmlns:r="http://schemas.openxmlformats.org/officeDocument/2006/relationships" name="LF Energy Theme 2023">
   <a:themeElements>
     <a:clrScheme name="Geometric">
@@ -34557,283 +34836,4 @@
     </a:fmtScheme>
   </a:themeElements>
 </a:theme>
-</file>
-
-<file path=ppt/theme/theme3.xml><?xml version="1.0" encoding="utf-8"?>
-<a:theme xmlns:a="http://schemas.openxmlformats.org/drawingml/2006/main" xmlns:r="http://schemas.openxmlformats.org/officeDocument/2006/relationships" name="Simple Light">
-  <a:themeElements>
-    <a:clrScheme name="Simple Light">
-      <a:dk1>
-        <a:srgbClr val="000000"/>
-      </a:dk1>
-      <a:lt1>
-        <a:srgbClr val="FFFFFF"/>
-      </a:lt1>
-      <a:dk2>
-        <a:srgbClr val="595959"/>
-      </a:dk2>
-      <a:lt2>
-        <a:srgbClr val="EEEEEE"/>
-      </a:lt2>
-      <a:accent1>
-        <a:srgbClr val="4285F4"/>
-      </a:accent1>
-      <a:accent2>
-        <a:srgbClr val="212121"/>
-      </a:accent2>
-      <a:accent3>
-        <a:srgbClr val="78909C"/>
-      </a:accent3>
-      <a:accent4>
-        <a:srgbClr val="FFAB40"/>
-      </a:accent4>
-      <a:accent5>
-        <a:srgbClr val="0097A7"/>
-      </a:accent5>
-      <a:accent6>
-        <a:srgbClr val="EEFF41"/>
-      </a:accent6>
-      <a:hlink>
-        <a:srgbClr val="0097A7"/>
-      </a:hlink>
-      <a:folHlink>
-        <a:srgbClr val="0097A7"/>
-      </a:folHlink>
-    </a:clrScheme>
-    <a:fontScheme name="Office">
-      <a:majorFont>
-        <a:latin typeface="Arial"/>
-        <a:ea typeface=""/>
-        <a:cs typeface=""/>
-        <a:font script="Jpan" typeface="ＭＳ Ｐゴシック"/>
-        <a:font script="Hang" typeface="맑은 고딕"/>
-        <a:font script="Hans" typeface="宋体"/>
-        <a:font script="Hant" typeface="新細明體"/>
-        <a:font script="Arab" typeface="Times New Roman"/>
-        <a:font script="Hebr" typeface="Times New Roman"/>
-        <a:font script="Thai" typeface="Angsana New"/>
-        <a:font script="Ethi" typeface="Nyala"/>
-        <a:font script="Beng" typeface="Vrinda"/>
-        <a:font script="Gujr" typeface="Shruti"/>
-        <a:font script="Khmr" typeface="MoolBoran"/>
-        <a:font script="Knda" typeface="Tunga"/>
-        <a:font script="Guru" typeface="Raavi"/>
-        <a:font script="Cans" typeface="Euphemia"/>
-        <a:font script="Cher" typeface="Plantagenet Cherokee"/>
-        <a:font script="Yiii" typeface="Microsoft Yi Baiti"/>
-        <a:font script="Tibt" typeface="Microsoft Himalaya"/>
-        <a:font script="Thaa" typeface="MV Boli"/>
-        <a:font script="Deva" typeface="Mangal"/>
-        <a:font script="Telu" typeface="Gautami"/>
-        <a:font script="Taml" typeface="Latha"/>
-        <a:font script="Syrc" typeface="Estrangelo Edessa"/>
-        <a:font script="Orya" typeface="Kalinga"/>
-        <a:font script="Mlym" typeface="Kartika"/>
-        <a:font script="Laoo" typeface="DokChampa"/>
-        <a:font script="Sinh" typeface="Iskoola Pota"/>
-        <a:font script="Mong" typeface="Mongolian Baiti"/>
-        <a:font script="Viet" typeface="Times New Roman"/>
-        <a:font script="Uigh" typeface="Microsoft Uighur"/>
-        <a:font script="Geor" typeface="Sylfaen"/>
-      </a:majorFont>
-      <a:minorFont>
-        <a:latin typeface="Arial"/>
-        <a:ea typeface=""/>
-        <a:cs typeface=""/>
-        <a:font script="Jpan" typeface="ＭＳ Ｐゴシック"/>
-        <a:font script="Hang" typeface="맑은 고딕"/>
-        <a:font script="Hans" typeface="宋体"/>
-        <a:font script="Hant" typeface="新細明體"/>
-        <a:font script="Arab" typeface="Arial"/>
-        <a:font script="Hebr" typeface="Arial"/>
-        <a:font script="Thai" typeface="Cordia New"/>
-        <a:font script="Ethi" typeface="Nyala"/>
-        <a:font script="Beng" typeface="Vrinda"/>
-        <a:font script="Gujr" typeface="Shruti"/>
-        <a:font script="Khmr" typeface="DaunPenh"/>
-        <a:font script="Knda" typeface="Tunga"/>
-        <a:font script="Guru" typeface="Raavi"/>
-        <a:font script="Cans" typeface="Euphemia"/>
-        <a:font script="Cher" typeface="Plantagenet Cherokee"/>
-        <a:font script="Yiii" typeface="Microsoft Yi Baiti"/>
-        <a:font script="Tibt" typeface="Microsoft Himalaya"/>
-        <a:font script="Thaa" typeface="MV Boli"/>
-        <a:font script="Deva" typeface="Mangal"/>
-        <a:font script="Telu" typeface="Gautami"/>
-        <a:font script="Taml" typeface="Latha"/>
-        <a:font script="Syrc" typeface="Estrangelo Edessa"/>
-        <a:font script="Orya" typeface="Kalinga"/>
-        <a:font script="Mlym" typeface="Kartika"/>
-        <a:font script="Laoo" typeface="DokChampa"/>
-        <a:font script="Sinh" typeface="Iskoola Pota"/>
-        <a:font script="Mong" typeface="Mongolian Baiti"/>
-        <a:font script="Viet" typeface="Arial"/>
-        <a:font script="Uigh" typeface="Microsoft Uighur"/>
-        <a:font script="Geor" typeface="Sylfaen"/>
-      </a:minorFont>
-    </a:fontScheme>
-    <a:fmtScheme name="Office">
-      <a:fillStyleLst>
-        <a:solidFill>
-          <a:schemeClr val="phClr"/>
-        </a:solidFill>
-        <a:gradFill rotWithShape="1">
-          <a:gsLst>
-            <a:gs pos="0">
-              <a:schemeClr val="phClr">
-                <a:tint val="50000"/>
-                <a:satMod val="300000"/>
-              </a:schemeClr>
-            </a:gs>
-            <a:gs pos="35000">
-              <a:schemeClr val="phClr">
-                <a:tint val="37000"/>
-                <a:satMod val="300000"/>
-              </a:schemeClr>
-            </a:gs>
-            <a:gs pos="100000">
-              <a:schemeClr val="phClr">
-                <a:tint val="15000"/>
-                <a:satMod val="350000"/>
-              </a:schemeClr>
-            </a:gs>
-          </a:gsLst>
-          <a:lin ang="16200000" scaled="1"/>
-        </a:gradFill>
-        <a:gradFill rotWithShape="1">
-          <a:gsLst>
-            <a:gs pos="0">
-              <a:schemeClr val="phClr">
-                <a:tint val="100000"/>
-                <a:shade val="100000"/>
-                <a:satMod val="130000"/>
-              </a:schemeClr>
-            </a:gs>
-            <a:gs pos="100000">
-              <a:schemeClr val="phClr">
-                <a:tint val="50000"/>
-                <a:shade val="100000"/>
-                <a:satMod val="350000"/>
-              </a:schemeClr>
-            </a:gs>
-          </a:gsLst>
-          <a:lin ang="16200000" scaled="0"/>
-        </a:gradFill>
-      </a:fillStyleLst>
-      <a:lnStyleLst>
-        <a:ln w="9525" cap="flat" cmpd="sng" algn="ctr">
-          <a:solidFill>
-            <a:schemeClr val="phClr">
-              <a:shade val="95000"/>
-              <a:satMod val="105000"/>
-            </a:schemeClr>
-          </a:solidFill>
-          <a:prstDash val="solid"/>
-        </a:ln>
-        <a:ln w="25400" cap="flat" cmpd="sng" algn="ctr">
-          <a:solidFill>
-            <a:schemeClr val="phClr"/>
-          </a:solidFill>
-          <a:prstDash val="solid"/>
-        </a:ln>
-        <a:ln w="38100" cap="flat" cmpd="sng" algn="ctr">
-          <a:solidFill>
-            <a:schemeClr val="phClr"/>
-          </a:solidFill>
-          <a:prstDash val="solid"/>
-        </a:ln>
-      </a:lnStyleLst>
-      <a:effectStyleLst>
-        <a:effectStyle>
-          <a:effectLst>
-            <a:outerShdw blurRad="40000" dist="20000" dir="5400000" rotWithShape="0">
-              <a:srgbClr val="000000">
-                <a:alpha val="38000"/>
-              </a:srgbClr>
-            </a:outerShdw>
-          </a:effectLst>
-        </a:effectStyle>
-        <a:effectStyle>
-          <a:effectLst>
-            <a:outerShdw blurRad="40000" dist="23000" dir="5400000" rotWithShape="0">
-              <a:srgbClr val="000000">
-                <a:alpha val="35000"/>
-              </a:srgbClr>
-            </a:outerShdw>
-          </a:effectLst>
-        </a:effectStyle>
-        <a:effectStyle>
-          <a:effectLst>
-            <a:outerShdw blurRad="40000" dist="23000" dir="5400000" rotWithShape="0">
-              <a:srgbClr val="000000">
-                <a:alpha val="35000"/>
-              </a:srgbClr>
-            </a:outerShdw>
-          </a:effectLst>
-          <a:scene3d>
-            <a:camera prst="orthographicFront">
-              <a:rot lat="0" lon="0" rev="0"/>
-            </a:camera>
-            <a:lightRig rig="threePt" dir="t">
-              <a:rot lat="0" lon="0" rev="1200000"/>
-            </a:lightRig>
-          </a:scene3d>
-          <a:sp3d>
-            <a:bevelT w="63500" h="25400"/>
-          </a:sp3d>
-        </a:effectStyle>
-      </a:effectStyleLst>
-      <a:bgFillStyleLst>
-        <a:solidFill>
-          <a:schemeClr val="phClr"/>
-        </a:solidFill>
-        <a:gradFill rotWithShape="1">
-          <a:gsLst>
-            <a:gs pos="0">
-              <a:schemeClr val="phClr">
-                <a:tint val="40000"/>
-                <a:satMod val="350000"/>
-              </a:schemeClr>
-            </a:gs>
-            <a:gs pos="40000">
-              <a:schemeClr val="phClr">
-                <a:tint val="45000"/>
-                <a:shade val="99000"/>
-                <a:satMod val="350000"/>
-              </a:schemeClr>
-            </a:gs>
-            <a:gs pos="100000">
-              <a:schemeClr val="phClr">
-                <a:shade val="20000"/>
-                <a:satMod val="255000"/>
-              </a:schemeClr>
-            </a:gs>
-          </a:gsLst>
-          <a:path path="circle">
-            <a:fillToRect l="50000" t="-80000" r="50000" b="180000"/>
-          </a:path>
-        </a:gradFill>
-        <a:gradFill rotWithShape="1">
-          <a:gsLst>
-            <a:gs pos="0">
-              <a:schemeClr val="phClr">
-                <a:tint val="80000"/>
-                <a:satMod val="300000"/>
-              </a:schemeClr>
-            </a:gs>
-            <a:gs pos="100000">
-              <a:schemeClr val="phClr">
-                <a:shade val="30000"/>
-                <a:satMod val="200000"/>
-              </a:schemeClr>
-            </a:gs>
-          </a:gsLst>
-          <a:path path="circle">
-            <a:fillToRect l="50000" t="50000" r="50000" b="50000"/>
-          </a:path>
-        </a:gradFill>
-      </a:bgFillStyleLst>
-    </a:fmtScheme>
-  </a:themeElements>
-</a:theme>
 </file>
</xml_diff>

<commit_message>
Update Data Sources from LFX 2026-02-26 (#100)
Update Data Sources from LFX

Signed-off-by: github-actions[bot] <41898282+github-actions[bot]@users.noreply.github.com>
</commit_message>
<xml_diff>
--- a/overview_deck/LF Energy High Level Overview.pptx
+++ b/overview_deck/LF Energy High Level Overview.pptx
@@ -25946,7 +25946,7 @@
             <a:tbl>
               <a:tblPr>
                 <a:noFill/>
-                <a:tableStyleId>{29C00761-1278-4D47-A8A2-6FB156EE355D}</a:tableStyleId>
+                <a:tableStyleId>{94D75FCD-CB37-4833-9CB0-7D57DDA634E7}</a:tableStyleId>
               </a:tblPr>
               <a:tblGrid>
                 <a:gridCol w="1695200"/>
@@ -26736,7 +26736,7 @@
             <a:tbl>
               <a:tblPr>
                 <a:noFill/>
-                <a:tableStyleId>{29C00761-1278-4D47-A8A2-6FB156EE355D}</a:tableStyleId>
+                <a:tableStyleId>{94D75FCD-CB37-4833-9CB0-7D57DDA634E7}</a:tableStyleId>
               </a:tblPr>
               <a:tblGrid>
                 <a:gridCol w="1695200"/>
@@ -27426,7 +27426,7 @@
             <a:tbl>
               <a:tblPr>
                 <a:noFill/>
-                <a:tableStyleId>{29C00761-1278-4D47-A8A2-6FB156EE355D}</a:tableStyleId>
+                <a:tableStyleId>{94D75FCD-CB37-4833-9CB0-7D57DDA634E7}</a:tableStyleId>
               </a:tblPr>
               <a:tblGrid>
                 <a:gridCol w="1695200"/>
@@ -28678,7 +28678,7 @@
             <a:tbl>
               <a:tblPr>
                 <a:noFill/>
-                <a:tableStyleId>{29C00761-1278-4D47-A8A2-6FB156EE355D}</a:tableStyleId>
+                <a:tableStyleId>{94D75FCD-CB37-4833-9CB0-7D57DDA634E7}</a:tableStyleId>
               </a:tblPr>
               <a:tblGrid>
                 <a:gridCol w="1695200"/>
@@ -29670,7 +29670,7 @@
             <a:tbl>
               <a:tblPr>
                 <a:noFill/>
-                <a:tableStyleId>{29C00761-1278-4D47-A8A2-6FB156EE355D}</a:tableStyleId>
+                <a:tableStyleId>{94D75FCD-CB37-4833-9CB0-7D57DDA634E7}</a:tableStyleId>
               </a:tblPr>
               <a:tblGrid>
                 <a:gridCol w="3048000"/>
@@ -33175,7 +33175,7 @@
             <a:tbl>
               <a:tblPr>
                 <a:noFill/>
-                <a:tableStyleId>{29C00761-1278-4D47-A8A2-6FB156EE355D}</a:tableStyleId>
+                <a:tableStyleId>{94D75FCD-CB37-4833-9CB0-7D57DDA634E7}</a:tableStyleId>
               </a:tblPr>
               <a:tblGrid>
                 <a:gridCol w="1828800"/>
@@ -34002,44 +34002,44 @@
 </file>
 
 <file path=ppt/theme/theme1.xml><?xml version="1.0" encoding="utf-8"?>
-<a:theme xmlns:a="http://schemas.openxmlformats.org/drawingml/2006/main" xmlns:r="http://schemas.openxmlformats.org/officeDocument/2006/relationships">
+<a:theme xmlns:a="http://schemas.openxmlformats.org/drawingml/2006/main" xmlns:r="http://schemas.openxmlformats.org/officeDocument/2006/relationships" name="LF Energy Theme 2023">
   <a:themeElements>
-    <a:clrScheme name="Default">
+    <a:clrScheme name="Geometric">
       <a:dk1>
-        <a:srgbClr val="000000"/>
+        <a:srgbClr val="222222"/>
       </a:dk1>
       <a:lt1>
         <a:srgbClr val="FFFFFF"/>
       </a:lt1>
       <a:dk2>
-        <a:srgbClr val="158158"/>
+        <a:srgbClr val="434343"/>
       </a:dk2>
       <a:lt2>
-        <a:srgbClr val="F3F3F3"/>
+        <a:srgbClr val="999999"/>
       </a:lt2>
       <a:accent1>
-        <a:srgbClr val="058DC7"/>
+        <a:srgbClr val="003778"/>
       </a:accent1>
       <a:accent2>
-        <a:srgbClr val="50B432"/>
+        <a:srgbClr val="0094FF"/>
       </a:accent2>
       <a:accent3>
-        <a:srgbClr val="ED561B"/>
+        <a:srgbClr val="5B1DE7"/>
       </a:accent3>
       <a:accent4>
-        <a:srgbClr val="EDEF00"/>
+        <a:srgbClr val="12E2E2"/>
       </a:accent4>
       <a:accent5>
-        <a:srgbClr val="24CBE5"/>
+        <a:srgbClr val="FF00AA"/>
       </a:accent5>
       <a:accent6>
-        <a:srgbClr val="64E572"/>
+        <a:srgbClr val="ACDE1F"/>
       </a:accent6>
       <a:hlink>
-        <a:srgbClr val="2200CC"/>
+        <a:srgbClr val="0077CC"/>
       </a:hlink>
       <a:folHlink>
-        <a:srgbClr val="551A8B"/>
+        <a:srgbClr val="F06292"/>
       </a:folHlink>
     </a:clrScheme>
     <a:fontScheme name="Office">
@@ -34560,44 +34560,44 @@
 </file>
 
 <file path=ppt/theme/theme3.xml><?xml version="1.0" encoding="utf-8"?>
-<a:theme xmlns:a="http://schemas.openxmlformats.org/drawingml/2006/main" xmlns:r="http://schemas.openxmlformats.org/officeDocument/2006/relationships" name="LF Energy Theme 2023">
+<a:theme xmlns:a="http://schemas.openxmlformats.org/drawingml/2006/main" xmlns:r="http://schemas.openxmlformats.org/officeDocument/2006/relationships">
   <a:themeElements>
-    <a:clrScheme name="Geometric">
+    <a:clrScheme name="Default">
       <a:dk1>
-        <a:srgbClr val="222222"/>
+        <a:srgbClr val="000000"/>
       </a:dk1>
       <a:lt1>
         <a:srgbClr val="FFFFFF"/>
       </a:lt1>
       <a:dk2>
-        <a:srgbClr val="434343"/>
+        <a:srgbClr val="158158"/>
       </a:dk2>
       <a:lt2>
-        <a:srgbClr val="999999"/>
+        <a:srgbClr val="F3F3F3"/>
       </a:lt2>
       <a:accent1>
-        <a:srgbClr val="003778"/>
+        <a:srgbClr val="058DC7"/>
       </a:accent1>
       <a:accent2>
-        <a:srgbClr val="0094FF"/>
+        <a:srgbClr val="50B432"/>
       </a:accent2>
       <a:accent3>
-        <a:srgbClr val="5B1DE7"/>
+        <a:srgbClr val="ED561B"/>
       </a:accent3>
       <a:accent4>
-        <a:srgbClr val="12E2E2"/>
+        <a:srgbClr val="EDEF00"/>
       </a:accent4>
       <a:accent5>
-        <a:srgbClr val="FF00AA"/>
+        <a:srgbClr val="24CBE5"/>
       </a:accent5>
       <a:accent6>
-        <a:srgbClr val="ACDE1F"/>
+        <a:srgbClr val="64E572"/>
       </a:accent6>
       <a:hlink>
-        <a:srgbClr val="0077CC"/>
+        <a:srgbClr val="2200CC"/>
       </a:hlink>
       <a:folHlink>
-        <a:srgbClr val="F06292"/>
+        <a:srgbClr val="551A8B"/>
       </a:folHlink>
     </a:clrScheme>
     <a:fontScheme name="Office">

</xml_diff>

<commit_message>
Update Data Sources from LFX 2026-02-27 (#101)
Update Data Sources from LFX

Signed-off-by: github-actions[bot] <41898282+github-actions[bot]@users.noreply.github.com>
</commit_message>
<xml_diff>
--- a/overview_deck/LF Energy High Level Overview.pptx
+++ b/overview_deck/LF Energy High Level Overview.pptx
@@ -25946,7 +25946,7 @@
             <a:tbl>
               <a:tblPr>
                 <a:noFill/>
-                <a:tableStyleId>{94D75FCD-CB37-4833-9CB0-7D57DDA634E7}</a:tableStyleId>
+                <a:tableStyleId>{C75BC050-3C19-41D3-958A-A709838A6AC1}</a:tableStyleId>
               </a:tblPr>
               <a:tblGrid>
                 <a:gridCol w="1695200"/>
@@ -26736,7 +26736,7 @@
             <a:tbl>
               <a:tblPr>
                 <a:noFill/>
-                <a:tableStyleId>{94D75FCD-CB37-4833-9CB0-7D57DDA634E7}</a:tableStyleId>
+                <a:tableStyleId>{C75BC050-3C19-41D3-958A-A709838A6AC1}</a:tableStyleId>
               </a:tblPr>
               <a:tblGrid>
                 <a:gridCol w="1695200"/>
@@ -27426,7 +27426,7 @@
             <a:tbl>
               <a:tblPr>
                 <a:noFill/>
-                <a:tableStyleId>{94D75FCD-CB37-4833-9CB0-7D57DDA634E7}</a:tableStyleId>
+                <a:tableStyleId>{C75BC050-3C19-41D3-958A-A709838A6AC1}</a:tableStyleId>
               </a:tblPr>
               <a:tblGrid>
                 <a:gridCol w="1695200"/>
@@ -28678,7 +28678,7 @@
             <a:tbl>
               <a:tblPr>
                 <a:noFill/>
-                <a:tableStyleId>{94D75FCD-CB37-4833-9CB0-7D57DDA634E7}</a:tableStyleId>
+                <a:tableStyleId>{C75BC050-3C19-41D3-958A-A709838A6AC1}</a:tableStyleId>
               </a:tblPr>
               <a:tblGrid>
                 <a:gridCol w="1695200"/>
@@ -29670,7 +29670,7 @@
             <a:tbl>
               <a:tblPr>
                 <a:noFill/>
-                <a:tableStyleId>{94D75FCD-CB37-4833-9CB0-7D57DDA634E7}</a:tableStyleId>
+                <a:tableStyleId>{C75BC050-3C19-41D3-958A-A709838A6AC1}</a:tableStyleId>
               </a:tblPr>
               <a:tblGrid>
                 <a:gridCol w="3048000"/>
@@ -33175,7 +33175,7 @@
             <a:tbl>
               <a:tblPr>
                 <a:noFill/>
-                <a:tableStyleId>{94D75FCD-CB37-4833-9CB0-7D57DDA634E7}</a:tableStyleId>
+                <a:tableStyleId>{C75BC050-3C19-41D3-958A-A709838A6AC1}</a:tableStyleId>
               </a:tblPr>
               <a:tblGrid>
                 <a:gridCol w="1828800"/>
@@ -34002,44 +34002,44 @@
 </file>
 
 <file path=ppt/theme/theme1.xml><?xml version="1.0" encoding="utf-8"?>
-<a:theme xmlns:a="http://schemas.openxmlformats.org/drawingml/2006/main" xmlns:r="http://schemas.openxmlformats.org/officeDocument/2006/relationships" name="LF Energy Theme 2023">
+<a:theme xmlns:a="http://schemas.openxmlformats.org/drawingml/2006/main" xmlns:r="http://schemas.openxmlformats.org/officeDocument/2006/relationships">
   <a:themeElements>
-    <a:clrScheme name="Geometric">
+    <a:clrScheme name="Default">
       <a:dk1>
-        <a:srgbClr val="222222"/>
+        <a:srgbClr val="000000"/>
       </a:dk1>
       <a:lt1>
         <a:srgbClr val="FFFFFF"/>
       </a:lt1>
       <a:dk2>
-        <a:srgbClr val="434343"/>
+        <a:srgbClr val="158158"/>
       </a:dk2>
       <a:lt2>
-        <a:srgbClr val="999999"/>
+        <a:srgbClr val="F3F3F3"/>
       </a:lt2>
       <a:accent1>
-        <a:srgbClr val="003778"/>
+        <a:srgbClr val="058DC7"/>
       </a:accent1>
       <a:accent2>
-        <a:srgbClr val="0094FF"/>
+        <a:srgbClr val="50B432"/>
       </a:accent2>
       <a:accent3>
-        <a:srgbClr val="5B1DE7"/>
+        <a:srgbClr val="ED561B"/>
       </a:accent3>
       <a:accent4>
-        <a:srgbClr val="12E2E2"/>
+        <a:srgbClr val="EDEF00"/>
       </a:accent4>
       <a:accent5>
-        <a:srgbClr val="FF00AA"/>
+        <a:srgbClr val="24CBE5"/>
       </a:accent5>
       <a:accent6>
-        <a:srgbClr val="ACDE1F"/>
+        <a:srgbClr val="64E572"/>
       </a:accent6>
       <a:hlink>
-        <a:srgbClr val="0077CC"/>
+        <a:srgbClr val="2200CC"/>
       </a:hlink>
       <a:folHlink>
-        <a:srgbClr val="F06292"/>
+        <a:srgbClr val="551A8B"/>
       </a:folHlink>
     </a:clrScheme>
     <a:fontScheme name="Office">
@@ -34560,44 +34560,44 @@
 </file>
 
 <file path=ppt/theme/theme3.xml><?xml version="1.0" encoding="utf-8"?>
-<a:theme xmlns:a="http://schemas.openxmlformats.org/drawingml/2006/main" xmlns:r="http://schemas.openxmlformats.org/officeDocument/2006/relationships">
+<a:theme xmlns:a="http://schemas.openxmlformats.org/drawingml/2006/main" xmlns:r="http://schemas.openxmlformats.org/officeDocument/2006/relationships" name="LF Energy Theme 2023">
   <a:themeElements>
-    <a:clrScheme name="Default">
+    <a:clrScheme name="Geometric">
       <a:dk1>
-        <a:srgbClr val="000000"/>
+        <a:srgbClr val="222222"/>
       </a:dk1>
       <a:lt1>
         <a:srgbClr val="FFFFFF"/>
       </a:lt1>
       <a:dk2>
-        <a:srgbClr val="158158"/>
+        <a:srgbClr val="434343"/>
       </a:dk2>
       <a:lt2>
-        <a:srgbClr val="F3F3F3"/>
+        <a:srgbClr val="999999"/>
       </a:lt2>
       <a:accent1>
-        <a:srgbClr val="058DC7"/>
+        <a:srgbClr val="003778"/>
       </a:accent1>
       <a:accent2>
-        <a:srgbClr val="50B432"/>
+        <a:srgbClr val="0094FF"/>
       </a:accent2>
       <a:accent3>
-        <a:srgbClr val="ED561B"/>
+        <a:srgbClr val="5B1DE7"/>
       </a:accent3>
       <a:accent4>
-        <a:srgbClr val="EDEF00"/>
+        <a:srgbClr val="12E2E2"/>
       </a:accent4>
       <a:accent5>
-        <a:srgbClr val="24CBE5"/>
+        <a:srgbClr val="FF00AA"/>
       </a:accent5>
       <a:accent6>
-        <a:srgbClr val="64E572"/>
+        <a:srgbClr val="ACDE1F"/>
       </a:accent6>
       <a:hlink>
-        <a:srgbClr val="2200CC"/>
+        <a:srgbClr val="0077CC"/>
       </a:hlink>
       <a:folHlink>
-        <a:srgbClr val="551A8B"/>
+        <a:srgbClr val="F06292"/>
       </a:folHlink>
     </a:clrScheme>
     <a:fontScheme name="Office">

</xml_diff>

<commit_message>
Update Data Sources from LFX 2026-02-28 (#102)
Update Data Sources from LFX

Signed-off-by: github-actions[bot] <41898282+github-actions[bot]@users.noreply.github.com>
</commit_message>
<xml_diff>
--- a/overview_deck/LF Energy High Level Overview.pptx
+++ b/overview_deck/LF Energy High Level Overview.pptx
@@ -25946,7 +25946,7 @@
             <a:tbl>
               <a:tblPr>
                 <a:noFill/>
-                <a:tableStyleId>{C75BC050-3C19-41D3-958A-A709838A6AC1}</a:tableStyleId>
+                <a:tableStyleId>{86A1A7EE-9A7A-468C-9D75-9378E41A33B2}</a:tableStyleId>
               </a:tblPr>
               <a:tblGrid>
                 <a:gridCol w="1695200"/>
@@ -26736,7 +26736,7 @@
             <a:tbl>
               <a:tblPr>
                 <a:noFill/>
-                <a:tableStyleId>{C75BC050-3C19-41D3-958A-A709838A6AC1}</a:tableStyleId>
+                <a:tableStyleId>{86A1A7EE-9A7A-468C-9D75-9378E41A33B2}</a:tableStyleId>
               </a:tblPr>
               <a:tblGrid>
                 <a:gridCol w="1695200"/>
@@ -27426,7 +27426,7 @@
             <a:tbl>
               <a:tblPr>
                 <a:noFill/>
-                <a:tableStyleId>{C75BC050-3C19-41D3-958A-A709838A6AC1}</a:tableStyleId>
+                <a:tableStyleId>{86A1A7EE-9A7A-468C-9D75-9378E41A33B2}</a:tableStyleId>
               </a:tblPr>
               <a:tblGrid>
                 <a:gridCol w="1695200"/>
@@ -28678,7 +28678,7 @@
             <a:tbl>
               <a:tblPr>
                 <a:noFill/>
-                <a:tableStyleId>{C75BC050-3C19-41D3-958A-A709838A6AC1}</a:tableStyleId>
+                <a:tableStyleId>{86A1A7EE-9A7A-468C-9D75-9378E41A33B2}</a:tableStyleId>
               </a:tblPr>
               <a:tblGrid>
                 <a:gridCol w="1695200"/>
@@ -29670,7 +29670,7 @@
             <a:tbl>
               <a:tblPr>
                 <a:noFill/>
-                <a:tableStyleId>{C75BC050-3C19-41D3-958A-A709838A6AC1}</a:tableStyleId>
+                <a:tableStyleId>{86A1A7EE-9A7A-468C-9D75-9378E41A33B2}</a:tableStyleId>
               </a:tblPr>
               <a:tblGrid>
                 <a:gridCol w="3048000"/>
@@ -33175,7 +33175,7 @@
             <a:tbl>
               <a:tblPr>
                 <a:noFill/>
-                <a:tableStyleId>{C75BC050-3C19-41D3-958A-A709838A6AC1}</a:tableStyleId>
+                <a:tableStyleId>{86A1A7EE-9A7A-468C-9D75-9378E41A33B2}</a:tableStyleId>
               </a:tblPr>
               <a:tblGrid>
                 <a:gridCol w="1828800"/>

</xml_diff>